<commit_message>
Minor clarification on encryption
</commit_message>
<xml_diff>
--- a/saturn/saturn-authorization.pptx
+++ b/saturn/saturn-authorization.pptx
@@ -309,7 +309,7 @@
           <a:p>
             <a:fld id="{E3744D7E-A5BB-4306-A750-C25515017678}" type="datetimeFigureOut">
               <a:rPr lang="en-US" smtClean="0"/>
-              <a:t>2017-03-27</a:t>
+              <a:t>2017-08-15</a:t>
             </a:fld>
             <a:endParaRPr lang="en-US"/>
           </a:p>
@@ -519,7 +519,7 @@
           <a:p>
             <a:fld id="{E3744D7E-A5BB-4306-A750-C25515017678}" type="datetimeFigureOut">
               <a:rPr lang="en-US" smtClean="0"/>
-              <a:t>2017-03-27</a:t>
+              <a:t>2017-08-15</a:t>
             </a:fld>
             <a:endParaRPr lang="en-US"/>
           </a:p>
@@ -736,7 +736,7 @@
           <a:p>
             <a:fld id="{E3744D7E-A5BB-4306-A750-C25515017678}" type="datetimeFigureOut">
               <a:rPr lang="en-US" smtClean="0"/>
-              <a:t>2017-03-27</a:t>
+              <a:t>2017-08-15</a:t>
             </a:fld>
             <a:endParaRPr lang="en-US"/>
           </a:p>
@@ -1001,7 +1001,7 @@
           <a:p>
             <a:fld id="{B880F04E-B60C-4530-BE27-DE08322B2422}" type="datetimeFigureOut">
               <a:rPr lang="en-US" smtClean="0"/>
-              <a:t>2017-03-27</a:t>
+              <a:t>2017-08-15</a:t>
             </a:fld>
             <a:endParaRPr lang="en-US"/>
           </a:p>
@@ -1171,7 +1171,7 @@
           <a:p>
             <a:fld id="{B880F04E-B60C-4530-BE27-DE08322B2422}" type="datetimeFigureOut">
               <a:rPr lang="en-US" smtClean="0"/>
-              <a:t>2017-03-27</a:t>
+              <a:t>2017-08-15</a:t>
             </a:fld>
             <a:endParaRPr lang="en-US"/>
           </a:p>
@@ -1417,7 +1417,7 @@
           <a:p>
             <a:fld id="{B880F04E-B60C-4530-BE27-DE08322B2422}" type="datetimeFigureOut">
               <a:rPr lang="en-US" smtClean="0"/>
-              <a:t>2017-03-27</a:t>
+              <a:t>2017-08-15</a:t>
             </a:fld>
             <a:endParaRPr lang="en-US"/>
           </a:p>
@@ -1705,7 +1705,7 @@
           <a:p>
             <a:fld id="{B880F04E-B60C-4530-BE27-DE08322B2422}" type="datetimeFigureOut">
               <a:rPr lang="en-US" smtClean="0"/>
-              <a:t>2017-03-27</a:t>
+              <a:t>2017-08-15</a:t>
             </a:fld>
             <a:endParaRPr lang="en-US"/>
           </a:p>
@@ -2127,7 +2127,7 @@
           <a:p>
             <a:fld id="{B880F04E-B60C-4530-BE27-DE08322B2422}" type="datetimeFigureOut">
               <a:rPr lang="en-US" smtClean="0"/>
-              <a:t>2017-03-27</a:t>
+              <a:t>2017-08-15</a:t>
             </a:fld>
             <a:endParaRPr lang="en-US"/>
           </a:p>
@@ -2245,7 +2245,7 @@
           <a:p>
             <a:fld id="{B880F04E-B60C-4530-BE27-DE08322B2422}" type="datetimeFigureOut">
               <a:rPr lang="en-US" smtClean="0"/>
-              <a:t>2017-03-27</a:t>
+              <a:t>2017-08-15</a:t>
             </a:fld>
             <a:endParaRPr lang="en-US"/>
           </a:p>
@@ -2340,7 +2340,7 @@
           <a:p>
             <a:fld id="{B880F04E-B60C-4530-BE27-DE08322B2422}" type="datetimeFigureOut">
               <a:rPr lang="en-US" smtClean="0"/>
-              <a:t>2017-03-27</a:t>
+              <a:t>2017-08-15</a:t>
             </a:fld>
             <a:endParaRPr lang="en-US"/>
           </a:p>
@@ -2617,7 +2617,7 @@
           <a:p>
             <a:fld id="{B880F04E-B60C-4530-BE27-DE08322B2422}" type="datetimeFigureOut">
               <a:rPr lang="en-US" smtClean="0"/>
-              <a:t>2017-03-27</a:t>
+              <a:t>2017-08-15</a:t>
             </a:fld>
             <a:endParaRPr lang="en-US"/>
           </a:p>
@@ -2811,7 +2811,7 @@
           <a:p>
             <a:fld id="{E3744D7E-A5BB-4306-A750-C25515017678}" type="datetimeFigureOut">
               <a:rPr lang="en-US" smtClean="0"/>
-              <a:t>2017-03-27</a:t>
+              <a:t>2017-08-15</a:t>
             </a:fld>
             <a:endParaRPr lang="en-US"/>
           </a:p>
@@ -3080,7 +3080,7 @@
           <a:p>
             <a:fld id="{B880F04E-B60C-4530-BE27-DE08322B2422}" type="datetimeFigureOut">
               <a:rPr lang="en-US" smtClean="0"/>
-              <a:t>2017-03-27</a:t>
+              <a:t>2017-08-15</a:t>
             </a:fld>
             <a:endParaRPr lang="en-US"/>
           </a:p>
@@ -3250,7 +3250,7 @@
           <a:p>
             <a:fld id="{B880F04E-B60C-4530-BE27-DE08322B2422}" type="datetimeFigureOut">
               <a:rPr lang="en-US" smtClean="0"/>
-              <a:t>2017-03-27</a:t>
+              <a:t>2017-08-15</a:t>
             </a:fld>
             <a:endParaRPr lang="en-US"/>
           </a:p>
@@ -3430,7 +3430,7 @@
           <a:p>
             <a:fld id="{B880F04E-B60C-4530-BE27-DE08322B2422}" type="datetimeFigureOut">
               <a:rPr lang="en-US" smtClean="0"/>
-              <a:t>2017-03-27</a:t>
+              <a:t>2017-08-15</a:t>
             </a:fld>
             <a:endParaRPr lang="en-US"/>
           </a:p>
@@ -3672,7 +3672,7 @@
           <a:p>
             <a:fld id="{C5690C41-1B19-4491-A062-33F2F29E9A8D}" type="datetimeFigureOut">
               <a:rPr lang="en-US" smtClean="0"/>
-              <a:t>2017-03-27</a:t>
+              <a:t>2017-08-15</a:t>
             </a:fld>
             <a:endParaRPr lang="en-US"/>
           </a:p>
@@ -3842,7 +3842,7 @@
           <a:p>
             <a:fld id="{C5690C41-1B19-4491-A062-33F2F29E9A8D}" type="datetimeFigureOut">
               <a:rPr lang="en-US" smtClean="0"/>
-              <a:t>2017-03-27</a:t>
+              <a:t>2017-08-15</a:t>
             </a:fld>
             <a:endParaRPr lang="en-US"/>
           </a:p>
@@ -4088,7 +4088,7 @@
           <a:p>
             <a:fld id="{C5690C41-1B19-4491-A062-33F2F29E9A8D}" type="datetimeFigureOut">
               <a:rPr lang="en-US" smtClean="0"/>
-              <a:t>2017-03-27</a:t>
+              <a:t>2017-08-15</a:t>
             </a:fld>
             <a:endParaRPr lang="en-US"/>
           </a:p>
@@ -4376,7 +4376,7 @@
           <a:p>
             <a:fld id="{C5690C41-1B19-4491-A062-33F2F29E9A8D}" type="datetimeFigureOut">
               <a:rPr lang="en-US" smtClean="0"/>
-              <a:t>2017-03-27</a:t>
+              <a:t>2017-08-15</a:t>
             </a:fld>
             <a:endParaRPr lang="en-US"/>
           </a:p>
@@ -4798,7 +4798,7 @@
           <a:p>
             <a:fld id="{C5690C41-1B19-4491-A062-33F2F29E9A8D}" type="datetimeFigureOut">
               <a:rPr lang="en-US" smtClean="0"/>
-              <a:t>2017-03-27</a:t>
+              <a:t>2017-08-15</a:t>
             </a:fld>
             <a:endParaRPr lang="en-US"/>
           </a:p>
@@ -4916,7 +4916,7 @@
           <a:p>
             <a:fld id="{C5690C41-1B19-4491-A062-33F2F29E9A8D}" type="datetimeFigureOut">
               <a:rPr lang="en-US" smtClean="0"/>
-              <a:t>2017-03-27</a:t>
+              <a:t>2017-08-15</a:t>
             </a:fld>
             <a:endParaRPr lang="en-US"/>
           </a:p>
@@ -5011,7 +5011,7 @@
           <a:p>
             <a:fld id="{C5690C41-1B19-4491-A062-33F2F29E9A8D}" type="datetimeFigureOut">
               <a:rPr lang="en-US" smtClean="0"/>
-              <a:t>2017-03-27</a:t>
+              <a:t>2017-08-15</a:t>
             </a:fld>
             <a:endParaRPr lang="en-US"/>
           </a:p>
@@ -5271,7 +5271,7 @@
           <a:p>
             <a:fld id="{E3744D7E-A5BB-4306-A750-C25515017678}" type="datetimeFigureOut">
               <a:rPr lang="en-US" smtClean="0"/>
-              <a:t>2017-03-27</a:t>
+              <a:t>2017-08-15</a:t>
             </a:fld>
             <a:endParaRPr lang="en-US"/>
           </a:p>
@@ -5564,7 +5564,7 @@
           <a:p>
             <a:fld id="{C5690C41-1B19-4491-A062-33F2F29E9A8D}" type="datetimeFigureOut">
               <a:rPr lang="en-US" smtClean="0"/>
-              <a:t>2017-03-27</a:t>
+              <a:t>2017-08-15</a:t>
             </a:fld>
             <a:endParaRPr lang="en-US"/>
           </a:p>
@@ -5817,7 +5817,7 @@
           <a:p>
             <a:fld id="{C5690C41-1B19-4491-A062-33F2F29E9A8D}" type="datetimeFigureOut">
               <a:rPr lang="en-US" smtClean="0"/>
-              <a:t>2017-03-27</a:t>
+              <a:t>2017-08-15</a:t>
             </a:fld>
             <a:endParaRPr lang="en-US"/>
           </a:p>
@@ -5987,7 +5987,7 @@
           <a:p>
             <a:fld id="{C5690C41-1B19-4491-A062-33F2F29E9A8D}" type="datetimeFigureOut">
               <a:rPr lang="en-US" smtClean="0"/>
-              <a:t>2017-03-27</a:t>
+              <a:t>2017-08-15</a:t>
             </a:fld>
             <a:endParaRPr lang="en-US"/>
           </a:p>
@@ -6167,7 +6167,7 @@
           <a:p>
             <a:fld id="{C5690C41-1B19-4491-A062-33F2F29E9A8D}" type="datetimeFigureOut">
               <a:rPr lang="en-US" smtClean="0"/>
-              <a:t>2017-03-27</a:t>
+              <a:t>2017-08-15</a:t>
             </a:fld>
             <a:endParaRPr lang="en-US"/>
           </a:p>
@@ -6409,7 +6409,7 @@
           <a:p>
             <a:fld id="{23D18025-B22E-453D-AA62-4A08DAEF541F}" type="datetimeFigureOut">
               <a:rPr lang="en-US" smtClean="0"/>
-              <a:t>2017-03-27</a:t>
+              <a:t>2017-08-15</a:t>
             </a:fld>
             <a:endParaRPr lang="en-US"/>
           </a:p>
@@ -6579,7 +6579,7 @@
           <a:p>
             <a:fld id="{23D18025-B22E-453D-AA62-4A08DAEF541F}" type="datetimeFigureOut">
               <a:rPr lang="en-US" smtClean="0"/>
-              <a:t>2017-03-27</a:t>
+              <a:t>2017-08-15</a:t>
             </a:fld>
             <a:endParaRPr lang="en-US"/>
           </a:p>
@@ -6825,7 +6825,7 @@
           <a:p>
             <a:fld id="{23D18025-B22E-453D-AA62-4A08DAEF541F}" type="datetimeFigureOut">
               <a:rPr lang="en-US" smtClean="0"/>
-              <a:t>2017-03-27</a:t>
+              <a:t>2017-08-15</a:t>
             </a:fld>
             <a:endParaRPr lang="en-US"/>
           </a:p>
@@ -7113,7 +7113,7 @@
           <a:p>
             <a:fld id="{23D18025-B22E-453D-AA62-4A08DAEF541F}" type="datetimeFigureOut">
               <a:rPr lang="en-US" smtClean="0"/>
-              <a:t>2017-03-27</a:t>
+              <a:t>2017-08-15</a:t>
             </a:fld>
             <a:endParaRPr lang="en-US"/>
           </a:p>
@@ -7535,7 +7535,7 @@
           <a:p>
             <a:fld id="{23D18025-B22E-453D-AA62-4A08DAEF541F}" type="datetimeFigureOut">
               <a:rPr lang="en-US" smtClean="0"/>
-              <a:t>2017-03-27</a:t>
+              <a:t>2017-08-15</a:t>
             </a:fld>
             <a:endParaRPr lang="en-US"/>
           </a:p>
@@ -7653,7 +7653,7 @@
           <a:p>
             <a:fld id="{23D18025-B22E-453D-AA62-4A08DAEF541F}" type="datetimeFigureOut">
               <a:rPr lang="en-US" smtClean="0"/>
-              <a:t>2017-03-27</a:t>
+              <a:t>2017-08-15</a:t>
             </a:fld>
             <a:endParaRPr lang="en-US"/>
           </a:p>
@@ -7963,7 +7963,7 @@
           <a:p>
             <a:fld id="{E3744D7E-A5BB-4306-A750-C25515017678}" type="datetimeFigureOut">
               <a:rPr lang="en-US" smtClean="0"/>
-              <a:t>2017-03-27</a:t>
+              <a:t>2017-08-15</a:t>
             </a:fld>
             <a:endParaRPr lang="en-US"/>
           </a:p>
@@ -8074,7 +8074,7 @@
           <a:p>
             <a:fld id="{23D18025-B22E-453D-AA62-4A08DAEF541F}" type="datetimeFigureOut">
               <a:rPr lang="en-US" smtClean="0"/>
-              <a:t>2017-03-27</a:t>
+              <a:t>2017-08-15</a:t>
             </a:fld>
             <a:endParaRPr lang="en-US"/>
           </a:p>
@@ -8351,7 +8351,7 @@
           <a:p>
             <a:fld id="{23D18025-B22E-453D-AA62-4A08DAEF541F}" type="datetimeFigureOut">
               <a:rPr lang="en-US" smtClean="0"/>
-              <a:t>2017-03-27</a:t>
+              <a:t>2017-08-15</a:t>
             </a:fld>
             <a:endParaRPr lang="en-US"/>
           </a:p>
@@ -8604,7 +8604,7 @@
           <a:p>
             <a:fld id="{23D18025-B22E-453D-AA62-4A08DAEF541F}" type="datetimeFigureOut">
               <a:rPr lang="en-US" smtClean="0"/>
-              <a:t>2017-03-27</a:t>
+              <a:t>2017-08-15</a:t>
             </a:fld>
             <a:endParaRPr lang="en-US"/>
           </a:p>
@@ -8774,7 +8774,7 @@
           <a:p>
             <a:fld id="{23D18025-B22E-453D-AA62-4A08DAEF541F}" type="datetimeFigureOut">
               <a:rPr lang="en-US" smtClean="0"/>
-              <a:t>2017-03-27</a:t>
+              <a:t>2017-08-15</a:t>
             </a:fld>
             <a:endParaRPr lang="en-US"/>
           </a:p>
@@ -8954,7 +8954,7 @@
           <a:p>
             <a:fld id="{23D18025-B22E-453D-AA62-4A08DAEF541F}" type="datetimeFigureOut">
               <a:rPr lang="en-US" smtClean="0"/>
-              <a:t>2017-03-27</a:t>
+              <a:t>2017-08-15</a:t>
             </a:fld>
             <a:endParaRPr lang="en-US"/>
           </a:p>
@@ -9196,7 +9196,7 @@
           <a:p>
             <a:fld id="{5A29F1F3-0306-4ADD-8575-5F845BC34EA0}" type="datetimeFigureOut">
               <a:rPr lang="en-US" smtClean="0"/>
-              <a:t>2017-03-27</a:t>
+              <a:t>2017-08-15</a:t>
             </a:fld>
             <a:endParaRPr lang="en-US"/>
           </a:p>
@@ -9366,7 +9366,7 @@
           <a:p>
             <a:fld id="{5A29F1F3-0306-4ADD-8575-5F845BC34EA0}" type="datetimeFigureOut">
               <a:rPr lang="en-US" smtClean="0"/>
-              <a:t>2017-03-27</a:t>
+              <a:t>2017-08-15</a:t>
             </a:fld>
             <a:endParaRPr lang="en-US"/>
           </a:p>
@@ -9612,7 +9612,7 @@
           <a:p>
             <a:fld id="{5A29F1F3-0306-4ADD-8575-5F845BC34EA0}" type="datetimeFigureOut">
               <a:rPr lang="en-US" smtClean="0"/>
-              <a:t>2017-03-27</a:t>
+              <a:t>2017-08-15</a:t>
             </a:fld>
             <a:endParaRPr lang="en-US"/>
           </a:p>
@@ -9900,7 +9900,7 @@
           <a:p>
             <a:fld id="{5A29F1F3-0306-4ADD-8575-5F845BC34EA0}" type="datetimeFigureOut">
               <a:rPr lang="en-US" smtClean="0"/>
-              <a:t>2017-03-27</a:t>
+              <a:t>2017-08-15</a:t>
             </a:fld>
             <a:endParaRPr lang="en-US"/>
           </a:p>
@@ -10322,7 +10322,7 @@
           <a:p>
             <a:fld id="{5A29F1F3-0306-4ADD-8575-5F845BC34EA0}" type="datetimeFigureOut">
               <a:rPr lang="en-US" smtClean="0"/>
-              <a:t>2017-03-27</a:t>
+              <a:t>2017-08-15</a:t>
             </a:fld>
             <a:endParaRPr lang="en-US"/>
           </a:p>
@@ -10772,7 +10772,7 @@
           <a:p>
             <a:fld id="{E3744D7E-A5BB-4306-A750-C25515017678}" type="datetimeFigureOut">
               <a:rPr lang="en-US" smtClean="0"/>
-              <a:t>2017-03-27</a:t>
+              <a:t>2017-08-15</a:t>
             </a:fld>
             <a:endParaRPr lang="en-US"/>
           </a:p>
@@ -10906,7 +10906,7 @@
           <a:p>
             <a:fld id="{5A29F1F3-0306-4ADD-8575-5F845BC34EA0}" type="datetimeFigureOut">
               <a:rPr lang="en-US" smtClean="0"/>
-              <a:t>2017-03-27</a:t>
+              <a:t>2017-08-15</a:t>
             </a:fld>
             <a:endParaRPr lang="en-US"/>
           </a:p>
@@ -11001,7 +11001,7 @@
           <a:p>
             <a:fld id="{5A29F1F3-0306-4ADD-8575-5F845BC34EA0}" type="datetimeFigureOut">
               <a:rPr lang="en-US" smtClean="0"/>
-              <a:t>2017-03-27</a:t>
+              <a:t>2017-08-15</a:t>
             </a:fld>
             <a:endParaRPr lang="en-US"/>
           </a:p>
@@ -11278,7 +11278,7 @@
           <a:p>
             <a:fld id="{5A29F1F3-0306-4ADD-8575-5F845BC34EA0}" type="datetimeFigureOut">
               <a:rPr lang="en-US" smtClean="0"/>
-              <a:t>2017-03-27</a:t>
+              <a:t>2017-08-15</a:t>
             </a:fld>
             <a:endParaRPr lang="en-US"/>
           </a:p>
@@ -11531,7 +11531,7 @@
           <a:p>
             <a:fld id="{5A29F1F3-0306-4ADD-8575-5F845BC34EA0}" type="datetimeFigureOut">
               <a:rPr lang="en-US" smtClean="0"/>
-              <a:t>2017-03-27</a:t>
+              <a:t>2017-08-15</a:t>
             </a:fld>
             <a:endParaRPr lang="en-US"/>
           </a:p>
@@ -11701,7 +11701,7 @@
           <a:p>
             <a:fld id="{5A29F1F3-0306-4ADD-8575-5F845BC34EA0}" type="datetimeFigureOut">
               <a:rPr lang="en-US" smtClean="0"/>
-              <a:t>2017-03-27</a:t>
+              <a:t>2017-08-15</a:t>
             </a:fld>
             <a:endParaRPr lang="en-US"/>
           </a:p>
@@ -11881,7 +11881,7 @@
           <a:p>
             <a:fld id="{5A29F1F3-0306-4ADD-8575-5F845BC34EA0}" type="datetimeFigureOut">
               <a:rPr lang="en-US" smtClean="0"/>
-              <a:t>2017-03-27</a:t>
+              <a:t>2017-08-15</a:t>
             </a:fld>
             <a:endParaRPr lang="en-US"/>
           </a:p>
@@ -12123,7 +12123,7 @@
           <a:p>
             <a:fld id="{2CD378D0-82C9-47C6-BEE5-E347AC6F0A5E}" type="datetimeFigureOut">
               <a:rPr lang="en-US" smtClean="0"/>
-              <a:t>2017-03-27</a:t>
+              <a:t>2017-08-15</a:t>
             </a:fld>
             <a:endParaRPr lang="en-US"/>
           </a:p>
@@ -12293,7 +12293,7 @@
           <a:p>
             <a:fld id="{2CD378D0-82C9-47C6-BEE5-E347AC6F0A5E}" type="datetimeFigureOut">
               <a:rPr lang="en-US" smtClean="0"/>
-              <a:t>2017-03-27</a:t>
+              <a:t>2017-08-15</a:t>
             </a:fld>
             <a:endParaRPr lang="en-US"/>
           </a:p>
@@ -12539,7 +12539,7 @@
           <a:p>
             <a:fld id="{2CD378D0-82C9-47C6-BEE5-E347AC6F0A5E}" type="datetimeFigureOut">
               <a:rPr lang="en-US" smtClean="0"/>
-              <a:t>2017-03-27</a:t>
+              <a:t>2017-08-15</a:t>
             </a:fld>
             <a:endParaRPr lang="en-US"/>
           </a:p>
@@ -12827,7 +12827,7 @@
           <a:p>
             <a:fld id="{2CD378D0-82C9-47C6-BEE5-E347AC6F0A5E}" type="datetimeFigureOut">
               <a:rPr lang="en-US" smtClean="0"/>
-              <a:t>2017-03-27</a:t>
+              <a:t>2017-08-15</a:t>
             </a:fld>
             <a:endParaRPr lang="en-US"/>
           </a:p>
@@ -12961,7 +12961,7 @@
           <a:p>
             <a:fld id="{E3744D7E-A5BB-4306-A750-C25515017678}" type="datetimeFigureOut">
               <a:rPr lang="en-US" smtClean="0"/>
-              <a:t>2017-03-27</a:t>
+              <a:t>2017-08-15</a:t>
             </a:fld>
             <a:endParaRPr lang="en-US"/>
           </a:p>
@@ -13399,7 +13399,7 @@
           <a:p>
             <a:fld id="{2CD378D0-82C9-47C6-BEE5-E347AC6F0A5E}" type="datetimeFigureOut">
               <a:rPr lang="en-US" smtClean="0"/>
-              <a:t>2017-03-27</a:t>
+              <a:t>2017-08-15</a:t>
             </a:fld>
             <a:endParaRPr lang="en-US"/>
           </a:p>
@@ -13517,7 +13517,7 @@
           <a:p>
             <a:fld id="{2CD378D0-82C9-47C6-BEE5-E347AC6F0A5E}" type="datetimeFigureOut">
               <a:rPr lang="en-US" smtClean="0"/>
-              <a:t>2017-03-27</a:t>
+              <a:t>2017-08-15</a:t>
             </a:fld>
             <a:endParaRPr lang="en-US"/>
           </a:p>
@@ -13612,7 +13612,7 @@
           <a:p>
             <a:fld id="{2CD378D0-82C9-47C6-BEE5-E347AC6F0A5E}" type="datetimeFigureOut">
               <a:rPr lang="en-US" smtClean="0"/>
-              <a:t>2017-03-27</a:t>
+              <a:t>2017-08-15</a:t>
             </a:fld>
             <a:endParaRPr lang="en-US"/>
           </a:p>
@@ -13889,7 +13889,7 @@
           <a:p>
             <a:fld id="{2CD378D0-82C9-47C6-BEE5-E347AC6F0A5E}" type="datetimeFigureOut">
               <a:rPr lang="en-US" smtClean="0"/>
-              <a:t>2017-03-27</a:t>
+              <a:t>2017-08-15</a:t>
             </a:fld>
             <a:endParaRPr lang="en-US"/>
           </a:p>
@@ -14142,7 +14142,7 @@
           <a:p>
             <a:fld id="{2CD378D0-82C9-47C6-BEE5-E347AC6F0A5E}" type="datetimeFigureOut">
               <a:rPr lang="en-US" smtClean="0"/>
-              <a:t>2017-03-27</a:t>
+              <a:t>2017-08-15</a:t>
             </a:fld>
             <a:endParaRPr lang="en-US"/>
           </a:p>
@@ -14312,7 +14312,7 @@
           <a:p>
             <a:fld id="{2CD378D0-82C9-47C6-BEE5-E347AC6F0A5E}" type="datetimeFigureOut">
               <a:rPr lang="en-US" smtClean="0"/>
-              <a:t>2017-03-27</a:t>
+              <a:t>2017-08-15</a:t>
             </a:fld>
             <a:endParaRPr lang="en-US"/>
           </a:p>
@@ -14492,7 +14492,7 @@
           <a:p>
             <a:fld id="{2CD378D0-82C9-47C6-BEE5-E347AC6F0A5E}" type="datetimeFigureOut">
               <a:rPr lang="en-US" smtClean="0"/>
-              <a:t>2017-03-27</a:t>
+              <a:t>2017-08-15</a:t>
             </a:fld>
             <a:endParaRPr lang="en-US"/>
           </a:p>
@@ -14734,7 +14734,7 @@
           <a:p>
             <a:fld id="{B96FFCCF-F4AB-4D56-AEE8-39DF7F28FF62}" type="datetimeFigureOut">
               <a:rPr lang="en-US" smtClean="0"/>
-              <a:t>2017-03-27</a:t>
+              <a:t>2017-08-15</a:t>
             </a:fld>
             <a:endParaRPr lang="en-US"/>
           </a:p>
@@ -14904,7 +14904,7 @@
           <a:p>
             <a:fld id="{B96FFCCF-F4AB-4D56-AEE8-39DF7F28FF62}" type="datetimeFigureOut">
               <a:rPr lang="en-US" smtClean="0"/>
-              <a:t>2017-03-27</a:t>
+              <a:t>2017-08-15</a:t>
             </a:fld>
             <a:endParaRPr lang="en-US"/>
           </a:p>
@@ -15150,7 +15150,7 @@
           <a:p>
             <a:fld id="{B96FFCCF-F4AB-4D56-AEE8-39DF7F28FF62}" type="datetimeFigureOut">
               <a:rPr lang="en-US" smtClean="0"/>
-              <a:t>2017-03-27</a:t>
+              <a:t>2017-08-15</a:t>
             </a:fld>
             <a:endParaRPr lang="en-US"/>
           </a:p>
@@ -15253,7 +15253,7 @@
           <a:p>
             <a:fld id="{E3744D7E-A5BB-4306-A750-C25515017678}" type="datetimeFigureOut">
               <a:rPr lang="en-US" smtClean="0"/>
-              <a:t>2017-03-27</a:t>
+              <a:t>2017-08-15</a:t>
             </a:fld>
             <a:endParaRPr lang="en-US"/>
           </a:p>
@@ -15564,7 +15564,7 @@
           <a:p>
             <a:fld id="{B96FFCCF-F4AB-4D56-AEE8-39DF7F28FF62}" type="datetimeFigureOut">
               <a:rPr lang="en-US" smtClean="0"/>
-              <a:t>2017-03-27</a:t>
+              <a:t>2017-08-15</a:t>
             </a:fld>
             <a:endParaRPr lang="en-US"/>
           </a:p>
@@ -15986,7 +15986,7 @@
           <a:p>
             <a:fld id="{B96FFCCF-F4AB-4D56-AEE8-39DF7F28FF62}" type="datetimeFigureOut">
               <a:rPr lang="en-US" smtClean="0"/>
-              <a:t>2017-03-27</a:t>
+              <a:t>2017-08-15</a:t>
             </a:fld>
             <a:endParaRPr lang="en-US"/>
           </a:p>
@@ -16104,7 +16104,7 @@
           <a:p>
             <a:fld id="{B96FFCCF-F4AB-4D56-AEE8-39DF7F28FF62}" type="datetimeFigureOut">
               <a:rPr lang="en-US" smtClean="0"/>
-              <a:t>2017-03-27</a:t>
+              <a:t>2017-08-15</a:t>
             </a:fld>
             <a:endParaRPr lang="en-US"/>
           </a:p>
@@ -16199,7 +16199,7 @@
           <a:p>
             <a:fld id="{B96FFCCF-F4AB-4D56-AEE8-39DF7F28FF62}" type="datetimeFigureOut">
               <a:rPr lang="en-US" smtClean="0"/>
-              <a:t>2017-03-27</a:t>
+              <a:t>2017-08-15</a:t>
             </a:fld>
             <a:endParaRPr lang="en-US"/>
           </a:p>
@@ -16476,7 +16476,7 @@
           <a:p>
             <a:fld id="{B96FFCCF-F4AB-4D56-AEE8-39DF7F28FF62}" type="datetimeFigureOut">
               <a:rPr lang="en-US" smtClean="0"/>
-              <a:t>2017-03-27</a:t>
+              <a:t>2017-08-15</a:t>
             </a:fld>
             <a:endParaRPr lang="en-US"/>
           </a:p>
@@ -16729,7 +16729,7 @@
           <a:p>
             <a:fld id="{B96FFCCF-F4AB-4D56-AEE8-39DF7F28FF62}" type="datetimeFigureOut">
               <a:rPr lang="en-US" smtClean="0"/>
-              <a:t>2017-03-27</a:t>
+              <a:t>2017-08-15</a:t>
             </a:fld>
             <a:endParaRPr lang="en-US"/>
           </a:p>
@@ -16899,7 +16899,7 @@
           <a:p>
             <a:fld id="{B96FFCCF-F4AB-4D56-AEE8-39DF7F28FF62}" type="datetimeFigureOut">
               <a:rPr lang="en-US" smtClean="0"/>
-              <a:t>2017-03-27</a:t>
+              <a:t>2017-08-15</a:t>
             </a:fld>
             <a:endParaRPr lang="en-US"/>
           </a:p>
@@ -17079,7 +17079,7 @@
           <a:p>
             <a:fld id="{B96FFCCF-F4AB-4D56-AEE8-39DF7F28FF62}" type="datetimeFigureOut">
               <a:rPr lang="en-US" smtClean="0"/>
-              <a:t>2017-03-27</a:t>
+              <a:t>2017-08-15</a:t>
             </a:fld>
             <a:endParaRPr lang="en-US"/>
           </a:p>
@@ -17321,7 +17321,7 @@
           <a:p>
             <a:fld id="{E90DB797-294B-4B2B-9A48-229F3ACF3E1A}" type="datetimeFigureOut">
               <a:rPr lang="en-US" smtClean="0"/>
-              <a:t>2017-03-27</a:t>
+              <a:t>2017-08-15</a:t>
             </a:fld>
             <a:endParaRPr lang="en-US"/>
           </a:p>
@@ -17491,7 +17491,7 @@
           <a:p>
             <a:fld id="{E90DB797-294B-4B2B-9A48-229F3ACF3E1A}" type="datetimeFigureOut">
               <a:rPr lang="en-US" smtClean="0"/>
-              <a:t>2017-03-27</a:t>
+              <a:t>2017-08-15</a:t>
             </a:fld>
             <a:endParaRPr lang="en-US"/>
           </a:p>
@@ -17785,7 +17785,7 @@
           <a:p>
             <a:fld id="{E3744D7E-A5BB-4306-A750-C25515017678}" type="datetimeFigureOut">
               <a:rPr lang="en-US" smtClean="0"/>
-              <a:t>2017-03-27</a:t>
+              <a:t>2017-08-15</a:t>
             </a:fld>
             <a:endParaRPr lang="en-US"/>
           </a:p>
@@ -18047,7 +18047,7 @@
           <a:p>
             <a:fld id="{E90DB797-294B-4B2B-9A48-229F3ACF3E1A}" type="datetimeFigureOut">
               <a:rPr lang="en-US" smtClean="0"/>
-              <a:t>2017-03-27</a:t>
+              <a:t>2017-08-15</a:t>
             </a:fld>
             <a:endParaRPr lang="en-US"/>
           </a:p>
@@ -18335,7 +18335,7 @@
           <a:p>
             <a:fld id="{E90DB797-294B-4B2B-9A48-229F3ACF3E1A}" type="datetimeFigureOut">
               <a:rPr lang="en-US" smtClean="0"/>
-              <a:t>2017-03-27</a:t>
+              <a:t>2017-08-15</a:t>
             </a:fld>
             <a:endParaRPr lang="en-US"/>
           </a:p>
@@ -18757,7 +18757,7 @@
           <a:p>
             <a:fld id="{E90DB797-294B-4B2B-9A48-229F3ACF3E1A}" type="datetimeFigureOut">
               <a:rPr lang="en-US" smtClean="0"/>
-              <a:t>2017-03-27</a:t>
+              <a:t>2017-08-15</a:t>
             </a:fld>
             <a:endParaRPr lang="en-US"/>
           </a:p>
@@ -18875,7 +18875,7 @@
           <a:p>
             <a:fld id="{E90DB797-294B-4B2B-9A48-229F3ACF3E1A}" type="datetimeFigureOut">
               <a:rPr lang="en-US" smtClean="0"/>
-              <a:t>2017-03-27</a:t>
+              <a:t>2017-08-15</a:t>
             </a:fld>
             <a:endParaRPr lang="en-US"/>
           </a:p>
@@ -18970,7 +18970,7 @@
           <a:p>
             <a:fld id="{E90DB797-294B-4B2B-9A48-229F3ACF3E1A}" type="datetimeFigureOut">
               <a:rPr lang="en-US" smtClean="0"/>
-              <a:t>2017-03-27</a:t>
+              <a:t>2017-08-15</a:t>
             </a:fld>
             <a:endParaRPr lang="en-US"/>
           </a:p>
@@ -19247,7 +19247,7 @@
           <a:p>
             <a:fld id="{E90DB797-294B-4B2B-9A48-229F3ACF3E1A}" type="datetimeFigureOut">
               <a:rPr lang="en-US" smtClean="0"/>
-              <a:t>2017-03-27</a:t>
+              <a:t>2017-08-15</a:t>
             </a:fld>
             <a:endParaRPr lang="en-US"/>
           </a:p>
@@ -19500,7 +19500,7 @@
           <a:p>
             <a:fld id="{E90DB797-294B-4B2B-9A48-229F3ACF3E1A}" type="datetimeFigureOut">
               <a:rPr lang="en-US" smtClean="0"/>
-              <a:t>2017-03-27</a:t>
+              <a:t>2017-08-15</a:t>
             </a:fld>
             <a:endParaRPr lang="en-US"/>
           </a:p>
@@ -19670,7 +19670,7 @@
           <a:p>
             <a:fld id="{E90DB797-294B-4B2B-9A48-229F3ACF3E1A}" type="datetimeFigureOut">
               <a:rPr lang="en-US" smtClean="0"/>
-              <a:t>2017-03-27</a:t>
+              <a:t>2017-08-15</a:t>
             </a:fld>
             <a:endParaRPr lang="en-US"/>
           </a:p>
@@ -19850,7 +19850,7 @@
           <a:p>
             <a:fld id="{E90DB797-294B-4B2B-9A48-229F3ACF3E1A}" type="datetimeFigureOut">
               <a:rPr lang="en-US" smtClean="0"/>
-              <a:t>2017-03-27</a:t>
+              <a:t>2017-08-15</a:t>
             </a:fld>
             <a:endParaRPr lang="en-US"/>
           </a:p>
@@ -20120,7 +20120,7 @@
           <a:p>
             <a:fld id="{E3744D7E-A5BB-4306-A750-C25515017678}" type="datetimeFigureOut">
               <a:rPr lang="en-US" smtClean="0"/>
-              <a:t>2017-03-27</a:t>
+              <a:t>2017-08-15</a:t>
             </a:fld>
             <a:endParaRPr lang="en-US"/>
           </a:p>
@@ -20652,7 +20652,7 @@
           <a:p>
             <a:fld id="{B880F04E-B60C-4530-BE27-DE08322B2422}" type="datetimeFigureOut">
               <a:rPr lang="en-US" smtClean="0"/>
-              <a:t>2017-03-27</a:t>
+              <a:t>2017-08-15</a:t>
             </a:fld>
             <a:endParaRPr lang="en-US"/>
           </a:p>
@@ -21162,7 +21162,7 @@
           <a:p>
             <a:fld id="{C5690C41-1B19-4491-A062-33F2F29E9A8D}" type="datetimeFigureOut">
               <a:rPr lang="en-US" smtClean="0"/>
-              <a:t>2017-03-27</a:t>
+              <a:t>2017-08-15</a:t>
             </a:fld>
             <a:endParaRPr lang="en-US"/>
           </a:p>
@@ -21672,7 +21672,7 @@
           <a:p>
             <a:fld id="{23D18025-B22E-453D-AA62-4A08DAEF541F}" type="datetimeFigureOut">
               <a:rPr lang="en-US" smtClean="0"/>
-              <a:t>2017-03-27</a:t>
+              <a:t>2017-08-15</a:t>
             </a:fld>
             <a:endParaRPr lang="en-US"/>
           </a:p>
@@ -22182,7 +22182,7 @@
           <a:p>
             <a:fld id="{5A29F1F3-0306-4ADD-8575-5F845BC34EA0}" type="datetimeFigureOut">
               <a:rPr lang="en-US" smtClean="0"/>
-              <a:t>2017-03-27</a:t>
+              <a:t>2017-08-15</a:t>
             </a:fld>
             <a:endParaRPr lang="en-US"/>
           </a:p>
@@ -22692,7 +22692,7 @@
           <a:p>
             <a:fld id="{2CD378D0-82C9-47C6-BEE5-E347AC6F0A5E}" type="datetimeFigureOut">
               <a:rPr lang="en-US" smtClean="0"/>
-              <a:t>2017-03-27</a:t>
+              <a:t>2017-08-15</a:t>
             </a:fld>
             <a:endParaRPr lang="en-US"/>
           </a:p>
@@ -23202,7 +23202,7 @@
           <a:p>
             <a:fld id="{B96FFCCF-F4AB-4D56-AEE8-39DF7F28FF62}" type="datetimeFigureOut">
               <a:rPr lang="en-US" smtClean="0"/>
-              <a:t>2017-03-27</a:t>
+              <a:t>2017-08-15</a:t>
             </a:fld>
             <a:endParaRPr lang="en-US"/>
           </a:p>
@@ -23712,7 +23712,7 @@
           <a:p>
             <a:fld id="{E90DB797-294B-4B2B-9A48-229F3ACF3E1A}" type="datetimeFigureOut">
               <a:rPr lang="en-US" smtClean="0"/>
-              <a:t>2017-03-27</a:t>
+              <a:t>2017-08-15</a:t>
             </a:fld>
             <a:endParaRPr lang="en-US"/>
           </a:p>
@@ -24102,8 +24102,8 @@
         </p:nvCxnSpPr>
         <p:spPr>
           <a:xfrm>
-            <a:off x="5074615" y="861548"/>
-            <a:ext cx="0" cy="3132000"/>
+            <a:off x="5074615" y="945072"/>
+            <a:ext cx="0" cy="3060000"/>
           </a:xfrm>
           <a:prstGeom prst="line">
             <a:avLst/>
@@ -26780,7 +26780,7 @@
           </a:stretch>
         </p:blipFill>
         <p:spPr bwMode="auto">
-          <a:xfrm rot="5400000">
+          <a:xfrm rot="10800000">
             <a:off x="4887105" y="467737"/>
             <a:ext cx="355673" cy="502719"/>
           </a:xfrm>
@@ -27113,8 +27113,8 @@
         </p:nvSpPr>
         <p:spPr>
           <a:xfrm>
-            <a:off x="7307897" y="3222149"/>
-            <a:ext cx="1050288" cy="246221"/>
+            <a:off x="7396736" y="3222149"/>
+            <a:ext cx="837089" cy="400110"/>
           </a:xfrm>
           <a:prstGeom prst="rect">
             <a:avLst/>
@@ -27132,7 +27132,34 @@
                 <a:latin typeface="Arial" panose="020B0604020202020204" pitchFamily="34" charset="0"/>
                 <a:cs typeface="Arial" panose="020B0604020202020204" pitchFamily="34" charset="0"/>
               </a:rPr>
-              <a:t>Decryption Key</a:t>
+              <a:t>En</a:t>
+            </a:r>
+            <a:r>
+              <a:rPr lang="en-US" sz="1000" dirty="0" smtClean="0">
+                <a:latin typeface="Arial" panose="020B0604020202020204" pitchFamily="34" charset="0"/>
+                <a:cs typeface="Arial" panose="020B0604020202020204" pitchFamily="34" charset="0"/>
+              </a:rPr>
+              <a:t>cryption </a:t>
+            </a:r>
+            <a:br>
+              <a:rPr lang="en-US" sz="1000" dirty="0" smtClean="0">
+                <a:latin typeface="Arial" panose="020B0604020202020204" pitchFamily="34" charset="0"/>
+                <a:cs typeface="Arial" panose="020B0604020202020204" pitchFamily="34" charset="0"/>
+              </a:rPr>
+            </a:br>
+            <a:r>
+              <a:rPr lang="en-US" sz="1000" i="1" dirty="0" smtClean="0">
+                <a:latin typeface="Arial" panose="020B0604020202020204" pitchFamily="34" charset="0"/>
+                <a:cs typeface="Arial" panose="020B0604020202020204" pitchFamily="34" charset="0"/>
+              </a:rPr>
+              <a:t>Private</a:t>
+            </a:r>
+            <a:r>
+              <a:rPr lang="en-US" sz="1000" dirty="0" smtClean="0">
+                <a:latin typeface="Arial" panose="020B0604020202020204" pitchFamily="34" charset="0"/>
+                <a:cs typeface="Arial" panose="020B0604020202020204" pitchFamily="34" charset="0"/>
+              </a:rPr>
+              <a:t> Key</a:t>
             </a:r>
             <a:endParaRPr lang="en-US" sz="1000" dirty="0">
               <a:latin typeface="Arial" panose="020B0604020202020204" pitchFamily="34" charset="0"/>
@@ -28414,8 +28441,8 @@
           </p:nvSpPr>
           <p:spPr>
             <a:xfrm>
-              <a:off x="7641778" y="1887157"/>
-              <a:ext cx="1042273" cy="246221"/>
+              <a:off x="7641778" y="1816813"/>
+              <a:ext cx="822661" cy="400110"/>
             </a:xfrm>
             <a:prstGeom prst="rect">
               <a:avLst/>
@@ -28433,7 +28460,34 @@
                   <a:latin typeface="Arial" panose="020B0604020202020204" pitchFamily="34" charset="0"/>
                   <a:cs typeface="Arial" panose="020B0604020202020204" pitchFamily="34" charset="0"/>
                 </a:rPr>
-                <a:t>Encryption Key</a:t>
+                <a:t>Encryption </a:t>
+              </a:r>
+              <a:r>
+                <a:rPr lang="en-US" sz="1000" dirty="0" smtClean="0">
+                  <a:latin typeface="Arial" panose="020B0604020202020204" pitchFamily="34" charset="0"/>
+                  <a:cs typeface="Arial" panose="020B0604020202020204" pitchFamily="34" charset="0"/>
+                </a:rPr>
+                <a:t/>
+              </a:r>
+              <a:br>
+                <a:rPr lang="en-US" sz="1000" dirty="0" smtClean="0">
+                  <a:latin typeface="Arial" panose="020B0604020202020204" pitchFamily="34" charset="0"/>
+                  <a:cs typeface="Arial" panose="020B0604020202020204" pitchFamily="34" charset="0"/>
+                </a:rPr>
+              </a:br>
+              <a:r>
+                <a:rPr lang="en-US" sz="1000" i="1" dirty="0" smtClean="0">
+                  <a:latin typeface="Arial" panose="020B0604020202020204" pitchFamily="34" charset="0"/>
+                  <a:cs typeface="Arial" panose="020B0604020202020204" pitchFamily="34" charset="0"/>
+                </a:rPr>
+                <a:t>Public</a:t>
+              </a:r>
+              <a:r>
+                <a:rPr lang="en-US" sz="1000" dirty="0" smtClean="0">
+                  <a:latin typeface="Arial" panose="020B0604020202020204" pitchFamily="34" charset="0"/>
+                  <a:cs typeface="Arial" panose="020B0604020202020204" pitchFamily="34" charset="0"/>
+                </a:rPr>
+                <a:t> Key</a:t>
               </a:r>
               <a:endParaRPr lang="en-US" sz="1000" dirty="0">
                 <a:latin typeface="Arial" panose="020B0604020202020204" pitchFamily="34" charset="0"/>

</xml_diff>

<commit_message>
Added Saturn logo :-)
</commit_message>
<xml_diff>
--- a/saturn/saturn-authorization.pptx
+++ b/saturn/saturn-authorization.pptx
@@ -309,7 +309,7 @@
           <a:p>
             <a:fld id="{E3744D7E-A5BB-4306-A750-C25515017678}" type="datetimeFigureOut">
               <a:rPr lang="en-US" smtClean="0"/>
-              <a:t>2017-08-15</a:t>
+              <a:t>2017-08-16</a:t>
             </a:fld>
             <a:endParaRPr lang="en-US"/>
           </a:p>
@@ -519,7 +519,7 @@
           <a:p>
             <a:fld id="{E3744D7E-A5BB-4306-A750-C25515017678}" type="datetimeFigureOut">
               <a:rPr lang="en-US" smtClean="0"/>
-              <a:t>2017-08-15</a:t>
+              <a:t>2017-08-16</a:t>
             </a:fld>
             <a:endParaRPr lang="en-US"/>
           </a:p>
@@ -736,7 +736,7 @@
           <a:p>
             <a:fld id="{E3744D7E-A5BB-4306-A750-C25515017678}" type="datetimeFigureOut">
               <a:rPr lang="en-US" smtClean="0"/>
-              <a:t>2017-08-15</a:t>
+              <a:t>2017-08-16</a:t>
             </a:fld>
             <a:endParaRPr lang="en-US"/>
           </a:p>
@@ -1001,7 +1001,7 @@
           <a:p>
             <a:fld id="{B880F04E-B60C-4530-BE27-DE08322B2422}" type="datetimeFigureOut">
               <a:rPr lang="en-US" smtClean="0"/>
-              <a:t>2017-08-15</a:t>
+              <a:t>2017-08-16</a:t>
             </a:fld>
             <a:endParaRPr lang="en-US"/>
           </a:p>
@@ -1171,7 +1171,7 @@
           <a:p>
             <a:fld id="{B880F04E-B60C-4530-BE27-DE08322B2422}" type="datetimeFigureOut">
               <a:rPr lang="en-US" smtClean="0"/>
-              <a:t>2017-08-15</a:t>
+              <a:t>2017-08-16</a:t>
             </a:fld>
             <a:endParaRPr lang="en-US"/>
           </a:p>
@@ -1417,7 +1417,7 @@
           <a:p>
             <a:fld id="{B880F04E-B60C-4530-BE27-DE08322B2422}" type="datetimeFigureOut">
               <a:rPr lang="en-US" smtClean="0"/>
-              <a:t>2017-08-15</a:t>
+              <a:t>2017-08-16</a:t>
             </a:fld>
             <a:endParaRPr lang="en-US"/>
           </a:p>
@@ -1705,7 +1705,7 @@
           <a:p>
             <a:fld id="{B880F04E-B60C-4530-BE27-DE08322B2422}" type="datetimeFigureOut">
               <a:rPr lang="en-US" smtClean="0"/>
-              <a:t>2017-08-15</a:t>
+              <a:t>2017-08-16</a:t>
             </a:fld>
             <a:endParaRPr lang="en-US"/>
           </a:p>
@@ -2127,7 +2127,7 @@
           <a:p>
             <a:fld id="{B880F04E-B60C-4530-BE27-DE08322B2422}" type="datetimeFigureOut">
               <a:rPr lang="en-US" smtClean="0"/>
-              <a:t>2017-08-15</a:t>
+              <a:t>2017-08-16</a:t>
             </a:fld>
             <a:endParaRPr lang="en-US"/>
           </a:p>
@@ -2245,7 +2245,7 @@
           <a:p>
             <a:fld id="{B880F04E-B60C-4530-BE27-DE08322B2422}" type="datetimeFigureOut">
               <a:rPr lang="en-US" smtClean="0"/>
-              <a:t>2017-08-15</a:t>
+              <a:t>2017-08-16</a:t>
             </a:fld>
             <a:endParaRPr lang="en-US"/>
           </a:p>
@@ -2340,7 +2340,7 @@
           <a:p>
             <a:fld id="{B880F04E-B60C-4530-BE27-DE08322B2422}" type="datetimeFigureOut">
               <a:rPr lang="en-US" smtClean="0"/>
-              <a:t>2017-08-15</a:t>
+              <a:t>2017-08-16</a:t>
             </a:fld>
             <a:endParaRPr lang="en-US"/>
           </a:p>
@@ -2617,7 +2617,7 @@
           <a:p>
             <a:fld id="{B880F04E-B60C-4530-BE27-DE08322B2422}" type="datetimeFigureOut">
               <a:rPr lang="en-US" smtClean="0"/>
-              <a:t>2017-08-15</a:t>
+              <a:t>2017-08-16</a:t>
             </a:fld>
             <a:endParaRPr lang="en-US"/>
           </a:p>
@@ -2811,7 +2811,7 @@
           <a:p>
             <a:fld id="{E3744D7E-A5BB-4306-A750-C25515017678}" type="datetimeFigureOut">
               <a:rPr lang="en-US" smtClean="0"/>
-              <a:t>2017-08-15</a:t>
+              <a:t>2017-08-16</a:t>
             </a:fld>
             <a:endParaRPr lang="en-US"/>
           </a:p>
@@ -3080,7 +3080,7 @@
           <a:p>
             <a:fld id="{B880F04E-B60C-4530-BE27-DE08322B2422}" type="datetimeFigureOut">
               <a:rPr lang="en-US" smtClean="0"/>
-              <a:t>2017-08-15</a:t>
+              <a:t>2017-08-16</a:t>
             </a:fld>
             <a:endParaRPr lang="en-US"/>
           </a:p>
@@ -3250,7 +3250,7 @@
           <a:p>
             <a:fld id="{B880F04E-B60C-4530-BE27-DE08322B2422}" type="datetimeFigureOut">
               <a:rPr lang="en-US" smtClean="0"/>
-              <a:t>2017-08-15</a:t>
+              <a:t>2017-08-16</a:t>
             </a:fld>
             <a:endParaRPr lang="en-US"/>
           </a:p>
@@ -3430,7 +3430,7 @@
           <a:p>
             <a:fld id="{B880F04E-B60C-4530-BE27-DE08322B2422}" type="datetimeFigureOut">
               <a:rPr lang="en-US" smtClean="0"/>
-              <a:t>2017-08-15</a:t>
+              <a:t>2017-08-16</a:t>
             </a:fld>
             <a:endParaRPr lang="en-US"/>
           </a:p>
@@ -3672,7 +3672,7 @@
           <a:p>
             <a:fld id="{C5690C41-1B19-4491-A062-33F2F29E9A8D}" type="datetimeFigureOut">
               <a:rPr lang="en-US" smtClean="0"/>
-              <a:t>2017-08-15</a:t>
+              <a:t>2017-08-16</a:t>
             </a:fld>
             <a:endParaRPr lang="en-US"/>
           </a:p>
@@ -3842,7 +3842,7 @@
           <a:p>
             <a:fld id="{C5690C41-1B19-4491-A062-33F2F29E9A8D}" type="datetimeFigureOut">
               <a:rPr lang="en-US" smtClean="0"/>
-              <a:t>2017-08-15</a:t>
+              <a:t>2017-08-16</a:t>
             </a:fld>
             <a:endParaRPr lang="en-US"/>
           </a:p>
@@ -4088,7 +4088,7 @@
           <a:p>
             <a:fld id="{C5690C41-1B19-4491-A062-33F2F29E9A8D}" type="datetimeFigureOut">
               <a:rPr lang="en-US" smtClean="0"/>
-              <a:t>2017-08-15</a:t>
+              <a:t>2017-08-16</a:t>
             </a:fld>
             <a:endParaRPr lang="en-US"/>
           </a:p>
@@ -4376,7 +4376,7 @@
           <a:p>
             <a:fld id="{C5690C41-1B19-4491-A062-33F2F29E9A8D}" type="datetimeFigureOut">
               <a:rPr lang="en-US" smtClean="0"/>
-              <a:t>2017-08-15</a:t>
+              <a:t>2017-08-16</a:t>
             </a:fld>
             <a:endParaRPr lang="en-US"/>
           </a:p>
@@ -4798,7 +4798,7 @@
           <a:p>
             <a:fld id="{C5690C41-1B19-4491-A062-33F2F29E9A8D}" type="datetimeFigureOut">
               <a:rPr lang="en-US" smtClean="0"/>
-              <a:t>2017-08-15</a:t>
+              <a:t>2017-08-16</a:t>
             </a:fld>
             <a:endParaRPr lang="en-US"/>
           </a:p>
@@ -4916,7 +4916,7 @@
           <a:p>
             <a:fld id="{C5690C41-1B19-4491-A062-33F2F29E9A8D}" type="datetimeFigureOut">
               <a:rPr lang="en-US" smtClean="0"/>
-              <a:t>2017-08-15</a:t>
+              <a:t>2017-08-16</a:t>
             </a:fld>
             <a:endParaRPr lang="en-US"/>
           </a:p>
@@ -5011,7 +5011,7 @@
           <a:p>
             <a:fld id="{C5690C41-1B19-4491-A062-33F2F29E9A8D}" type="datetimeFigureOut">
               <a:rPr lang="en-US" smtClean="0"/>
-              <a:t>2017-08-15</a:t>
+              <a:t>2017-08-16</a:t>
             </a:fld>
             <a:endParaRPr lang="en-US"/>
           </a:p>
@@ -5271,7 +5271,7 @@
           <a:p>
             <a:fld id="{E3744D7E-A5BB-4306-A750-C25515017678}" type="datetimeFigureOut">
               <a:rPr lang="en-US" smtClean="0"/>
-              <a:t>2017-08-15</a:t>
+              <a:t>2017-08-16</a:t>
             </a:fld>
             <a:endParaRPr lang="en-US"/>
           </a:p>
@@ -5564,7 +5564,7 @@
           <a:p>
             <a:fld id="{C5690C41-1B19-4491-A062-33F2F29E9A8D}" type="datetimeFigureOut">
               <a:rPr lang="en-US" smtClean="0"/>
-              <a:t>2017-08-15</a:t>
+              <a:t>2017-08-16</a:t>
             </a:fld>
             <a:endParaRPr lang="en-US"/>
           </a:p>
@@ -5817,7 +5817,7 @@
           <a:p>
             <a:fld id="{C5690C41-1B19-4491-A062-33F2F29E9A8D}" type="datetimeFigureOut">
               <a:rPr lang="en-US" smtClean="0"/>
-              <a:t>2017-08-15</a:t>
+              <a:t>2017-08-16</a:t>
             </a:fld>
             <a:endParaRPr lang="en-US"/>
           </a:p>
@@ -5987,7 +5987,7 @@
           <a:p>
             <a:fld id="{C5690C41-1B19-4491-A062-33F2F29E9A8D}" type="datetimeFigureOut">
               <a:rPr lang="en-US" smtClean="0"/>
-              <a:t>2017-08-15</a:t>
+              <a:t>2017-08-16</a:t>
             </a:fld>
             <a:endParaRPr lang="en-US"/>
           </a:p>
@@ -6167,7 +6167,7 @@
           <a:p>
             <a:fld id="{C5690C41-1B19-4491-A062-33F2F29E9A8D}" type="datetimeFigureOut">
               <a:rPr lang="en-US" smtClean="0"/>
-              <a:t>2017-08-15</a:t>
+              <a:t>2017-08-16</a:t>
             </a:fld>
             <a:endParaRPr lang="en-US"/>
           </a:p>
@@ -6409,7 +6409,7 @@
           <a:p>
             <a:fld id="{23D18025-B22E-453D-AA62-4A08DAEF541F}" type="datetimeFigureOut">
               <a:rPr lang="en-US" smtClean="0"/>
-              <a:t>2017-08-15</a:t>
+              <a:t>2017-08-16</a:t>
             </a:fld>
             <a:endParaRPr lang="en-US"/>
           </a:p>
@@ -6579,7 +6579,7 @@
           <a:p>
             <a:fld id="{23D18025-B22E-453D-AA62-4A08DAEF541F}" type="datetimeFigureOut">
               <a:rPr lang="en-US" smtClean="0"/>
-              <a:t>2017-08-15</a:t>
+              <a:t>2017-08-16</a:t>
             </a:fld>
             <a:endParaRPr lang="en-US"/>
           </a:p>
@@ -6825,7 +6825,7 @@
           <a:p>
             <a:fld id="{23D18025-B22E-453D-AA62-4A08DAEF541F}" type="datetimeFigureOut">
               <a:rPr lang="en-US" smtClean="0"/>
-              <a:t>2017-08-15</a:t>
+              <a:t>2017-08-16</a:t>
             </a:fld>
             <a:endParaRPr lang="en-US"/>
           </a:p>
@@ -7113,7 +7113,7 @@
           <a:p>
             <a:fld id="{23D18025-B22E-453D-AA62-4A08DAEF541F}" type="datetimeFigureOut">
               <a:rPr lang="en-US" smtClean="0"/>
-              <a:t>2017-08-15</a:t>
+              <a:t>2017-08-16</a:t>
             </a:fld>
             <a:endParaRPr lang="en-US"/>
           </a:p>
@@ -7535,7 +7535,7 @@
           <a:p>
             <a:fld id="{23D18025-B22E-453D-AA62-4A08DAEF541F}" type="datetimeFigureOut">
               <a:rPr lang="en-US" smtClean="0"/>
-              <a:t>2017-08-15</a:t>
+              <a:t>2017-08-16</a:t>
             </a:fld>
             <a:endParaRPr lang="en-US"/>
           </a:p>
@@ -7653,7 +7653,7 @@
           <a:p>
             <a:fld id="{23D18025-B22E-453D-AA62-4A08DAEF541F}" type="datetimeFigureOut">
               <a:rPr lang="en-US" smtClean="0"/>
-              <a:t>2017-08-15</a:t>
+              <a:t>2017-08-16</a:t>
             </a:fld>
             <a:endParaRPr lang="en-US"/>
           </a:p>
@@ -7963,7 +7963,7 @@
           <a:p>
             <a:fld id="{E3744D7E-A5BB-4306-A750-C25515017678}" type="datetimeFigureOut">
               <a:rPr lang="en-US" smtClean="0"/>
-              <a:t>2017-08-15</a:t>
+              <a:t>2017-08-16</a:t>
             </a:fld>
             <a:endParaRPr lang="en-US"/>
           </a:p>
@@ -8074,7 +8074,7 @@
           <a:p>
             <a:fld id="{23D18025-B22E-453D-AA62-4A08DAEF541F}" type="datetimeFigureOut">
               <a:rPr lang="en-US" smtClean="0"/>
-              <a:t>2017-08-15</a:t>
+              <a:t>2017-08-16</a:t>
             </a:fld>
             <a:endParaRPr lang="en-US"/>
           </a:p>
@@ -8351,7 +8351,7 @@
           <a:p>
             <a:fld id="{23D18025-B22E-453D-AA62-4A08DAEF541F}" type="datetimeFigureOut">
               <a:rPr lang="en-US" smtClean="0"/>
-              <a:t>2017-08-15</a:t>
+              <a:t>2017-08-16</a:t>
             </a:fld>
             <a:endParaRPr lang="en-US"/>
           </a:p>
@@ -8604,7 +8604,7 @@
           <a:p>
             <a:fld id="{23D18025-B22E-453D-AA62-4A08DAEF541F}" type="datetimeFigureOut">
               <a:rPr lang="en-US" smtClean="0"/>
-              <a:t>2017-08-15</a:t>
+              <a:t>2017-08-16</a:t>
             </a:fld>
             <a:endParaRPr lang="en-US"/>
           </a:p>
@@ -8774,7 +8774,7 @@
           <a:p>
             <a:fld id="{23D18025-B22E-453D-AA62-4A08DAEF541F}" type="datetimeFigureOut">
               <a:rPr lang="en-US" smtClean="0"/>
-              <a:t>2017-08-15</a:t>
+              <a:t>2017-08-16</a:t>
             </a:fld>
             <a:endParaRPr lang="en-US"/>
           </a:p>
@@ -8954,7 +8954,7 @@
           <a:p>
             <a:fld id="{23D18025-B22E-453D-AA62-4A08DAEF541F}" type="datetimeFigureOut">
               <a:rPr lang="en-US" smtClean="0"/>
-              <a:t>2017-08-15</a:t>
+              <a:t>2017-08-16</a:t>
             </a:fld>
             <a:endParaRPr lang="en-US"/>
           </a:p>
@@ -9196,7 +9196,7 @@
           <a:p>
             <a:fld id="{5A29F1F3-0306-4ADD-8575-5F845BC34EA0}" type="datetimeFigureOut">
               <a:rPr lang="en-US" smtClean="0"/>
-              <a:t>2017-08-15</a:t>
+              <a:t>2017-08-16</a:t>
             </a:fld>
             <a:endParaRPr lang="en-US"/>
           </a:p>
@@ -9366,7 +9366,7 @@
           <a:p>
             <a:fld id="{5A29F1F3-0306-4ADD-8575-5F845BC34EA0}" type="datetimeFigureOut">
               <a:rPr lang="en-US" smtClean="0"/>
-              <a:t>2017-08-15</a:t>
+              <a:t>2017-08-16</a:t>
             </a:fld>
             <a:endParaRPr lang="en-US"/>
           </a:p>
@@ -9612,7 +9612,7 @@
           <a:p>
             <a:fld id="{5A29F1F3-0306-4ADD-8575-5F845BC34EA0}" type="datetimeFigureOut">
               <a:rPr lang="en-US" smtClean="0"/>
-              <a:t>2017-08-15</a:t>
+              <a:t>2017-08-16</a:t>
             </a:fld>
             <a:endParaRPr lang="en-US"/>
           </a:p>
@@ -9900,7 +9900,7 @@
           <a:p>
             <a:fld id="{5A29F1F3-0306-4ADD-8575-5F845BC34EA0}" type="datetimeFigureOut">
               <a:rPr lang="en-US" smtClean="0"/>
-              <a:t>2017-08-15</a:t>
+              <a:t>2017-08-16</a:t>
             </a:fld>
             <a:endParaRPr lang="en-US"/>
           </a:p>
@@ -10322,7 +10322,7 @@
           <a:p>
             <a:fld id="{5A29F1F3-0306-4ADD-8575-5F845BC34EA0}" type="datetimeFigureOut">
               <a:rPr lang="en-US" smtClean="0"/>
-              <a:t>2017-08-15</a:t>
+              <a:t>2017-08-16</a:t>
             </a:fld>
             <a:endParaRPr lang="en-US"/>
           </a:p>
@@ -10772,7 +10772,7 @@
           <a:p>
             <a:fld id="{E3744D7E-A5BB-4306-A750-C25515017678}" type="datetimeFigureOut">
               <a:rPr lang="en-US" smtClean="0"/>
-              <a:t>2017-08-15</a:t>
+              <a:t>2017-08-16</a:t>
             </a:fld>
             <a:endParaRPr lang="en-US"/>
           </a:p>
@@ -10906,7 +10906,7 @@
           <a:p>
             <a:fld id="{5A29F1F3-0306-4ADD-8575-5F845BC34EA0}" type="datetimeFigureOut">
               <a:rPr lang="en-US" smtClean="0"/>
-              <a:t>2017-08-15</a:t>
+              <a:t>2017-08-16</a:t>
             </a:fld>
             <a:endParaRPr lang="en-US"/>
           </a:p>
@@ -11001,7 +11001,7 @@
           <a:p>
             <a:fld id="{5A29F1F3-0306-4ADD-8575-5F845BC34EA0}" type="datetimeFigureOut">
               <a:rPr lang="en-US" smtClean="0"/>
-              <a:t>2017-08-15</a:t>
+              <a:t>2017-08-16</a:t>
             </a:fld>
             <a:endParaRPr lang="en-US"/>
           </a:p>
@@ -11278,7 +11278,7 @@
           <a:p>
             <a:fld id="{5A29F1F3-0306-4ADD-8575-5F845BC34EA0}" type="datetimeFigureOut">
               <a:rPr lang="en-US" smtClean="0"/>
-              <a:t>2017-08-15</a:t>
+              <a:t>2017-08-16</a:t>
             </a:fld>
             <a:endParaRPr lang="en-US"/>
           </a:p>
@@ -11531,7 +11531,7 @@
           <a:p>
             <a:fld id="{5A29F1F3-0306-4ADD-8575-5F845BC34EA0}" type="datetimeFigureOut">
               <a:rPr lang="en-US" smtClean="0"/>
-              <a:t>2017-08-15</a:t>
+              <a:t>2017-08-16</a:t>
             </a:fld>
             <a:endParaRPr lang="en-US"/>
           </a:p>
@@ -11701,7 +11701,7 @@
           <a:p>
             <a:fld id="{5A29F1F3-0306-4ADD-8575-5F845BC34EA0}" type="datetimeFigureOut">
               <a:rPr lang="en-US" smtClean="0"/>
-              <a:t>2017-08-15</a:t>
+              <a:t>2017-08-16</a:t>
             </a:fld>
             <a:endParaRPr lang="en-US"/>
           </a:p>
@@ -11881,7 +11881,7 @@
           <a:p>
             <a:fld id="{5A29F1F3-0306-4ADD-8575-5F845BC34EA0}" type="datetimeFigureOut">
               <a:rPr lang="en-US" smtClean="0"/>
-              <a:t>2017-08-15</a:t>
+              <a:t>2017-08-16</a:t>
             </a:fld>
             <a:endParaRPr lang="en-US"/>
           </a:p>
@@ -12123,7 +12123,7 @@
           <a:p>
             <a:fld id="{2CD378D0-82C9-47C6-BEE5-E347AC6F0A5E}" type="datetimeFigureOut">
               <a:rPr lang="en-US" smtClean="0"/>
-              <a:t>2017-08-15</a:t>
+              <a:t>2017-08-16</a:t>
             </a:fld>
             <a:endParaRPr lang="en-US"/>
           </a:p>
@@ -12293,7 +12293,7 @@
           <a:p>
             <a:fld id="{2CD378D0-82C9-47C6-BEE5-E347AC6F0A5E}" type="datetimeFigureOut">
               <a:rPr lang="en-US" smtClean="0"/>
-              <a:t>2017-08-15</a:t>
+              <a:t>2017-08-16</a:t>
             </a:fld>
             <a:endParaRPr lang="en-US"/>
           </a:p>
@@ -12539,7 +12539,7 @@
           <a:p>
             <a:fld id="{2CD378D0-82C9-47C6-BEE5-E347AC6F0A5E}" type="datetimeFigureOut">
               <a:rPr lang="en-US" smtClean="0"/>
-              <a:t>2017-08-15</a:t>
+              <a:t>2017-08-16</a:t>
             </a:fld>
             <a:endParaRPr lang="en-US"/>
           </a:p>
@@ -12827,7 +12827,7 @@
           <a:p>
             <a:fld id="{2CD378D0-82C9-47C6-BEE5-E347AC6F0A5E}" type="datetimeFigureOut">
               <a:rPr lang="en-US" smtClean="0"/>
-              <a:t>2017-08-15</a:t>
+              <a:t>2017-08-16</a:t>
             </a:fld>
             <a:endParaRPr lang="en-US"/>
           </a:p>
@@ -12961,7 +12961,7 @@
           <a:p>
             <a:fld id="{E3744D7E-A5BB-4306-A750-C25515017678}" type="datetimeFigureOut">
               <a:rPr lang="en-US" smtClean="0"/>
-              <a:t>2017-08-15</a:t>
+              <a:t>2017-08-16</a:t>
             </a:fld>
             <a:endParaRPr lang="en-US"/>
           </a:p>
@@ -13399,7 +13399,7 @@
           <a:p>
             <a:fld id="{2CD378D0-82C9-47C6-BEE5-E347AC6F0A5E}" type="datetimeFigureOut">
               <a:rPr lang="en-US" smtClean="0"/>
-              <a:t>2017-08-15</a:t>
+              <a:t>2017-08-16</a:t>
             </a:fld>
             <a:endParaRPr lang="en-US"/>
           </a:p>
@@ -13517,7 +13517,7 @@
           <a:p>
             <a:fld id="{2CD378D0-82C9-47C6-BEE5-E347AC6F0A5E}" type="datetimeFigureOut">
               <a:rPr lang="en-US" smtClean="0"/>
-              <a:t>2017-08-15</a:t>
+              <a:t>2017-08-16</a:t>
             </a:fld>
             <a:endParaRPr lang="en-US"/>
           </a:p>
@@ -13612,7 +13612,7 @@
           <a:p>
             <a:fld id="{2CD378D0-82C9-47C6-BEE5-E347AC6F0A5E}" type="datetimeFigureOut">
               <a:rPr lang="en-US" smtClean="0"/>
-              <a:t>2017-08-15</a:t>
+              <a:t>2017-08-16</a:t>
             </a:fld>
             <a:endParaRPr lang="en-US"/>
           </a:p>
@@ -13889,7 +13889,7 @@
           <a:p>
             <a:fld id="{2CD378D0-82C9-47C6-BEE5-E347AC6F0A5E}" type="datetimeFigureOut">
               <a:rPr lang="en-US" smtClean="0"/>
-              <a:t>2017-08-15</a:t>
+              <a:t>2017-08-16</a:t>
             </a:fld>
             <a:endParaRPr lang="en-US"/>
           </a:p>
@@ -14142,7 +14142,7 @@
           <a:p>
             <a:fld id="{2CD378D0-82C9-47C6-BEE5-E347AC6F0A5E}" type="datetimeFigureOut">
               <a:rPr lang="en-US" smtClean="0"/>
-              <a:t>2017-08-15</a:t>
+              <a:t>2017-08-16</a:t>
             </a:fld>
             <a:endParaRPr lang="en-US"/>
           </a:p>
@@ -14312,7 +14312,7 @@
           <a:p>
             <a:fld id="{2CD378D0-82C9-47C6-BEE5-E347AC6F0A5E}" type="datetimeFigureOut">
               <a:rPr lang="en-US" smtClean="0"/>
-              <a:t>2017-08-15</a:t>
+              <a:t>2017-08-16</a:t>
             </a:fld>
             <a:endParaRPr lang="en-US"/>
           </a:p>
@@ -14492,7 +14492,7 @@
           <a:p>
             <a:fld id="{2CD378D0-82C9-47C6-BEE5-E347AC6F0A5E}" type="datetimeFigureOut">
               <a:rPr lang="en-US" smtClean="0"/>
-              <a:t>2017-08-15</a:t>
+              <a:t>2017-08-16</a:t>
             </a:fld>
             <a:endParaRPr lang="en-US"/>
           </a:p>
@@ -14734,7 +14734,7 @@
           <a:p>
             <a:fld id="{B96FFCCF-F4AB-4D56-AEE8-39DF7F28FF62}" type="datetimeFigureOut">
               <a:rPr lang="en-US" smtClean="0"/>
-              <a:t>2017-08-15</a:t>
+              <a:t>2017-08-16</a:t>
             </a:fld>
             <a:endParaRPr lang="en-US"/>
           </a:p>
@@ -14904,7 +14904,7 @@
           <a:p>
             <a:fld id="{B96FFCCF-F4AB-4D56-AEE8-39DF7F28FF62}" type="datetimeFigureOut">
               <a:rPr lang="en-US" smtClean="0"/>
-              <a:t>2017-08-15</a:t>
+              <a:t>2017-08-16</a:t>
             </a:fld>
             <a:endParaRPr lang="en-US"/>
           </a:p>
@@ -15150,7 +15150,7 @@
           <a:p>
             <a:fld id="{B96FFCCF-F4AB-4D56-AEE8-39DF7F28FF62}" type="datetimeFigureOut">
               <a:rPr lang="en-US" smtClean="0"/>
-              <a:t>2017-08-15</a:t>
+              <a:t>2017-08-16</a:t>
             </a:fld>
             <a:endParaRPr lang="en-US"/>
           </a:p>
@@ -15253,7 +15253,7 @@
           <a:p>
             <a:fld id="{E3744D7E-A5BB-4306-A750-C25515017678}" type="datetimeFigureOut">
               <a:rPr lang="en-US" smtClean="0"/>
-              <a:t>2017-08-15</a:t>
+              <a:t>2017-08-16</a:t>
             </a:fld>
             <a:endParaRPr lang="en-US"/>
           </a:p>
@@ -15564,7 +15564,7 @@
           <a:p>
             <a:fld id="{B96FFCCF-F4AB-4D56-AEE8-39DF7F28FF62}" type="datetimeFigureOut">
               <a:rPr lang="en-US" smtClean="0"/>
-              <a:t>2017-08-15</a:t>
+              <a:t>2017-08-16</a:t>
             </a:fld>
             <a:endParaRPr lang="en-US"/>
           </a:p>
@@ -15986,7 +15986,7 @@
           <a:p>
             <a:fld id="{B96FFCCF-F4AB-4D56-AEE8-39DF7F28FF62}" type="datetimeFigureOut">
               <a:rPr lang="en-US" smtClean="0"/>
-              <a:t>2017-08-15</a:t>
+              <a:t>2017-08-16</a:t>
             </a:fld>
             <a:endParaRPr lang="en-US"/>
           </a:p>
@@ -16104,7 +16104,7 @@
           <a:p>
             <a:fld id="{B96FFCCF-F4AB-4D56-AEE8-39DF7F28FF62}" type="datetimeFigureOut">
               <a:rPr lang="en-US" smtClean="0"/>
-              <a:t>2017-08-15</a:t>
+              <a:t>2017-08-16</a:t>
             </a:fld>
             <a:endParaRPr lang="en-US"/>
           </a:p>
@@ -16199,7 +16199,7 @@
           <a:p>
             <a:fld id="{B96FFCCF-F4AB-4D56-AEE8-39DF7F28FF62}" type="datetimeFigureOut">
               <a:rPr lang="en-US" smtClean="0"/>
-              <a:t>2017-08-15</a:t>
+              <a:t>2017-08-16</a:t>
             </a:fld>
             <a:endParaRPr lang="en-US"/>
           </a:p>
@@ -16476,7 +16476,7 @@
           <a:p>
             <a:fld id="{B96FFCCF-F4AB-4D56-AEE8-39DF7F28FF62}" type="datetimeFigureOut">
               <a:rPr lang="en-US" smtClean="0"/>
-              <a:t>2017-08-15</a:t>
+              <a:t>2017-08-16</a:t>
             </a:fld>
             <a:endParaRPr lang="en-US"/>
           </a:p>
@@ -16729,7 +16729,7 @@
           <a:p>
             <a:fld id="{B96FFCCF-F4AB-4D56-AEE8-39DF7F28FF62}" type="datetimeFigureOut">
               <a:rPr lang="en-US" smtClean="0"/>
-              <a:t>2017-08-15</a:t>
+              <a:t>2017-08-16</a:t>
             </a:fld>
             <a:endParaRPr lang="en-US"/>
           </a:p>
@@ -16899,7 +16899,7 @@
           <a:p>
             <a:fld id="{B96FFCCF-F4AB-4D56-AEE8-39DF7F28FF62}" type="datetimeFigureOut">
               <a:rPr lang="en-US" smtClean="0"/>
-              <a:t>2017-08-15</a:t>
+              <a:t>2017-08-16</a:t>
             </a:fld>
             <a:endParaRPr lang="en-US"/>
           </a:p>
@@ -17079,7 +17079,7 @@
           <a:p>
             <a:fld id="{B96FFCCF-F4AB-4D56-AEE8-39DF7F28FF62}" type="datetimeFigureOut">
               <a:rPr lang="en-US" smtClean="0"/>
-              <a:t>2017-08-15</a:t>
+              <a:t>2017-08-16</a:t>
             </a:fld>
             <a:endParaRPr lang="en-US"/>
           </a:p>
@@ -17321,7 +17321,7 @@
           <a:p>
             <a:fld id="{E90DB797-294B-4B2B-9A48-229F3ACF3E1A}" type="datetimeFigureOut">
               <a:rPr lang="en-US" smtClean="0"/>
-              <a:t>2017-08-15</a:t>
+              <a:t>2017-08-16</a:t>
             </a:fld>
             <a:endParaRPr lang="en-US"/>
           </a:p>
@@ -17491,7 +17491,7 @@
           <a:p>
             <a:fld id="{E90DB797-294B-4B2B-9A48-229F3ACF3E1A}" type="datetimeFigureOut">
               <a:rPr lang="en-US" smtClean="0"/>
-              <a:t>2017-08-15</a:t>
+              <a:t>2017-08-16</a:t>
             </a:fld>
             <a:endParaRPr lang="en-US"/>
           </a:p>
@@ -17785,7 +17785,7 @@
           <a:p>
             <a:fld id="{E3744D7E-A5BB-4306-A750-C25515017678}" type="datetimeFigureOut">
               <a:rPr lang="en-US" smtClean="0"/>
-              <a:t>2017-08-15</a:t>
+              <a:t>2017-08-16</a:t>
             </a:fld>
             <a:endParaRPr lang="en-US"/>
           </a:p>
@@ -18047,7 +18047,7 @@
           <a:p>
             <a:fld id="{E90DB797-294B-4B2B-9A48-229F3ACF3E1A}" type="datetimeFigureOut">
               <a:rPr lang="en-US" smtClean="0"/>
-              <a:t>2017-08-15</a:t>
+              <a:t>2017-08-16</a:t>
             </a:fld>
             <a:endParaRPr lang="en-US"/>
           </a:p>
@@ -18335,7 +18335,7 @@
           <a:p>
             <a:fld id="{E90DB797-294B-4B2B-9A48-229F3ACF3E1A}" type="datetimeFigureOut">
               <a:rPr lang="en-US" smtClean="0"/>
-              <a:t>2017-08-15</a:t>
+              <a:t>2017-08-16</a:t>
             </a:fld>
             <a:endParaRPr lang="en-US"/>
           </a:p>
@@ -18757,7 +18757,7 @@
           <a:p>
             <a:fld id="{E90DB797-294B-4B2B-9A48-229F3ACF3E1A}" type="datetimeFigureOut">
               <a:rPr lang="en-US" smtClean="0"/>
-              <a:t>2017-08-15</a:t>
+              <a:t>2017-08-16</a:t>
             </a:fld>
             <a:endParaRPr lang="en-US"/>
           </a:p>
@@ -18875,7 +18875,7 @@
           <a:p>
             <a:fld id="{E90DB797-294B-4B2B-9A48-229F3ACF3E1A}" type="datetimeFigureOut">
               <a:rPr lang="en-US" smtClean="0"/>
-              <a:t>2017-08-15</a:t>
+              <a:t>2017-08-16</a:t>
             </a:fld>
             <a:endParaRPr lang="en-US"/>
           </a:p>
@@ -18970,7 +18970,7 @@
           <a:p>
             <a:fld id="{E90DB797-294B-4B2B-9A48-229F3ACF3E1A}" type="datetimeFigureOut">
               <a:rPr lang="en-US" smtClean="0"/>
-              <a:t>2017-08-15</a:t>
+              <a:t>2017-08-16</a:t>
             </a:fld>
             <a:endParaRPr lang="en-US"/>
           </a:p>
@@ -19247,7 +19247,7 @@
           <a:p>
             <a:fld id="{E90DB797-294B-4B2B-9A48-229F3ACF3E1A}" type="datetimeFigureOut">
               <a:rPr lang="en-US" smtClean="0"/>
-              <a:t>2017-08-15</a:t>
+              <a:t>2017-08-16</a:t>
             </a:fld>
             <a:endParaRPr lang="en-US"/>
           </a:p>
@@ -19500,7 +19500,7 @@
           <a:p>
             <a:fld id="{E90DB797-294B-4B2B-9A48-229F3ACF3E1A}" type="datetimeFigureOut">
               <a:rPr lang="en-US" smtClean="0"/>
-              <a:t>2017-08-15</a:t>
+              <a:t>2017-08-16</a:t>
             </a:fld>
             <a:endParaRPr lang="en-US"/>
           </a:p>
@@ -19670,7 +19670,7 @@
           <a:p>
             <a:fld id="{E90DB797-294B-4B2B-9A48-229F3ACF3E1A}" type="datetimeFigureOut">
               <a:rPr lang="en-US" smtClean="0"/>
-              <a:t>2017-08-15</a:t>
+              <a:t>2017-08-16</a:t>
             </a:fld>
             <a:endParaRPr lang="en-US"/>
           </a:p>
@@ -19850,7 +19850,7 @@
           <a:p>
             <a:fld id="{E90DB797-294B-4B2B-9A48-229F3ACF3E1A}" type="datetimeFigureOut">
               <a:rPr lang="en-US" smtClean="0"/>
-              <a:t>2017-08-15</a:t>
+              <a:t>2017-08-16</a:t>
             </a:fld>
             <a:endParaRPr lang="en-US"/>
           </a:p>
@@ -20120,7 +20120,7 @@
           <a:p>
             <a:fld id="{E3744D7E-A5BB-4306-A750-C25515017678}" type="datetimeFigureOut">
               <a:rPr lang="en-US" smtClean="0"/>
-              <a:t>2017-08-15</a:t>
+              <a:t>2017-08-16</a:t>
             </a:fld>
             <a:endParaRPr lang="en-US"/>
           </a:p>
@@ -20652,7 +20652,7 @@
           <a:p>
             <a:fld id="{B880F04E-B60C-4530-BE27-DE08322B2422}" type="datetimeFigureOut">
               <a:rPr lang="en-US" smtClean="0"/>
-              <a:t>2017-08-15</a:t>
+              <a:t>2017-08-16</a:t>
             </a:fld>
             <a:endParaRPr lang="en-US"/>
           </a:p>
@@ -21162,7 +21162,7 @@
           <a:p>
             <a:fld id="{C5690C41-1B19-4491-A062-33F2F29E9A8D}" type="datetimeFigureOut">
               <a:rPr lang="en-US" smtClean="0"/>
-              <a:t>2017-08-15</a:t>
+              <a:t>2017-08-16</a:t>
             </a:fld>
             <a:endParaRPr lang="en-US"/>
           </a:p>
@@ -21672,7 +21672,7 @@
           <a:p>
             <a:fld id="{23D18025-B22E-453D-AA62-4A08DAEF541F}" type="datetimeFigureOut">
               <a:rPr lang="en-US" smtClean="0"/>
-              <a:t>2017-08-15</a:t>
+              <a:t>2017-08-16</a:t>
             </a:fld>
             <a:endParaRPr lang="en-US"/>
           </a:p>
@@ -22182,7 +22182,7 @@
           <a:p>
             <a:fld id="{5A29F1F3-0306-4ADD-8575-5F845BC34EA0}" type="datetimeFigureOut">
               <a:rPr lang="en-US" smtClean="0"/>
-              <a:t>2017-08-15</a:t>
+              <a:t>2017-08-16</a:t>
             </a:fld>
             <a:endParaRPr lang="en-US"/>
           </a:p>
@@ -22692,7 +22692,7 @@
           <a:p>
             <a:fld id="{2CD378D0-82C9-47C6-BEE5-E347AC6F0A5E}" type="datetimeFigureOut">
               <a:rPr lang="en-US" smtClean="0"/>
-              <a:t>2017-08-15</a:t>
+              <a:t>2017-08-16</a:t>
             </a:fld>
             <a:endParaRPr lang="en-US"/>
           </a:p>
@@ -23202,7 +23202,7 @@
           <a:p>
             <a:fld id="{B96FFCCF-F4AB-4D56-AEE8-39DF7F28FF62}" type="datetimeFigureOut">
               <a:rPr lang="en-US" smtClean="0"/>
-              <a:t>2017-08-15</a:t>
+              <a:t>2017-08-16</a:t>
             </a:fld>
             <a:endParaRPr lang="en-US"/>
           </a:p>
@@ -23712,7 +23712,7 @@
           <a:p>
             <a:fld id="{E90DB797-294B-4B2B-9A48-229F3ACF3E1A}" type="datetimeFigureOut">
               <a:rPr lang="en-US" smtClean="0"/>
-              <a:t>2017-08-15</a:t>
+              <a:t>2017-08-16</a:t>
             </a:fld>
             <a:endParaRPr lang="en-US"/>
           </a:p>
@@ -27132,14 +27132,7 @@
                 <a:latin typeface="Arial" panose="020B0604020202020204" pitchFamily="34" charset="0"/>
                 <a:cs typeface="Arial" panose="020B0604020202020204" pitchFamily="34" charset="0"/>
               </a:rPr>
-              <a:t>En</a:t>
-            </a:r>
-            <a:r>
-              <a:rPr lang="en-US" sz="1000" dirty="0" smtClean="0">
-                <a:latin typeface="Arial" panose="020B0604020202020204" pitchFamily="34" charset="0"/>
-                <a:cs typeface="Arial" panose="020B0604020202020204" pitchFamily="34" charset="0"/>
-              </a:rPr>
-              <a:t>cryption </a:t>
+              <a:t>Encryption </a:t>
             </a:r>
             <a:br>
               <a:rPr lang="en-US" sz="1000" dirty="0" smtClean="0">
@@ -28462,13 +28455,6 @@
                 </a:rPr>
                 <a:t>Encryption </a:t>
               </a:r>
-              <a:r>
-                <a:rPr lang="en-US" sz="1000" dirty="0" smtClean="0">
-                  <a:latin typeface="Arial" panose="020B0604020202020204" pitchFamily="34" charset="0"/>
-                  <a:cs typeface="Arial" panose="020B0604020202020204" pitchFamily="34" charset="0"/>
-                </a:rPr>
-                <a:t/>
-              </a:r>
               <a:br>
                 <a:rPr lang="en-US" sz="1000" dirty="0" smtClean="0">
                   <a:latin typeface="Arial" panose="020B0604020202020204" pitchFamily="34" charset="0"/>
@@ -29445,6 +29431,36 @@
           </a:p>
         </p:txBody>
       </p:sp>
+      <p:pic>
+        <p:nvPicPr>
+          <p:cNvPr id="102" name="Picture 101"/>
+          <p:cNvPicPr>
+            <a:picLocks noChangeAspect="1"/>
+          </p:cNvPicPr>
+          <p:nvPr/>
+        </p:nvPicPr>
+        <p:blipFill>
+          <a:blip r:embed="rId11" cstate="print">
+            <a:extLst>
+              <a:ext uri="{28A0092B-C50C-407E-A947-70E740481C1C}">
+                <a14:useLocalDpi xmlns:a14="http://schemas.microsoft.com/office/drawing/2010/main" val="0"/>
+              </a:ext>
+            </a:extLst>
+          </a:blip>
+          <a:stretch>
+            <a:fillRect/>
+          </a:stretch>
+        </p:blipFill>
+        <p:spPr>
+          <a:xfrm>
+            <a:off x="122353" y="132142"/>
+            <a:ext cx="854906" cy="294147"/>
+          </a:xfrm>
+          <a:prstGeom prst="rect">
+            <a:avLst/>
+          </a:prstGeom>
+        </p:spPr>
+      </p:pic>
     </p:spTree>
     <p:extLst>
       <p:ext uri="{BB962C8B-B14F-4D97-AF65-F5344CB8AC3E}">

</xml_diff>

<commit_message>
Saturn auth PPT updated (more is payment system indep)
</commit_message>
<xml_diff>
--- a/saturn/saturn-authorization.pptx
+++ b/saturn/saturn-authorization.pptx
@@ -309,7 +309,7 @@
           <a:p>
             <a:fld id="{E3744D7E-A5BB-4306-A750-C25515017678}" type="datetimeFigureOut">
               <a:rPr lang="en-US" smtClean="0"/>
-              <a:t>2017-08-25</a:t>
+              <a:t>2017-09-17</a:t>
             </a:fld>
             <a:endParaRPr lang="en-US"/>
           </a:p>
@@ -519,7 +519,7 @@
           <a:p>
             <a:fld id="{E3744D7E-A5BB-4306-A750-C25515017678}" type="datetimeFigureOut">
               <a:rPr lang="en-US" smtClean="0"/>
-              <a:t>2017-08-25</a:t>
+              <a:t>2017-09-17</a:t>
             </a:fld>
             <a:endParaRPr lang="en-US"/>
           </a:p>
@@ -736,7 +736,7 @@
           <a:p>
             <a:fld id="{E3744D7E-A5BB-4306-A750-C25515017678}" type="datetimeFigureOut">
               <a:rPr lang="en-US" smtClean="0"/>
-              <a:t>2017-08-25</a:t>
+              <a:t>2017-09-17</a:t>
             </a:fld>
             <a:endParaRPr lang="en-US"/>
           </a:p>
@@ -1001,7 +1001,7 @@
           <a:p>
             <a:fld id="{B880F04E-B60C-4530-BE27-DE08322B2422}" type="datetimeFigureOut">
               <a:rPr lang="en-US" smtClean="0"/>
-              <a:t>2017-08-25</a:t>
+              <a:t>2017-09-17</a:t>
             </a:fld>
             <a:endParaRPr lang="en-US"/>
           </a:p>
@@ -1171,7 +1171,7 @@
           <a:p>
             <a:fld id="{B880F04E-B60C-4530-BE27-DE08322B2422}" type="datetimeFigureOut">
               <a:rPr lang="en-US" smtClean="0"/>
-              <a:t>2017-08-25</a:t>
+              <a:t>2017-09-17</a:t>
             </a:fld>
             <a:endParaRPr lang="en-US"/>
           </a:p>
@@ -1417,7 +1417,7 @@
           <a:p>
             <a:fld id="{B880F04E-B60C-4530-BE27-DE08322B2422}" type="datetimeFigureOut">
               <a:rPr lang="en-US" smtClean="0"/>
-              <a:t>2017-08-25</a:t>
+              <a:t>2017-09-17</a:t>
             </a:fld>
             <a:endParaRPr lang="en-US"/>
           </a:p>
@@ -1705,7 +1705,7 @@
           <a:p>
             <a:fld id="{B880F04E-B60C-4530-BE27-DE08322B2422}" type="datetimeFigureOut">
               <a:rPr lang="en-US" smtClean="0"/>
-              <a:t>2017-08-25</a:t>
+              <a:t>2017-09-17</a:t>
             </a:fld>
             <a:endParaRPr lang="en-US"/>
           </a:p>
@@ -2127,7 +2127,7 @@
           <a:p>
             <a:fld id="{B880F04E-B60C-4530-BE27-DE08322B2422}" type="datetimeFigureOut">
               <a:rPr lang="en-US" smtClean="0"/>
-              <a:t>2017-08-25</a:t>
+              <a:t>2017-09-17</a:t>
             </a:fld>
             <a:endParaRPr lang="en-US"/>
           </a:p>
@@ -2245,7 +2245,7 @@
           <a:p>
             <a:fld id="{B880F04E-B60C-4530-BE27-DE08322B2422}" type="datetimeFigureOut">
               <a:rPr lang="en-US" smtClean="0"/>
-              <a:t>2017-08-25</a:t>
+              <a:t>2017-09-17</a:t>
             </a:fld>
             <a:endParaRPr lang="en-US"/>
           </a:p>
@@ -2340,7 +2340,7 @@
           <a:p>
             <a:fld id="{B880F04E-B60C-4530-BE27-DE08322B2422}" type="datetimeFigureOut">
               <a:rPr lang="en-US" smtClean="0"/>
-              <a:t>2017-08-25</a:t>
+              <a:t>2017-09-17</a:t>
             </a:fld>
             <a:endParaRPr lang="en-US"/>
           </a:p>
@@ -2617,7 +2617,7 @@
           <a:p>
             <a:fld id="{B880F04E-B60C-4530-BE27-DE08322B2422}" type="datetimeFigureOut">
               <a:rPr lang="en-US" smtClean="0"/>
-              <a:t>2017-08-25</a:t>
+              <a:t>2017-09-17</a:t>
             </a:fld>
             <a:endParaRPr lang="en-US"/>
           </a:p>
@@ -2811,7 +2811,7 @@
           <a:p>
             <a:fld id="{E3744D7E-A5BB-4306-A750-C25515017678}" type="datetimeFigureOut">
               <a:rPr lang="en-US" smtClean="0"/>
-              <a:t>2017-08-25</a:t>
+              <a:t>2017-09-17</a:t>
             </a:fld>
             <a:endParaRPr lang="en-US"/>
           </a:p>
@@ -3080,7 +3080,7 @@
           <a:p>
             <a:fld id="{B880F04E-B60C-4530-BE27-DE08322B2422}" type="datetimeFigureOut">
               <a:rPr lang="en-US" smtClean="0"/>
-              <a:t>2017-08-25</a:t>
+              <a:t>2017-09-17</a:t>
             </a:fld>
             <a:endParaRPr lang="en-US"/>
           </a:p>
@@ -3250,7 +3250,7 @@
           <a:p>
             <a:fld id="{B880F04E-B60C-4530-BE27-DE08322B2422}" type="datetimeFigureOut">
               <a:rPr lang="en-US" smtClean="0"/>
-              <a:t>2017-08-25</a:t>
+              <a:t>2017-09-17</a:t>
             </a:fld>
             <a:endParaRPr lang="en-US"/>
           </a:p>
@@ -3430,7 +3430,7 @@
           <a:p>
             <a:fld id="{B880F04E-B60C-4530-BE27-DE08322B2422}" type="datetimeFigureOut">
               <a:rPr lang="en-US" smtClean="0"/>
-              <a:t>2017-08-25</a:t>
+              <a:t>2017-09-17</a:t>
             </a:fld>
             <a:endParaRPr lang="en-US"/>
           </a:p>
@@ -3672,7 +3672,7 @@
           <a:p>
             <a:fld id="{C5690C41-1B19-4491-A062-33F2F29E9A8D}" type="datetimeFigureOut">
               <a:rPr lang="en-US" smtClean="0"/>
-              <a:t>2017-08-25</a:t>
+              <a:t>2017-09-17</a:t>
             </a:fld>
             <a:endParaRPr lang="en-US"/>
           </a:p>
@@ -3842,7 +3842,7 @@
           <a:p>
             <a:fld id="{C5690C41-1B19-4491-A062-33F2F29E9A8D}" type="datetimeFigureOut">
               <a:rPr lang="en-US" smtClean="0"/>
-              <a:t>2017-08-25</a:t>
+              <a:t>2017-09-17</a:t>
             </a:fld>
             <a:endParaRPr lang="en-US"/>
           </a:p>
@@ -4088,7 +4088,7 @@
           <a:p>
             <a:fld id="{C5690C41-1B19-4491-A062-33F2F29E9A8D}" type="datetimeFigureOut">
               <a:rPr lang="en-US" smtClean="0"/>
-              <a:t>2017-08-25</a:t>
+              <a:t>2017-09-17</a:t>
             </a:fld>
             <a:endParaRPr lang="en-US"/>
           </a:p>
@@ -4376,7 +4376,7 @@
           <a:p>
             <a:fld id="{C5690C41-1B19-4491-A062-33F2F29E9A8D}" type="datetimeFigureOut">
               <a:rPr lang="en-US" smtClean="0"/>
-              <a:t>2017-08-25</a:t>
+              <a:t>2017-09-17</a:t>
             </a:fld>
             <a:endParaRPr lang="en-US"/>
           </a:p>
@@ -4798,7 +4798,7 @@
           <a:p>
             <a:fld id="{C5690C41-1B19-4491-A062-33F2F29E9A8D}" type="datetimeFigureOut">
               <a:rPr lang="en-US" smtClean="0"/>
-              <a:t>2017-08-25</a:t>
+              <a:t>2017-09-17</a:t>
             </a:fld>
             <a:endParaRPr lang="en-US"/>
           </a:p>
@@ -4916,7 +4916,7 @@
           <a:p>
             <a:fld id="{C5690C41-1B19-4491-A062-33F2F29E9A8D}" type="datetimeFigureOut">
               <a:rPr lang="en-US" smtClean="0"/>
-              <a:t>2017-08-25</a:t>
+              <a:t>2017-09-17</a:t>
             </a:fld>
             <a:endParaRPr lang="en-US"/>
           </a:p>
@@ -5011,7 +5011,7 @@
           <a:p>
             <a:fld id="{C5690C41-1B19-4491-A062-33F2F29E9A8D}" type="datetimeFigureOut">
               <a:rPr lang="en-US" smtClean="0"/>
-              <a:t>2017-08-25</a:t>
+              <a:t>2017-09-17</a:t>
             </a:fld>
             <a:endParaRPr lang="en-US"/>
           </a:p>
@@ -5271,7 +5271,7 @@
           <a:p>
             <a:fld id="{E3744D7E-A5BB-4306-A750-C25515017678}" type="datetimeFigureOut">
               <a:rPr lang="en-US" smtClean="0"/>
-              <a:t>2017-08-25</a:t>
+              <a:t>2017-09-17</a:t>
             </a:fld>
             <a:endParaRPr lang="en-US"/>
           </a:p>
@@ -5564,7 +5564,7 @@
           <a:p>
             <a:fld id="{C5690C41-1B19-4491-A062-33F2F29E9A8D}" type="datetimeFigureOut">
               <a:rPr lang="en-US" smtClean="0"/>
-              <a:t>2017-08-25</a:t>
+              <a:t>2017-09-17</a:t>
             </a:fld>
             <a:endParaRPr lang="en-US"/>
           </a:p>
@@ -5817,7 +5817,7 @@
           <a:p>
             <a:fld id="{C5690C41-1B19-4491-A062-33F2F29E9A8D}" type="datetimeFigureOut">
               <a:rPr lang="en-US" smtClean="0"/>
-              <a:t>2017-08-25</a:t>
+              <a:t>2017-09-17</a:t>
             </a:fld>
             <a:endParaRPr lang="en-US"/>
           </a:p>
@@ -5987,7 +5987,7 @@
           <a:p>
             <a:fld id="{C5690C41-1B19-4491-A062-33F2F29E9A8D}" type="datetimeFigureOut">
               <a:rPr lang="en-US" smtClean="0"/>
-              <a:t>2017-08-25</a:t>
+              <a:t>2017-09-17</a:t>
             </a:fld>
             <a:endParaRPr lang="en-US"/>
           </a:p>
@@ -6167,7 +6167,7 @@
           <a:p>
             <a:fld id="{C5690C41-1B19-4491-A062-33F2F29E9A8D}" type="datetimeFigureOut">
               <a:rPr lang="en-US" smtClean="0"/>
-              <a:t>2017-08-25</a:t>
+              <a:t>2017-09-17</a:t>
             </a:fld>
             <a:endParaRPr lang="en-US"/>
           </a:p>
@@ -6409,7 +6409,7 @@
           <a:p>
             <a:fld id="{23D18025-B22E-453D-AA62-4A08DAEF541F}" type="datetimeFigureOut">
               <a:rPr lang="en-US" smtClean="0"/>
-              <a:t>2017-08-25</a:t>
+              <a:t>2017-09-17</a:t>
             </a:fld>
             <a:endParaRPr lang="en-US"/>
           </a:p>
@@ -6579,7 +6579,7 @@
           <a:p>
             <a:fld id="{23D18025-B22E-453D-AA62-4A08DAEF541F}" type="datetimeFigureOut">
               <a:rPr lang="en-US" smtClean="0"/>
-              <a:t>2017-08-25</a:t>
+              <a:t>2017-09-17</a:t>
             </a:fld>
             <a:endParaRPr lang="en-US"/>
           </a:p>
@@ -6825,7 +6825,7 @@
           <a:p>
             <a:fld id="{23D18025-B22E-453D-AA62-4A08DAEF541F}" type="datetimeFigureOut">
               <a:rPr lang="en-US" smtClean="0"/>
-              <a:t>2017-08-25</a:t>
+              <a:t>2017-09-17</a:t>
             </a:fld>
             <a:endParaRPr lang="en-US"/>
           </a:p>
@@ -7113,7 +7113,7 @@
           <a:p>
             <a:fld id="{23D18025-B22E-453D-AA62-4A08DAEF541F}" type="datetimeFigureOut">
               <a:rPr lang="en-US" smtClean="0"/>
-              <a:t>2017-08-25</a:t>
+              <a:t>2017-09-17</a:t>
             </a:fld>
             <a:endParaRPr lang="en-US"/>
           </a:p>
@@ -7535,7 +7535,7 @@
           <a:p>
             <a:fld id="{23D18025-B22E-453D-AA62-4A08DAEF541F}" type="datetimeFigureOut">
               <a:rPr lang="en-US" smtClean="0"/>
-              <a:t>2017-08-25</a:t>
+              <a:t>2017-09-17</a:t>
             </a:fld>
             <a:endParaRPr lang="en-US"/>
           </a:p>
@@ -7653,7 +7653,7 @@
           <a:p>
             <a:fld id="{23D18025-B22E-453D-AA62-4A08DAEF541F}" type="datetimeFigureOut">
               <a:rPr lang="en-US" smtClean="0"/>
-              <a:t>2017-08-25</a:t>
+              <a:t>2017-09-17</a:t>
             </a:fld>
             <a:endParaRPr lang="en-US"/>
           </a:p>
@@ -7963,7 +7963,7 @@
           <a:p>
             <a:fld id="{E3744D7E-A5BB-4306-A750-C25515017678}" type="datetimeFigureOut">
               <a:rPr lang="en-US" smtClean="0"/>
-              <a:t>2017-08-25</a:t>
+              <a:t>2017-09-17</a:t>
             </a:fld>
             <a:endParaRPr lang="en-US"/>
           </a:p>
@@ -8074,7 +8074,7 @@
           <a:p>
             <a:fld id="{23D18025-B22E-453D-AA62-4A08DAEF541F}" type="datetimeFigureOut">
               <a:rPr lang="en-US" smtClean="0"/>
-              <a:t>2017-08-25</a:t>
+              <a:t>2017-09-17</a:t>
             </a:fld>
             <a:endParaRPr lang="en-US"/>
           </a:p>
@@ -8351,7 +8351,7 @@
           <a:p>
             <a:fld id="{23D18025-B22E-453D-AA62-4A08DAEF541F}" type="datetimeFigureOut">
               <a:rPr lang="en-US" smtClean="0"/>
-              <a:t>2017-08-25</a:t>
+              <a:t>2017-09-17</a:t>
             </a:fld>
             <a:endParaRPr lang="en-US"/>
           </a:p>
@@ -8604,7 +8604,7 @@
           <a:p>
             <a:fld id="{23D18025-B22E-453D-AA62-4A08DAEF541F}" type="datetimeFigureOut">
               <a:rPr lang="en-US" smtClean="0"/>
-              <a:t>2017-08-25</a:t>
+              <a:t>2017-09-17</a:t>
             </a:fld>
             <a:endParaRPr lang="en-US"/>
           </a:p>
@@ -8774,7 +8774,7 @@
           <a:p>
             <a:fld id="{23D18025-B22E-453D-AA62-4A08DAEF541F}" type="datetimeFigureOut">
               <a:rPr lang="en-US" smtClean="0"/>
-              <a:t>2017-08-25</a:t>
+              <a:t>2017-09-17</a:t>
             </a:fld>
             <a:endParaRPr lang="en-US"/>
           </a:p>
@@ -8954,7 +8954,7 @@
           <a:p>
             <a:fld id="{23D18025-B22E-453D-AA62-4A08DAEF541F}" type="datetimeFigureOut">
               <a:rPr lang="en-US" smtClean="0"/>
-              <a:t>2017-08-25</a:t>
+              <a:t>2017-09-17</a:t>
             </a:fld>
             <a:endParaRPr lang="en-US"/>
           </a:p>
@@ -9196,7 +9196,7 @@
           <a:p>
             <a:fld id="{5A29F1F3-0306-4ADD-8575-5F845BC34EA0}" type="datetimeFigureOut">
               <a:rPr lang="en-US" smtClean="0"/>
-              <a:t>2017-08-25</a:t>
+              <a:t>2017-09-17</a:t>
             </a:fld>
             <a:endParaRPr lang="en-US"/>
           </a:p>
@@ -9366,7 +9366,7 @@
           <a:p>
             <a:fld id="{5A29F1F3-0306-4ADD-8575-5F845BC34EA0}" type="datetimeFigureOut">
               <a:rPr lang="en-US" smtClean="0"/>
-              <a:t>2017-08-25</a:t>
+              <a:t>2017-09-17</a:t>
             </a:fld>
             <a:endParaRPr lang="en-US"/>
           </a:p>
@@ -9612,7 +9612,7 @@
           <a:p>
             <a:fld id="{5A29F1F3-0306-4ADD-8575-5F845BC34EA0}" type="datetimeFigureOut">
               <a:rPr lang="en-US" smtClean="0"/>
-              <a:t>2017-08-25</a:t>
+              <a:t>2017-09-17</a:t>
             </a:fld>
             <a:endParaRPr lang="en-US"/>
           </a:p>
@@ -9900,7 +9900,7 @@
           <a:p>
             <a:fld id="{5A29F1F3-0306-4ADD-8575-5F845BC34EA0}" type="datetimeFigureOut">
               <a:rPr lang="en-US" smtClean="0"/>
-              <a:t>2017-08-25</a:t>
+              <a:t>2017-09-17</a:t>
             </a:fld>
             <a:endParaRPr lang="en-US"/>
           </a:p>
@@ -10322,7 +10322,7 @@
           <a:p>
             <a:fld id="{5A29F1F3-0306-4ADD-8575-5F845BC34EA0}" type="datetimeFigureOut">
               <a:rPr lang="en-US" smtClean="0"/>
-              <a:t>2017-08-25</a:t>
+              <a:t>2017-09-17</a:t>
             </a:fld>
             <a:endParaRPr lang="en-US"/>
           </a:p>
@@ -10772,7 +10772,7 @@
           <a:p>
             <a:fld id="{E3744D7E-A5BB-4306-A750-C25515017678}" type="datetimeFigureOut">
               <a:rPr lang="en-US" smtClean="0"/>
-              <a:t>2017-08-25</a:t>
+              <a:t>2017-09-17</a:t>
             </a:fld>
             <a:endParaRPr lang="en-US"/>
           </a:p>
@@ -10906,7 +10906,7 @@
           <a:p>
             <a:fld id="{5A29F1F3-0306-4ADD-8575-5F845BC34EA0}" type="datetimeFigureOut">
               <a:rPr lang="en-US" smtClean="0"/>
-              <a:t>2017-08-25</a:t>
+              <a:t>2017-09-17</a:t>
             </a:fld>
             <a:endParaRPr lang="en-US"/>
           </a:p>
@@ -11001,7 +11001,7 @@
           <a:p>
             <a:fld id="{5A29F1F3-0306-4ADD-8575-5F845BC34EA0}" type="datetimeFigureOut">
               <a:rPr lang="en-US" smtClean="0"/>
-              <a:t>2017-08-25</a:t>
+              <a:t>2017-09-17</a:t>
             </a:fld>
             <a:endParaRPr lang="en-US"/>
           </a:p>
@@ -11278,7 +11278,7 @@
           <a:p>
             <a:fld id="{5A29F1F3-0306-4ADD-8575-5F845BC34EA0}" type="datetimeFigureOut">
               <a:rPr lang="en-US" smtClean="0"/>
-              <a:t>2017-08-25</a:t>
+              <a:t>2017-09-17</a:t>
             </a:fld>
             <a:endParaRPr lang="en-US"/>
           </a:p>
@@ -11531,7 +11531,7 @@
           <a:p>
             <a:fld id="{5A29F1F3-0306-4ADD-8575-5F845BC34EA0}" type="datetimeFigureOut">
               <a:rPr lang="en-US" smtClean="0"/>
-              <a:t>2017-08-25</a:t>
+              <a:t>2017-09-17</a:t>
             </a:fld>
             <a:endParaRPr lang="en-US"/>
           </a:p>
@@ -11701,7 +11701,7 @@
           <a:p>
             <a:fld id="{5A29F1F3-0306-4ADD-8575-5F845BC34EA0}" type="datetimeFigureOut">
               <a:rPr lang="en-US" smtClean="0"/>
-              <a:t>2017-08-25</a:t>
+              <a:t>2017-09-17</a:t>
             </a:fld>
             <a:endParaRPr lang="en-US"/>
           </a:p>
@@ -11881,7 +11881,7 @@
           <a:p>
             <a:fld id="{5A29F1F3-0306-4ADD-8575-5F845BC34EA0}" type="datetimeFigureOut">
               <a:rPr lang="en-US" smtClean="0"/>
-              <a:t>2017-08-25</a:t>
+              <a:t>2017-09-17</a:t>
             </a:fld>
             <a:endParaRPr lang="en-US"/>
           </a:p>
@@ -12123,7 +12123,7 @@
           <a:p>
             <a:fld id="{2CD378D0-82C9-47C6-BEE5-E347AC6F0A5E}" type="datetimeFigureOut">
               <a:rPr lang="en-US" smtClean="0"/>
-              <a:t>2017-08-25</a:t>
+              <a:t>2017-09-17</a:t>
             </a:fld>
             <a:endParaRPr lang="en-US"/>
           </a:p>
@@ -12293,7 +12293,7 @@
           <a:p>
             <a:fld id="{2CD378D0-82C9-47C6-BEE5-E347AC6F0A5E}" type="datetimeFigureOut">
               <a:rPr lang="en-US" smtClean="0"/>
-              <a:t>2017-08-25</a:t>
+              <a:t>2017-09-17</a:t>
             </a:fld>
             <a:endParaRPr lang="en-US"/>
           </a:p>
@@ -12539,7 +12539,7 @@
           <a:p>
             <a:fld id="{2CD378D0-82C9-47C6-BEE5-E347AC6F0A5E}" type="datetimeFigureOut">
               <a:rPr lang="en-US" smtClean="0"/>
-              <a:t>2017-08-25</a:t>
+              <a:t>2017-09-17</a:t>
             </a:fld>
             <a:endParaRPr lang="en-US"/>
           </a:p>
@@ -12827,7 +12827,7 @@
           <a:p>
             <a:fld id="{2CD378D0-82C9-47C6-BEE5-E347AC6F0A5E}" type="datetimeFigureOut">
               <a:rPr lang="en-US" smtClean="0"/>
-              <a:t>2017-08-25</a:t>
+              <a:t>2017-09-17</a:t>
             </a:fld>
             <a:endParaRPr lang="en-US"/>
           </a:p>
@@ -12961,7 +12961,7 @@
           <a:p>
             <a:fld id="{E3744D7E-A5BB-4306-A750-C25515017678}" type="datetimeFigureOut">
               <a:rPr lang="en-US" smtClean="0"/>
-              <a:t>2017-08-25</a:t>
+              <a:t>2017-09-17</a:t>
             </a:fld>
             <a:endParaRPr lang="en-US"/>
           </a:p>
@@ -13399,7 +13399,7 @@
           <a:p>
             <a:fld id="{2CD378D0-82C9-47C6-BEE5-E347AC6F0A5E}" type="datetimeFigureOut">
               <a:rPr lang="en-US" smtClean="0"/>
-              <a:t>2017-08-25</a:t>
+              <a:t>2017-09-17</a:t>
             </a:fld>
             <a:endParaRPr lang="en-US"/>
           </a:p>
@@ -13517,7 +13517,7 @@
           <a:p>
             <a:fld id="{2CD378D0-82C9-47C6-BEE5-E347AC6F0A5E}" type="datetimeFigureOut">
               <a:rPr lang="en-US" smtClean="0"/>
-              <a:t>2017-08-25</a:t>
+              <a:t>2017-09-17</a:t>
             </a:fld>
             <a:endParaRPr lang="en-US"/>
           </a:p>
@@ -13612,7 +13612,7 @@
           <a:p>
             <a:fld id="{2CD378D0-82C9-47C6-BEE5-E347AC6F0A5E}" type="datetimeFigureOut">
               <a:rPr lang="en-US" smtClean="0"/>
-              <a:t>2017-08-25</a:t>
+              <a:t>2017-09-17</a:t>
             </a:fld>
             <a:endParaRPr lang="en-US"/>
           </a:p>
@@ -13889,7 +13889,7 @@
           <a:p>
             <a:fld id="{2CD378D0-82C9-47C6-BEE5-E347AC6F0A5E}" type="datetimeFigureOut">
               <a:rPr lang="en-US" smtClean="0"/>
-              <a:t>2017-08-25</a:t>
+              <a:t>2017-09-17</a:t>
             </a:fld>
             <a:endParaRPr lang="en-US"/>
           </a:p>
@@ -14142,7 +14142,7 @@
           <a:p>
             <a:fld id="{2CD378D0-82C9-47C6-BEE5-E347AC6F0A5E}" type="datetimeFigureOut">
               <a:rPr lang="en-US" smtClean="0"/>
-              <a:t>2017-08-25</a:t>
+              <a:t>2017-09-17</a:t>
             </a:fld>
             <a:endParaRPr lang="en-US"/>
           </a:p>
@@ -14312,7 +14312,7 @@
           <a:p>
             <a:fld id="{2CD378D0-82C9-47C6-BEE5-E347AC6F0A5E}" type="datetimeFigureOut">
               <a:rPr lang="en-US" smtClean="0"/>
-              <a:t>2017-08-25</a:t>
+              <a:t>2017-09-17</a:t>
             </a:fld>
             <a:endParaRPr lang="en-US"/>
           </a:p>
@@ -14492,7 +14492,7 @@
           <a:p>
             <a:fld id="{2CD378D0-82C9-47C6-BEE5-E347AC6F0A5E}" type="datetimeFigureOut">
               <a:rPr lang="en-US" smtClean="0"/>
-              <a:t>2017-08-25</a:t>
+              <a:t>2017-09-17</a:t>
             </a:fld>
             <a:endParaRPr lang="en-US"/>
           </a:p>
@@ -14734,7 +14734,7 @@
           <a:p>
             <a:fld id="{B96FFCCF-F4AB-4D56-AEE8-39DF7F28FF62}" type="datetimeFigureOut">
               <a:rPr lang="en-US" smtClean="0"/>
-              <a:t>2017-08-25</a:t>
+              <a:t>2017-09-17</a:t>
             </a:fld>
             <a:endParaRPr lang="en-US"/>
           </a:p>
@@ -14904,7 +14904,7 @@
           <a:p>
             <a:fld id="{B96FFCCF-F4AB-4D56-AEE8-39DF7F28FF62}" type="datetimeFigureOut">
               <a:rPr lang="en-US" smtClean="0"/>
-              <a:t>2017-08-25</a:t>
+              <a:t>2017-09-17</a:t>
             </a:fld>
             <a:endParaRPr lang="en-US"/>
           </a:p>
@@ -15150,7 +15150,7 @@
           <a:p>
             <a:fld id="{B96FFCCF-F4AB-4D56-AEE8-39DF7F28FF62}" type="datetimeFigureOut">
               <a:rPr lang="en-US" smtClean="0"/>
-              <a:t>2017-08-25</a:t>
+              <a:t>2017-09-17</a:t>
             </a:fld>
             <a:endParaRPr lang="en-US"/>
           </a:p>
@@ -15253,7 +15253,7 @@
           <a:p>
             <a:fld id="{E3744D7E-A5BB-4306-A750-C25515017678}" type="datetimeFigureOut">
               <a:rPr lang="en-US" smtClean="0"/>
-              <a:t>2017-08-25</a:t>
+              <a:t>2017-09-17</a:t>
             </a:fld>
             <a:endParaRPr lang="en-US"/>
           </a:p>
@@ -15564,7 +15564,7 @@
           <a:p>
             <a:fld id="{B96FFCCF-F4AB-4D56-AEE8-39DF7F28FF62}" type="datetimeFigureOut">
               <a:rPr lang="en-US" smtClean="0"/>
-              <a:t>2017-08-25</a:t>
+              <a:t>2017-09-17</a:t>
             </a:fld>
             <a:endParaRPr lang="en-US"/>
           </a:p>
@@ -15986,7 +15986,7 @@
           <a:p>
             <a:fld id="{B96FFCCF-F4AB-4D56-AEE8-39DF7F28FF62}" type="datetimeFigureOut">
               <a:rPr lang="en-US" smtClean="0"/>
-              <a:t>2017-08-25</a:t>
+              <a:t>2017-09-17</a:t>
             </a:fld>
             <a:endParaRPr lang="en-US"/>
           </a:p>
@@ -16104,7 +16104,7 @@
           <a:p>
             <a:fld id="{B96FFCCF-F4AB-4D56-AEE8-39DF7F28FF62}" type="datetimeFigureOut">
               <a:rPr lang="en-US" smtClean="0"/>
-              <a:t>2017-08-25</a:t>
+              <a:t>2017-09-17</a:t>
             </a:fld>
             <a:endParaRPr lang="en-US"/>
           </a:p>
@@ -16199,7 +16199,7 @@
           <a:p>
             <a:fld id="{B96FFCCF-F4AB-4D56-AEE8-39DF7F28FF62}" type="datetimeFigureOut">
               <a:rPr lang="en-US" smtClean="0"/>
-              <a:t>2017-08-25</a:t>
+              <a:t>2017-09-17</a:t>
             </a:fld>
             <a:endParaRPr lang="en-US"/>
           </a:p>
@@ -16476,7 +16476,7 @@
           <a:p>
             <a:fld id="{B96FFCCF-F4AB-4D56-AEE8-39DF7F28FF62}" type="datetimeFigureOut">
               <a:rPr lang="en-US" smtClean="0"/>
-              <a:t>2017-08-25</a:t>
+              <a:t>2017-09-17</a:t>
             </a:fld>
             <a:endParaRPr lang="en-US"/>
           </a:p>
@@ -16729,7 +16729,7 @@
           <a:p>
             <a:fld id="{B96FFCCF-F4AB-4D56-AEE8-39DF7F28FF62}" type="datetimeFigureOut">
               <a:rPr lang="en-US" smtClean="0"/>
-              <a:t>2017-08-25</a:t>
+              <a:t>2017-09-17</a:t>
             </a:fld>
             <a:endParaRPr lang="en-US"/>
           </a:p>
@@ -16899,7 +16899,7 @@
           <a:p>
             <a:fld id="{B96FFCCF-F4AB-4D56-AEE8-39DF7F28FF62}" type="datetimeFigureOut">
               <a:rPr lang="en-US" smtClean="0"/>
-              <a:t>2017-08-25</a:t>
+              <a:t>2017-09-17</a:t>
             </a:fld>
             <a:endParaRPr lang="en-US"/>
           </a:p>
@@ -17079,7 +17079,7 @@
           <a:p>
             <a:fld id="{B96FFCCF-F4AB-4D56-AEE8-39DF7F28FF62}" type="datetimeFigureOut">
               <a:rPr lang="en-US" smtClean="0"/>
-              <a:t>2017-08-25</a:t>
+              <a:t>2017-09-17</a:t>
             </a:fld>
             <a:endParaRPr lang="en-US"/>
           </a:p>
@@ -17321,7 +17321,7 @@
           <a:p>
             <a:fld id="{E90DB797-294B-4B2B-9A48-229F3ACF3E1A}" type="datetimeFigureOut">
               <a:rPr lang="en-US" smtClean="0"/>
-              <a:t>2017-08-25</a:t>
+              <a:t>2017-09-17</a:t>
             </a:fld>
             <a:endParaRPr lang="en-US"/>
           </a:p>
@@ -17491,7 +17491,7 @@
           <a:p>
             <a:fld id="{E90DB797-294B-4B2B-9A48-229F3ACF3E1A}" type="datetimeFigureOut">
               <a:rPr lang="en-US" smtClean="0"/>
-              <a:t>2017-08-25</a:t>
+              <a:t>2017-09-17</a:t>
             </a:fld>
             <a:endParaRPr lang="en-US"/>
           </a:p>
@@ -17785,7 +17785,7 @@
           <a:p>
             <a:fld id="{E3744D7E-A5BB-4306-A750-C25515017678}" type="datetimeFigureOut">
               <a:rPr lang="en-US" smtClean="0"/>
-              <a:t>2017-08-25</a:t>
+              <a:t>2017-09-17</a:t>
             </a:fld>
             <a:endParaRPr lang="en-US"/>
           </a:p>
@@ -18047,7 +18047,7 @@
           <a:p>
             <a:fld id="{E90DB797-294B-4B2B-9A48-229F3ACF3E1A}" type="datetimeFigureOut">
               <a:rPr lang="en-US" smtClean="0"/>
-              <a:t>2017-08-25</a:t>
+              <a:t>2017-09-17</a:t>
             </a:fld>
             <a:endParaRPr lang="en-US"/>
           </a:p>
@@ -18335,7 +18335,7 @@
           <a:p>
             <a:fld id="{E90DB797-294B-4B2B-9A48-229F3ACF3E1A}" type="datetimeFigureOut">
               <a:rPr lang="en-US" smtClean="0"/>
-              <a:t>2017-08-25</a:t>
+              <a:t>2017-09-17</a:t>
             </a:fld>
             <a:endParaRPr lang="en-US"/>
           </a:p>
@@ -18757,7 +18757,7 @@
           <a:p>
             <a:fld id="{E90DB797-294B-4B2B-9A48-229F3ACF3E1A}" type="datetimeFigureOut">
               <a:rPr lang="en-US" smtClean="0"/>
-              <a:t>2017-08-25</a:t>
+              <a:t>2017-09-17</a:t>
             </a:fld>
             <a:endParaRPr lang="en-US"/>
           </a:p>
@@ -18875,7 +18875,7 @@
           <a:p>
             <a:fld id="{E90DB797-294B-4B2B-9A48-229F3ACF3E1A}" type="datetimeFigureOut">
               <a:rPr lang="en-US" smtClean="0"/>
-              <a:t>2017-08-25</a:t>
+              <a:t>2017-09-17</a:t>
             </a:fld>
             <a:endParaRPr lang="en-US"/>
           </a:p>
@@ -18970,7 +18970,7 @@
           <a:p>
             <a:fld id="{E90DB797-294B-4B2B-9A48-229F3ACF3E1A}" type="datetimeFigureOut">
               <a:rPr lang="en-US" smtClean="0"/>
-              <a:t>2017-08-25</a:t>
+              <a:t>2017-09-17</a:t>
             </a:fld>
             <a:endParaRPr lang="en-US"/>
           </a:p>
@@ -19247,7 +19247,7 @@
           <a:p>
             <a:fld id="{E90DB797-294B-4B2B-9A48-229F3ACF3E1A}" type="datetimeFigureOut">
               <a:rPr lang="en-US" smtClean="0"/>
-              <a:t>2017-08-25</a:t>
+              <a:t>2017-09-17</a:t>
             </a:fld>
             <a:endParaRPr lang="en-US"/>
           </a:p>
@@ -19500,7 +19500,7 @@
           <a:p>
             <a:fld id="{E90DB797-294B-4B2B-9A48-229F3ACF3E1A}" type="datetimeFigureOut">
               <a:rPr lang="en-US" smtClean="0"/>
-              <a:t>2017-08-25</a:t>
+              <a:t>2017-09-17</a:t>
             </a:fld>
             <a:endParaRPr lang="en-US"/>
           </a:p>
@@ -19670,7 +19670,7 @@
           <a:p>
             <a:fld id="{E90DB797-294B-4B2B-9A48-229F3ACF3E1A}" type="datetimeFigureOut">
               <a:rPr lang="en-US" smtClean="0"/>
-              <a:t>2017-08-25</a:t>
+              <a:t>2017-09-17</a:t>
             </a:fld>
             <a:endParaRPr lang="en-US"/>
           </a:p>
@@ -19850,7 +19850,7 @@
           <a:p>
             <a:fld id="{E90DB797-294B-4B2B-9A48-229F3ACF3E1A}" type="datetimeFigureOut">
               <a:rPr lang="en-US" smtClean="0"/>
-              <a:t>2017-08-25</a:t>
+              <a:t>2017-09-17</a:t>
             </a:fld>
             <a:endParaRPr lang="en-US"/>
           </a:p>
@@ -20120,7 +20120,7 @@
           <a:p>
             <a:fld id="{E3744D7E-A5BB-4306-A750-C25515017678}" type="datetimeFigureOut">
               <a:rPr lang="en-US" smtClean="0"/>
-              <a:t>2017-08-25</a:t>
+              <a:t>2017-09-17</a:t>
             </a:fld>
             <a:endParaRPr lang="en-US"/>
           </a:p>
@@ -20652,7 +20652,7 @@
           <a:p>
             <a:fld id="{B880F04E-B60C-4530-BE27-DE08322B2422}" type="datetimeFigureOut">
               <a:rPr lang="en-US" smtClean="0"/>
-              <a:t>2017-08-25</a:t>
+              <a:t>2017-09-17</a:t>
             </a:fld>
             <a:endParaRPr lang="en-US"/>
           </a:p>
@@ -21162,7 +21162,7 @@
           <a:p>
             <a:fld id="{C5690C41-1B19-4491-A062-33F2F29E9A8D}" type="datetimeFigureOut">
               <a:rPr lang="en-US" smtClean="0"/>
-              <a:t>2017-08-25</a:t>
+              <a:t>2017-09-17</a:t>
             </a:fld>
             <a:endParaRPr lang="en-US"/>
           </a:p>
@@ -21672,7 +21672,7 @@
           <a:p>
             <a:fld id="{23D18025-B22E-453D-AA62-4A08DAEF541F}" type="datetimeFigureOut">
               <a:rPr lang="en-US" smtClean="0"/>
-              <a:t>2017-08-25</a:t>
+              <a:t>2017-09-17</a:t>
             </a:fld>
             <a:endParaRPr lang="en-US"/>
           </a:p>
@@ -22182,7 +22182,7 @@
           <a:p>
             <a:fld id="{5A29F1F3-0306-4ADD-8575-5F845BC34EA0}" type="datetimeFigureOut">
               <a:rPr lang="en-US" smtClean="0"/>
-              <a:t>2017-08-25</a:t>
+              <a:t>2017-09-17</a:t>
             </a:fld>
             <a:endParaRPr lang="en-US"/>
           </a:p>
@@ -22692,7 +22692,7 @@
           <a:p>
             <a:fld id="{2CD378D0-82C9-47C6-BEE5-E347AC6F0A5E}" type="datetimeFigureOut">
               <a:rPr lang="en-US" smtClean="0"/>
-              <a:t>2017-08-25</a:t>
+              <a:t>2017-09-17</a:t>
             </a:fld>
             <a:endParaRPr lang="en-US"/>
           </a:p>
@@ -23202,7 +23202,7 @@
           <a:p>
             <a:fld id="{B96FFCCF-F4AB-4D56-AEE8-39DF7F28FF62}" type="datetimeFigureOut">
               <a:rPr lang="en-US" smtClean="0"/>
-              <a:t>2017-08-25</a:t>
+              <a:t>2017-09-17</a:t>
             </a:fld>
             <a:endParaRPr lang="en-US"/>
           </a:p>
@@ -23712,7 +23712,7 @@
           <a:p>
             <a:fld id="{E90DB797-294B-4B2B-9A48-229F3ACF3E1A}" type="datetimeFigureOut">
               <a:rPr lang="en-US" smtClean="0"/>
-              <a:t>2017-08-25</a:t>
+              <a:t>2017-09-17</a:t>
             </a:fld>
             <a:endParaRPr lang="en-US"/>
           </a:p>
@@ -24102,7 +24102,7 @@
         </p:nvCxnSpPr>
         <p:spPr>
           <a:xfrm>
-            <a:off x="3618342" y="4600203"/>
+            <a:off x="3618342" y="4414376"/>
             <a:ext cx="4302000" cy="0"/>
           </a:xfrm>
           <a:prstGeom prst="straightConnector1">
@@ -24142,7 +24142,7 @@
         </p:nvSpPr>
         <p:spPr>
           <a:xfrm>
-            <a:off x="3618756" y="4464571"/>
+            <a:off x="3618756" y="4278744"/>
             <a:ext cx="902811" cy="246221"/>
           </a:xfrm>
           <a:prstGeom prst="rect">
@@ -24223,7 +24223,7 @@
         </p:nvCxnSpPr>
         <p:spPr>
           <a:xfrm flipH="1">
-            <a:off x="1623961" y="7552531"/>
+            <a:off x="1623961" y="7682602"/>
             <a:ext cx="6318000" cy="0"/>
           </a:xfrm>
           <a:prstGeom prst="straightConnector1">
@@ -24263,7 +24263,7 @@
         </p:nvCxnSpPr>
         <p:spPr>
           <a:xfrm>
-            <a:off x="1602532" y="7848947"/>
+            <a:off x="1602532" y="7979018"/>
             <a:ext cx="6318000" cy="0"/>
           </a:xfrm>
           <a:prstGeom prst="straightConnector1">
@@ -24303,7 +24303,7 @@
         </p:nvCxnSpPr>
         <p:spPr>
           <a:xfrm flipH="1">
-            <a:off x="1623961" y="8344619"/>
+            <a:off x="1623961" y="8474690"/>
             <a:ext cx="6318000" cy="0"/>
           </a:xfrm>
           <a:prstGeom prst="straightConnector1">
@@ -24343,7 +24343,7 @@
         </p:nvCxnSpPr>
         <p:spPr>
           <a:xfrm>
-            <a:off x="1602532" y="8641035"/>
+            <a:off x="1602532" y="8771106"/>
             <a:ext cx="6318000" cy="0"/>
           </a:xfrm>
           <a:prstGeom prst="straightConnector1">
@@ -24383,7 +24383,7 @@
         </p:nvSpPr>
         <p:spPr>
           <a:xfrm flipH="1">
-            <a:off x="7031663" y="8208987"/>
+            <a:off x="7031663" y="8339058"/>
             <a:ext cx="902811" cy="246221"/>
           </a:xfrm>
           <a:prstGeom prst="rect">
@@ -24428,7 +24428,7 @@
         </p:nvSpPr>
         <p:spPr>
           <a:xfrm flipH="1">
-            <a:off x="7031663" y="7416899"/>
+            <a:off x="7031663" y="7546970"/>
             <a:ext cx="902811" cy="246221"/>
           </a:xfrm>
           <a:prstGeom prst="rect">
@@ -24473,7 +24473,7 @@
         </p:nvCxnSpPr>
         <p:spPr>
           <a:xfrm flipH="1">
-            <a:off x="3637236" y="4896619"/>
+            <a:off x="3637236" y="4710792"/>
             <a:ext cx="4302000" cy="0"/>
           </a:xfrm>
           <a:prstGeom prst="straightConnector1">
@@ -24514,7 +24514,7 @@
         <p:spPr>
           <a:xfrm>
             <a:off x="6443711" y="1017031"/>
-            <a:ext cx="0" cy="3060000"/>
+            <a:ext cx="0" cy="2952000"/>
           </a:xfrm>
           <a:prstGeom prst="line">
             <a:avLst/>
@@ -24968,7 +24968,7 @@
         </p:nvCxnSpPr>
         <p:spPr>
           <a:xfrm>
-            <a:off x="376834" y="3517164"/>
+            <a:off x="376834" y="4732643"/>
             <a:ext cx="0" cy="684000"/>
           </a:xfrm>
           <a:prstGeom prst="line">
@@ -25006,7 +25006,7 @@
         </p:nvCxnSpPr>
         <p:spPr>
           <a:xfrm>
-            <a:off x="3784197" y="6684958"/>
+            <a:off x="3784197" y="6892448"/>
             <a:ext cx="4140000" cy="0"/>
           </a:xfrm>
           <a:prstGeom prst="straightConnector1">
@@ -25362,7 +25362,7 @@
         </p:nvSpPr>
         <p:spPr>
           <a:xfrm>
-            <a:off x="5006692" y="6407392"/>
+            <a:off x="5006692" y="6614882"/>
             <a:ext cx="1889235" cy="276999"/>
           </a:xfrm>
           <a:prstGeom prst="rect">
@@ -26732,7 +26732,7 @@
         </p:blipFill>
         <p:spPr bwMode="auto">
           <a:xfrm>
-            <a:off x="2925412" y="6492886"/>
+            <a:off x="2925412" y="6700376"/>
             <a:ext cx="360040" cy="356341"/>
           </a:xfrm>
           <a:prstGeom prst="rect">
@@ -26853,7 +26853,7 @@
         </p:nvSpPr>
         <p:spPr>
           <a:xfrm>
-            <a:off x="8117877" y="8338770"/>
+            <a:off x="8117877" y="8468841"/>
             <a:ext cx="1117343" cy="241931"/>
           </a:xfrm>
           <a:prstGeom prst="roundRect">
@@ -26995,7 +26995,7 @@
         </p:nvSpPr>
         <p:spPr>
           <a:xfrm>
-            <a:off x="4729667" y="6401188"/>
+            <a:off x="4729667" y="6608678"/>
             <a:ext cx="389850" cy="276999"/>
           </a:xfrm>
           <a:prstGeom prst="rect">
@@ -27109,7 +27109,7 @@
         </p:nvSpPr>
         <p:spPr>
           <a:xfrm>
-            <a:off x="5254822" y="6679319"/>
+            <a:off x="5254822" y="6886809"/>
             <a:ext cx="1074333" cy="246221"/>
           </a:xfrm>
           <a:prstGeom prst="rect">
@@ -27464,7 +27464,7 @@
         </p:nvSpPr>
         <p:spPr>
           <a:xfrm>
-            <a:off x="2235474" y="6468934"/>
+            <a:off x="2235474" y="6676424"/>
             <a:ext cx="729687" cy="400110"/>
           </a:xfrm>
           <a:prstGeom prst="rect">
@@ -28891,7 +28891,7 @@
         </p:nvGrpSpPr>
         <p:grpSpPr>
           <a:xfrm>
-            <a:off x="3265687" y="6236441"/>
+            <a:off x="3265687" y="6443931"/>
             <a:ext cx="714205" cy="922858"/>
             <a:chOff x="1896591" y="5170438"/>
             <a:chExt cx="714205" cy="922858"/>
@@ -29145,7 +29145,7 @@
         </p:nvCxnSpPr>
         <p:spPr>
           <a:xfrm>
-            <a:off x="415412" y="3853007"/>
+            <a:off x="415412" y="5068486"/>
             <a:ext cx="9108000" cy="0"/>
           </a:xfrm>
           <a:prstGeom prst="line">
@@ -29183,7 +29183,7 @@
         </p:nvSpPr>
         <p:spPr>
           <a:xfrm>
-            <a:off x="321580" y="3795637"/>
+            <a:off x="321580" y="5011116"/>
             <a:ext cx="108000" cy="108000"/>
           </a:xfrm>
           <a:prstGeom prst="ellipse">
@@ -29231,7 +29231,7 @@
         </p:nvSpPr>
         <p:spPr>
           <a:xfrm rot="16200000">
-            <a:off x="-741918" y="2282209"/>
+            <a:off x="-741918" y="3497688"/>
             <a:ext cx="2241319" cy="276999"/>
           </a:xfrm>
           <a:prstGeom prst="rect">
@@ -29274,7 +29274,7 @@
         </p:nvSpPr>
         <p:spPr>
           <a:xfrm rot="16200000">
-            <a:off x="-936132" y="5437823"/>
+            <a:off x="-936132" y="6653302"/>
             <a:ext cx="2618024" cy="276999"/>
           </a:xfrm>
           <a:prstGeom prst="rect">
@@ -29486,7 +29486,7 @@
         </p:nvSpPr>
         <p:spPr>
           <a:xfrm>
-            <a:off x="5556082" y="4143169"/>
+            <a:off x="5490964" y="3966161"/>
             <a:ext cx="1915909" cy="246221"/>
           </a:xfrm>
           <a:prstGeom prst="rect">
@@ -29522,8 +29522,8 @@
         </p:nvCxnSpPr>
         <p:spPr>
           <a:xfrm>
-            <a:off x="2278225" y="5906793"/>
-            <a:ext cx="1188000" cy="1067984"/>
+            <a:off x="2278225" y="6012710"/>
+            <a:ext cx="1188000" cy="1152000"/>
           </a:xfrm>
           <a:prstGeom prst="bentConnector3">
             <a:avLst>
@@ -29561,7 +29561,7 @@
         </p:nvSpPr>
         <p:spPr>
           <a:xfrm>
-            <a:off x="2099445" y="5199088"/>
+            <a:off x="2099445" y="5406578"/>
             <a:ext cx="1323493" cy="802202"/>
           </a:xfrm>
           <a:prstGeom prst="roundRect">
@@ -30455,7 +30455,7 @@
         </p:nvSpPr>
         <p:spPr>
           <a:xfrm>
-            <a:off x="2216911" y="4614545"/>
+            <a:off x="2216911" y="4428718"/>
             <a:ext cx="1206027" cy="237548"/>
           </a:xfrm>
           <a:prstGeom prst="roundRect">
@@ -30529,7 +30529,7 @@
         </p:nvSpPr>
         <p:spPr>
           <a:xfrm>
-            <a:off x="5159092" y="4619620"/>
+            <a:off x="5159092" y="4433793"/>
             <a:ext cx="1889235" cy="276999"/>
           </a:xfrm>
           <a:prstGeom prst="rect">
@@ -30579,7 +30579,7 @@
         </p:nvSpPr>
         <p:spPr>
           <a:xfrm flipH="1">
-            <a:off x="5159506" y="7571948"/>
+            <a:off x="5159506" y="7702019"/>
             <a:ext cx="1889235" cy="276999"/>
           </a:xfrm>
           <a:prstGeom prst="rect">
@@ -30629,7 +30629,7 @@
         </p:nvSpPr>
         <p:spPr>
           <a:xfrm flipH="1">
-            <a:off x="5104373" y="8364036"/>
+            <a:off x="5104373" y="8494107"/>
             <a:ext cx="1889235" cy="276999"/>
           </a:xfrm>
           <a:prstGeom prst="rect">
@@ -30679,7 +30679,7 @@
         </p:nvSpPr>
         <p:spPr>
           <a:xfrm>
-            <a:off x="8117877" y="7531765"/>
+            <a:off x="8117877" y="7661836"/>
             <a:ext cx="1173990" cy="241931"/>
           </a:xfrm>
           <a:prstGeom prst="roundRect">
@@ -30760,7 +30760,7 @@
         </p:nvSpPr>
         <p:spPr>
           <a:xfrm>
-            <a:off x="8117877" y="8840359"/>
+            <a:off x="8117877" y="8970430"/>
             <a:ext cx="1155243" cy="570544"/>
           </a:xfrm>
           <a:prstGeom prst="roundRect">
@@ -30834,7 +30834,7 @@
         </p:nvSpPr>
         <p:spPr>
           <a:xfrm>
-            <a:off x="7598795" y="4761934"/>
+            <a:off x="7598795" y="4576107"/>
             <a:ext cx="669093" cy="252000"/>
           </a:xfrm>
           <a:prstGeom prst="ellipse">
@@ -30912,7 +30912,7 @@
         </p:nvSpPr>
         <p:spPr>
           <a:xfrm>
-            <a:off x="1270485" y="8508924"/>
+            <a:off x="1270485" y="8638995"/>
             <a:ext cx="669093" cy="252000"/>
           </a:xfrm>
           <a:prstGeom prst="ellipse">
@@ -30990,7 +30990,7 @@
         </p:nvSpPr>
         <p:spPr>
           <a:xfrm>
-            <a:off x="1272050" y="7719217"/>
+            <a:off x="1272050" y="7849288"/>
             <a:ext cx="669093" cy="252000"/>
           </a:xfrm>
           <a:prstGeom prst="ellipse">
@@ -31132,7 +31132,7 @@
         </p:nvGrpSpPr>
         <p:grpSpPr>
           <a:xfrm>
-            <a:off x="8380249" y="4590346"/>
+            <a:off x="8380249" y="4329083"/>
             <a:ext cx="445844" cy="603379"/>
             <a:chOff x="8232155" y="587661"/>
             <a:chExt cx="445844" cy="603379"/>
@@ -31242,7 +31242,7 @@
         </p:nvSpPr>
         <p:spPr>
           <a:xfrm>
-            <a:off x="8810785" y="4669639"/>
+            <a:off x="8810785" y="4483812"/>
             <a:ext cx="785792" cy="400110"/>
           </a:xfrm>
           <a:prstGeom prst="rect">
@@ -31292,7 +31292,7 @@
         </p:nvGrpSpPr>
         <p:grpSpPr>
           <a:xfrm>
-            <a:off x="735752" y="7536655"/>
+            <a:off x="735752" y="7666726"/>
             <a:ext cx="445844" cy="603379"/>
             <a:chOff x="8232155" y="587661"/>
             <a:chExt cx="445844" cy="603379"/>
@@ -31402,7 +31402,7 @@
         </p:nvGrpSpPr>
         <p:grpSpPr>
           <a:xfrm>
-            <a:off x="735752" y="8316838"/>
+            <a:off x="735752" y="8446909"/>
             <a:ext cx="445844" cy="603379"/>
             <a:chOff x="8232155" y="587661"/>
             <a:chExt cx="445844" cy="603379"/>
@@ -31512,7 +31512,7 @@
         </p:nvSpPr>
         <p:spPr>
           <a:xfrm>
-            <a:off x="561771" y="8960988"/>
+            <a:off x="561771" y="9091059"/>
             <a:ext cx="793807" cy="400110"/>
           </a:xfrm>
           <a:prstGeom prst="rect">
@@ -31562,7 +31562,7 @@
         </p:nvSpPr>
         <p:spPr>
           <a:xfrm>
-            <a:off x="561771" y="7124640"/>
+            <a:off x="561771" y="7254711"/>
             <a:ext cx="793807" cy="400110"/>
           </a:xfrm>
           <a:prstGeom prst="rect">

</xml_diff>

<commit_message>
Changed user image (it was ugly)
</commit_message>
<xml_diff>
--- a/saturn/saturn-authorization.pptx
+++ b/saturn/saturn-authorization.pptx
@@ -309,7 +309,7 @@
           <a:p>
             <a:fld id="{E3744D7E-A5BB-4306-A750-C25515017678}" type="datetimeFigureOut">
               <a:rPr lang="en-US" smtClean="0"/>
-              <a:t>2017-09-17</a:t>
+              <a:t>2017-09-18</a:t>
             </a:fld>
             <a:endParaRPr lang="en-US"/>
           </a:p>
@@ -519,7 +519,7 @@
           <a:p>
             <a:fld id="{E3744D7E-A5BB-4306-A750-C25515017678}" type="datetimeFigureOut">
               <a:rPr lang="en-US" smtClean="0"/>
-              <a:t>2017-09-17</a:t>
+              <a:t>2017-09-18</a:t>
             </a:fld>
             <a:endParaRPr lang="en-US"/>
           </a:p>
@@ -736,7 +736,7 @@
           <a:p>
             <a:fld id="{E3744D7E-A5BB-4306-A750-C25515017678}" type="datetimeFigureOut">
               <a:rPr lang="en-US" smtClean="0"/>
-              <a:t>2017-09-17</a:t>
+              <a:t>2017-09-18</a:t>
             </a:fld>
             <a:endParaRPr lang="en-US"/>
           </a:p>
@@ -1001,7 +1001,7 @@
           <a:p>
             <a:fld id="{B880F04E-B60C-4530-BE27-DE08322B2422}" type="datetimeFigureOut">
               <a:rPr lang="en-US" smtClean="0"/>
-              <a:t>2017-09-17</a:t>
+              <a:t>2017-09-18</a:t>
             </a:fld>
             <a:endParaRPr lang="en-US"/>
           </a:p>
@@ -1171,7 +1171,7 @@
           <a:p>
             <a:fld id="{B880F04E-B60C-4530-BE27-DE08322B2422}" type="datetimeFigureOut">
               <a:rPr lang="en-US" smtClean="0"/>
-              <a:t>2017-09-17</a:t>
+              <a:t>2017-09-18</a:t>
             </a:fld>
             <a:endParaRPr lang="en-US"/>
           </a:p>
@@ -1417,7 +1417,7 @@
           <a:p>
             <a:fld id="{B880F04E-B60C-4530-BE27-DE08322B2422}" type="datetimeFigureOut">
               <a:rPr lang="en-US" smtClean="0"/>
-              <a:t>2017-09-17</a:t>
+              <a:t>2017-09-18</a:t>
             </a:fld>
             <a:endParaRPr lang="en-US"/>
           </a:p>
@@ -1705,7 +1705,7 @@
           <a:p>
             <a:fld id="{B880F04E-B60C-4530-BE27-DE08322B2422}" type="datetimeFigureOut">
               <a:rPr lang="en-US" smtClean="0"/>
-              <a:t>2017-09-17</a:t>
+              <a:t>2017-09-18</a:t>
             </a:fld>
             <a:endParaRPr lang="en-US"/>
           </a:p>
@@ -2127,7 +2127,7 @@
           <a:p>
             <a:fld id="{B880F04E-B60C-4530-BE27-DE08322B2422}" type="datetimeFigureOut">
               <a:rPr lang="en-US" smtClean="0"/>
-              <a:t>2017-09-17</a:t>
+              <a:t>2017-09-18</a:t>
             </a:fld>
             <a:endParaRPr lang="en-US"/>
           </a:p>
@@ -2245,7 +2245,7 @@
           <a:p>
             <a:fld id="{B880F04E-B60C-4530-BE27-DE08322B2422}" type="datetimeFigureOut">
               <a:rPr lang="en-US" smtClean="0"/>
-              <a:t>2017-09-17</a:t>
+              <a:t>2017-09-18</a:t>
             </a:fld>
             <a:endParaRPr lang="en-US"/>
           </a:p>
@@ -2340,7 +2340,7 @@
           <a:p>
             <a:fld id="{B880F04E-B60C-4530-BE27-DE08322B2422}" type="datetimeFigureOut">
               <a:rPr lang="en-US" smtClean="0"/>
-              <a:t>2017-09-17</a:t>
+              <a:t>2017-09-18</a:t>
             </a:fld>
             <a:endParaRPr lang="en-US"/>
           </a:p>
@@ -2617,7 +2617,7 @@
           <a:p>
             <a:fld id="{B880F04E-B60C-4530-BE27-DE08322B2422}" type="datetimeFigureOut">
               <a:rPr lang="en-US" smtClean="0"/>
-              <a:t>2017-09-17</a:t>
+              <a:t>2017-09-18</a:t>
             </a:fld>
             <a:endParaRPr lang="en-US"/>
           </a:p>
@@ -2811,7 +2811,7 @@
           <a:p>
             <a:fld id="{E3744D7E-A5BB-4306-A750-C25515017678}" type="datetimeFigureOut">
               <a:rPr lang="en-US" smtClean="0"/>
-              <a:t>2017-09-17</a:t>
+              <a:t>2017-09-18</a:t>
             </a:fld>
             <a:endParaRPr lang="en-US"/>
           </a:p>
@@ -3080,7 +3080,7 @@
           <a:p>
             <a:fld id="{B880F04E-B60C-4530-BE27-DE08322B2422}" type="datetimeFigureOut">
               <a:rPr lang="en-US" smtClean="0"/>
-              <a:t>2017-09-17</a:t>
+              <a:t>2017-09-18</a:t>
             </a:fld>
             <a:endParaRPr lang="en-US"/>
           </a:p>
@@ -3250,7 +3250,7 @@
           <a:p>
             <a:fld id="{B880F04E-B60C-4530-BE27-DE08322B2422}" type="datetimeFigureOut">
               <a:rPr lang="en-US" smtClean="0"/>
-              <a:t>2017-09-17</a:t>
+              <a:t>2017-09-18</a:t>
             </a:fld>
             <a:endParaRPr lang="en-US"/>
           </a:p>
@@ -3430,7 +3430,7 @@
           <a:p>
             <a:fld id="{B880F04E-B60C-4530-BE27-DE08322B2422}" type="datetimeFigureOut">
               <a:rPr lang="en-US" smtClean="0"/>
-              <a:t>2017-09-17</a:t>
+              <a:t>2017-09-18</a:t>
             </a:fld>
             <a:endParaRPr lang="en-US"/>
           </a:p>
@@ -3672,7 +3672,7 @@
           <a:p>
             <a:fld id="{C5690C41-1B19-4491-A062-33F2F29E9A8D}" type="datetimeFigureOut">
               <a:rPr lang="en-US" smtClean="0"/>
-              <a:t>2017-09-17</a:t>
+              <a:t>2017-09-18</a:t>
             </a:fld>
             <a:endParaRPr lang="en-US"/>
           </a:p>
@@ -3842,7 +3842,7 @@
           <a:p>
             <a:fld id="{C5690C41-1B19-4491-A062-33F2F29E9A8D}" type="datetimeFigureOut">
               <a:rPr lang="en-US" smtClean="0"/>
-              <a:t>2017-09-17</a:t>
+              <a:t>2017-09-18</a:t>
             </a:fld>
             <a:endParaRPr lang="en-US"/>
           </a:p>
@@ -4088,7 +4088,7 @@
           <a:p>
             <a:fld id="{C5690C41-1B19-4491-A062-33F2F29E9A8D}" type="datetimeFigureOut">
               <a:rPr lang="en-US" smtClean="0"/>
-              <a:t>2017-09-17</a:t>
+              <a:t>2017-09-18</a:t>
             </a:fld>
             <a:endParaRPr lang="en-US"/>
           </a:p>
@@ -4376,7 +4376,7 @@
           <a:p>
             <a:fld id="{C5690C41-1B19-4491-A062-33F2F29E9A8D}" type="datetimeFigureOut">
               <a:rPr lang="en-US" smtClean="0"/>
-              <a:t>2017-09-17</a:t>
+              <a:t>2017-09-18</a:t>
             </a:fld>
             <a:endParaRPr lang="en-US"/>
           </a:p>
@@ -4798,7 +4798,7 @@
           <a:p>
             <a:fld id="{C5690C41-1B19-4491-A062-33F2F29E9A8D}" type="datetimeFigureOut">
               <a:rPr lang="en-US" smtClean="0"/>
-              <a:t>2017-09-17</a:t>
+              <a:t>2017-09-18</a:t>
             </a:fld>
             <a:endParaRPr lang="en-US"/>
           </a:p>
@@ -4916,7 +4916,7 @@
           <a:p>
             <a:fld id="{C5690C41-1B19-4491-A062-33F2F29E9A8D}" type="datetimeFigureOut">
               <a:rPr lang="en-US" smtClean="0"/>
-              <a:t>2017-09-17</a:t>
+              <a:t>2017-09-18</a:t>
             </a:fld>
             <a:endParaRPr lang="en-US"/>
           </a:p>
@@ -5011,7 +5011,7 @@
           <a:p>
             <a:fld id="{C5690C41-1B19-4491-A062-33F2F29E9A8D}" type="datetimeFigureOut">
               <a:rPr lang="en-US" smtClean="0"/>
-              <a:t>2017-09-17</a:t>
+              <a:t>2017-09-18</a:t>
             </a:fld>
             <a:endParaRPr lang="en-US"/>
           </a:p>
@@ -5271,7 +5271,7 @@
           <a:p>
             <a:fld id="{E3744D7E-A5BB-4306-A750-C25515017678}" type="datetimeFigureOut">
               <a:rPr lang="en-US" smtClean="0"/>
-              <a:t>2017-09-17</a:t>
+              <a:t>2017-09-18</a:t>
             </a:fld>
             <a:endParaRPr lang="en-US"/>
           </a:p>
@@ -5564,7 +5564,7 @@
           <a:p>
             <a:fld id="{C5690C41-1B19-4491-A062-33F2F29E9A8D}" type="datetimeFigureOut">
               <a:rPr lang="en-US" smtClean="0"/>
-              <a:t>2017-09-17</a:t>
+              <a:t>2017-09-18</a:t>
             </a:fld>
             <a:endParaRPr lang="en-US"/>
           </a:p>
@@ -5817,7 +5817,7 @@
           <a:p>
             <a:fld id="{C5690C41-1B19-4491-A062-33F2F29E9A8D}" type="datetimeFigureOut">
               <a:rPr lang="en-US" smtClean="0"/>
-              <a:t>2017-09-17</a:t>
+              <a:t>2017-09-18</a:t>
             </a:fld>
             <a:endParaRPr lang="en-US"/>
           </a:p>
@@ -5987,7 +5987,7 @@
           <a:p>
             <a:fld id="{C5690C41-1B19-4491-A062-33F2F29E9A8D}" type="datetimeFigureOut">
               <a:rPr lang="en-US" smtClean="0"/>
-              <a:t>2017-09-17</a:t>
+              <a:t>2017-09-18</a:t>
             </a:fld>
             <a:endParaRPr lang="en-US"/>
           </a:p>
@@ -6167,7 +6167,7 @@
           <a:p>
             <a:fld id="{C5690C41-1B19-4491-A062-33F2F29E9A8D}" type="datetimeFigureOut">
               <a:rPr lang="en-US" smtClean="0"/>
-              <a:t>2017-09-17</a:t>
+              <a:t>2017-09-18</a:t>
             </a:fld>
             <a:endParaRPr lang="en-US"/>
           </a:p>
@@ -6409,7 +6409,7 @@
           <a:p>
             <a:fld id="{23D18025-B22E-453D-AA62-4A08DAEF541F}" type="datetimeFigureOut">
               <a:rPr lang="en-US" smtClean="0"/>
-              <a:t>2017-09-17</a:t>
+              <a:t>2017-09-18</a:t>
             </a:fld>
             <a:endParaRPr lang="en-US"/>
           </a:p>
@@ -6579,7 +6579,7 @@
           <a:p>
             <a:fld id="{23D18025-B22E-453D-AA62-4A08DAEF541F}" type="datetimeFigureOut">
               <a:rPr lang="en-US" smtClean="0"/>
-              <a:t>2017-09-17</a:t>
+              <a:t>2017-09-18</a:t>
             </a:fld>
             <a:endParaRPr lang="en-US"/>
           </a:p>
@@ -6825,7 +6825,7 @@
           <a:p>
             <a:fld id="{23D18025-B22E-453D-AA62-4A08DAEF541F}" type="datetimeFigureOut">
               <a:rPr lang="en-US" smtClean="0"/>
-              <a:t>2017-09-17</a:t>
+              <a:t>2017-09-18</a:t>
             </a:fld>
             <a:endParaRPr lang="en-US"/>
           </a:p>
@@ -7113,7 +7113,7 @@
           <a:p>
             <a:fld id="{23D18025-B22E-453D-AA62-4A08DAEF541F}" type="datetimeFigureOut">
               <a:rPr lang="en-US" smtClean="0"/>
-              <a:t>2017-09-17</a:t>
+              <a:t>2017-09-18</a:t>
             </a:fld>
             <a:endParaRPr lang="en-US"/>
           </a:p>
@@ -7535,7 +7535,7 @@
           <a:p>
             <a:fld id="{23D18025-B22E-453D-AA62-4A08DAEF541F}" type="datetimeFigureOut">
               <a:rPr lang="en-US" smtClean="0"/>
-              <a:t>2017-09-17</a:t>
+              <a:t>2017-09-18</a:t>
             </a:fld>
             <a:endParaRPr lang="en-US"/>
           </a:p>
@@ -7653,7 +7653,7 @@
           <a:p>
             <a:fld id="{23D18025-B22E-453D-AA62-4A08DAEF541F}" type="datetimeFigureOut">
               <a:rPr lang="en-US" smtClean="0"/>
-              <a:t>2017-09-17</a:t>
+              <a:t>2017-09-18</a:t>
             </a:fld>
             <a:endParaRPr lang="en-US"/>
           </a:p>
@@ -7963,7 +7963,7 @@
           <a:p>
             <a:fld id="{E3744D7E-A5BB-4306-A750-C25515017678}" type="datetimeFigureOut">
               <a:rPr lang="en-US" smtClean="0"/>
-              <a:t>2017-09-17</a:t>
+              <a:t>2017-09-18</a:t>
             </a:fld>
             <a:endParaRPr lang="en-US"/>
           </a:p>
@@ -8074,7 +8074,7 @@
           <a:p>
             <a:fld id="{23D18025-B22E-453D-AA62-4A08DAEF541F}" type="datetimeFigureOut">
               <a:rPr lang="en-US" smtClean="0"/>
-              <a:t>2017-09-17</a:t>
+              <a:t>2017-09-18</a:t>
             </a:fld>
             <a:endParaRPr lang="en-US"/>
           </a:p>
@@ -8351,7 +8351,7 @@
           <a:p>
             <a:fld id="{23D18025-B22E-453D-AA62-4A08DAEF541F}" type="datetimeFigureOut">
               <a:rPr lang="en-US" smtClean="0"/>
-              <a:t>2017-09-17</a:t>
+              <a:t>2017-09-18</a:t>
             </a:fld>
             <a:endParaRPr lang="en-US"/>
           </a:p>
@@ -8604,7 +8604,7 @@
           <a:p>
             <a:fld id="{23D18025-B22E-453D-AA62-4A08DAEF541F}" type="datetimeFigureOut">
               <a:rPr lang="en-US" smtClean="0"/>
-              <a:t>2017-09-17</a:t>
+              <a:t>2017-09-18</a:t>
             </a:fld>
             <a:endParaRPr lang="en-US"/>
           </a:p>
@@ -8774,7 +8774,7 @@
           <a:p>
             <a:fld id="{23D18025-B22E-453D-AA62-4A08DAEF541F}" type="datetimeFigureOut">
               <a:rPr lang="en-US" smtClean="0"/>
-              <a:t>2017-09-17</a:t>
+              <a:t>2017-09-18</a:t>
             </a:fld>
             <a:endParaRPr lang="en-US"/>
           </a:p>
@@ -8954,7 +8954,7 @@
           <a:p>
             <a:fld id="{23D18025-B22E-453D-AA62-4A08DAEF541F}" type="datetimeFigureOut">
               <a:rPr lang="en-US" smtClean="0"/>
-              <a:t>2017-09-17</a:t>
+              <a:t>2017-09-18</a:t>
             </a:fld>
             <a:endParaRPr lang="en-US"/>
           </a:p>
@@ -9196,7 +9196,7 @@
           <a:p>
             <a:fld id="{5A29F1F3-0306-4ADD-8575-5F845BC34EA0}" type="datetimeFigureOut">
               <a:rPr lang="en-US" smtClean="0"/>
-              <a:t>2017-09-17</a:t>
+              <a:t>2017-09-18</a:t>
             </a:fld>
             <a:endParaRPr lang="en-US"/>
           </a:p>
@@ -9366,7 +9366,7 @@
           <a:p>
             <a:fld id="{5A29F1F3-0306-4ADD-8575-5F845BC34EA0}" type="datetimeFigureOut">
               <a:rPr lang="en-US" smtClean="0"/>
-              <a:t>2017-09-17</a:t>
+              <a:t>2017-09-18</a:t>
             </a:fld>
             <a:endParaRPr lang="en-US"/>
           </a:p>
@@ -9612,7 +9612,7 @@
           <a:p>
             <a:fld id="{5A29F1F3-0306-4ADD-8575-5F845BC34EA0}" type="datetimeFigureOut">
               <a:rPr lang="en-US" smtClean="0"/>
-              <a:t>2017-09-17</a:t>
+              <a:t>2017-09-18</a:t>
             </a:fld>
             <a:endParaRPr lang="en-US"/>
           </a:p>
@@ -9900,7 +9900,7 @@
           <a:p>
             <a:fld id="{5A29F1F3-0306-4ADD-8575-5F845BC34EA0}" type="datetimeFigureOut">
               <a:rPr lang="en-US" smtClean="0"/>
-              <a:t>2017-09-17</a:t>
+              <a:t>2017-09-18</a:t>
             </a:fld>
             <a:endParaRPr lang="en-US"/>
           </a:p>
@@ -10322,7 +10322,7 @@
           <a:p>
             <a:fld id="{5A29F1F3-0306-4ADD-8575-5F845BC34EA0}" type="datetimeFigureOut">
               <a:rPr lang="en-US" smtClean="0"/>
-              <a:t>2017-09-17</a:t>
+              <a:t>2017-09-18</a:t>
             </a:fld>
             <a:endParaRPr lang="en-US"/>
           </a:p>
@@ -10772,7 +10772,7 @@
           <a:p>
             <a:fld id="{E3744D7E-A5BB-4306-A750-C25515017678}" type="datetimeFigureOut">
               <a:rPr lang="en-US" smtClean="0"/>
-              <a:t>2017-09-17</a:t>
+              <a:t>2017-09-18</a:t>
             </a:fld>
             <a:endParaRPr lang="en-US"/>
           </a:p>
@@ -10906,7 +10906,7 @@
           <a:p>
             <a:fld id="{5A29F1F3-0306-4ADD-8575-5F845BC34EA0}" type="datetimeFigureOut">
               <a:rPr lang="en-US" smtClean="0"/>
-              <a:t>2017-09-17</a:t>
+              <a:t>2017-09-18</a:t>
             </a:fld>
             <a:endParaRPr lang="en-US"/>
           </a:p>
@@ -11001,7 +11001,7 @@
           <a:p>
             <a:fld id="{5A29F1F3-0306-4ADD-8575-5F845BC34EA0}" type="datetimeFigureOut">
               <a:rPr lang="en-US" smtClean="0"/>
-              <a:t>2017-09-17</a:t>
+              <a:t>2017-09-18</a:t>
             </a:fld>
             <a:endParaRPr lang="en-US"/>
           </a:p>
@@ -11278,7 +11278,7 @@
           <a:p>
             <a:fld id="{5A29F1F3-0306-4ADD-8575-5F845BC34EA0}" type="datetimeFigureOut">
               <a:rPr lang="en-US" smtClean="0"/>
-              <a:t>2017-09-17</a:t>
+              <a:t>2017-09-18</a:t>
             </a:fld>
             <a:endParaRPr lang="en-US"/>
           </a:p>
@@ -11531,7 +11531,7 @@
           <a:p>
             <a:fld id="{5A29F1F3-0306-4ADD-8575-5F845BC34EA0}" type="datetimeFigureOut">
               <a:rPr lang="en-US" smtClean="0"/>
-              <a:t>2017-09-17</a:t>
+              <a:t>2017-09-18</a:t>
             </a:fld>
             <a:endParaRPr lang="en-US"/>
           </a:p>
@@ -11701,7 +11701,7 @@
           <a:p>
             <a:fld id="{5A29F1F3-0306-4ADD-8575-5F845BC34EA0}" type="datetimeFigureOut">
               <a:rPr lang="en-US" smtClean="0"/>
-              <a:t>2017-09-17</a:t>
+              <a:t>2017-09-18</a:t>
             </a:fld>
             <a:endParaRPr lang="en-US"/>
           </a:p>
@@ -11881,7 +11881,7 @@
           <a:p>
             <a:fld id="{5A29F1F3-0306-4ADD-8575-5F845BC34EA0}" type="datetimeFigureOut">
               <a:rPr lang="en-US" smtClean="0"/>
-              <a:t>2017-09-17</a:t>
+              <a:t>2017-09-18</a:t>
             </a:fld>
             <a:endParaRPr lang="en-US"/>
           </a:p>
@@ -12123,7 +12123,7 @@
           <a:p>
             <a:fld id="{2CD378D0-82C9-47C6-BEE5-E347AC6F0A5E}" type="datetimeFigureOut">
               <a:rPr lang="en-US" smtClean="0"/>
-              <a:t>2017-09-17</a:t>
+              <a:t>2017-09-18</a:t>
             </a:fld>
             <a:endParaRPr lang="en-US"/>
           </a:p>
@@ -12293,7 +12293,7 @@
           <a:p>
             <a:fld id="{2CD378D0-82C9-47C6-BEE5-E347AC6F0A5E}" type="datetimeFigureOut">
               <a:rPr lang="en-US" smtClean="0"/>
-              <a:t>2017-09-17</a:t>
+              <a:t>2017-09-18</a:t>
             </a:fld>
             <a:endParaRPr lang="en-US"/>
           </a:p>
@@ -12539,7 +12539,7 @@
           <a:p>
             <a:fld id="{2CD378D0-82C9-47C6-BEE5-E347AC6F0A5E}" type="datetimeFigureOut">
               <a:rPr lang="en-US" smtClean="0"/>
-              <a:t>2017-09-17</a:t>
+              <a:t>2017-09-18</a:t>
             </a:fld>
             <a:endParaRPr lang="en-US"/>
           </a:p>
@@ -12827,7 +12827,7 @@
           <a:p>
             <a:fld id="{2CD378D0-82C9-47C6-BEE5-E347AC6F0A5E}" type="datetimeFigureOut">
               <a:rPr lang="en-US" smtClean="0"/>
-              <a:t>2017-09-17</a:t>
+              <a:t>2017-09-18</a:t>
             </a:fld>
             <a:endParaRPr lang="en-US"/>
           </a:p>
@@ -12961,7 +12961,7 @@
           <a:p>
             <a:fld id="{E3744D7E-A5BB-4306-A750-C25515017678}" type="datetimeFigureOut">
               <a:rPr lang="en-US" smtClean="0"/>
-              <a:t>2017-09-17</a:t>
+              <a:t>2017-09-18</a:t>
             </a:fld>
             <a:endParaRPr lang="en-US"/>
           </a:p>
@@ -13399,7 +13399,7 @@
           <a:p>
             <a:fld id="{2CD378D0-82C9-47C6-BEE5-E347AC6F0A5E}" type="datetimeFigureOut">
               <a:rPr lang="en-US" smtClean="0"/>
-              <a:t>2017-09-17</a:t>
+              <a:t>2017-09-18</a:t>
             </a:fld>
             <a:endParaRPr lang="en-US"/>
           </a:p>
@@ -13517,7 +13517,7 @@
           <a:p>
             <a:fld id="{2CD378D0-82C9-47C6-BEE5-E347AC6F0A5E}" type="datetimeFigureOut">
               <a:rPr lang="en-US" smtClean="0"/>
-              <a:t>2017-09-17</a:t>
+              <a:t>2017-09-18</a:t>
             </a:fld>
             <a:endParaRPr lang="en-US"/>
           </a:p>
@@ -13612,7 +13612,7 @@
           <a:p>
             <a:fld id="{2CD378D0-82C9-47C6-BEE5-E347AC6F0A5E}" type="datetimeFigureOut">
               <a:rPr lang="en-US" smtClean="0"/>
-              <a:t>2017-09-17</a:t>
+              <a:t>2017-09-18</a:t>
             </a:fld>
             <a:endParaRPr lang="en-US"/>
           </a:p>
@@ -13889,7 +13889,7 @@
           <a:p>
             <a:fld id="{2CD378D0-82C9-47C6-BEE5-E347AC6F0A5E}" type="datetimeFigureOut">
               <a:rPr lang="en-US" smtClean="0"/>
-              <a:t>2017-09-17</a:t>
+              <a:t>2017-09-18</a:t>
             </a:fld>
             <a:endParaRPr lang="en-US"/>
           </a:p>
@@ -14142,7 +14142,7 @@
           <a:p>
             <a:fld id="{2CD378D0-82C9-47C6-BEE5-E347AC6F0A5E}" type="datetimeFigureOut">
               <a:rPr lang="en-US" smtClean="0"/>
-              <a:t>2017-09-17</a:t>
+              <a:t>2017-09-18</a:t>
             </a:fld>
             <a:endParaRPr lang="en-US"/>
           </a:p>
@@ -14312,7 +14312,7 @@
           <a:p>
             <a:fld id="{2CD378D0-82C9-47C6-BEE5-E347AC6F0A5E}" type="datetimeFigureOut">
               <a:rPr lang="en-US" smtClean="0"/>
-              <a:t>2017-09-17</a:t>
+              <a:t>2017-09-18</a:t>
             </a:fld>
             <a:endParaRPr lang="en-US"/>
           </a:p>
@@ -14492,7 +14492,7 @@
           <a:p>
             <a:fld id="{2CD378D0-82C9-47C6-BEE5-E347AC6F0A5E}" type="datetimeFigureOut">
               <a:rPr lang="en-US" smtClean="0"/>
-              <a:t>2017-09-17</a:t>
+              <a:t>2017-09-18</a:t>
             </a:fld>
             <a:endParaRPr lang="en-US"/>
           </a:p>
@@ -14734,7 +14734,7 @@
           <a:p>
             <a:fld id="{B96FFCCF-F4AB-4D56-AEE8-39DF7F28FF62}" type="datetimeFigureOut">
               <a:rPr lang="en-US" smtClean="0"/>
-              <a:t>2017-09-17</a:t>
+              <a:t>2017-09-18</a:t>
             </a:fld>
             <a:endParaRPr lang="en-US"/>
           </a:p>
@@ -14904,7 +14904,7 @@
           <a:p>
             <a:fld id="{B96FFCCF-F4AB-4D56-AEE8-39DF7F28FF62}" type="datetimeFigureOut">
               <a:rPr lang="en-US" smtClean="0"/>
-              <a:t>2017-09-17</a:t>
+              <a:t>2017-09-18</a:t>
             </a:fld>
             <a:endParaRPr lang="en-US"/>
           </a:p>
@@ -15150,7 +15150,7 @@
           <a:p>
             <a:fld id="{B96FFCCF-F4AB-4D56-AEE8-39DF7F28FF62}" type="datetimeFigureOut">
               <a:rPr lang="en-US" smtClean="0"/>
-              <a:t>2017-09-17</a:t>
+              <a:t>2017-09-18</a:t>
             </a:fld>
             <a:endParaRPr lang="en-US"/>
           </a:p>
@@ -15253,7 +15253,7 @@
           <a:p>
             <a:fld id="{E3744D7E-A5BB-4306-A750-C25515017678}" type="datetimeFigureOut">
               <a:rPr lang="en-US" smtClean="0"/>
-              <a:t>2017-09-17</a:t>
+              <a:t>2017-09-18</a:t>
             </a:fld>
             <a:endParaRPr lang="en-US"/>
           </a:p>
@@ -15564,7 +15564,7 @@
           <a:p>
             <a:fld id="{B96FFCCF-F4AB-4D56-AEE8-39DF7F28FF62}" type="datetimeFigureOut">
               <a:rPr lang="en-US" smtClean="0"/>
-              <a:t>2017-09-17</a:t>
+              <a:t>2017-09-18</a:t>
             </a:fld>
             <a:endParaRPr lang="en-US"/>
           </a:p>
@@ -15986,7 +15986,7 @@
           <a:p>
             <a:fld id="{B96FFCCF-F4AB-4D56-AEE8-39DF7F28FF62}" type="datetimeFigureOut">
               <a:rPr lang="en-US" smtClean="0"/>
-              <a:t>2017-09-17</a:t>
+              <a:t>2017-09-18</a:t>
             </a:fld>
             <a:endParaRPr lang="en-US"/>
           </a:p>
@@ -16104,7 +16104,7 @@
           <a:p>
             <a:fld id="{B96FFCCF-F4AB-4D56-AEE8-39DF7F28FF62}" type="datetimeFigureOut">
               <a:rPr lang="en-US" smtClean="0"/>
-              <a:t>2017-09-17</a:t>
+              <a:t>2017-09-18</a:t>
             </a:fld>
             <a:endParaRPr lang="en-US"/>
           </a:p>
@@ -16199,7 +16199,7 @@
           <a:p>
             <a:fld id="{B96FFCCF-F4AB-4D56-AEE8-39DF7F28FF62}" type="datetimeFigureOut">
               <a:rPr lang="en-US" smtClean="0"/>
-              <a:t>2017-09-17</a:t>
+              <a:t>2017-09-18</a:t>
             </a:fld>
             <a:endParaRPr lang="en-US"/>
           </a:p>
@@ -16476,7 +16476,7 @@
           <a:p>
             <a:fld id="{B96FFCCF-F4AB-4D56-AEE8-39DF7F28FF62}" type="datetimeFigureOut">
               <a:rPr lang="en-US" smtClean="0"/>
-              <a:t>2017-09-17</a:t>
+              <a:t>2017-09-18</a:t>
             </a:fld>
             <a:endParaRPr lang="en-US"/>
           </a:p>
@@ -16729,7 +16729,7 @@
           <a:p>
             <a:fld id="{B96FFCCF-F4AB-4D56-AEE8-39DF7F28FF62}" type="datetimeFigureOut">
               <a:rPr lang="en-US" smtClean="0"/>
-              <a:t>2017-09-17</a:t>
+              <a:t>2017-09-18</a:t>
             </a:fld>
             <a:endParaRPr lang="en-US"/>
           </a:p>
@@ -16899,7 +16899,7 @@
           <a:p>
             <a:fld id="{B96FFCCF-F4AB-4D56-AEE8-39DF7F28FF62}" type="datetimeFigureOut">
               <a:rPr lang="en-US" smtClean="0"/>
-              <a:t>2017-09-17</a:t>
+              <a:t>2017-09-18</a:t>
             </a:fld>
             <a:endParaRPr lang="en-US"/>
           </a:p>
@@ -17079,7 +17079,7 @@
           <a:p>
             <a:fld id="{B96FFCCF-F4AB-4D56-AEE8-39DF7F28FF62}" type="datetimeFigureOut">
               <a:rPr lang="en-US" smtClean="0"/>
-              <a:t>2017-09-17</a:t>
+              <a:t>2017-09-18</a:t>
             </a:fld>
             <a:endParaRPr lang="en-US"/>
           </a:p>
@@ -17321,7 +17321,7 @@
           <a:p>
             <a:fld id="{E90DB797-294B-4B2B-9A48-229F3ACF3E1A}" type="datetimeFigureOut">
               <a:rPr lang="en-US" smtClean="0"/>
-              <a:t>2017-09-17</a:t>
+              <a:t>2017-09-18</a:t>
             </a:fld>
             <a:endParaRPr lang="en-US"/>
           </a:p>
@@ -17491,7 +17491,7 @@
           <a:p>
             <a:fld id="{E90DB797-294B-4B2B-9A48-229F3ACF3E1A}" type="datetimeFigureOut">
               <a:rPr lang="en-US" smtClean="0"/>
-              <a:t>2017-09-17</a:t>
+              <a:t>2017-09-18</a:t>
             </a:fld>
             <a:endParaRPr lang="en-US"/>
           </a:p>
@@ -17785,7 +17785,7 @@
           <a:p>
             <a:fld id="{E3744D7E-A5BB-4306-A750-C25515017678}" type="datetimeFigureOut">
               <a:rPr lang="en-US" smtClean="0"/>
-              <a:t>2017-09-17</a:t>
+              <a:t>2017-09-18</a:t>
             </a:fld>
             <a:endParaRPr lang="en-US"/>
           </a:p>
@@ -18047,7 +18047,7 @@
           <a:p>
             <a:fld id="{E90DB797-294B-4B2B-9A48-229F3ACF3E1A}" type="datetimeFigureOut">
               <a:rPr lang="en-US" smtClean="0"/>
-              <a:t>2017-09-17</a:t>
+              <a:t>2017-09-18</a:t>
             </a:fld>
             <a:endParaRPr lang="en-US"/>
           </a:p>
@@ -18335,7 +18335,7 @@
           <a:p>
             <a:fld id="{E90DB797-294B-4B2B-9A48-229F3ACF3E1A}" type="datetimeFigureOut">
               <a:rPr lang="en-US" smtClean="0"/>
-              <a:t>2017-09-17</a:t>
+              <a:t>2017-09-18</a:t>
             </a:fld>
             <a:endParaRPr lang="en-US"/>
           </a:p>
@@ -18757,7 +18757,7 @@
           <a:p>
             <a:fld id="{E90DB797-294B-4B2B-9A48-229F3ACF3E1A}" type="datetimeFigureOut">
               <a:rPr lang="en-US" smtClean="0"/>
-              <a:t>2017-09-17</a:t>
+              <a:t>2017-09-18</a:t>
             </a:fld>
             <a:endParaRPr lang="en-US"/>
           </a:p>
@@ -18875,7 +18875,7 @@
           <a:p>
             <a:fld id="{E90DB797-294B-4B2B-9A48-229F3ACF3E1A}" type="datetimeFigureOut">
               <a:rPr lang="en-US" smtClean="0"/>
-              <a:t>2017-09-17</a:t>
+              <a:t>2017-09-18</a:t>
             </a:fld>
             <a:endParaRPr lang="en-US"/>
           </a:p>
@@ -18970,7 +18970,7 @@
           <a:p>
             <a:fld id="{E90DB797-294B-4B2B-9A48-229F3ACF3E1A}" type="datetimeFigureOut">
               <a:rPr lang="en-US" smtClean="0"/>
-              <a:t>2017-09-17</a:t>
+              <a:t>2017-09-18</a:t>
             </a:fld>
             <a:endParaRPr lang="en-US"/>
           </a:p>
@@ -19247,7 +19247,7 @@
           <a:p>
             <a:fld id="{E90DB797-294B-4B2B-9A48-229F3ACF3E1A}" type="datetimeFigureOut">
               <a:rPr lang="en-US" smtClean="0"/>
-              <a:t>2017-09-17</a:t>
+              <a:t>2017-09-18</a:t>
             </a:fld>
             <a:endParaRPr lang="en-US"/>
           </a:p>
@@ -19500,7 +19500,7 @@
           <a:p>
             <a:fld id="{E90DB797-294B-4B2B-9A48-229F3ACF3E1A}" type="datetimeFigureOut">
               <a:rPr lang="en-US" smtClean="0"/>
-              <a:t>2017-09-17</a:t>
+              <a:t>2017-09-18</a:t>
             </a:fld>
             <a:endParaRPr lang="en-US"/>
           </a:p>
@@ -19670,7 +19670,7 @@
           <a:p>
             <a:fld id="{E90DB797-294B-4B2B-9A48-229F3ACF3E1A}" type="datetimeFigureOut">
               <a:rPr lang="en-US" smtClean="0"/>
-              <a:t>2017-09-17</a:t>
+              <a:t>2017-09-18</a:t>
             </a:fld>
             <a:endParaRPr lang="en-US"/>
           </a:p>
@@ -19850,7 +19850,7 @@
           <a:p>
             <a:fld id="{E90DB797-294B-4B2B-9A48-229F3ACF3E1A}" type="datetimeFigureOut">
               <a:rPr lang="en-US" smtClean="0"/>
-              <a:t>2017-09-17</a:t>
+              <a:t>2017-09-18</a:t>
             </a:fld>
             <a:endParaRPr lang="en-US"/>
           </a:p>
@@ -20120,7 +20120,7 @@
           <a:p>
             <a:fld id="{E3744D7E-A5BB-4306-A750-C25515017678}" type="datetimeFigureOut">
               <a:rPr lang="en-US" smtClean="0"/>
-              <a:t>2017-09-17</a:t>
+              <a:t>2017-09-18</a:t>
             </a:fld>
             <a:endParaRPr lang="en-US"/>
           </a:p>
@@ -20652,7 +20652,7 @@
           <a:p>
             <a:fld id="{B880F04E-B60C-4530-BE27-DE08322B2422}" type="datetimeFigureOut">
               <a:rPr lang="en-US" smtClean="0"/>
-              <a:t>2017-09-17</a:t>
+              <a:t>2017-09-18</a:t>
             </a:fld>
             <a:endParaRPr lang="en-US"/>
           </a:p>
@@ -21162,7 +21162,7 @@
           <a:p>
             <a:fld id="{C5690C41-1B19-4491-A062-33F2F29E9A8D}" type="datetimeFigureOut">
               <a:rPr lang="en-US" smtClean="0"/>
-              <a:t>2017-09-17</a:t>
+              <a:t>2017-09-18</a:t>
             </a:fld>
             <a:endParaRPr lang="en-US"/>
           </a:p>
@@ -21672,7 +21672,7 @@
           <a:p>
             <a:fld id="{23D18025-B22E-453D-AA62-4A08DAEF541F}" type="datetimeFigureOut">
               <a:rPr lang="en-US" smtClean="0"/>
-              <a:t>2017-09-17</a:t>
+              <a:t>2017-09-18</a:t>
             </a:fld>
             <a:endParaRPr lang="en-US"/>
           </a:p>
@@ -22182,7 +22182,7 @@
           <a:p>
             <a:fld id="{5A29F1F3-0306-4ADD-8575-5F845BC34EA0}" type="datetimeFigureOut">
               <a:rPr lang="en-US" smtClean="0"/>
-              <a:t>2017-09-17</a:t>
+              <a:t>2017-09-18</a:t>
             </a:fld>
             <a:endParaRPr lang="en-US"/>
           </a:p>
@@ -22692,7 +22692,7 @@
           <a:p>
             <a:fld id="{2CD378D0-82C9-47C6-BEE5-E347AC6F0A5E}" type="datetimeFigureOut">
               <a:rPr lang="en-US" smtClean="0"/>
-              <a:t>2017-09-17</a:t>
+              <a:t>2017-09-18</a:t>
             </a:fld>
             <a:endParaRPr lang="en-US"/>
           </a:p>
@@ -23202,7 +23202,7 @@
           <a:p>
             <a:fld id="{B96FFCCF-F4AB-4D56-AEE8-39DF7F28FF62}" type="datetimeFigureOut">
               <a:rPr lang="en-US" smtClean="0"/>
-              <a:t>2017-09-17</a:t>
+              <a:t>2017-09-18</a:t>
             </a:fld>
             <a:endParaRPr lang="en-US"/>
           </a:p>
@@ -23712,7 +23712,7 @@
           <a:p>
             <a:fld id="{E90DB797-294B-4B2B-9A48-229F3ACF3E1A}" type="datetimeFigureOut">
               <a:rPr lang="en-US" smtClean="0"/>
-              <a:t>2017-09-17</a:t>
+              <a:t>2017-09-18</a:t>
             </a:fld>
             <a:endParaRPr lang="en-US"/>
           </a:p>
@@ -24188,7 +24188,7 @@
         <p:spPr>
           <a:xfrm>
             <a:off x="3617747" y="933507"/>
-            <a:ext cx="0" cy="8820000"/>
+            <a:ext cx="0" cy="9000000"/>
           </a:xfrm>
           <a:prstGeom prst="line">
             <a:avLst/>
@@ -24223,7 +24223,7 @@
         </p:nvCxnSpPr>
         <p:spPr>
           <a:xfrm flipH="1">
-            <a:off x="1623961" y="7682602"/>
+            <a:off x="1623961" y="7784550"/>
             <a:ext cx="6318000" cy="0"/>
           </a:xfrm>
           <a:prstGeom prst="straightConnector1">
@@ -24263,7 +24263,7 @@
         </p:nvCxnSpPr>
         <p:spPr>
           <a:xfrm>
-            <a:off x="1602532" y="7979018"/>
+            <a:off x="1602532" y="8080966"/>
             <a:ext cx="6318000" cy="0"/>
           </a:xfrm>
           <a:prstGeom prst="straightConnector1">
@@ -24303,7 +24303,7 @@
         </p:nvCxnSpPr>
         <p:spPr>
           <a:xfrm flipH="1">
-            <a:off x="1623961" y="8474690"/>
+            <a:off x="1623961" y="8576638"/>
             <a:ext cx="6318000" cy="0"/>
           </a:xfrm>
           <a:prstGeom prst="straightConnector1">
@@ -24343,7 +24343,7 @@
         </p:nvCxnSpPr>
         <p:spPr>
           <a:xfrm>
-            <a:off x="1602532" y="8771106"/>
+            <a:off x="1602532" y="8873054"/>
             <a:ext cx="6318000" cy="0"/>
           </a:xfrm>
           <a:prstGeom prst="straightConnector1">
@@ -24383,7 +24383,7 @@
         </p:nvSpPr>
         <p:spPr>
           <a:xfrm flipH="1">
-            <a:off x="7031663" y="8339058"/>
+            <a:off x="7031663" y="8441006"/>
             <a:ext cx="902811" cy="246221"/>
           </a:xfrm>
           <a:prstGeom prst="rect">
@@ -24428,7 +24428,7 @@
         </p:nvSpPr>
         <p:spPr>
           <a:xfrm flipH="1">
-            <a:off x="7031663" y="7546970"/>
+            <a:off x="7031663" y="7648918"/>
             <a:ext cx="902811" cy="246221"/>
           </a:xfrm>
           <a:prstGeom prst="rect">
@@ -24514,7 +24514,7 @@
         <p:spPr>
           <a:xfrm>
             <a:off x="6443711" y="1017031"/>
-            <a:ext cx="0" cy="2952000"/>
+            <a:ext cx="0" cy="2880000"/>
           </a:xfrm>
           <a:prstGeom prst="line">
             <a:avLst/>
@@ -24968,7 +24968,7 @@
         </p:nvCxnSpPr>
         <p:spPr>
           <a:xfrm>
-            <a:off x="376834" y="4732643"/>
+            <a:off x="376834" y="4822581"/>
             <a:ext cx="0" cy="684000"/>
           </a:xfrm>
           <a:prstGeom prst="line">
@@ -25006,7 +25006,7 @@
         </p:nvCxnSpPr>
         <p:spPr>
           <a:xfrm>
-            <a:off x="3784197" y="6892448"/>
+            <a:off x="3784197" y="6994396"/>
             <a:ext cx="4140000" cy="0"/>
           </a:xfrm>
           <a:prstGeom prst="straightConnector1">
@@ -25362,7 +25362,7 @@
         </p:nvSpPr>
         <p:spPr>
           <a:xfrm>
-            <a:off x="5006692" y="6614882"/>
+            <a:off x="5006692" y="6716830"/>
             <a:ext cx="1889235" cy="276999"/>
           </a:xfrm>
           <a:prstGeom prst="rect">
@@ -25564,7 +25564,7 @@
         <p:spPr>
           <a:xfrm>
             <a:off x="7933042" y="3093507"/>
-            <a:ext cx="0" cy="6660000"/>
+            <a:ext cx="0" cy="6840000"/>
           </a:xfrm>
           <a:prstGeom prst="line">
             <a:avLst/>
@@ -25636,7 +25636,7 @@
         </p:nvSpPr>
         <p:spPr>
           <a:xfrm>
-            <a:off x="5702001" y="188591"/>
+            <a:off x="5643945" y="188591"/>
             <a:ext cx="1105495" cy="276999"/>
           </a:xfrm>
           <a:prstGeom prst="rect">
@@ -26732,7 +26732,7 @@
         </p:blipFill>
         <p:spPr bwMode="auto">
           <a:xfrm>
-            <a:off x="2925412" y="6700376"/>
+            <a:off x="2925412" y="6802324"/>
             <a:ext cx="360040" cy="356341"/>
           </a:xfrm>
           <a:prstGeom prst="rect">
@@ -26765,7 +26765,7 @@
       </p:pic>
       <p:pic>
         <p:nvPicPr>
-          <p:cNvPr id="867" name="Picture 6" descr="C:\Users\Anders\AppData\Local\Microsoft\Windows\INetCache\IE\93T5FZW3\person7[1].png"/>
+          <p:cNvPr id="868" name="Picture 7" descr="C:\Users\Anders\AppData\Local\Microsoft\Windows\INetCache\IE\RPLCESMO\14481-illustration-of-a-house-pv[1].png"/>
           <p:cNvPicPr>
             <a:picLocks noChangeAspect="1" noChangeArrowheads="1"/>
           </p:cNvPicPr>
@@ -26773,47 +26773,6 @@
         </p:nvPicPr>
         <p:blipFill>
           <a:blip r:embed="rId6" cstate="print">
-            <a:extLst>
-              <a:ext uri="{28A0092B-C50C-407E-A947-70E740481C1C}">
-                <a14:useLocalDpi xmlns:a14="http://schemas.microsoft.com/office/drawing/2010/main" val="0"/>
-              </a:ext>
-            </a:extLst>
-          </a:blip>
-          <a:srcRect/>
-          <a:stretch>
-            <a:fillRect/>
-          </a:stretch>
-        </p:blipFill>
-        <p:spPr bwMode="auto">
-          <a:xfrm>
-            <a:off x="5815810" y="503816"/>
-            <a:ext cx="288031" cy="577019"/>
-          </a:xfrm>
-          <a:prstGeom prst="rect">
-            <a:avLst/>
-          </a:prstGeom>
-          <a:noFill/>
-          <a:extLst>
-            <a:ext uri="{909E8E84-426E-40DD-AFC4-6F175D3DCCD1}">
-              <a14:hiddenFill xmlns:a14="http://schemas.microsoft.com/office/drawing/2010/main">
-                <a:solidFill>
-                  <a:srgbClr val="FFFFFF"/>
-                </a:solidFill>
-              </a14:hiddenFill>
-            </a:ext>
-          </a:extLst>
-        </p:spPr>
-      </p:pic>
-      <p:pic>
-        <p:nvPicPr>
-          <p:cNvPr id="868" name="Picture 7" descr="C:\Users\Anders\AppData\Local\Microsoft\Windows\INetCache\IE\RPLCESMO\14481-illustration-of-a-house-pv[1].png"/>
-          <p:cNvPicPr>
-            <a:picLocks noChangeAspect="1" noChangeArrowheads="1"/>
-          </p:cNvPicPr>
-          <p:nvPr/>
-        </p:nvPicPr>
-        <p:blipFill>
-          <a:blip r:embed="rId7" cstate="print">
             <a:extLst>
               <a:ext uri="{28A0092B-C50C-407E-A947-70E740481C1C}">
                 <a14:useLocalDpi xmlns:a14="http://schemas.microsoft.com/office/drawing/2010/main" val="0"/>
@@ -26853,7 +26812,7 @@
         </p:nvSpPr>
         <p:spPr>
           <a:xfrm>
-            <a:off x="8117877" y="8468841"/>
+            <a:off x="8117877" y="8570789"/>
             <a:ext cx="1117343" cy="241931"/>
           </a:xfrm>
           <a:prstGeom prst="roundRect">
@@ -26995,7 +26954,7 @@
         </p:nvSpPr>
         <p:spPr>
           <a:xfrm>
-            <a:off x="4729667" y="6608678"/>
+            <a:off x="4729667" y="6710626"/>
             <a:ext cx="389850" cy="276999"/>
           </a:xfrm>
           <a:prstGeom prst="rect">
@@ -27062,7 +27021,7 @@
           <p:nvPr/>
         </p:nvPicPr>
         <p:blipFill>
-          <a:blip r:embed="rId8" cstate="print">
+          <a:blip r:embed="rId7" cstate="print">
             <a:extLst>
               <a:ext uri="{28A0092B-C50C-407E-A947-70E740481C1C}">
                 <a14:useLocalDpi xmlns:a14="http://schemas.microsoft.com/office/drawing/2010/main" val="0"/>
@@ -27109,7 +27068,7 @@
         </p:nvSpPr>
         <p:spPr>
           <a:xfrm>
-            <a:off x="5254822" y="6886809"/>
+            <a:off x="5254822" y="6988757"/>
             <a:ext cx="1074333" cy="246221"/>
           </a:xfrm>
           <a:prstGeom prst="rect">
@@ -27152,7 +27111,7 @@
             <a:avLst/>
           </a:prstGeom>
           <a:blipFill>
-            <a:blip r:embed="rId9"/>
+            <a:blip r:embed="rId8"/>
             <a:tile tx="0" ty="0" sx="50000" sy="50000" flip="none" algn="tl"/>
           </a:blipFill>
           <a:ln w="6350">
@@ -27339,7 +27298,7 @@
           <p:nvPr/>
         </p:nvPicPr>
         <p:blipFill>
-          <a:blip r:embed="rId10">
+          <a:blip r:embed="rId9">
             <a:duotone>
               <a:prstClr val="black"/>
               <a:srgbClr val="D9C3A5">
@@ -27464,7 +27423,7 @@
         </p:nvSpPr>
         <p:spPr>
           <a:xfrm>
-            <a:off x="2235474" y="6676424"/>
+            <a:off x="2235474" y="6778372"/>
             <a:ext cx="729687" cy="400110"/>
           </a:xfrm>
           <a:prstGeom prst="rect">
@@ -28891,7 +28850,7 @@
         </p:nvGrpSpPr>
         <p:grpSpPr>
           <a:xfrm>
-            <a:off x="3265687" y="6443931"/>
+            <a:off x="3265687" y="6545879"/>
             <a:ext cx="714205" cy="922858"/>
             <a:chOff x="1896591" y="5170438"/>
             <a:chExt cx="714205" cy="922858"/>
@@ -29036,7 +28995,7 @@
               <a:avLst/>
             </a:prstGeom>
             <a:blipFill>
-              <a:blip r:embed="rId9"/>
+              <a:blip r:embed="rId8"/>
               <a:tile tx="0" ty="0" sx="50000" sy="50000" flip="none" algn="tl"/>
             </a:blipFill>
             <a:ln w="6350">
@@ -29145,7 +29104,7 @@
         </p:nvCxnSpPr>
         <p:spPr>
           <a:xfrm>
-            <a:off x="415412" y="5068486"/>
+            <a:off x="415412" y="5158424"/>
             <a:ext cx="9108000" cy="0"/>
           </a:xfrm>
           <a:prstGeom prst="line">
@@ -29183,7 +29142,7 @@
         </p:nvSpPr>
         <p:spPr>
           <a:xfrm>
-            <a:off x="321580" y="5011116"/>
+            <a:off x="321580" y="5101054"/>
             <a:ext cx="108000" cy="108000"/>
           </a:xfrm>
           <a:prstGeom prst="ellipse">
@@ -29231,7 +29190,7 @@
         </p:nvSpPr>
         <p:spPr>
           <a:xfrm rot="16200000">
-            <a:off x="-741918" y="3497688"/>
+            <a:off x="-741918" y="3587626"/>
             <a:ext cx="2241319" cy="276999"/>
           </a:xfrm>
           <a:prstGeom prst="rect">
@@ -29274,7 +29233,7 @@
         </p:nvSpPr>
         <p:spPr>
           <a:xfrm rot="16200000">
-            <a:off x="-936132" y="6653302"/>
+            <a:off x="-936132" y="6743240"/>
             <a:ext cx="2618024" cy="276999"/>
           </a:xfrm>
           <a:prstGeom prst="rect">
@@ -29392,7 +29351,7 @@
               <a:rPr lang="en-US" sz="1000" dirty="0" smtClean="0">
                 <a:latin typeface="Arial" panose="020B0604020202020204" pitchFamily="34" charset="0"/>
                 <a:cs typeface="Arial" panose="020B0604020202020204" pitchFamily="34" charset="0"/>
-                <a:hlinkClick r:id="rId11"/>
+                <a:hlinkClick r:id="rId10"/>
               </a:rPr>
               <a:t>Authority Objects</a:t>
             </a:r>
@@ -29522,8 +29481,8 @@
         </p:nvCxnSpPr>
         <p:spPr>
           <a:xfrm>
-            <a:off x="2278225" y="6012710"/>
-            <a:ext cx="1188000" cy="1152000"/>
+            <a:off x="2278225" y="6114658"/>
+            <a:ext cx="1188000" cy="1188000"/>
           </a:xfrm>
           <a:prstGeom prst="bentConnector3">
             <a:avLst>
@@ -29561,7 +29520,7 @@
         </p:nvSpPr>
         <p:spPr>
           <a:xfrm>
-            <a:off x="2099445" y="5406578"/>
+            <a:off x="2099445" y="5508526"/>
             <a:ext cx="1323493" cy="802202"/>
           </a:xfrm>
           <a:prstGeom prst="roundRect">
@@ -29724,7 +29683,7 @@
           <p:nvPr/>
         </p:nvPicPr>
         <p:blipFill>
-          <a:blip r:embed="rId12" cstate="print">
+          <a:blip r:embed="rId11" cstate="print">
             <a:extLst>
               <a:ext uri="{28A0092B-C50C-407E-A947-70E740481C1C}">
                 <a14:useLocalDpi xmlns:a14="http://schemas.microsoft.com/office/drawing/2010/main" val="0"/>
@@ -29754,7 +29713,7 @@
         <p:spPr>
           <a:xfrm>
             <a:off x="1604525" y="3084486"/>
-            <a:ext cx="0" cy="6660000"/>
+            <a:ext cx="0" cy="6840000"/>
           </a:xfrm>
           <a:prstGeom prst="line">
             <a:avLst/>
@@ -30579,7 +30538,7 @@
         </p:nvSpPr>
         <p:spPr>
           <a:xfrm flipH="1">
-            <a:off x="5159506" y="7702019"/>
+            <a:off x="5159506" y="7803967"/>
             <a:ext cx="1889235" cy="276999"/>
           </a:xfrm>
           <a:prstGeom prst="rect">
@@ -30629,7 +30588,7 @@
         </p:nvSpPr>
         <p:spPr>
           <a:xfrm flipH="1">
-            <a:off x="5104373" y="8494107"/>
+            <a:off x="5104373" y="8596055"/>
             <a:ext cx="1889235" cy="276999"/>
           </a:xfrm>
           <a:prstGeom prst="rect">
@@ -30679,7 +30638,7 @@
         </p:nvSpPr>
         <p:spPr>
           <a:xfrm>
-            <a:off x="8117877" y="7661836"/>
+            <a:off x="8117877" y="7763784"/>
             <a:ext cx="1173990" cy="241931"/>
           </a:xfrm>
           <a:prstGeom prst="roundRect">
@@ -30760,7 +30719,7 @@
         </p:nvSpPr>
         <p:spPr>
           <a:xfrm>
-            <a:off x="8117877" y="8970430"/>
+            <a:off x="8117877" y="9072378"/>
             <a:ext cx="1155243" cy="570544"/>
           </a:xfrm>
           <a:prstGeom prst="roundRect">
@@ -30912,7 +30871,7 @@
         </p:nvSpPr>
         <p:spPr>
           <a:xfrm>
-            <a:off x="1270485" y="8638995"/>
+            <a:off x="1270485" y="8740943"/>
             <a:ext cx="669093" cy="252000"/>
           </a:xfrm>
           <a:prstGeom prst="ellipse">
@@ -30990,7 +30949,7 @@
         </p:nvSpPr>
         <p:spPr>
           <a:xfrm>
-            <a:off x="1272050" y="7849288"/>
+            <a:off x="1272050" y="7951236"/>
             <a:ext cx="669093" cy="252000"/>
           </a:xfrm>
           <a:prstGeom prst="ellipse">
@@ -31098,7 +31057,14 @@
                 <a:latin typeface="Arial" panose="020B0604020202020204" pitchFamily="34" charset="0"/>
                 <a:cs typeface="Arial" panose="020B0604020202020204" pitchFamily="34" charset="0"/>
               </a:rPr>
-              <a:t>Succeeding steps depend on the</a:t>
+              <a:t>Subsequent </a:t>
+            </a:r>
+            <a:r>
+              <a:rPr lang="en-US" sz="1200" dirty="0" smtClean="0">
+                <a:latin typeface="Arial" panose="020B0604020202020204" pitchFamily="34" charset="0"/>
+                <a:cs typeface="Arial" panose="020B0604020202020204" pitchFamily="34" charset="0"/>
+              </a:rPr>
+              <a:t>steps depend on the</a:t>
             </a:r>
           </a:p>
           <a:p>
@@ -31292,7 +31258,7 @@
         </p:nvGrpSpPr>
         <p:grpSpPr>
           <a:xfrm>
-            <a:off x="735752" y="7666726"/>
+            <a:off x="735752" y="7768674"/>
             <a:ext cx="445844" cy="603379"/>
             <a:chOff x="8232155" y="587661"/>
             <a:chExt cx="445844" cy="603379"/>
@@ -31402,7 +31368,7 @@
         </p:nvGrpSpPr>
         <p:grpSpPr>
           <a:xfrm>
-            <a:off x="735752" y="8446909"/>
+            <a:off x="735752" y="8548857"/>
             <a:ext cx="445844" cy="603379"/>
             <a:chOff x="8232155" y="587661"/>
             <a:chExt cx="445844" cy="603379"/>
@@ -31512,7 +31478,7 @@
         </p:nvSpPr>
         <p:spPr>
           <a:xfrm>
-            <a:off x="561771" y="9091059"/>
+            <a:off x="561771" y="9193007"/>
             <a:ext cx="793807" cy="400110"/>
           </a:xfrm>
           <a:prstGeom prst="rect">
@@ -31562,7 +31528,7 @@
         </p:nvSpPr>
         <p:spPr>
           <a:xfrm>
-            <a:off x="561771" y="7254711"/>
+            <a:off x="561771" y="7356659"/>
             <a:ext cx="793807" cy="400110"/>
           </a:xfrm>
           <a:prstGeom prst="rect">
@@ -31604,6 +31570,47 @@
           </a:p>
         </p:txBody>
       </p:sp>
+      <p:pic>
+        <p:nvPicPr>
+          <p:cNvPr id="145" name="Picture 6" descr="C:\Users\Anders\AppData\Local\Microsoft\Windows\INetCache\IE\10FYNQXY\Crystal_Clear_kdm_user_female[1].png"/>
+          <p:cNvPicPr>
+            <a:picLocks noChangeAspect="1" noChangeArrowheads="1"/>
+          </p:cNvPicPr>
+          <p:nvPr/>
+        </p:nvPicPr>
+        <p:blipFill>
+          <a:blip r:embed="rId12" cstate="print">
+            <a:extLst>
+              <a:ext uri="{28A0092B-C50C-407E-A947-70E740481C1C}">
+                <a14:useLocalDpi xmlns:a14="http://schemas.microsoft.com/office/drawing/2010/main" val="0"/>
+              </a:ext>
+            </a:extLst>
+          </a:blip>
+          <a:srcRect/>
+          <a:stretch>
+            <a:fillRect/>
+          </a:stretch>
+        </p:blipFill>
+        <p:spPr bwMode="auto">
+          <a:xfrm>
+            <a:off x="5751709" y="540211"/>
+            <a:ext cx="459335" cy="459335"/>
+          </a:xfrm>
+          <a:prstGeom prst="rect">
+            <a:avLst/>
+          </a:prstGeom>
+          <a:noFill/>
+          <a:extLst>
+            <a:ext uri="{909E8E84-426E-40DD-AFC4-6F175D3DCCD1}">
+              <a14:hiddenFill xmlns:a14="http://schemas.microsoft.com/office/drawing/2010/main">
+                <a:solidFill>
+                  <a:srgbClr val="FFFFFF"/>
+                </a:solidFill>
+              </a14:hiddenFill>
+            </a:ext>
+          </a:extLst>
+        </p:spPr>
+      </p:pic>
     </p:spTree>
     <p:extLst>
       <p:ext uri="{BB962C8B-B14F-4D97-AF65-F5344CB8AC3E}">

</xml_diff>

<commit_message>
Account Type => Payment Method
</commit_message>
<xml_diff>
--- a/saturn/saturn-authorization.pptx
+++ b/saturn/saturn-authorization.pptx
@@ -309,7 +309,7 @@
           <a:p>
             <a:fld id="{E3744D7E-A5BB-4306-A750-C25515017678}" type="datetimeFigureOut">
               <a:rPr lang="en-US" smtClean="0"/>
-              <a:t>2017-09-18</a:t>
+              <a:t>2017-09-27</a:t>
             </a:fld>
             <a:endParaRPr lang="en-US"/>
           </a:p>
@@ -519,7 +519,7 @@
           <a:p>
             <a:fld id="{E3744D7E-A5BB-4306-A750-C25515017678}" type="datetimeFigureOut">
               <a:rPr lang="en-US" smtClean="0"/>
-              <a:t>2017-09-18</a:t>
+              <a:t>2017-09-27</a:t>
             </a:fld>
             <a:endParaRPr lang="en-US"/>
           </a:p>
@@ -736,7 +736,7 @@
           <a:p>
             <a:fld id="{E3744D7E-A5BB-4306-A750-C25515017678}" type="datetimeFigureOut">
               <a:rPr lang="en-US" smtClean="0"/>
-              <a:t>2017-09-18</a:t>
+              <a:t>2017-09-27</a:t>
             </a:fld>
             <a:endParaRPr lang="en-US"/>
           </a:p>
@@ -1001,7 +1001,7 @@
           <a:p>
             <a:fld id="{B880F04E-B60C-4530-BE27-DE08322B2422}" type="datetimeFigureOut">
               <a:rPr lang="en-US" smtClean="0"/>
-              <a:t>2017-09-18</a:t>
+              <a:t>2017-09-27</a:t>
             </a:fld>
             <a:endParaRPr lang="en-US"/>
           </a:p>
@@ -1171,7 +1171,7 @@
           <a:p>
             <a:fld id="{B880F04E-B60C-4530-BE27-DE08322B2422}" type="datetimeFigureOut">
               <a:rPr lang="en-US" smtClean="0"/>
-              <a:t>2017-09-18</a:t>
+              <a:t>2017-09-27</a:t>
             </a:fld>
             <a:endParaRPr lang="en-US"/>
           </a:p>
@@ -1417,7 +1417,7 @@
           <a:p>
             <a:fld id="{B880F04E-B60C-4530-BE27-DE08322B2422}" type="datetimeFigureOut">
               <a:rPr lang="en-US" smtClean="0"/>
-              <a:t>2017-09-18</a:t>
+              <a:t>2017-09-27</a:t>
             </a:fld>
             <a:endParaRPr lang="en-US"/>
           </a:p>
@@ -1705,7 +1705,7 @@
           <a:p>
             <a:fld id="{B880F04E-B60C-4530-BE27-DE08322B2422}" type="datetimeFigureOut">
               <a:rPr lang="en-US" smtClean="0"/>
-              <a:t>2017-09-18</a:t>
+              <a:t>2017-09-27</a:t>
             </a:fld>
             <a:endParaRPr lang="en-US"/>
           </a:p>
@@ -2127,7 +2127,7 @@
           <a:p>
             <a:fld id="{B880F04E-B60C-4530-BE27-DE08322B2422}" type="datetimeFigureOut">
               <a:rPr lang="en-US" smtClean="0"/>
-              <a:t>2017-09-18</a:t>
+              <a:t>2017-09-27</a:t>
             </a:fld>
             <a:endParaRPr lang="en-US"/>
           </a:p>
@@ -2245,7 +2245,7 @@
           <a:p>
             <a:fld id="{B880F04E-B60C-4530-BE27-DE08322B2422}" type="datetimeFigureOut">
               <a:rPr lang="en-US" smtClean="0"/>
-              <a:t>2017-09-18</a:t>
+              <a:t>2017-09-27</a:t>
             </a:fld>
             <a:endParaRPr lang="en-US"/>
           </a:p>
@@ -2340,7 +2340,7 @@
           <a:p>
             <a:fld id="{B880F04E-B60C-4530-BE27-DE08322B2422}" type="datetimeFigureOut">
               <a:rPr lang="en-US" smtClean="0"/>
-              <a:t>2017-09-18</a:t>
+              <a:t>2017-09-27</a:t>
             </a:fld>
             <a:endParaRPr lang="en-US"/>
           </a:p>
@@ -2617,7 +2617,7 @@
           <a:p>
             <a:fld id="{B880F04E-B60C-4530-BE27-DE08322B2422}" type="datetimeFigureOut">
               <a:rPr lang="en-US" smtClean="0"/>
-              <a:t>2017-09-18</a:t>
+              <a:t>2017-09-27</a:t>
             </a:fld>
             <a:endParaRPr lang="en-US"/>
           </a:p>
@@ -2811,7 +2811,7 @@
           <a:p>
             <a:fld id="{E3744D7E-A5BB-4306-A750-C25515017678}" type="datetimeFigureOut">
               <a:rPr lang="en-US" smtClean="0"/>
-              <a:t>2017-09-18</a:t>
+              <a:t>2017-09-27</a:t>
             </a:fld>
             <a:endParaRPr lang="en-US"/>
           </a:p>
@@ -3080,7 +3080,7 @@
           <a:p>
             <a:fld id="{B880F04E-B60C-4530-BE27-DE08322B2422}" type="datetimeFigureOut">
               <a:rPr lang="en-US" smtClean="0"/>
-              <a:t>2017-09-18</a:t>
+              <a:t>2017-09-27</a:t>
             </a:fld>
             <a:endParaRPr lang="en-US"/>
           </a:p>
@@ -3250,7 +3250,7 @@
           <a:p>
             <a:fld id="{B880F04E-B60C-4530-BE27-DE08322B2422}" type="datetimeFigureOut">
               <a:rPr lang="en-US" smtClean="0"/>
-              <a:t>2017-09-18</a:t>
+              <a:t>2017-09-27</a:t>
             </a:fld>
             <a:endParaRPr lang="en-US"/>
           </a:p>
@@ -3430,7 +3430,7 @@
           <a:p>
             <a:fld id="{B880F04E-B60C-4530-BE27-DE08322B2422}" type="datetimeFigureOut">
               <a:rPr lang="en-US" smtClean="0"/>
-              <a:t>2017-09-18</a:t>
+              <a:t>2017-09-27</a:t>
             </a:fld>
             <a:endParaRPr lang="en-US"/>
           </a:p>
@@ -3672,7 +3672,7 @@
           <a:p>
             <a:fld id="{C5690C41-1B19-4491-A062-33F2F29E9A8D}" type="datetimeFigureOut">
               <a:rPr lang="en-US" smtClean="0"/>
-              <a:t>2017-09-18</a:t>
+              <a:t>2017-09-27</a:t>
             </a:fld>
             <a:endParaRPr lang="en-US"/>
           </a:p>
@@ -3842,7 +3842,7 @@
           <a:p>
             <a:fld id="{C5690C41-1B19-4491-A062-33F2F29E9A8D}" type="datetimeFigureOut">
               <a:rPr lang="en-US" smtClean="0"/>
-              <a:t>2017-09-18</a:t>
+              <a:t>2017-09-27</a:t>
             </a:fld>
             <a:endParaRPr lang="en-US"/>
           </a:p>
@@ -4088,7 +4088,7 @@
           <a:p>
             <a:fld id="{C5690C41-1B19-4491-A062-33F2F29E9A8D}" type="datetimeFigureOut">
               <a:rPr lang="en-US" smtClean="0"/>
-              <a:t>2017-09-18</a:t>
+              <a:t>2017-09-27</a:t>
             </a:fld>
             <a:endParaRPr lang="en-US"/>
           </a:p>
@@ -4376,7 +4376,7 @@
           <a:p>
             <a:fld id="{C5690C41-1B19-4491-A062-33F2F29E9A8D}" type="datetimeFigureOut">
               <a:rPr lang="en-US" smtClean="0"/>
-              <a:t>2017-09-18</a:t>
+              <a:t>2017-09-27</a:t>
             </a:fld>
             <a:endParaRPr lang="en-US"/>
           </a:p>
@@ -4798,7 +4798,7 @@
           <a:p>
             <a:fld id="{C5690C41-1B19-4491-A062-33F2F29E9A8D}" type="datetimeFigureOut">
               <a:rPr lang="en-US" smtClean="0"/>
-              <a:t>2017-09-18</a:t>
+              <a:t>2017-09-27</a:t>
             </a:fld>
             <a:endParaRPr lang="en-US"/>
           </a:p>
@@ -4916,7 +4916,7 @@
           <a:p>
             <a:fld id="{C5690C41-1B19-4491-A062-33F2F29E9A8D}" type="datetimeFigureOut">
               <a:rPr lang="en-US" smtClean="0"/>
-              <a:t>2017-09-18</a:t>
+              <a:t>2017-09-27</a:t>
             </a:fld>
             <a:endParaRPr lang="en-US"/>
           </a:p>
@@ -5011,7 +5011,7 @@
           <a:p>
             <a:fld id="{C5690C41-1B19-4491-A062-33F2F29E9A8D}" type="datetimeFigureOut">
               <a:rPr lang="en-US" smtClean="0"/>
-              <a:t>2017-09-18</a:t>
+              <a:t>2017-09-27</a:t>
             </a:fld>
             <a:endParaRPr lang="en-US"/>
           </a:p>
@@ -5271,7 +5271,7 @@
           <a:p>
             <a:fld id="{E3744D7E-A5BB-4306-A750-C25515017678}" type="datetimeFigureOut">
               <a:rPr lang="en-US" smtClean="0"/>
-              <a:t>2017-09-18</a:t>
+              <a:t>2017-09-27</a:t>
             </a:fld>
             <a:endParaRPr lang="en-US"/>
           </a:p>
@@ -5564,7 +5564,7 @@
           <a:p>
             <a:fld id="{C5690C41-1B19-4491-A062-33F2F29E9A8D}" type="datetimeFigureOut">
               <a:rPr lang="en-US" smtClean="0"/>
-              <a:t>2017-09-18</a:t>
+              <a:t>2017-09-27</a:t>
             </a:fld>
             <a:endParaRPr lang="en-US"/>
           </a:p>
@@ -5817,7 +5817,7 @@
           <a:p>
             <a:fld id="{C5690C41-1B19-4491-A062-33F2F29E9A8D}" type="datetimeFigureOut">
               <a:rPr lang="en-US" smtClean="0"/>
-              <a:t>2017-09-18</a:t>
+              <a:t>2017-09-27</a:t>
             </a:fld>
             <a:endParaRPr lang="en-US"/>
           </a:p>
@@ -5987,7 +5987,7 @@
           <a:p>
             <a:fld id="{C5690C41-1B19-4491-A062-33F2F29E9A8D}" type="datetimeFigureOut">
               <a:rPr lang="en-US" smtClean="0"/>
-              <a:t>2017-09-18</a:t>
+              <a:t>2017-09-27</a:t>
             </a:fld>
             <a:endParaRPr lang="en-US"/>
           </a:p>
@@ -6167,7 +6167,7 @@
           <a:p>
             <a:fld id="{C5690C41-1B19-4491-A062-33F2F29E9A8D}" type="datetimeFigureOut">
               <a:rPr lang="en-US" smtClean="0"/>
-              <a:t>2017-09-18</a:t>
+              <a:t>2017-09-27</a:t>
             </a:fld>
             <a:endParaRPr lang="en-US"/>
           </a:p>
@@ -6409,7 +6409,7 @@
           <a:p>
             <a:fld id="{23D18025-B22E-453D-AA62-4A08DAEF541F}" type="datetimeFigureOut">
               <a:rPr lang="en-US" smtClean="0"/>
-              <a:t>2017-09-18</a:t>
+              <a:t>2017-09-27</a:t>
             </a:fld>
             <a:endParaRPr lang="en-US"/>
           </a:p>
@@ -6579,7 +6579,7 @@
           <a:p>
             <a:fld id="{23D18025-B22E-453D-AA62-4A08DAEF541F}" type="datetimeFigureOut">
               <a:rPr lang="en-US" smtClean="0"/>
-              <a:t>2017-09-18</a:t>
+              <a:t>2017-09-27</a:t>
             </a:fld>
             <a:endParaRPr lang="en-US"/>
           </a:p>
@@ -6825,7 +6825,7 @@
           <a:p>
             <a:fld id="{23D18025-B22E-453D-AA62-4A08DAEF541F}" type="datetimeFigureOut">
               <a:rPr lang="en-US" smtClean="0"/>
-              <a:t>2017-09-18</a:t>
+              <a:t>2017-09-27</a:t>
             </a:fld>
             <a:endParaRPr lang="en-US"/>
           </a:p>
@@ -7113,7 +7113,7 @@
           <a:p>
             <a:fld id="{23D18025-B22E-453D-AA62-4A08DAEF541F}" type="datetimeFigureOut">
               <a:rPr lang="en-US" smtClean="0"/>
-              <a:t>2017-09-18</a:t>
+              <a:t>2017-09-27</a:t>
             </a:fld>
             <a:endParaRPr lang="en-US"/>
           </a:p>
@@ -7535,7 +7535,7 @@
           <a:p>
             <a:fld id="{23D18025-B22E-453D-AA62-4A08DAEF541F}" type="datetimeFigureOut">
               <a:rPr lang="en-US" smtClean="0"/>
-              <a:t>2017-09-18</a:t>
+              <a:t>2017-09-27</a:t>
             </a:fld>
             <a:endParaRPr lang="en-US"/>
           </a:p>
@@ -7653,7 +7653,7 @@
           <a:p>
             <a:fld id="{23D18025-B22E-453D-AA62-4A08DAEF541F}" type="datetimeFigureOut">
               <a:rPr lang="en-US" smtClean="0"/>
-              <a:t>2017-09-18</a:t>
+              <a:t>2017-09-27</a:t>
             </a:fld>
             <a:endParaRPr lang="en-US"/>
           </a:p>
@@ -7963,7 +7963,7 @@
           <a:p>
             <a:fld id="{E3744D7E-A5BB-4306-A750-C25515017678}" type="datetimeFigureOut">
               <a:rPr lang="en-US" smtClean="0"/>
-              <a:t>2017-09-18</a:t>
+              <a:t>2017-09-27</a:t>
             </a:fld>
             <a:endParaRPr lang="en-US"/>
           </a:p>
@@ -8074,7 +8074,7 @@
           <a:p>
             <a:fld id="{23D18025-B22E-453D-AA62-4A08DAEF541F}" type="datetimeFigureOut">
               <a:rPr lang="en-US" smtClean="0"/>
-              <a:t>2017-09-18</a:t>
+              <a:t>2017-09-27</a:t>
             </a:fld>
             <a:endParaRPr lang="en-US"/>
           </a:p>
@@ -8351,7 +8351,7 @@
           <a:p>
             <a:fld id="{23D18025-B22E-453D-AA62-4A08DAEF541F}" type="datetimeFigureOut">
               <a:rPr lang="en-US" smtClean="0"/>
-              <a:t>2017-09-18</a:t>
+              <a:t>2017-09-27</a:t>
             </a:fld>
             <a:endParaRPr lang="en-US"/>
           </a:p>
@@ -8604,7 +8604,7 @@
           <a:p>
             <a:fld id="{23D18025-B22E-453D-AA62-4A08DAEF541F}" type="datetimeFigureOut">
               <a:rPr lang="en-US" smtClean="0"/>
-              <a:t>2017-09-18</a:t>
+              <a:t>2017-09-27</a:t>
             </a:fld>
             <a:endParaRPr lang="en-US"/>
           </a:p>
@@ -8774,7 +8774,7 @@
           <a:p>
             <a:fld id="{23D18025-B22E-453D-AA62-4A08DAEF541F}" type="datetimeFigureOut">
               <a:rPr lang="en-US" smtClean="0"/>
-              <a:t>2017-09-18</a:t>
+              <a:t>2017-09-27</a:t>
             </a:fld>
             <a:endParaRPr lang="en-US"/>
           </a:p>
@@ -8954,7 +8954,7 @@
           <a:p>
             <a:fld id="{23D18025-B22E-453D-AA62-4A08DAEF541F}" type="datetimeFigureOut">
               <a:rPr lang="en-US" smtClean="0"/>
-              <a:t>2017-09-18</a:t>
+              <a:t>2017-09-27</a:t>
             </a:fld>
             <a:endParaRPr lang="en-US"/>
           </a:p>
@@ -9196,7 +9196,7 @@
           <a:p>
             <a:fld id="{5A29F1F3-0306-4ADD-8575-5F845BC34EA0}" type="datetimeFigureOut">
               <a:rPr lang="en-US" smtClean="0"/>
-              <a:t>2017-09-18</a:t>
+              <a:t>2017-09-27</a:t>
             </a:fld>
             <a:endParaRPr lang="en-US"/>
           </a:p>
@@ -9366,7 +9366,7 @@
           <a:p>
             <a:fld id="{5A29F1F3-0306-4ADD-8575-5F845BC34EA0}" type="datetimeFigureOut">
               <a:rPr lang="en-US" smtClean="0"/>
-              <a:t>2017-09-18</a:t>
+              <a:t>2017-09-27</a:t>
             </a:fld>
             <a:endParaRPr lang="en-US"/>
           </a:p>
@@ -9612,7 +9612,7 @@
           <a:p>
             <a:fld id="{5A29F1F3-0306-4ADD-8575-5F845BC34EA0}" type="datetimeFigureOut">
               <a:rPr lang="en-US" smtClean="0"/>
-              <a:t>2017-09-18</a:t>
+              <a:t>2017-09-27</a:t>
             </a:fld>
             <a:endParaRPr lang="en-US"/>
           </a:p>
@@ -9900,7 +9900,7 @@
           <a:p>
             <a:fld id="{5A29F1F3-0306-4ADD-8575-5F845BC34EA0}" type="datetimeFigureOut">
               <a:rPr lang="en-US" smtClean="0"/>
-              <a:t>2017-09-18</a:t>
+              <a:t>2017-09-27</a:t>
             </a:fld>
             <a:endParaRPr lang="en-US"/>
           </a:p>
@@ -10322,7 +10322,7 @@
           <a:p>
             <a:fld id="{5A29F1F3-0306-4ADD-8575-5F845BC34EA0}" type="datetimeFigureOut">
               <a:rPr lang="en-US" smtClean="0"/>
-              <a:t>2017-09-18</a:t>
+              <a:t>2017-09-27</a:t>
             </a:fld>
             <a:endParaRPr lang="en-US"/>
           </a:p>
@@ -10772,7 +10772,7 @@
           <a:p>
             <a:fld id="{E3744D7E-A5BB-4306-A750-C25515017678}" type="datetimeFigureOut">
               <a:rPr lang="en-US" smtClean="0"/>
-              <a:t>2017-09-18</a:t>
+              <a:t>2017-09-27</a:t>
             </a:fld>
             <a:endParaRPr lang="en-US"/>
           </a:p>
@@ -10906,7 +10906,7 @@
           <a:p>
             <a:fld id="{5A29F1F3-0306-4ADD-8575-5F845BC34EA0}" type="datetimeFigureOut">
               <a:rPr lang="en-US" smtClean="0"/>
-              <a:t>2017-09-18</a:t>
+              <a:t>2017-09-27</a:t>
             </a:fld>
             <a:endParaRPr lang="en-US"/>
           </a:p>
@@ -11001,7 +11001,7 @@
           <a:p>
             <a:fld id="{5A29F1F3-0306-4ADD-8575-5F845BC34EA0}" type="datetimeFigureOut">
               <a:rPr lang="en-US" smtClean="0"/>
-              <a:t>2017-09-18</a:t>
+              <a:t>2017-09-27</a:t>
             </a:fld>
             <a:endParaRPr lang="en-US"/>
           </a:p>
@@ -11278,7 +11278,7 @@
           <a:p>
             <a:fld id="{5A29F1F3-0306-4ADD-8575-5F845BC34EA0}" type="datetimeFigureOut">
               <a:rPr lang="en-US" smtClean="0"/>
-              <a:t>2017-09-18</a:t>
+              <a:t>2017-09-27</a:t>
             </a:fld>
             <a:endParaRPr lang="en-US"/>
           </a:p>
@@ -11531,7 +11531,7 @@
           <a:p>
             <a:fld id="{5A29F1F3-0306-4ADD-8575-5F845BC34EA0}" type="datetimeFigureOut">
               <a:rPr lang="en-US" smtClean="0"/>
-              <a:t>2017-09-18</a:t>
+              <a:t>2017-09-27</a:t>
             </a:fld>
             <a:endParaRPr lang="en-US"/>
           </a:p>
@@ -11701,7 +11701,7 @@
           <a:p>
             <a:fld id="{5A29F1F3-0306-4ADD-8575-5F845BC34EA0}" type="datetimeFigureOut">
               <a:rPr lang="en-US" smtClean="0"/>
-              <a:t>2017-09-18</a:t>
+              <a:t>2017-09-27</a:t>
             </a:fld>
             <a:endParaRPr lang="en-US"/>
           </a:p>
@@ -11881,7 +11881,7 @@
           <a:p>
             <a:fld id="{5A29F1F3-0306-4ADD-8575-5F845BC34EA0}" type="datetimeFigureOut">
               <a:rPr lang="en-US" smtClean="0"/>
-              <a:t>2017-09-18</a:t>
+              <a:t>2017-09-27</a:t>
             </a:fld>
             <a:endParaRPr lang="en-US"/>
           </a:p>
@@ -12123,7 +12123,7 @@
           <a:p>
             <a:fld id="{2CD378D0-82C9-47C6-BEE5-E347AC6F0A5E}" type="datetimeFigureOut">
               <a:rPr lang="en-US" smtClean="0"/>
-              <a:t>2017-09-18</a:t>
+              <a:t>2017-09-27</a:t>
             </a:fld>
             <a:endParaRPr lang="en-US"/>
           </a:p>
@@ -12293,7 +12293,7 @@
           <a:p>
             <a:fld id="{2CD378D0-82C9-47C6-BEE5-E347AC6F0A5E}" type="datetimeFigureOut">
               <a:rPr lang="en-US" smtClean="0"/>
-              <a:t>2017-09-18</a:t>
+              <a:t>2017-09-27</a:t>
             </a:fld>
             <a:endParaRPr lang="en-US"/>
           </a:p>
@@ -12539,7 +12539,7 @@
           <a:p>
             <a:fld id="{2CD378D0-82C9-47C6-BEE5-E347AC6F0A5E}" type="datetimeFigureOut">
               <a:rPr lang="en-US" smtClean="0"/>
-              <a:t>2017-09-18</a:t>
+              <a:t>2017-09-27</a:t>
             </a:fld>
             <a:endParaRPr lang="en-US"/>
           </a:p>
@@ -12827,7 +12827,7 @@
           <a:p>
             <a:fld id="{2CD378D0-82C9-47C6-BEE5-E347AC6F0A5E}" type="datetimeFigureOut">
               <a:rPr lang="en-US" smtClean="0"/>
-              <a:t>2017-09-18</a:t>
+              <a:t>2017-09-27</a:t>
             </a:fld>
             <a:endParaRPr lang="en-US"/>
           </a:p>
@@ -12961,7 +12961,7 @@
           <a:p>
             <a:fld id="{E3744D7E-A5BB-4306-A750-C25515017678}" type="datetimeFigureOut">
               <a:rPr lang="en-US" smtClean="0"/>
-              <a:t>2017-09-18</a:t>
+              <a:t>2017-09-27</a:t>
             </a:fld>
             <a:endParaRPr lang="en-US"/>
           </a:p>
@@ -13399,7 +13399,7 @@
           <a:p>
             <a:fld id="{2CD378D0-82C9-47C6-BEE5-E347AC6F0A5E}" type="datetimeFigureOut">
               <a:rPr lang="en-US" smtClean="0"/>
-              <a:t>2017-09-18</a:t>
+              <a:t>2017-09-27</a:t>
             </a:fld>
             <a:endParaRPr lang="en-US"/>
           </a:p>
@@ -13517,7 +13517,7 @@
           <a:p>
             <a:fld id="{2CD378D0-82C9-47C6-BEE5-E347AC6F0A5E}" type="datetimeFigureOut">
               <a:rPr lang="en-US" smtClean="0"/>
-              <a:t>2017-09-18</a:t>
+              <a:t>2017-09-27</a:t>
             </a:fld>
             <a:endParaRPr lang="en-US"/>
           </a:p>
@@ -13612,7 +13612,7 @@
           <a:p>
             <a:fld id="{2CD378D0-82C9-47C6-BEE5-E347AC6F0A5E}" type="datetimeFigureOut">
               <a:rPr lang="en-US" smtClean="0"/>
-              <a:t>2017-09-18</a:t>
+              <a:t>2017-09-27</a:t>
             </a:fld>
             <a:endParaRPr lang="en-US"/>
           </a:p>
@@ -13889,7 +13889,7 @@
           <a:p>
             <a:fld id="{2CD378D0-82C9-47C6-BEE5-E347AC6F0A5E}" type="datetimeFigureOut">
               <a:rPr lang="en-US" smtClean="0"/>
-              <a:t>2017-09-18</a:t>
+              <a:t>2017-09-27</a:t>
             </a:fld>
             <a:endParaRPr lang="en-US"/>
           </a:p>
@@ -14142,7 +14142,7 @@
           <a:p>
             <a:fld id="{2CD378D0-82C9-47C6-BEE5-E347AC6F0A5E}" type="datetimeFigureOut">
               <a:rPr lang="en-US" smtClean="0"/>
-              <a:t>2017-09-18</a:t>
+              <a:t>2017-09-27</a:t>
             </a:fld>
             <a:endParaRPr lang="en-US"/>
           </a:p>
@@ -14312,7 +14312,7 @@
           <a:p>
             <a:fld id="{2CD378D0-82C9-47C6-BEE5-E347AC6F0A5E}" type="datetimeFigureOut">
               <a:rPr lang="en-US" smtClean="0"/>
-              <a:t>2017-09-18</a:t>
+              <a:t>2017-09-27</a:t>
             </a:fld>
             <a:endParaRPr lang="en-US"/>
           </a:p>
@@ -14492,7 +14492,7 @@
           <a:p>
             <a:fld id="{2CD378D0-82C9-47C6-BEE5-E347AC6F0A5E}" type="datetimeFigureOut">
               <a:rPr lang="en-US" smtClean="0"/>
-              <a:t>2017-09-18</a:t>
+              <a:t>2017-09-27</a:t>
             </a:fld>
             <a:endParaRPr lang="en-US"/>
           </a:p>
@@ -14734,7 +14734,7 @@
           <a:p>
             <a:fld id="{B96FFCCF-F4AB-4D56-AEE8-39DF7F28FF62}" type="datetimeFigureOut">
               <a:rPr lang="en-US" smtClean="0"/>
-              <a:t>2017-09-18</a:t>
+              <a:t>2017-09-27</a:t>
             </a:fld>
             <a:endParaRPr lang="en-US"/>
           </a:p>
@@ -14904,7 +14904,7 @@
           <a:p>
             <a:fld id="{B96FFCCF-F4AB-4D56-AEE8-39DF7F28FF62}" type="datetimeFigureOut">
               <a:rPr lang="en-US" smtClean="0"/>
-              <a:t>2017-09-18</a:t>
+              <a:t>2017-09-27</a:t>
             </a:fld>
             <a:endParaRPr lang="en-US"/>
           </a:p>
@@ -15150,7 +15150,7 @@
           <a:p>
             <a:fld id="{B96FFCCF-F4AB-4D56-AEE8-39DF7F28FF62}" type="datetimeFigureOut">
               <a:rPr lang="en-US" smtClean="0"/>
-              <a:t>2017-09-18</a:t>
+              <a:t>2017-09-27</a:t>
             </a:fld>
             <a:endParaRPr lang="en-US"/>
           </a:p>
@@ -15253,7 +15253,7 @@
           <a:p>
             <a:fld id="{E3744D7E-A5BB-4306-A750-C25515017678}" type="datetimeFigureOut">
               <a:rPr lang="en-US" smtClean="0"/>
-              <a:t>2017-09-18</a:t>
+              <a:t>2017-09-27</a:t>
             </a:fld>
             <a:endParaRPr lang="en-US"/>
           </a:p>
@@ -15564,7 +15564,7 @@
           <a:p>
             <a:fld id="{B96FFCCF-F4AB-4D56-AEE8-39DF7F28FF62}" type="datetimeFigureOut">
               <a:rPr lang="en-US" smtClean="0"/>
-              <a:t>2017-09-18</a:t>
+              <a:t>2017-09-27</a:t>
             </a:fld>
             <a:endParaRPr lang="en-US"/>
           </a:p>
@@ -15986,7 +15986,7 @@
           <a:p>
             <a:fld id="{B96FFCCF-F4AB-4D56-AEE8-39DF7F28FF62}" type="datetimeFigureOut">
               <a:rPr lang="en-US" smtClean="0"/>
-              <a:t>2017-09-18</a:t>
+              <a:t>2017-09-27</a:t>
             </a:fld>
             <a:endParaRPr lang="en-US"/>
           </a:p>
@@ -16104,7 +16104,7 @@
           <a:p>
             <a:fld id="{B96FFCCF-F4AB-4D56-AEE8-39DF7F28FF62}" type="datetimeFigureOut">
               <a:rPr lang="en-US" smtClean="0"/>
-              <a:t>2017-09-18</a:t>
+              <a:t>2017-09-27</a:t>
             </a:fld>
             <a:endParaRPr lang="en-US"/>
           </a:p>
@@ -16199,7 +16199,7 @@
           <a:p>
             <a:fld id="{B96FFCCF-F4AB-4D56-AEE8-39DF7F28FF62}" type="datetimeFigureOut">
               <a:rPr lang="en-US" smtClean="0"/>
-              <a:t>2017-09-18</a:t>
+              <a:t>2017-09-27</a:t>
             </a:fld>
             <a:endParaRPr lang="en-US"/>
           </a:p>
@@ -16476,7 +16476,7 @@
           <a:p>
             <a:fld id="{B96FFCCF-F4AB-4D56-AEE8-39DF7F28FF62}" type="datetimeFigureOut">
               <a:rPr lang="en-US" smtClean="0"/>
-              <a:t>2017-09-18</a:t>
+              <a:t>2017-09-27</a:t>
             </a:fld>
             <a:endParaRPr lang="en-US"/>
           </a:p>
@@ -16729,7 +16729,7 @@
           <a:p>
             <a:fld id="{B96FFCCF-F4AB-4D56-AEE8-39DF7F28FF62}" type="datetimeFigureOut">
               <a:rPr lang="en-US" smtClean="0"/>
-              <a:t>2017-09-18</a:t>
+              <a:t>2017-09-27</a:t>
             </a:fld>
             <a:endParaRPr lang="en-US"/>
           </a:p>
@@ -16899,7 +16899,7 @@
           <a:p>
             <a:fld id="{B96FFCCF-F4AB-4D56-AEE8-39DF7F28FF62}" type="datetimeFigureOut">
               <a:rPr lang="en-US" smtClean="0"/>
-              <a:t>2017-09-18</a:t>
+              <a:t>2017-09-27</a:t>
             </a:fld>
             <a:endParaRPr lang="en-US"/>
           </a:p>
@@ -17079,7 +17079,7 @@
           <a:p>
             <a:fld id="{B96FFCCF-F4AB-4D56-AEE8-39DF7F28FF62}" type="datetimeFigureOut">
               <a:rPr lang="en-US" smtClean="0"/>
-              <a:t>2017-09-18</a:t>
+              <a:t>2017-09-27</a:t>
             </a:fld>
             <a:endParaRPr lang="en-US"/>
           </a:p>
@@ -17321,7 +17321,7 @@
           <a:p>
             <a:fld id="{E90DB797-294B-4B2B-9A48-229F3ACF3E1A}" type="datetimeFigureOut">
               <a:rPr lang="en-US" smtClean="0"/>
-              <a:t>2017-09-18</a:t>
+              <a:t>2017-09-27</a:t>
             </a:fld>
             <a:endParaRPr lang="en-US"/>
           </a:p>
@@ -17491,7 +17491,7 @@
           <a:p>
             <a:fld id="{E90DB797-294B-4B2B-9A48-229F3ACF3E1A}" type="datetimeFigureOut">
               <a:rPr lang="en-US" smtClean="0"/>
-              <a:t>2017-09-18</a:t>
+              <a:t>2017-09-27</a:t>
             </a:fld>
             <a:endParaRPr lang="en-US"/>
           </a:p>
@@ -17785,7 +17785,7 @@
           <a:p>
             <a:fld id="{E3744D7E-A5BB-4306-A750-C25515017678}" type="datetimeFigureOut">
               <a:rPr lang="en-US" smtClean="0"/>
-              <a:t>2017-09-18</a:t>
+              <a:t>2017-09-27</a:t>
             </a:fld>
             <a:endParaRPr lang="en-US"/>
           </a:p>
@@ -18047,7 +18047,7 @@
           <a:p>
             <a:fld id="{E90DB797-294B-4B2B-9A48-229F3ACF3E1A}" type="datetimeFigureOut">
               <a:rPr lang="en-US" smtClean="0"/>
-              <a:t>2017-09-18</a:t>
+              <a:t>2017-09-27</a:t>
             </a:fld>
             <a:endParaRPr lang="en-US"/>
           </a:p>
@@ -18335,7 +18335,7 @@
           <a:p>
             <a:fld id="{E90DB797-294B-4B2B-9A48-229F3ACF3E1A}" type="datetimeFigureOut">
               <a:rPr lang="en-US" smtClean="0"/>
-              <a:t>2017-09-18</a:t>
+              <a:t>2017-09-27</a:t>
             </a:fld>
             <a:endParaRPr lang="en-US"/>
           </a:p>
@@ -18757,7 +18757,7 @@
           <a:p>
             <a:fld id="{E90DB797-294B-4B2B-9A48-229F3ACF3E1A}" type="datetimeFigureOut">
               <a:rPr lang="en-US" smtClean="0"/>
-              <a:t>2017-09-18</a:t>
+              <a:t>2017-09-27</a:t>
             </a:fld>
             <a:endParaRPr lang="en-US"/>
           </a:p>
@@ -18875,7 +18875,7 @@
           <a:p>
             <a:fld id="{E90DB797-294B-4B2B-9A48-229F3ACF3E1A}" type="datetimeFigureOut">
               <a:rPr lang="en-US" smtClean="0"/>
-              <a:t>2017-09-18</a:t>
+              <a:t>2017-09-27</a:t>
             </a:fld>
             <a:endParaRPr lang="en-US"/>
           </a:p>
@@ -18970,7 +18970,7 @@
           <a:p>
             <a:fld id="{E90DB797-294B-4B2B-9A48-229F3ACF3E1A}" type="datetimeFigureOut">
               <a:rPr lang="en-US" smtClean="0"/>
-              <a:t>2017-09-18</a:t>
+              <a:t>2017-09-27</a:t>
             </a:fld>
             <a:endParaRPr lang="en-US"/>
           </a:p>
@@ -19247,7 +19247,7 @@
           <a:p>
             <a:fld id="{E90DB797-294B-4B2B-9A48-229F3ACF3E1A}" type="datetimeFigureOut">
               <a:rPr lang="en-US" smtClean="0"/>
-              <a:t>2017-09-18</a:t>
+              <a:t>2017-09-27</a:t>
             </a:fld>
             <a:endParaRPr lang="en-US"/>
           </a:p>
@@ -19500,7 +19500,7 @@
           <a:p>
             <a:fld id="{E90DB797-294B-4B2B-9A48-229F3ACF3E1A}" type="datetimeFigureOut">
               <a:rPr lang="en-US" smtClean="0"/>
-              <a:t>2017-09-18</a:t>
+              <a:t>2017-09-27</a:t>
             </a:fld>
             <a:endParaRPr lang="en-US"/>
           </a:p>
@@ -19670,7 +19670,7 @@
           <a:p>
             <a:fld id="{E90DB797-294B-4B2B-9A48-229F3ACF3E1A}" type="datetimeFigureOut">
               <a:rPr lang="en-US" smtClean="0"/>
-              <a:t>2017-09-18</a:t>
+              <a:t>2017-09-27</a:t>
             </a:fld>
             <a:endParaRPr lang="en-US"/>
           </a:p>
@@ -19850,7 +19850,7 @@
           <a:p>
             <a:fld id="{E90DB797-294B-4B2B-9A48-229F3ACF3E1A}" type="datetimeFigureOut">
               <a:rPr lang="en-US" smtClean="0"/>
-              <a:t>2017-09-18</a:t>
+              <a:t>2017-09-27</a:t>
             </a:fld>
             <a:endParaRPr lang="en-US"/>
           </a:p>
@@ -20120,7 +20120,7 @@
           <a:p>
             <a:fld id="{E3744D7E-A5BB-4306-A750-C25515017678}" type="datetimeFigureOut">
               <a:rPr lang="en-US" smtClean="0"/>
-              <a:t>2017-09-18</a:t>
+              <a:t>2017-09-27</a:t>
             </a:fld>
             <a:endParaRPr lang="en-US"/>
           </a:p>
@@ -20652,7 +20652,7 @@
           <a:p>
             <a:fld id="{B880F04E-B60C-4530-BE27-DE08322B2422}" type="datetimeFigureOut">
               <a:rPr lang="en-US" smtClean="0"/>
-              <a:t>2017-09-18</a:t>
+              <a:t>2017-09-27</a:t>
             </a:fld>
             <a:endParaRPr lang="en-US"/>
           </a:p>
@@ -21162,7 +21162,7 @@
           <a:p>
             <a:fld id="{C5690C41-1B19-4491-A062-33F2F29E9A8D}" type="datetimeFigureOut">
               <a:rPr lang="en-US" smtClean="0"/>
-              <a:t>2017-09-18</a:t>
+              <a:t>2017-09-27</a:t>
             </a:fld>
             <a:endParaRPr lang="en-US"/>
           </a:p>
@@ -21672,7 +21672,7 @@
           <a:p>
             <a:fld id="{23D18025-B22E-453D-AA62-4A08DAEF541F}" type="datetimeFigureOut">
               <a:rPr lang="en-US" smtClean="0"/>
-              <a:t>2017-09-18</a:t>
+              <a:t>2017-09-27</a:t>
             </a:fld>
             <a:endParaRPr lang="en-US"/>
           </a:p>
@@ -22182,7 +22182,7 @@
           <a:p>
             <a:fld id="{5A29F1F3-0306-4ADD-8575-5F845BC34EA0}" type="datetimeFigureOut">
               <a:rPr lang="en-US" smtClean="0"/>
-              <a:t>2017-09-18</a:t>
+              <a:t>2017-09-27</a:t>
             </a:fld>
             <a:endParaRPr lang="en-US"/>
           </a:p>
@@ -22692,7 +22692,7 @@
           <a:p>
             <a:fld id="{2CD378D0-82C9-47C6-BEE5-E347AC6F0A5E}" type="datetimeFigureOut">
               <a:rPr lang="en-US" smtClean="0"/>
-              <a:t>2017-09-18</a:t>
+              <a:t>2017-09-27</a:t>
             </a:fld>
             <a:endParaRPr lang="en-US"/>
           </a:p>
@@ -23202,7 +23202,7 @@
           <a:p>
             <a:fld id="{B96FFCCF-F4AB-4D56-AEE8-39DF7F28FF62}" type="datetimeFigureOut">
               <a:rPr lang="en-US" smtClean="0"/>
-              <a:t>2017-09-18</a:t>
+              <a:t>2017-09-27</a:t>
             </a:fld>
             <a:endParaRPr lang="en-US"/>
           </a:p>
@@ -23712,7 +23712,7 @@
           <a:p>
             <a:fld id="{E90DB797-294B-4B2B-9A48-229F3ACF3E1A}" type="datetimeFigureOut">
               <a:rPr lang="en-US" smtClean="0"/>
-              <a:t>2017-09-18</a:t>
+              <a:t>2017-09-27</a:t>
             </a:fld>
             <a:endParaRPr lang="en-US"/>
           </a:p>
@@ -25458,8 +25458,8 @@
         </p:nvSpPr>
         <p:spPr>
           <a:xfrm>
-            <a:off x="3684877" y="3320053"/>
-            <a:ext cx="2626040" cy="430887"/>
+            <a:off x="3664604" y="3320053"/>
+            <a:ext cx="2672526" cy="430887"/>
           </a:xfrm>
           <a:prstGeom prst="rect">
             <a:avLst/>
@@ -25505,7 +25505,21 @@
                 <a:latin typeface="Arial" panose="020B0604020202020204" pitchFamily="34" charset="0"/>
                 <a:cs typeface="Arial" panose="020B0604020202020204" pitchFamily="34" charset="0"/>
               </a:rPr>
-              <a:t> user authorization</a:t>
+              <a:t> user </a:t>
+            </a:r>
+            <a:r>
+              <a:rPr lang="en-US" sz="1000" dirty="0" smtClean="0">
+                <a:latin typeface="Arial" panose="020B0604020202020204" pitchFamily="34" charset="0"/>
+                <a:cs typeface="Arial" panose="020B0604020202020204" pitchFamily="34" charset="0"/>
+              </a:rPr>
+              <a:t>authorization +</a:t>
+            </a:r>
+            <a:r>
+              <a:rPr lang="en-US" sz="1000" dirty="0" smtClean="0">
+                <a:latin typeface="Arial" panose="020B0604020202020204" pitchFamily="34" charset="0"/>
+                <a:cs typeface="Arial" panose="020B0604020202020204" pitchFamily="34" charset="0"/>
+              </a:rPr>
+              <a:t/>
             </a:r>
             <a:br>
               <a:rPr lang="en-US" sz="1000" dirty="0" smtClean="0">
@@ -25518,21 +25532,49 @@
                 <a:latin typeface="Arial" panose="020B0604020202020204" pitchFamily="34" charset="0"/>
                 <a:cs typeface="Arial" panose="020B0604020202020204" pitchFamily="34" charset="0"/>
               </a:rPr>
-              <a:t> + </a:t>
+              <a:t> </a:t>
             </a:r>
             <a:r>
               <a:rPr lang="en-US" sz="1000" i="1" dirty="0" smtClean="0">
                 <a:latin typeface="Arial" panose="020B0604020202020204" pitchFamily="34" charset="0"/>
                 <a:cs typeface="Arial" panose="020B0604020202020204" pitchFamily="34" charset="0"/>
               </a:rPr>
-              <a:t>Clear text</a:t>
+              <a:t>Clear </a:t>
+            </a:r>
+            <a:r>
+              <a:rPr lang="en-US" sz="1000" i="1" dirty="0" smtClean="0">
+                <a:latin typeface="Arial" panose="020B0604020202020204" pitchFamily="34" charset="0"/>
+                <a:cs typeface="Arial" panose="020B0604020202020204" pitchFamily="34" charset="0"/>
+              </a:rPr>
+              <a:t>text</a:t>
             </a:r>
             <a:r>
               <a:rPr lang="en-US" sz="1000" dirty="0" smtClean="0">
                 <a:latin typeface="Arial" panose="020B0604020202020204" pitchFamily="34" charset="0"/>
                 <a:cs typeface="Arial" panose="020B0604020202020204" pitchFamily="34" charset="0"/>
               </a:rPr>
-              <a:t> Account Type and </a:t>
+              <a:t> </a:t>
+            </a:r>
+            <a:r>
+              <a:rPr lang="en-US" sz="1000" dirty="0" smtClean="0">
+                <a:latin typeface="Arial" panose="020B0604020202020204" pitchFamily="34" charset="0"/>
+                <a:cs typeface="Arial" panose="020B0604020202020204" pitchFamily="34" charset="0"/>
+              </a:rPr>
+              <a:t>Payment Method</a:t>
+            </a:r>
+            <a:r>
+              <a:rPr lang="en-US" sz="1000" dirty="0" smtClean="0">
+                <a:latin typeface="Arial" panose="020B0604020202020204" pitchFamily="34" charset="0"/>
+                <a:cs typeface="Arial" panose="020B0604020202020204" pitchFamily="34" charset="0"/>
+              </a:rPr>
+              <a:t> </a:t>
+            </a:r>
+            <a:r>
+              <a:rPr lang="en-US" sz="1000" dirty="0" smtClean="0">
+                <a:latin typeface="Arial" panose="020B0604020202020204" pitchFamily="34" charset="0"/>
+                <a:cs typeface="Arial" panose="020B0604020202020204" pitchFamily="34" charset="0"/>
+              </a:rPr>
+              <a:t>and </a:t>
             </a:r>
             <a:r>
               <a:rPr lang="en-US" sz="1000" dirty="0">
@@ -28745,7 +28787,7 @@
           <p:spPr>
             <a:xfrm>
               <a:off x="7352890" y="2198752"/>
-              <a:ext cx="1393330" cy="1015663"/>
+              <a:ext cx="1414170" cy="1015663"/>
             </a:xfrm>
             <a:prstGeom prst="rect">
               <a:avLst/>
@@ -28767,8 +28809,12 @@
                   <a:latin typeface="Arial" panose="020B0604020202020204" pitchFamily="34" charset="0"/>
                   <a:cs typeface="Arial" panose="020B0604020202020204" pitchFamily="34" charset="0"/>
                 </a:rPr>
-                <a:t>Account Type URI</a:t>
+                <a:t>Payment Method</a:t>
               </a:r>
+              <a:endParaRPr lang="en-US" sz="1000" dirty="0" smtClean="0">
+                <a:latin typeface="Arial" panose="020B0604020202020204" pitchFamily="34" charset="0"/>
+                <a:cs typeface="Arial" panose="020B0604020202020204" pitchFamily="34" charset="0"/>
+              </a:endParaRPr>
             </a:p>
             <a:p>
               <a:pPr marL="171450" indent="-171450">

</xml_diff>

<commit_message>
General beautification of presentations
</commit_message>
<xml_diff>
--- a/saturn/saturn-authorization.pptx
+++ b/saturn/saturn-authorization.pptx
@@ -309,7 +309,7 @@
           <a:p>
             <a:fld id="{E3744D7E-A5BB-4306-A750-C25515017678}" type="datetimeFigureOut">
               <a:rPr lang="en-US" smtClean="0"/>
-              <a:t>2017-09-28</a:t>
+              <a:t>2017-10-13</a:t>
             </a:fld>
             <a:endParaRPr lang="en-US"/>
           </a:p>
@@ -519,7 +519,7 @@
           <a:p>
             <a:fld id="{E3744D7E-A5BB-4306-A750-C25515017678}" type="datetimeFigureOut">
               <a:rPr lang="en-US" smtClean="0"/>
-              <a:t>2017-09-28</a:t>
+              <a:t>2017-10-13</a:t>
             </a:fld>
             <a:endParaRPr lang="en-US"/>
           </a:p>
@@ -736,7 +736,7 @@
           <a:p>
             <a:fld id="{E3744D7E-A5BB-4306-A750-C25515017678}" type="datetimeFigureOut">
               <a:rPr lang="en-US" smtClean="0"/>
-              <a:t>2017-09-28</a:t>
+              <a:t>2017-10-13</a:t>
             </a:fld>
             <a:endParaRPr lang="en-US"/>
           </a:p>
@@ -1001,7 +1001,7 @@
           <a:p>
             <a:fld id="{B880F04E-B60C-4530-BE27-DE08322B2422}" type="datetimeFigureOut">
               <a:rPr lang="en-US" smtClean="0"/>
-              <a:t>2017-09-28</a:t>
+              <a:t>2017-10-13</a:t>
             </a:fld>
             <a:endParaRPr lang="en-US"/>
           </a:p>
@@ -1171,7 +1171,7 @@
           <a:p>
             <a:fld id="{B880F04E-B60C-4530-BE27-DE08322B2422}" type="datetimeFigureOut">
               <a:rPr lang="en-US" smtClean="0"/>
-              <a:t>2017-09-28</a:t>
+              <a:t>2017-10-13</a:t>
             </a:fld>
             <a:endParaRPr lang="en-US"/>
           </a:p>
@@ -1417,7 +1417,7 @@
           <a:p>
             <a:fld id="{B880F04E-B60C-4530-BE27-DE08322B2422}" type="datetimeFigureOut">
               <a:rPr lang="en-US" smtClean="0"/>
-              <a:t>2017-09-28</a:t>
+              <a:t>2017-10-13</a:t>
             </a:fld>
             <a:endParaRPr lang="en-US"/>
           </a:p>
@@ -1705,7 +1705,7 @@
           <a:p>
             <a:fld id="{B880F04E-B60C-4530-BE27-DE08322B2422}" type="datetimeFigureOut">
               <a:rPr lang="en-US" smtClean="0"/>
-              <a:t>2017-09-28</a:t>
+              <a:t>2017-10-13</a:t>
             </a:fld>
             <a:endParaRPr lang="en-US"/>
           </a:p>
@@ -2127,7 +2127,7 @@
           <a:p>
             <a:fld id="{B880F04E-B60C-4530-BE27-DE08322B2422}" type="datetimeFigureOut">
               <a:rPr lang="en-US" smtClean="0"/>
-              <a:t>2017-09-28</a:t>
+              <a:t>2017-10-13</a:t>
             </a:fld>
             <a:endParaRPr lang="en-US"/>
           </a:p>
@@ -2245,7 +2245,7 @@
           <a:p>
             <a:fld id="{B880F04E-B60C-4530-BE27-DE08322B2422}" type="datetimeFigureOut">
               <a:rPr lang="en-US" smtClean="0"/>
-              <a:t>2017-09-28</a:t>
+              <a:t>2017-10-13</a:t>
             </a:fld>
             <a:endParaRPr lang="en-US"/>
           </a:p>
@@ -2340,7 +2340,7 @@
           <a:p>
             <a:fld id="{B880F04E-B60C-4530-BE27-DE08322B2422}" type="datetimeFigureOut">
               <a:rPr lang="en-US" smtClean="0"/>
-              <a:t>2017-09-28</a:t>
+              <a:t>2017-10-13</a:t>
             </a:fld>
             <a:endParaRPr lang="en-US"/>
           </a:p>
@@ -2617,7 +2617,7 @@
           <a:p>
             <a:fld id="{B880F04E-B60C-4530-BE27-DE08322B2422}" type="datetimeFigureOut">
               <a:rPr lang="en-US" smtClean="0"/>
-              <a:t>2017-09-28</a:t>
+              <a:t>2017-10-13</a:t>
             </a:fld>
             <a:endParaRPr lang="en-US"/>
           </a:p>
@@ -2811,7 +2811,7 @@
           <a:p>
             <a:fld id="{E3744D7E-A5BB-4306-A750-C25515017678}" type="datetimeFigureOut">
               <a:rPr lang="en-US" smtClean="0"/>
-              <a:t>2017-09-28</a:t>
+              <a:t>2017-10-13</a:t>
             </a:fld>
             <a:endParaRPr lang="en-US"/>
           </a:p>
@@ -3080,7 +3080,7 @@
           <a:p>
             <a:fld id="{B880F04E-B60C-4530-BE27-DE08322B2422}" type="datetimeFigureOut">
               <a:rPr lang="en-US" smtClean="0"/>
-              <a:t>2017-09-28</a:t>
+              <a:t>2017-10-13</a:t>
             </a:fld>
             <a:endParaRPr lang="en-US"/>
           </a:p>
@@ -3250,7 +3250,7 @@
           <a:p>
             <a:fld id="{B880F04E-B60C-4530-BE27-DE08322B2422}" type="datetimeFigureOut">
               <a:rPr lang="en-US" smtClean="0"/>
-              <a:t>2017-09-28</a:t>
+              <a:t>2017-10-13</a:t>
             </a:fld>
             <a:endParaRPr lang="en-US"/>
           </a:p>
@@ -3430,7 +3430,7 @@
           <a:p>
             <a:fld id="{B880F04E-B60C-4530-BE27-DE08322B2422}" type="datetimeFigureOut">
               <a:rPr lang="en-US" smtClean="0"/>
-              <a:t>2017-09-28</a:t>
+              <a:t>2017-10-13</a:t>
             </a:fld>
             <a:endParaRPr lang="en-US"/>
           </a:p>
@@ -3672,7 +3672,7 @@
           <a:p>
             <a:fld id="{C5690C41-1B19-4491-A062-33F2F29E9A8D}" type="datetimeFigureOut">
               <a:rPr lang="en-US" smtClean="0"/>
-              <a:t>2017-09-28</a:t>
+              <a:t>2017-10-13</a:t>
             </a:fld>
             <a:endParaRPr lang="en-US"/>
           </a:p>
@@ -3842,7 +3842,7 @@
           <a:p>
             <a:fld id="{C5690C41-1B19-4491-A062-33F2F29E9A8D}" type="datetimeFigureOut">
               <a:rPr lang="en-US" smtClean="0"/>
-              <a:t>2017-09-28</a:t>
+              <a:t>2017-10-13</a:t>
             </a:fld>
             <a:endParaRPr lang="en-US"/>
           </a:p>
@@ -4088,7 +4088,7 @@
           <a:p>
             <a:fld id="{C5690C41-1B19-4491-A062-33F2F29E9A8D}" type="datetimeFigureOut">
               <a:rPr lang="en-US" smtClean="0"/>
-              <a:t>2017-09-28</a:t>
+              <a:t>2017-10-13</a:t>
             </a:fld>
             <a:endParaRPr lang="en-US"/>
           </a:p>
@@ -4376,7 +4376,7 @@
           <a:p>
             <a:fld id="{C5690C41-1B19-4491-A062-33F2F29E9A8D}" type="datetimeFigureOut">
               <a:rPr lang="en-US" smtClean="0"/>
-              <a:t>2017-09-28</a:t>
+              <a:t>2017-10-13</a:t>
             </a:fld>
             <a:endParaRPr lang="en-US"/>
           </a:p>
@@ -4798,7 +4798,7 @@
           <a:p>
             <a:fld id="{C5690C41-1B19-4491-A062-33F2F29E9A8D}" type="datetimeFigureOut">
               <a:rPr lang="en-US" smtClean="0"/>
-              <a:t>2017-09-28</a:t>
+              <a:t>2017-10-13</a:t>
             </a:fld>
             <a:endParaRPr lang="en-US"/>
           </a:p>
@@ -4916,7 +4916,7 @@
           <a:p>
             <a:fld id="{C5690C41-1B19-4491-A062-33F2F29E9A8D}" type="datetimeFigureOut">
               <a:rPr lang="en-US" smtClean="0"/>
-              <a:t>2017-09-28</a:t>
+              <a:t>2017-10-13</a:t>
             </a:fld>
             <a:endParaRPr lang="en-US"/>
           </a:p>
@@ -5011,7 +5011,7 @@
           <a:p>
             <a:fld id="{C5690C41-1B19-4491-A062-33F2F29E9A8D}" type="datetimeFigureOut">
               <a:rPr lang="en-US" smtClean="0"/>
-              <a:t>2017-09-28</a:t>
+              <a:t>2017-10-13</a:t>
             </a:fld>
             <a:endParaRPr lang="en-US"/>
           </a:p>
@@ -5271,7 +5271,7 @@
           <a:p>
             <a:fld id="{E3744D7E-A5BB-4306-A750-C25515017678}" type="datetimeFigureOut">
               <a:rPr lang="en-US" smtClean="0"/>
-              <a:t>2017-09-28</a:t>
+              <a:t>2017-10-13</a:t>
             </a:fld>
             <a:endParaRPr lang="en-US"/>
           </a:p>
@@ -5564,7 +5564,7 @@
           <a:p>
             <a:fld id="{C5690C41-1B19-4491-A062-33F2F29E9A8D}" type="datetimeFigureOut">
               <a:rPr lang="en-US" smtClean="0"/>
-              <a:t>2017-09-28</a:t>
+              <a:t>2017-10-13</a:t>
             </a:fld>
             <a:endParaRPr lang="en-US"/>
           </a:p>
@@ -5817,7 +5817,7 @@
           <a:p>
             <a:fld id="{C5690C41-1B19-4491-A062-33F2F29E9A8D}" type="datetimeFigureOut">
               <a:rPr lang="en-US" smtClean="0"/>
-              <a:t>2017-09-28</a:t>
+              <a:t>2017-10-13</a:t>
             </a:fld>
             <a:endParaRPr lang="en-US"/>
           </a:p>
@@ -5987,7 +5987,7 @@
           <a:p>
             <a:fld id="{C5690C41-1B19-4491-A062-33F2F29E9A8D}" type="datetimeFigureOut">
               <a:rPr lang="en-US" smtClean="0"/>
-              <a:t>2017-09-28</a:t>
+              <a:t>2017-10-13</a:t>
             </a:fld>
             <a:endParaRPr lang="en-US"/>
           </a:p>
@@ -6167,7 +6167,7 @@
           <a:p>
             <a:fld id="{C5690C41-1B19-4491-A062-33F2F29E9A8D}" type="datetimeFigureOut">
               <a:rPr lang="en-US" smtClean="0"/>
-              <a:t>2017-09-28</a:t>
+              <a:t>2017-10-13</a:t>
             </a:fld>
             <a:endParaRPr lang="en-US"/>
           </a:p>
@@ -6409,7 +6409,7 @@
           <a:p>
             <a:fld id="{23D18025-B22E-453D-AA62-4A08DAEF541F}" type="datetimeFigureOut">
               <a:rPr lang="en-US" smtClean="0"/>
-              <a:t>2017-09-28</a:t>
+              <a:t>2017-10-13</a:t>
             </a:fld>
             <a:endParaRPr lang="en-US"/>
           </a:p>
@@ -6579,7 +6579,7 @@
           <a:p>
             <a:fld id="{23D18025-B22E-453D-AA62-4A08DAEF541F}" type="datetimeFigureOut">
               <a:rPr lang="en-US" smtClean="0"/>
-              <a:t>2017-09-28</a:t>
+              <a:t>2017-10-13</a:t>
             </a:fld>
             <a:endParaRPr lang="en-US"/>
           </a:p>
@@ -6825,7 +6825,7 @@
           <a:p>
             <a:fld id="{23D18025-B22E-453D-AA62-4A08DAEF541F}" type="datetimeFigureOut">
               <a:rPr lang="en-US" smtClean="0"/>
-              <a:t>2017-09-28</a:t>
+              <a:t>2017-10-13</a:t>
             </a:fld>
             <a:endParaRPr lang="en-US"/>
           </a:p>
@@ -7113,7 +7113,7 @@
           <a:p>
             <a:fld id="{23D18025-B22E-453D-AA62-4A08DAEF541F}" type="datetimeFigureOut">
               <a:rPr lang="en-US" smtClean="0"/>
-              <a:t>2017-09-28</a:t>
+              <a:t>2017-10-13</a:t>
             </a:fld>
             <a:endParaRPr lang="en-US"/>
           </a:p>
@@ -7535,7 +7535,7 @@
           <a:p>
             <a:fld id="{23D18025-B22E-453D-AA62-4A08DAEF541F}" type="datetimeFigureOut">
               <a:rPr lang="en-US" smtClean="0"/>
-              <a:t>2017-09-28</a:t>
+              <a:t>2017-10-13</a:t>
             </a:fld>
             <a:endParaRPr lang="en-US"/>
           </a:p>
@@ -7653,7 +7653,7 @@
           <a:p>
             <a:fld id="{23D18025-B22E-453D-AA62-4A08DAEF541F}" type="datetimeFigureOut">
               <a:rPr lang="en-US" smtClean="0"/>
-              <a:t>2017-09-28</a:t>
+              <a:t>2017-10-13</a:t>
             </a:fld>
             <a:endParaRPr lang="en-US"/>
           </a:p>
@@ -7963,7 +7963,7 @@
           <a:p>
             <a:fld id="{E3744D7E-A5BB-4306-A750-C25515017678}" type="datetimeFigureOut">
               <a:rPr lang="en-US" smtClean="0"/>
-              <a:t>2017-09-28</a:t>
+              <a:t>2017-10-13</a:t>
             </a:fld>
             <a:endParaRPr lang="en-US"/>
           </a:p>
@@ -8074,7 +8074,7 @@
           <a:p>
             <a:fld id="{23D18025-B22E-453D-AA62-4A08DAEF541F}" type="datetimeFigureOut">
               <a:rPr lang="en-US" smtClean="0"/>
-              <a:t>2017-09-28</a:t>
+              <a:t>2017-10-13</a:t>
             </a:fld>
             <a:endParaRPr lang="en-US"/>
           </a:p>
@@ -8351,7 +8351,7 @@
           <a:p>
             <a:fld id="{23D18025-B22E-453D-AA62-4A08DAEF541F}" type="datetimeFigureOut">
               <a:rPr lang="en-US" smtClean="0"/>
-              <a:t>2017-09-28</a:t>
+              <a:t>2017-10-13</a:t>
             </a:fld>
             <a:endParaRPr lang="en-US"/>
           </a:p>
@@ -8604,7 +8604,7 @@
           <a:p>
             <a:fld id="{23D18025-B22E-453D-AA62-4A08DAEF541F}" type="datetimeFigureOut">
               <a:rPr lang="en-US" smtClean="0"/>
-              <a:t>2017-09-28</a:t>
+              <a:t>2017-10-13</a:t>
             </a:fld>
             <a:endParaRPr lang="en-US"/>
           </a:p>
@@ -8774,7 +8774,7 @@
           <a:p>
             <a:fld id="{23D18025-B22E-453D-AA62-4A08DAEF541F}" type="datetimeFigureOut">
               <a:rPr lang="en-US" smtClean="0"/>
-              <a:t>2017-09-28</a:t>
+              <a:t>2017-10-13</a:t>
             </a:fld>
             <a:endParaRPr lang="en-US"/>
           </a:p>
@@ -8954,7 +8954,7 @@
           <a:p>
             <a:fld id="{23D18025-B22E-453D-AA62-4A08DAEF541F}" type="datetimeFigureOut">
               <a:rPr lang="en-US" smtClean="0"/>
-              <a:t>2017-09-28</a:t>
+              <a:t>2017-10-13</a:t>
             </a:fld>
             <a:endParaRPr lang="en-US"/>
           </a:p>
@@ -9196,7 +9196,7 @@
           <a:p>
             <a:fld id="{5A29F1F3-0306-4ADD-8575-5F845BC34EA0}" type="datetimeFigureOut">
               <a:rPr lang="en-US" smtClean="0"/>
-              <a:t>2017-09-28</a:t>
+              <a:t>2017-10-13</a:t>
             </a:fld>
             <a:endParaRPr lang="en-US"/>
           </a:p>
@@ -9366,7 +9366,7 @@
           <a:p>
             <a:fld id="{5A29F1F3-0306-4ADD-8575-5F845BC34EA0}" type="datetimeFigureOut">
               <a:rPr lang="en-US" smtClean="0"/>
-              <a:t>2017-09-28</a:t>
+              <a:t>2017-10-13</a:t>
             </a:fld>
             <a:endParaRPr lang="en-US"/>
           </a:p>
@@ -9612,7 +9612,7 @@
           <a:p>
             <a:fld id="{5A29F1F3-0306-4ADD-8575-5F845BC34EA0}" type="datetimeFigureOut">
               <a:rPr lang="en-US" smtClean="0"/>
-              <a:t>2017-09-28</a:t>
+              <a:t>2017-10-13</a:t>
             </a:fld>
             <a:endParaRPr lang="en-US"/>
           </a:p>
@@ -9900,7 +9900,7 @@
           <a:p>
             <a:fld id="{5A29F1F3-0306-4ADD-8575-5F845BC34EA0}" type="datetimeFigureOut">
               <a:rPr lang="en-US" smtClean="0"/>
-              <a:t>2017-09-28</a:t>
+              <a:t>2017-10-13</a:t>
             </a:fld>
             <a:endParaRPr lang="en-US"/>
           </a:p>
@@ -10322,7 +10322,7 @@
           <a:p>
             <a:fld id="{5A29F1F3-0306-4ADD-8575-5F845BC34EA0}" type="datetimeFigureOut">
               <a:rPr lang="en-US" smtClean="0"/>
-              <a:t>2017-09-28</a:t>
+              <a:t>2017-10-13</a:t>
             </a:fld>
             <a:endParaRPr lang="en-US"/>
           </a:p>
@@ -10772,7 +10772,7 @@
           <a:p>
             <a:fld id="{E3744D7E-A5BB-4306-A750-C25515017678}" type="datetimeFigureOut">
               <a:rPr lang="en-US" smtClean="0"/>
-              <a:t>2017-09-28</a:t>
+              <a:t>2017-10-13</a:t>
             </a:fld>
             <a:endParaRPr lang="en-US"/>
           </a:p>
@@ -10906,7 +10906,7 @@
           <a:p>
             <a:fld id="{5A29F1F3-0306-4ADD-8575-5F845BC34EA0}" type="datetimeFigureOut">
               <a:rPr lang="en-US" smtClean="0"/>
-              <a:t>2017-09-28</a:t>
+              <a:t>2017-10-13</a:t>
             </a:fld>
             <a:endParaRPr lang="en-US"/>
           </a:p>
@@ -11001,7 +11001,7 @@
           <a:p>
             <a:fld id="{5A29F1F3-0306-4ADD-8575-5F845BC34EA0}" type="datetimeFigureOut">
               <a:rPr lang="en-US" smtClean="0"/>
-              <a:t>2017-09-28</a:t>
+              <a:t>2017-10-13</a:t>
             </a:fld>
             <a:endParaRPr lang="en-US"/>
           </a:p>
@@ -11278,7 +11278,7 @@
           <a:p>
             <a:fld id="{5A29F1F3-0306-4ADD-8575-5F845BC34EA0}" type="datetimeFigureOut">
               <a:rPr lang="en-US" smtClean="0"/>
-              <a:t>2017-09-28</a:t>
+              <a:t>2017-10-13</a:t>
             </a:fld>
             <a:endParaRPr lang="en-US"/>
           </a:p>
@@ -11531,7 +11531,7 @@
           <a:p>
             <a:fld id="{5A29F1F3-0306-4ADD-8575-5F845BC34EA0}" type="datetimeFigureOut">
               <a:rPr lang="en-US" smtClean="0"/>
-              <a:t>2017-09-28</a:t>
+              <a:t>2017-10-13</a:t>
             </a:fld>
             <a:endParaRPr lang="en-US"/>
           </a:p>
@@ -11701,7 +11701,7 @@
           <a:p>
             <a:fld id="{5A29F1F3-0306-4ADD-8575-5F845BC34EA0}" type="datetimeFigureOut">
               <a:rPr lang="en-US" smtClean="0"/>
-              <a:t>2017-09-28</a:t>
+              <a:t>2017-10-13</a:t>
             </a:fld>
             <a:endParaRPr lang="en-US"/>
           </a:p>
@@ -11881,7 +11881,7 @@
           <a:p>
             <a:fld id="{5A29F1F3-0306-4ADD-8575-5F845BC34EA0}" type="datetimeFigureOut">
               <a:rPr lang="en-US" smtClean="0"/>
-              <a:t>2017-09-28</a:t>
+              <a:t>2017-10-13</a:t>
             </a:fld>
             <a:endParaRPr lang="en-US"/>
           </a:p>
@@ -12123,7 +12123,7 @@
           <a:p>
             <a:fld id="{2CD378D0-82C9-47C6-BEE5-E347AC6F0A5E}" type="datetimeFigureOut">
               <a:rPr lang="en-US" smtClean="0"/>
-              <a:t>2017-09-28</a:t>
+              <a:t>2017-10-13</a:t>
             </a:fld>
             <a:endParaRPr lang="en-US"/>
           </a:p>
@@ -12293,7 +12293,7 @@
           <a:p>
             <a:fld id="{2CD378D0-82C9-47C6-BEE5-E347AC6F0A5E}" type="datetimeFigureOut">
               <a:rPr lang="en-US" smtClean="0"/>
-              <a:t>2017-09-28</a:t>
+              <a:t>2017-10-13</a:t>
             </a:fld>
             <a:endParaRPr lang="en-US"/>
           </a:p>
@@ -12539,7 +12539,7 @@
           <a:p>
             <a:fld id="{2CD378D0-82C9-47C6-BEE5-E347AC6F0A5E}" type="datetimeFigureOut">
               <a:rPr lang="en-US" smtClean="0"/>
-              <a:t>2017-09-28</a:t>
+              <a:t>2017-10-13</a:t>
             </a:fld>
             <a:endParaRPr lang="en-US"/>
           </a:p>
@@ -12827,7 +12827,7 @@
           <a:p>
             <a:fld id="{2CD378D0-82C9-47C6-BEE5-E347AC6F0A5E}" type="datetimeFigureOut">
               <a:rPr lang="en-US" smtClean="0"/>
-              <a:t>2017-09-28</a:t>
+              <a:t>2017-10-13</a:t>
             </a:fld>
             <a:endParaRPr lang="en-US"/>
           </a:p>
@@ -12961,7 +12961,7 @@
           <a:p>
             <a:fld id="{E3744D7E-A5BB-4306-A750-C25515017678}" type="datetimeFigureOut">
               <a:rPr lang="en-US" smtClean="0"/>
-              <a:t>2017-09-28</a:t>
+              <a:t>2017-10-13</a:t>
             </a:fld>
             <a:endParaRPr lang="en-US"/>
           </a:p>
@@ -13399,7 +13399,7 @@
           <a:p>
             <a:fld id="{2CD378D0-82C9-47C6-BEE5-E347AC6F0A5E}" type="datetimeFigureOut">
               <a:rPr lang="en-US" smtClean="0"/>
-              <a:t>2017-09-28</a:t>
+              <a:t>2017-10-13</a:t>
             </a:fld>
             <a:endParaRPr lang="en-US"/>
           </a:p>
@@ -13517,7 +13517,7 @@
           <a:p>
             <a:fld id="{2CD378D0-82C9-47C6-BEE5-E347AC6F0A5E}" type="datetimeFigureOut">
               <a:rPr lang="en-US" smtClean="0"/>
-              <a:t>2017-09-28</a:t>
+              <a:t>2017-10-13</a:t>
             </a:fld>
             <a:endParaRPr lang="en-US"/>
           </a:p>
@@ -13612,7 +13612,7 @@
           <a:p>
             <a:fld id="{2CD378D0-82C9-47C6-BEE5-E347AC6F0A5E}" type="datetimeFigureOut">
               <a:rPr lang="en-US" smtClean="0"/>
-              <a:t>2017-09-28</a:t>
+              <a:t>2017-10-13</a:t>
             </a:fld>
             <a:endParaRPr lang="en-US"/>
           </a:p>
@@ -13889,7 +13889,7 @@
           <a:p>
             <a:fld id="{2CD378D0-82C9-47C6-BEE5-E347AC6F0A5E}" type="datetimeFigureOut">
               <a:rPr lang="en-US" smtClean="0"/>
-              <a:t>2017-09-28</a:t>
+              <a:t>2017-10-13</a:t>
             </a:fld>
             <a:endParaRPr lang="en-US"/>
           </a:p>
@@ -14142,7 +14142,7 @@
           <a:p>
             <a:fld id="{2CD378D0-82C9-47C6-BEE5-E347AC6F0A5E}" type="datetimeFigureOut">
               <a:rPr lang="en-US" smtClean="0"/>
-              <a:t>2017-09-28</a:t>
+              <a:t>2017-10-13</a:t>
             </a:fld>
             <a:endParaRPr lang="en-US"/>
           </a:p>
@@ -14312,7 +14312,7 @@
           <a:p>
             <a:fld id="{2CD378D0-82C9-47C6-BEE5-E347AC6F0A5E}" type="datetimeFigureOut">
               <a:rPr lang="en-US" smtClean="0"/>
-              <a:t>2017-09-28</a:t>
+              <a:t>2017-10-13</a:t>
             </a:fld>
             <a:endParaRPr lang="en-US"/>
           </a:p>
@@ -14492,7 +14492,7 @@
           <a:p>
             <a:fld id="{2CD378D0-82C9-47C6-BEE5-E347AC6F0A5E}" type="datetimeFigureOut">
               <a:rPr lang="en-US" smtClean="0"/>
-              <a:t>2017-09-28</a:t>
+              <a:t>2017-10-13</a:t>
             </a:fld>
             <a:endParaRPr lang="en-US"/>
           </a:p>
@@ -14734,7 +14734,7 @@
           <a:p>
             <a:fld id="{B96FFCCF-F4AB-4D56-AEE8-39DF7F28FF62}" type="datetimeFigureOut">
               <a:rPr lang="en-US" smtClean="0"/>
-              <a:t>2017-09-28</a:t>
+              <a:t>2017-10-13</a:t>
             </a:fld>
             <a:endParaRPr lang="en-US"/>
           </a:p>
@@ -14904,7 +14904,7 @@
           <a:p>
             <a:fld id="{B96FFCCF-F4AB-4D56-AEE8-39DF7F28FF62}" type="datetimeFigureOut">
               <a:rPr lang="en-US" smtClean="0"/>
-              <a:t>2017-09-28</a:t>
+              <a:t>2017-10-13</a:t>
             </a:fld>
             <a:endParaRPr lang="en-US"/>
           </a:p>
@@ -15150,7 +15150,7 @@
           <a:p>
             <a:fld id="{B96FFCCF-F4AB-4D56-AEE8-39DF7F28FF62}" type="datetimeFigureOut">
               <a:rPr lang="en-US" smtClean="0"/>
-              <a:t>2017-09-28</a:t>
+              <a:t>2017-10-13</a:t>
             </a:fld>
             <a:endParaRPr lang="en-US"/>
           </a:p>
@@ -15253,7 +15253,7 @@
           <a:p>
             <a:fld id="{E3744D7E-A5BB-4306-A750-C25515017678}" type="datetimeFigureOut">
               <a:rPr lang="en-US" smtClean="0"/>
-              <a:t>2017-09-28</a:t>
+              <a:t>2017-10-13</a:t>
             </a:fld>
             <a:endParaRPr lang="en-US"/>
           </a:p>
@@ -15564,7 +15564,7 @@
           <a:p>
             <a:fld id="{B96FFCCF-F4AB-4D56-AEE8-39DF7F28FF62}" type="datetimeFigureOut">
               <a:rPr lang="en-US" smtClean="0"/>
-              <a:t>2017-09-28</a:t>
+              <a:t>2017-10-13</a:t>
             </a:fld>
             <a:endParaRPr lang="en-US"/>
           </a:p>
@@ -15986,7 +15986,7 @@
           <a:p>
             <a:fld id="{B96FFCCF-F4AB-4D56-AEE8-39DF7F28FF62}" type="datetimeFigureOut">
               <a:rPr lang="en-US" smtClean="0"/>
-              <a:t>2017-09-28</a:t>
+              <a:t>2017-10-13</a:t>
             </a:fld>
             <a:endParaRPr lang="en-US"/>
           </a:p>
@@ -16104,7 +16104,7 @@
           <a:p>
             <a:fld id="{B96FFCCF-F4AB-4D56-AEE8-39DF7F28FF62}" type="datetimeFigureOut">
               <a:rPr lang="en-US" smtClean="0"/>
-              <a:t>2017-09-28</a:t>
+              <a:t>2017-10-13</a:t>
             </a:fld>
             <a:endParaRPr lang="en-US"/>
           </a:p>
@@ -16199,7 +16199,7 @@
           <a:p>
             <a:fld id="{B96FFCCF-F4AB-4D56-AEE8-39DF7F28FF62}" type="datetimeFigureOut">
               <a:rPr lang="en-US" smtClean="0"/>
-              <a:t>2017-09-28</a:t>
+              <a:t>2017-10-13</a:t>
             </a:fld>
             <a:endParaRPr lang="en-US"/>
           </a:p>
@@ -16476,7 +16476,7 @@
           <a:p>
             <a:fld id="{B96FFCCF-F4AB-4D56-AEE8-39DF7F28FF62}" type="datetimeFigureOut">
               <a:rPr lang="en-US" smtClean="0"/>
-              <a:t>2017-09-28</a:t>
+              <a:t>2017-10-13</a:t>
             </a:fld>
             <a:endParaRPr lang="en-US"/>
           </a:p>
@@ -16729,7 +16729,7 @@
           <a:p>
             <a:fld id="{B96FFCCF-F4AB-4D56-AEE8-39DF7F28FF62}" type="datetimeFigureOut">
               <a:rPr lang="en-US" smtClean="0"/>
-              <a:t>2017-09-28</a:t>
+              <a:t>2017-10-13</a:t>
             </a:fld>
             <a:endParaRPr lang="en-US"/>
           </a:p>
@@ -16899,7 +16899,7 @@
           <a:p>
             <a:fld id="{B96FFCCF-F4AB-4D56-AEE8-39DF7F28FF62}" type="datetimeFigureOut">
               <a:rPr lang="en-US" smtClean="0"/>
-              <a:t>2017-09-28</a:t>
+              <a:t>2017-10-13</a:t>
             </a:fld>
             <a:endParaRPr lang="en-US"/>
           </a:p>
@@ -17079,7 +17079,7 @@
           <a:p>
             <a:fld id="{B96FFCCF-F4AB-4D56-AEE8-39DF7F28FF62}" type="datetimeFigureOut">
               <a:rPr lang="en-US" smtClean="0"/>
-              <a:t>2017-09-28</a:t>
+              <a:t>2017-10-13</a:t>
             </a:fld>
             <a:endParaRPr lang="en-US"/>
           </a:p>
@@ -17321,7 +17321,7 @@
           <a:p>
             <a:fld id="{E90DB797-294B-4B2B-9A48-229F3ACF3E1A}" type="datetimeFigureOut">
               <a:rPr lang="en-US" smtClean="0"/>
-              <a:t>2017-09-28</a:t>
+              <a:t>2017-10-13</a:t>
             </a:fld>
             <a:endParaRPr lang="en-US"/>
           </a:p>
@@ -17491,7 +17491,7 @@
           <a:p>
             <a:fld id="{E90DB797-294B-4B2B-9A48-229F3ACF3E1A}" type="datetimeFigureOut">
               <a:rPr lang="en-US" smtClean="0"/>
-              <a:t>2017-09-28</a:t>
+              <a:t>2017-10-13</a:t>
             </a:fld>
             <a:endParaRPr lang="en-US"/>
           </a:p>
@@ -17785,7 +17785,7 @@
           <a:p>
             <a:fld id="{E3744D7E-A5BB-4306-A750-C25515017678}" type="datetimeFigureOut">
               <a:rPr lang="en-US" smtClean="0"/>
-              <a:t>2017-09-28</a:t>
+              <a:t>2017-10-13</a:t>
             </a:fld>
             <a:endParaRPr lang="en-US"/>
           </a:p>
@@ -18047,7 +18047,7 @@
           <a:p>
             <a:fld id="{E90DB797-294B-4B2B-9A48-229F3ACF3E1A}" type="datetimeFigureOut">
               <a:rPr lang="en-US" smtClean="0"/>
-              <a:t>2017-09-28</a:t>
+              <a:t>2017-10-13</a:t>
             </a:fld>
             <a:endParaRPr lang="en-US"/>
           </a:p>
@@ -18335,7 +18335,7 @@
           <a:p>
             <a:fld id="{E90DB797-294B-4B2B-9A48-229F3ACF3E1A}" type="datetimeFigureOut">
               <a:rPr lang="en-US" smtClean="0"/>
-              <a:t>2017-09-28</a:t>
+              <a:t>2017-10-13</a:t>
             </a:fld>
             <a:endParaRPr lang="en-US"/>
           </a:p>
@@ -18757,7 +18757,7 @@
           <a:p>
             <a:fld id="{E90DB797-294B-4B2B-9A48-229F3ACF3E1A}" type="datetimeFigureOut">
               <a:rPr lang="en-US" smtClean="0"/>
-              <a:t>2017-09-28</a:t>
+              <a:t>2017-10-13</a:t>
             </a:fld>
             <a:endParaRPr lang="en-US"/>
           </a:p>
@@ -18875,7 +18875,7 @@
           <a:p>
             <a:fld id="{E90DB797-294B-4B2B-9A48-229F3ACF3E1A}" type="datetimeFigureOut">
               <a:rPr lang="en-US" smtClean="0"/>
-              <a:t>2017-09-28</a:t>
+              <a:t>2017-10-13</a:t>
             </a:fld>
             <a:endParaRPr lang="en-US"/>
           </a:p>
@@ -18970,7 +18970,7 @@
           <a:p>
             <a:fld id="{E90DB797-294B-4B2B-9A48-229F3ACF3E1A}" type="datetimeFigureOut">
               <a:rPr lang="en-US" smtClean="0"/>
-              <a:t>2017-09-28</a:t>
+              <a:t>2017-10-13</a:t>
             </a:fld>
             <a:endParaRPr lang="en-US"/>
           </a:p>
@@ -19247,7 +19247,7 @@
           <a:p>
             <a:fld id="{E90DB797-294B-4B2B-9A48-229F3ACF3E1A}" type="datetimeFigureOut">
               <a:rPr lang="en-US" smtClean="0"/>
-              <a:t>2017-09-28</a:t>
+              <a:t>2017-10-13</a:t>
             </a:fld>
             <a:endParaRPr lang="en-US"/>
           </a:p>
@@ -19500,7 +19500,7 @@
           <a:p>
             <a:fld id="{E90DB797-294B-4B2B-9A48-229F3ACF3E1A}" type="datetimeFigureOut">
               <a:rPr lang="en-US" smtClean="0"/>
-              <a:t>2017-09-28</a:t>
+              <a:t>2017-10-13</a:t>
             </a:fld>
             <a:endParaRPr lang="en-US"/>
           </a:p>
@@ -19670,7 +19670,7 @@
           <a:p>
             <a:fld id="{E90DB797-294B-4B2B-9A48-229F3ACF3E1A}" type="datetimeFigureOut">
               <a:rPr lang="en-US" smtClean="0"/>
-              <a:t>2017-09-28</a:t>
+              <a:t>2017-10-13</a:t>
             </a:fld>
             <a:endParaRPr lang="en-US"/>
           </a:p>
@@ -19850,7 +19850,7 @@
           <a:p>
             <a:fld id="{E90DB797-294B-4B2B-9A48-229F3ACF3E1A}" type="datetimeFigureOut">
               <a:rPr lang="en-US" smtClean="0"/>
-              <a:t>2017-09-28</a:t>
+              <a:t>2017-10-13</a:t>
             </a:fld>
             <a:endParaRPr lang="en-US"/>
           </a:p>
@@ -20120,7 +20120,7 @@
           <a:p>
             <a:fld id="{E3744D7E-A5BB-4306-A750-C25515017678}" type="datetimeFigureOut">
               <a:rPr lang="en-US" smtClean="0"/>
-              <a:t>2017-09-28</a:t>
+              <a:t>2017-10-13</a:t>
             </a:fld>
             <a:endParaRPr lang="en-US"/>
           </a:p>
@@ -20652,7 +20652,7 @@
           <a:p>
             <a:fld id="{B880F04E-B60C-4530-BE27-DE08322B2422}" type="datetimeFigureOut">
               <a:rPr lang="en-US" smtClean="0"/>
-              <a:t>2017-09-28</a:t>
+              <a:t>2017-10-13</a:t>
             </a:fld>
             <a:endParaRPr lang="en-US"/>
           </a:p>
@@ -21162,7 +21162,7 @@
           <a:p>
             <a:fld id="{C5690C41-1B19-4491-A062-33F2F29E9A8D}" type="datetimeFigureOut">
               <a:rPr lang="en-US" smtClean="0"/>
-              <a:t>2017-09-28</a:t>
+              <a:t>2017-10-13</a:t>
             </a:fld>
             <a:endParaRPr lang="en-US"/>
           </a:p>
@@ -21672,7 +21672,7 @@
           <a:p>
             <a:fld id="{23D18025-B22E-453D-AA62-4A08DAEF541F}" type="datetimeFigureOut">
               <a:rPr lang="en-US" smtClean="0"/>
-              <a:t>2017-09-28</a:t>
+              <a:t>2017-10-13</a:t>
             </a:fld>
             <a:endParaRPr lang="en-US"/>
           </a:p>
@@ -22182,7 +22182,7 @@
           <a:p>
             <a:fld id="{5A29F1F3-0306-4ADD-8575-5F845BC34EA0}" type="datetimeFigureOut">
               <a:rPr lang="en-US" smtClean="0"/>
-              <a:t>2017-09-28</a:t>
+              <a:t>2017-10-13</a:t>
             </a:fld>
             <a:endParaRPr lang="en-US"/>
           </a:p>
@@ -22692,7 +22692,7 @@
           <a:p>
             <a:fld id="{2CD378D0-82C9-47C6-BEE5-E347AC6F0A5E}" type="datetimeFigureOut">
               <a:rPr lang="en-US" smtClean="0"/>
-              <a:t>2017-09-28</a:t>
+              <a:t>2017-10-13</a:t>
             </a:fld>
             <a:endParaRPr lang="en-US"/>
           </a:p>
@@ -23202,7 +23202,7 @@
           <a:p>
             <a:fld id="{B96FFCCF-F4AB-4D56-AEE8-39DF7F28FF62}" type="datetimeFigureOut">
               <a:rPr lang="en-US" smtClean="0"/>
-              <a:t>2017-09-28</a:t>
+              <a:t>2017-10-13</a:t>
             </a:fld>
             <a:endParaRPr lang="en-US"/>
           </a:p>
@@ -23712,7 +23712,7 @@
           <a:p>
             <a:fld id="{E90DB797-294B-4B2B-9A48-229F3ACF3E1A}" type="datetimeFigureOut">
               <a:rPr lang="en-US" smtClean="0"/>
-              <a:t>2017-09-28</a:t>
+              <a:t>2017-10-13</a:t>
             </a:fld>
             <a:endParaRPr lang="en-US"/>
           </a:p>
@@ -25563,8 +25563,8 @@
         </p:nvCxnSpPr>
         <p:spPr>
           <a:xfrm>
-            <a:off x="7933042" y="3093507"/>
-            <a:ext cx="0" cy="6840000"/>
+            <a:off x="7933042" y="3348000"/>
+            <a:ext cx="0" cy="6588000"/>
           </a:xfrm>
           <a:prstGeom prst="line">
             <a:avLst/>
@@ -25636,7 +25636,7 @@
         </p:nvSpPr>
         <p:spPr>
           <a:xfrm>
-            <a:off x="5643945" y="188591"/>
+            <a:off x="5634419" y="188591"/>
             <a:ext cx="1105495" cy="276999"/>
           </a:xfrm>
           <a:prstGeom prst="rect">
@@ -25723,7 +25723,7 @@
         </p:nvGrpSpPr>
         <p:grpSpPr>
           <a:xfrm>
-            <a:off x="8275395" y="2969588"/>
+            <a:off x="8357488" y="2969588"/>
             <a:ext cx="445844" cy="603379"/>
             <a:chOff x="8232155" y="587661"/>
             <a:chExt cx="445844" cy="603379"/>
@@ -25825,525 +25825,6 @@
           </p:spPr>
         </p:pic>
       </p:grpSp>
-      <p:grpSp>
-        <p:nvGrpSpPr>
-          <p:cNvPr id="851" name="Group 850"/>
-          <p:cNvGrpSpPr/>
-          <p:nvPr/>
-        </p:nvGrpSpPr>
-        <p:grpSpPr>
-          <a:xfrm>
-            <a:off x="7687603" y="3008627"/>
-            <a:ext cx="504468" cy="363739"/>
-            <a:chOff x="2089401" y="630040"/>
-            <a:chExt cx="504468" cy="363739"/>
-          </a:xfrm>
-          <a:effectLst>
-            <a:outerShdw blurRad="50800" dist="38100" dir="2700000" algn="tl" rotWithShape="0">
-              <a:prstClr val="black">
-                <a:alpha val="40000"/>
-              </a:prstClr>
-            </a:outerShdw>
-          </a:effectLst>
-        </p:grpSpPr>
-        <p:sp>
-          <p:nvSpPr>
-            <p:cNvPr id="852" name="Rectangle 851"/>
-            <p:cNvSpPr>
-              <a:spLocks noChangeArrowheads="1"/>
-            </p:cNvSpPr>
-            <p:nvPr/>
-          </p:nvSpPr>
-          <p:spPr bwMode="auto">
-            <a:xfrm>
-              <a:off x="2470474" y="737128"/>
-              <a:ext cx="60698" cy="203641"/>
-            </a:xfrm>
-            <a:prstGeom prst="rect">
-              <a:avLst/>
-            </a:prstGeom>
-            <a:gradFill>
-              <a:gsLst>
-                <a:gs pos="0">
-                  <a:schemeClr val="bg1">
-                    <a:lumMod val="50000"/>
-                  </a:schemeClr>
-                </a:gs>
-                <a:gs pos="47000">
-                  <a:schemeClr val="bg1">
-                    <a:lumMod val="95000"/>
-                  </a:schemeClr>
-                </a:gs>
-                <a:gs pos="100000">
-                  <a:schemeClr val="bg1">
-                    <a:lumMod val="50000"/>
-                  </a:schemeClr>
-                </a:gs>
-              </a:gsLst>
-              <a:lin ang="10800000" scaled="0"/>
-            </a:gradFill>
-            <a:ln w="3175" cap="flat">
-              <a:solidFill>
-                <a:schemeClr val="tx1"/>
-              </a:solidFill>
-              <a:prstDash val="solid"/>
-              <a:miter lim="800000"/>
-              <a:headEnd/>
-              <a:tailEnd/>
-            </a:ln>
-          </p:spPr>
-          <p:txBody>
-            <a:bodyPr vert="horz" wrap="square" lIns="91440" tIns="45720" rIns="91440" bIns="45720" numCol="1" anchor="t" anchorCtr="0" compatLnSpc="1">
-              <a:prstTxWarp prst="textNoShape">
-                <a:avLst/>
-              </a:prstTxWarp>
-            </a:bodyPr>
-            <a:lstStyle/>
-            <a:p>
-              <a:endParaRPr lang="en-US"/>
-            </a:p>
-          </p:txBody>
-        </p:sp>
-        <p:sp>
-          <p:nvSpPr>
-            <p:cNvPr id="853" name="Rectangle 852"/>
-            <p:cNvSpPr>
-              <a:spLocks noChangeArrowheads="1"/>
-            </p:cNvSpPr>
-            <p:nvPr/>
-          </p:nvSpPr>
-          <p:spPr bwMode="auto">
-            <a:xfrm>
-              <a:off x="2308857" y="737128"/>
-              <a:ext cx="60698" cy="203641"/>
-            </a:xfrm>
-            <a:prstGeom prst="rect">
-              <a:avLst/>
-            </a:prstGeom>
-            <a:gradFill>
-              <a:gsLst>
-                <a:gs pos="0">
-                  <a:schemeClr val="bg1">
-                    <a:lumMod val="50000"/>
-                  </a:schemeClr>
-                </a:gs>
-                <a:gs pos="47000">
-                  <a:schemeClr val="bg1">
-                    <a:lumMod val="95000"/>
-                  </a:schemeClr>
-                </a:gs>
-                <a:gs pos="100000">
-                  <a:schemeClr val="bg1">
-                    <a:lumMod val="50000"/>
-                  </a:schemeClr>
-                </a:gs>
-              </a:gsLst>
-              <a:lin ang="10800000" scaled="0"/>
-            </a:gradFill>
-            <a:ln w="3175" cap="flat">
-              <a:solidFill>
-                <a:schemeClr val="tx1"/>
-              </a:solidFill>
-              <a:prstDash val="solid"/>
-              <a:miter lim="800000"/>
-              <a:headEnd/>
-              <a:tailEnd/>
-            </a:ln>
-          </p:spPr>
-          <p:txBody>
-            <a:bodyPr vert="horz" wrap="square" lIns="91440" tIns="45720" rIns="91440" bIns="45720" numCol="1" anchor="t" anchorCtr="0" compatLnSpc="1">
-              <a:prstTxWarp prst="textNoShape">
-                <a:avLst/>
-              </a:prstTxWarp>
-            </a:bodyPr>
-            <a:lstStyle/>
-            <a:p>
-              <a:endParaRPr lang="en-US"/>
-            </a:p>
-          </p:txBody>
-        </p:sp>
-        <p:sp>
-          <p:nvSpPr>
-            <p:cNvPr id="854" name="Rectangle 853"/>
-            <p:cNvSpPr>
-              <a:spLocks noChangeArrowheads="1"/>
-            </p:cNvSpPr>
-            <p:nvPr/>
-          </p:nvSpPr>
-          <p:spPr bwMode="auto">
-            <a:xfrm>
-              <a:off x="2147398" y="737128"/>
-              <a:ext cx="60698" cy="203641"/>
-            </a:xfrm>
-            <a:prstGeom prst="rect">
-              <a:avLst/>
-            </a:prstGeom>
-            <a:gradFill>
-              <a:gsLst>
-                <a:gs pos="0">
-                  <a:schemeClr val="bg1">
-                    <a:lumMod val="50000"/>
-                  </a:schemeClr>
-                </a:gs>
-                <a:gs pos="47000">
-                  <a:schemeClr val="bg1">
-                    <a:lumMod val="95000"/>
-                  </a:schemeClr>
-                </a:gs>
-                <a:gs pos="100000">
-                  <a:schemeClr val="bg1">
-                    <a:lumMod val="65000"/>
-                  </a:schemeClr>
-                </a:gs>
-              </a:gsLst>
-              <a:lin ang="10800000" scaled="0"/>
-            </a:gradFill>
-            <a:ln w="3175" cap="flat">
-              <a:solidFill>
-                <a:schemeClr val="tx1"/>
-              </a:solidFill>
-              <a:prstDash val="solid"/>
-              <a:miter lim="800000"/>
-              <a:headEnd/>
-              <a:tailEnd/>
-            </a:ln>
-          </p:spPr>
-          <p:txBody>
-            <a:bodyPr vert="horz" wrap="square" lIns="91440" tIns="45720" rIns="91440" bIns="45720" numCol="1" anchor="t" anchorCtr="0" compatLnSpc="1">
-              <a:prstTxWarp prst="textNoShape">
-                <a:avLst/>
-              </a:prstTxWarp>
-            </a:bodyPr>
-            <a:lstStyle/>
-            <a:p>
-              <a:endParaRPr lang="en-US"/>
-            </a:p>
-          </p:txBody>
-        </p:sp>
-        <p:sp>
-          <p:nvSpPr>
-            <p:cNvPr id="855" name="Freeform 16"/>
-            <p:cNvSpPr>
-              <a:spLocks/>
-            </p:cNvSpPr>
-            <p:nvPr/>
-          </p:nvSpPr>
-          <p:spPr bwMode="auto">
-            <a:xfrm>
-              <a:off x="2101635" y="630040"/>
-              <a:ext cx="472098" cy="120781"/>
-            </a:xfrm>
-            <a:custGeom>
-              <a:avLst/>
-              <a:gdLst>
-                <a:gd name="T0" fmla="*/ 6 w 3093"/>
-                <a:gd name="T1" fmla="*/ 451 h 764"/>
-                <a:gd name="T2" fmla="*/ 1523 w 3093"/>
-                <a:gd name="T3" fmla="*/ 0 h 764"/>
-                <a:gd name="T4" fmla="*/ 3093 w 3093"/>
-                <a:gd name="T5" fmla="*/ 468 h 764"/>
-                <a:gd name="T6" fmla="*/ 3089 w 3093"/>
-                <a:gd name="T7" fmla="*/ 764 h 764"/>
-                <a:gd name="T8" fmla="*/ 0 w 3093"/>
-                <a:gd name="T9" fmla="*/ 754 h 764"/>
-                <a:gd name="T10" fmla="*/ 6 w 3093"/>
-                <a:gd name="T11" fmla="*/ 451 h 764"/>
-              </a:gdLst>
-              <a:ahLst/>
-              <a:cxnLst>
-                <a:cxn ang="0">
-                  <a:pos x="T0" y="T1"/>
-                </a:cxn>
-                <a:cxn ang="0">
-                  <a:pos x="T2" y="T3"/>
-                </a:cxn>
-                <a:cxn ang="0">
-                  <a:pos x="T4" y="T5"/>
-                </a:cxn>
-                <a:cxn ang="0">
-                  <a:pos x="T6" y="T7"/>
-                </a:cxn>
-                <a:cxn ang="0">
-                  <a:pos x="T8" y="T9"/>
-                </a:cxn>
-                <a:cxn ang="0">
-                  <a:pos x="T10" y="T11"/>
-                </a:cxn>
-              </a:cxnLst>
-              <a:rect l="0" t="0" r="r" b="b"/>
-              <a:pathLst>
-                <a:path w="3093" h="764">
-                  <a:moveTo>
-                    <a:pt x="6" y="451"/>
-                  </a:moveTo>
-                  <a:cubicBezTo>
-                    <a:pt x="86" y="441"/>
-                    <a:pt x="1523" y="0"/>
-                    <a:pt x="1523" y="0"/>
-                  </a:cubicBezTo>
-                  <a:lnTo>
-                    <a:pt x="3093" y="468"/>
-                  </a:lnTo>
-                  <a:lnTo>
-                    <a:pt x="3089" y="764"/>
-                  </a:lnTo>
-                  <a:lnTo>
-                    <a:pt x="0" y="754"/>
-                  </a:lnTo>
-                  <a:lnTo>
-                    <a:pt x="6" y="451"/>
-                  </a:lnTo>
-                  <a:close/>
-                </a:path>
-              </a:pathLst>
-            </a:custGeom>
-            <a:solidFill>
-              <a:srgbClr val="E6E6E6"/>
-            </a:solidFill>
-            <a:ln w="3175" cap="flat">
-              <a:solidFill>
-                <a:srgbClr val="7B7B79"/>
-              </a:solidFill>
-              <a:prstDash val="solid"/>
-              <a:miter lim="800000"/>
-              <a:headEnd/>
-              <a:tailEnd/>
-            </a:ln>
-          </p:spPr>
-          <p:txBody>
-            <a:bodyPr vert="horz" wrap="square" lIns="91440" tIns="45720" rIns="91440" bIns="45720" numCol="1" anchor="t" anchorCtr="0" compatLnSpc="1">
-              <a:prstTxWarp prst="textNoShape">
-                <a:avLst/>
-              </a:prstTxWarp>
-            </a:bodyPr>
-            <a:lstStyle/>
-            <a:p>
-              <a:endParaRPr lang="en-US"/>
-            </a:p>
-          </p:txBody>
-        </p:sp>
-        <p:sp>
-          <p:nvSpPr>
-            <p:cNvPr id="856" name="Freeform 18"/>
-            <p:cNvSpPr>
-              <a:spLocks/>
-            </p:cNvSpPr>
-            <p:nvPr/>
-          </p:nvSpPr>
-          <p:spPr bwMode="auto">
-            <a:xfrm>
-              <a:off x="2120425" y="929176"/>
-              <a:ext cx="437027" cy="33707"/>
-            </a:xfrm>
-            <a:custGeom>
-              <a:avLst/>
-              <a:gdLst>
-                <a:gd name="T0" fmla="*/ 0 w 2853"/>
-                <a:gd name="T1" fmla="*/ 213 h 213"/>
-                <a:gd name="T2" fmla="*/ 4 w 2853"/>
-                <a:gd name="T3" fmla="*/ 1 h 213"/>
-                <a:gd name="T4" fmla="*/ 2849 w 2853"/>
-                <a:gd name="T5" fmla="*/ 0 h 213"/>
-                <a:gd name="T6" fmla="*/ 2853 w 2853"/>
-                <a:gd name="T7" fmla="*/ 213 h 213"/>
-              </a:gdLst>
-              <a:ahLst/>
-              <a:cxnLst>
-                <a:cxn ang="0">
-                  <a:pos x="T0" y="T1"/>
-                </a:cxn>
-                <a:cxn ang="0">
-                  <a:pos x="T2" y="T3"/>
-                </a:cxn>
-                <a:cxn ang="0">
-                  <a:pos x="T4" y="T5"/>
-                </a:cxn>
-                <a:cxn ang="0">
-                  <a:pos x="T6" y="T7"/>
-                </a:cxn>
-              </a:cxnLst>
-              <a:rect l="0" t="0" r="r" b="b"/>
-              <a:pathLst>
-                <a:path w="2853" h="213">
-                  <a:moveTo>
-                    <a:pt x="0" y="213"/>
-                  </a:moveTo>
-                  <a:lnTo>
-                    <a:pt x="4" y="1"/>
-                  </a:lnTo>
-                  <a:lnTo>
-                    <a:pt x="2849" y="0"/>
-                  </a:lnTo>
-                  <a:lnTo>
-                    <a:pt x="2853" y="213"/>
-                  </a:lnTo>
-                </a:path>
-              </a:pathLst>
-            </a:custGeom>
-            <a:solidFill>
-              <a:srgbClr val="E6E6E6"/>
-            </a:solidFill>
-            <a:ln w="3175" cap="flat">
-              <a:solidFill>
-                <a:srgbClr val="7B7B79"/>
-              </a:solidFill>
-              <a:prstDash val="solid"/>
-              <a:miter lim="800000"/>
-              <a:headEnd/>
-              <a:tailEnd/>
-            </a:ln>
-          </p:spPr>
-          <p:txBody>
-            <a:bodyPr vert="horz" wrap="square" lIns="91440" tIns="45720" rIns="91440" bIns="45720" numCol="1" anchor="t" anchorCtr="0" compatLnSpc="1">
-              <a:prstTxWarp prst="textNoShape">
-                <a:avLst/>
-              </a:prstTxWarp>
-            </a:bodyPr>
-            <a:lstStyle/>
-            <a:p>
-              <a:endParaRPr lang="en-US"/>
-            </a:p>
-          </p:txBody>
-        </p:sp>
-        <p:sp>
-          <p:nvSpPr>
-            <p:cNvPr id="857" name="Freeform 19"/>
-            <p:cNvSpPr>
-              <a:spLocks/>
-            </p:cNvSpPr>
-            <p:nvPr/>
-          </p:nvSpPr>
-          <p:spPr bwMode="auto">
-            <a:xfrm>
-              <a:off x="2089401" y="962879"/>
-              <a:ext cx="504468" cy="30900"/>
-            </a:xfrm>
-            <a:custGeom>
-              <a:avLst/>
-              <a:gdLst>
-                <a:gd name="T0" fmla="*/ 3290 w 3295"/>
-                <a:gd name="T1" fmla="*/ 0 h 197"/>
-                <a:gd name="T2" fmla="*/ 3295 w 3295"/>
-                <a:gd name="T3" fmla="*/ 197 h 197"/>
-                <a:gd name="T4" fmla="*/ 0 w 3295"/>
-                <a:gd name="T5" fmla="*/ 196 h 197"/>
-                <a:gd name="T6" fmla="*/ 4 w 3295"/>
-                <a:gd name="T7" fmla="*/ 1 h 197"/>
-                <a:gd name="T8" fmla="*/ 3290 w 3295"/>
-                <a:gd name="T9" fmla="*/ 0 h 197"/>
-              </a:gdLst>
-              <a:ahLst/>
-              <a:cxnLst>
-                <a:cxn ang="0">
-                  <a:pos x="T0" y="T1"/>
-                </a:cxn>
-                <a:cxn ang="0">
-                  <a:pos x="T2" y="T3"/>
-                </a:cxn>
-                <a:cxn ang="0">
-                  <a:pos x="T4" y="T5"/>
-                </a:cxn>
-                <a:cxn ang="0">
-                  <a:pos x="T6" y="T7"/>
-                </a:cxn>
-                <a:cxn ang="0">
-                  <a:pos x="T8" y="T9"/>
-                </a:cxn>
-              </a:cxnLst>
-              <a:rect l="0" t="0" r="r" b="b"/>
-              <a:pathLst>
-                <a:path w="3295" h="197">
-                  <a:moveTo>
-                    <a:pt x="3290" y="0"/>
-                  </a:moveTo>
-                  <a:lnTo>
-                    <a:pt x="3295" y="197"/>
-                  </a:lnTo>
-                  <a:lnTo>
-                    <a:pt x="0" y="196"/>
-                  </a:lnTo>
-                  <a:lnTo>
-                    <a:pt x="4" y="1"/>
-                  </a:lnTo>
-                  <a:lnTo>
-                    <a:pt x="3290" y="0"/>
-                  </a:lnTo>
-                  <a:close/>
-                </a:path>
-              </a:pathLst>
-            </a:custGeom>
-            <a:solidFill>
-              <a:srgbClr val="E6E6E6"/>
-            </a:solidFill>
-            <a:ln w="3175" cap="flat">
-              <a:solidFill>
-                <a:srgbClr val="7B7B79"/>
-              </a:solidFill>
-              <a:prstDash val="solid"/>
-              <a:miter lim="800000"/>
-              <a:headEnd/>
-              <a:tailEnd/>
-            </a:ln>
-          </p:spPr>
-          <p:txBody>
-            <a:bodyPr vert="horz" wrap="square" lIns="91440" tIns="45720" rIns="91440" bIns="45720" numCol="1" anchor="t" anchorCtr="0" compatLnSpc="1">
-              <a:prstTxWarp prst="textNoShape">
-                <a:avLst/>
-              </a:prstTxWarp>
-            </a:bodyPr>
-            <a:lstStyle/>
-            <a:p>
-              <a:endParaRPr lang="en-US"/>
-            </a:p>
-          </p:txBody>
-        </p:sp>
-        <p:sp>
-          <p:nvSpPr>
-            <p:cNvPr id="858" name="Line 20"/>
-            <p:cNvSpPr>
-              <a:spLocks noChangeShapeType="1"/>
-            </p:cNvSpPr>
-            <p:nvPr/>
-          </p:nvSpPr>
-          <p:spPr bwMode="auto">
-            <a:xfrm>
-              <a:off x="2105677" y="711495"/>
-              <a:ext cx="465350" cy="0"/>
-            </a:xfrm>
-            <a:prstGeom prst="line">
-              <a:avLst/>
-            </a:prstGeom>
-            <a:noFill/>
-            <a:ln w="3175" cap="flat">
-              <a:solidFill>
-                <a:srgbClr val="7B7B79"/>
-              </a:solidFill>
-              <a:prstDash val="solid"/>
-              <a:miter lim="800000"/>
-              <a:headEnd/>
-              <a:tailEnd/>
-            </a:ln>
-            <a:extLst>
-              <a:ext uri="{909E8E84-426E-40DD-AFC4-6F175D3DCCD1}">
-                <a14:hiddenFill xmlns:a14="http://schemas.microsoft.com/office/drawing/2010/main">
-                  <a:noFill/>
-                </a14:hiddenFill>
-              </a:ext>
-            </a:extLst>
-          </p:spPr>
-          <p:txBody>
-            <a:bodyPr vert="horz" wrap="square" lIns="91440" tIns="45720" rIns="91440" bIns="45720" numCol="1" anchor="t" anchorCtr="0" compatLnSpc="1">
-              <a:prstTxWarp prst="textNoShape">
-                <a:avLst/>
-              </a:prstTxWarp>
-            </a:bodyPr>
-            <a:lstStyle/>
-            <a:p>
-              <a:endParaRPr lang="en-US"/>
-            </a:p>
-          </p:txBody>
-        </p:sp>
-      </p:grpSp>
       <p:pic>
         <p:nvPicPr>
           <p:cNvPr id="859" name="Picture 8" descr="key"/>
@@ -26376,7 +25857,7 @@
         </p:blipFill>
         <p:spPr bwMode="auto">
           <a:xfrm>
-            <a:off x="2996545" y="608851"/>
+            <a:off x="2907929" y="614804"/>
             <a:ext cx="360040" cy="356341"/>
           </a:xfrm>
           <a:prstGeom prst="rect">
@@ -26749,47 +26230,6 @@
           </a:extLst>
         </p:spPr>
       </p:pic>
-      <p:pic>
-        <p:nvPicPr>
-          <p:cNvPr id="868" name="Picture 7" descr="C:\Users\Anders\AppData\Local\Microsoft\Windows\INetCache\IE\RPLCESMO\14481-illustration-of-a-house-pv[1].png"/>
-          <p:cNvPicPr>
-            <a:picLocks noChangeAspect="1" noChangeArrowheads="1"/>
-          </p:cNvPicPr>
-          <p:nvPr/>
-        </p:nvPicPr>
-        <p:blipFill>
-          <a:blip r:embed="rId6" cstate="print">
-            <a:extLst>
-              <a:ext uri="{28A0092B-C50C-407E-A947-70E740481C1C}">
-                <a14:useLocalDpi xmlns:a14="http://schemas.microsoft.com/office/drawing/2010/main" val="0"/>
-              </a:ext>
-            </a:extLst>
-          </a:blip>
-          <a:srcRect/>
-          <a:stretch>
-            <a:fillRect/>
-          </a:stretch>
-        </p:blipFill>
-        <p:spPr bwMode="auto">
-          <a:xfrm>
-            <a:off x="3331230" y="503816"/>
-            <a:ext cx="611639" cy="516836"/>
-          </a:xfrm>
-          <a:prstGeom prst="rect">
-            <a:avLst/>
-          </a:prstGeom>
-          <a:noFill/>
-          <a:extLst>
-            <a:ext uri="{909E8E84-426E-40DD-AFC4-6F175D3DCCD1}">
-              <a14:hiddenFill xmlns:a14="http://schemas.microsoft.com/office/drawing/2010/main">
-                <a:solidFill>
-                  <a:srgbClr val="FFFFFF"/>
-                </a:solidFill>
-              </a14:hiddenFill>
-            </a:ext>
-          </a:extLst>
-        </p:spPr>
-      </p:pic>
       <p:sp>
         <p:nvSpPr>
           <p:cNvPr id="869" name="TextBox 868"/>
@@ -27007,7 +26447,7 @@
           <p:nvPr/>
         </p:nvPicPr>
         <p:blipFill>
-          <a:blip r:embed="rId7" cstate="print">
+          <a:blip r:embed="rId6" cstate="print">
             <a:extLst>
               <a:ext uri="{28A0092B-C50C-407E-A947-70E740481C1C}">
                 <a14:useLocalDpi xmlns:a14="http://schemas.microsoft.com/office/drawing/2010/main" val="0"/>
@@ -27097,7 +26537,7 @@
             <a:avLst/>
           </a:prstGeom>
           <a:blipFill>
-            <a:blip r:embed="rId8"/>
+            <a:blip r:embed="rId7"/>
             <a:tile tx="0" ty="0" sx="50000" sy="50000" flip="none" algn="tl"/>
           </a:blipFill>
           <a:ln w="6350">
@@ -27284,7 +26724,7 @@
           <p:nvPr/>
         </p:nvPicPr>
         <p:blipFill>
-          <a:blip r:embed="rId9">
+          <a:blip r:embed="rId8">
             <a:duotone>
               <a:prstClr val="black"/>
               <a:srgbClr val="D9C3A5">
@@ -28981,7 +28421,7 @@
               <a:avLst/>
             </a:prstGeom>
             <a:blipFill>
-              <a:blip r:embed="rId8"/>
+              <a:blip r:embed="rId7"/>
               <a:tile tx="0" ty="0" sx="50000" sy="50000" flip="none" algn="tl"/>
             </a:blipFill>
             <a:ln w="6350">
@@ -29337,7 +28777,7 @@
               <a:rPr lang="en-US" sz="1000" dirty="0" smtClean="0">
                 <a:latin typeface="Arial" panose="020B0604020202020204" pitchFamily="34" charset="0"/>
                 <a:cs typeface="Arial" panose="020B0604020202020204" pitchFamily="34" charset="0"/>
-                <a:hlinkClick r:id="rId10"/>
+                <a:hlinkClick r:id="rId9"/>
               </a:rPr>
               <a:t>Authority Objects</a:t>
             </a:r>
@@ -29632,7 +29072,7 @@
           <p:nvPr/>
         </p:nvPicPr>
         <p:blipFill>
-          <a:blip r:embed="rId11" cstate="print">
+          <a:blip r:embed="rId10" cstate="print">
             <a:extLst>
               <a:ext uri="{28A0092B-C50C-407E-A947-70E740481C1C}">
                 <a14:useLocalDpi xmlns:a14="http://schemas.microsoft.com/office/drawing/2010/main" val="0"/>
@@ -29661,8 +29101,8 @@
         </p:nvCxnSpPr>
         <p:spPr>
           <a:xfrm>
-            <a:off x="1604525" y="3084486"/>
-            <a:ext cx="0" cy="6840000"/>
+            <a:off x="1604525" y="3348000"/>
+            <a:ext cx="0" cy="6588000"/>
           </a:xfrm>
           <a:prstGeom prst="line">
             <a:avLst/>
@@ -29734,7 +29174,7 @@
         </p:nvGrpSpPr>
         <p:grpSpPr>
           <a:xfrm>
-            <a:off x="868656" y="2960567"/>
+            <a:off x="810444" y="2960567"/>
             <a:ext cx="445844" cy="603379"/>
             <a:chOff x="8232155" y="587661"/>
             <a:chExt cx="445844" cy="603379"/>
@@ -29835,525 +29275,6 @@
             </a:extLst>
           </p:spPr>
         </p:pic>
-      </p:grpSp>
-      <p:grpSp>
-        <p:nvGrpSpPr>
-          <p:cNvPr id="931" name="Group 930"/>
-          <p:cNvGrpSpPr/>
-          <p:nvPr/>
-        </p:nvGrpSpPr>
-        <p:grpSpPr>
-          <a:xfrm>
-            <a:off x="1359086" y="2999606"/>
-            <a:ext cx="504468" cy="363739"/>
-            <a:chOff x="2089401" y="630040"/>
-            <a:chExt cx="504468" cy="363739"/>
-          </a:xfrm>
-          <a:effectLst>
-            <a:outerShdw blurRad="50800" dist="38100" dir="2700000" algn="tl" rotWithShape="0">
-              <a:prstClr val="black">
-                <a:alpha val="40000"/>
-              </a:prstClr>
-            </a:outerShdw>
-          </a:effectLst>
-        </p:grpSpPr>
-        <p:sp>
-          <p:nvSpPr>
-            <p:cNvPr id="932" name="Rectangle 931"/>
-            <p:cNvSpPr>
-              <a:spLocks noChangeArrowheads="1"/>
-            </p:cNvSpPr>
-            <p:nvPr/>
-          </p:nvSpPr>
-          <p:spPr bwMode="auto">
-            <a:xfrm>
-              <a:off x="2470474" y="737128"/>
-              <a:ext cx="60698" cy="203641"/>
-            </a:xfrm>
-            <a:prstGeom prst="rect">
-              <a:avLst/>
-            </a:prstGeom>
-            <a:gradFill>
-              <a:gsLst>
-                <a:gs pos="0">
-                  <a:schemeClr val="bg1">
-                    <a:lumMod val="50000"/>
-                  </a:schemeClr>
-                </a:gs>
-                <a:gs pos="47000">
-                  <a:schemeClr val="bg1">
-                    <a:lumMod val="95000"/>
-                  </a:schemeClr>
-                </a:gs>
-                <a:gs pos="100000">
-                  <a:schemeClr val="bg1">
-                    <a:lumMod val="50000"/>
-                  </a:schemeClr>
-                </a:gs>
-              </a:gsLst>
-              <a:lin ang="10800000" scaled="0"/>
-            </a:gradFill>
-            <a:ln w="3175" cap="flat">
-              <a:solidFill>
-                <a:schemeClr val="tx1"/>
-              </a:solidFill>
-              <a:prstDash val="solid"/>
-              <a:miter lim="800000"/>
-              <a:headEnd/>
-              <a:tailEnd/>
-            </a:ln>
-          </p:spPr>
-          <p:txBody>
-            <a:bodyPr vert="horz" wrap="square" lIns="91440" tIns="45720" rIns="91440" bIns="45720" numCol="1" anchor="t" anchorCtr="0" compatLnSpc="1">
-              <a:prstTxWarp prst="textNoShape">
-                <a:avLst/>
-              </a:prstTxWarp>
-            </a:bodyPr>
-            <a:lstStyle/>
-            <a:p>
-              <a:endParaRPr lang="en-US"/>
-            </a:p>
-          </p:txBody>
-        </p:sp>
-        <p:sp>
-          <p:nvSpPr>
-            <p:cNvPr id="933" name="Rectangle 932"/>
-            <p:cNvSpPr>
-              <a:spLocks noChangeArrowheads="1"/>
-            </p:cNvSpPr>
-            <p:nvPr/>
-          </p:nvSpPr>
-          <p:spPr bwMode="auto">
-            <a:xfrm>
-              <a:off x="2308857" y="737128"/>
-              <a:ext cx="60698" cy="203641"/>
-            </a:xfrm>
-            <a:prstGeom prst="rect">
-              <a:avLst/>
-            </a:prstGeom>
-            <a:gradFill>
-              <a:gsLst>
-                <a:gs pos="0">
-                  <a:schemeClr val="bg1">
-                    <a:lumMod val="50000"/>
-                  </a:schemeClr>
-                </a:gs>
-                <a:gs pos="47000">
-                  <a:schemeClr val="bg1">
-                    <a:lumMod val="95000"/>
-                  </a:schemeClr>
-                </a:gs>
-                <a:gs pos="100000">
-                  <a:schemeClr val="bg1">
-                    <a:lumMod val="50000"/>
-                  </a:schemeClr>
-                </a:gs>
-              </a:gsLst>
-              <a:lin ang="10800000" scaled="0"/>
-            </a:gradFill>
-            <a:ln w="3175" cap="flat">
-              <a:solidFill>
-                <a:schemeClr val="tx1"/>
-              </a:solidFill>
-              <a:prstDash val="solid"/>
-              <a:miter lim="800000"/>
-              <a:headEnd/>
-              <a:tailEnd/>
-            </a:ln>
-          </p:spPr>
-          <p:txBody>
-            <a:bodyPr vert="horz" wrap="square" lIns="91440" tIns="45720" rIns="91440" bIns="45720" numCol="1" anchor="t" anchorCtr="0" compatLnSpc="1">
-              <a:prstTxWarp prst="textNoShape">
-                <a:avLst/>
-              </a:prstTxWarp>
-            </a:bodyPr>
-            <a:lstStyle/>
-            <a:p>
-              <a:endParaRPr lang="en-US"/>
-            </a:p>
-          </p:txBody>
-        </p:sp>
-        <p:sp>
-          <p:nvSpPr>
-            <p:cNvPr id="934" name="Rectangle 933"/>
-            <p:cNvSpPr>
-              <a:spLocks noChangeArrowheads="1"/>
-            </p:cNvSpPr>
-            <p:nvPr/>
-          </p:nvSpPr>
-          <p:spPr bwMode="auto">
-            <a:xfrm>
-              <a:off x="2147398" y="737128"/>
-              <a:ext cx="60698" cy="203641"/>
-            </a:xfrm>
-            <a:prstGeom prst="rect">
-              <a:avLst/>
-            </a:prstGeom>
-            <a:gradFill>
-              <a:gsLst>
-                <a:gs pos="0">
-                  <a:schemeClr val="bg1">
-                    <a:lumMod val="50000"/>
-                  </a:schemeClr>
-                </a:gs>
-                <a:gs pos="47000">
-                  <a:schemeClr val="bg1">
-                    <a:lumMod val="95000"/>
-                  </a:schemeClr>
-                </a:gs>
-                <a:gs pos="100000">
-                  <a:schemeClr val="bg1">
-                    <a:lumMod val="65000"/>
-                  </a:schemeClr>
-                </a:gs>
-              </a:gsLst>
-              <a:lin ang="10800000" scaled="0"/>
-            </a:gradFill>
-            <a:ln w="3175" cap="flat">
-              <a:solidFill>
-                <a:schemeClr val="tx1"/>
-              </a:solidFill>
-              <a:prstDash val="solid"/>
-              <a:miter lim="800000"/>
-              <a:headEnd/>
-              <a:tailEnd/>
-            </a:ln>
-          </p:spPr>
-          <p:txBody>
-            <a:bodyPr vert="horz" wrap="square" lIns="91440" tIns="45720" rIns="91440" bIns="45720" numCol="1" anchor="t" anchorCtr="0" compatLnSpc="1">
-              <a:prstTxWarp prst="textNoShape">
-                <a:avLst/>
-              </a:prstTxWarp>
-            </a:bodyPr>
-            <a:lstStyle/>
-            <a:p>
-              <a:endParaRPr lang="en-US"/>
-            </a:p>
-          </p:txBody>
-        </p:sp>
-        <p:sp>
-          <p:nvSpPr>
-            <p:cNvPr id="935" name="Freeform 16"/>
-            <p:cNvSpPr>
-              <a:spLocks/>
-            </p:cNvSpPr>
-            <p:nvPr/>
-          </p:nvSpPr>
-          <p:spPr bwMode="auto">
-            <a:xfrm>
-              <a:off x="2101635" y="630040"/>
-              <a:ext cx="472098" cy="120781"/>
-            </a:xfrm>
-            <a:custGeom>
-              <a:avLst/>
-              <a:gdLst>
-                <a:gd name="T0" fmla="*/ 6 w 3093"/>
-                <a:gd name="T1" fmla="*/ 451 h 764"/>
-                <a:gd name="T2" fmla="*/ 1523 w 3093"/>
-                <a:gd name="T3" fmla="*/ 0 h 764"/>
-                <a:gd name="T4" fmla="*/ 3093 w 3093"/>
-                <a:gd name="T5" fmla="*/ 468 h 764"/>
-                <a:gd name="T6" fmla="*/ 3089 w 3093"/>
-                <a:gd name="T7" fmla="*/ 764 h 764"/>
-                <a:gd name="T8" fmla="*/ 0 w 3093"/>
-                <a:gd name="T9" fmla="*/ 754 h 764"/>
-                <a:gd name="T10" fmla="*/ 6 w 3093"/>
-                <a:gd name="T11" fmla="*/ 451 h 764"/>
-              </a:gdLst>
-              <a:ahLst/>
-              <a:cxnLst>
-                <a:cxn ang="0">
-                  <a:pos x="T0" y="T1"/>
-                </a:cxn>
-                <a:cxn ang="0">
-                  <a:pos x="T2" y="T3"/>
-                </a:cxn>
-                <a:cxn ang="0">
-                  <a:pos x="T4" y="T5"/>
-                </a:cxn>
-                <a:cxn ang="0">
-                  <a:pos x="T6" y="T7"/>
-                </a:cxn>
-                <a:cxn ang="0">
-                  <a:pos x="T8" y="T9"/>
-                </a:cxn>
-                <a:cxn ang="0">
-                  <a:pos x="T10" y="T11"/>
-                </a:cxn>
-              </a:cxnLst>
-              <a:rect l="0" t="0" r="r" b="b"/>
-              <a:pathLst>
-                <a:path w="3093" h="764">
-                  <a:moveTo>
-                    <a:pt x="6" y="451"/>
-                  </a:moveTo>
-                  <a:cubicBezTo>
-                    <a:pt x="86" y="441"/>
-                    <a:pt x="1523" y="0"/>
-                    <a:pt x="1523" y="0"/>
-                  </a:cubicBezTo>
-                  <a:lnTo>
-                    <a:pt x="3093" y="468"/>
-                  </a:lnTo>
-                  <a:lnTo>
-                    <a:pt x="3089" y="764"/>
-                  </a:lnTo>
-                  <a:lnTo>
-                    <a:pt x="0" y="754"/>
-                  </a:lnTo>
-                  <a:lnTo>
-                    <a:pt x="6" y="451"/>
-                  </a:lnTo>
-                  <a:close/>
-                </a:path>
-              </a:pathLst>
-            </a:custGeom>
-            <a:solidFill>
-              <a:srgbClr val="E6E6E6"/>
-            </a:solidFill>
-            <a:ln w="3175" cap="flat">
-              <a:solidFill>
-                <a:srgbClr val="7B7B79"/>
-              </a:solidFill>
-              <a:prstDash val="solid"/>
-              <a:miter lim="800000"/>
-              <a:headEnd/>
-              <a:tailEnd/>
-            </a:ln>
-          </p:spPr>
-          <p:txBody>
-            <a:bodyPr vert="horz" wrap="square" lIns="91440" tIns="45720" rIns="91440" bIns="45720" numCol="1" anchor="t" anchorCtr="0" compatLnSpc="1">
-              <a:prstTxWarp prst="textNoShape">
-                <a:avLst/>
-              </a:prstTxWarp>
-            </a:bodyPr>
-            <a:lstStyle/>
-            <a:p>
-              <a:endParaRPr lang="en-US"/>
-            </a:p>
-          </p:txBody>
-        </p:sp>
-        <p:sp>
-          <p:nvSpPr>
-            <p:cNvPr id="936" name="Freeform 18"/>
-            <p:cNvSpPr>
-              <a:spLocks/>
-            </p:cNvSpPr>
-            <p:nvPr/>
-          </p:nvSpPr>
-          <p:spPr bwMode="auto">
-            <a:xfrm>
-              <a:off x="2120425" y="929176"/>
-              <a:ext cx="437027" cy="33707"/>
-            </a:xfrm>
-            <a:custGeom>
-              <a:avLst/>
-              <a:gdLst>
-                <a:gd name="T0" fmla="*/ 0 w 2853"/>
-                <a:gd name="T1" fmla="*/ 213 h 213"/>
-                <a:gd name="T2" fmla="*/ 4 w 2853"/>
-                <a:gd name="T3" fmla="*/ 1 h 213"/>
-                <a:gd name="T4" fmla="*/ 2849 w 2853"/>
-                <a:gd name="T5" fmla="*/ 0 h 213"/>
-                <a:gd name="T6" fmla="*/ 2853 w 2853"/>
-                <a:gd name="T7" fmla="*/ 213 h 213"/>
-              </a:gdLst>
-              <a:ahLst/>
-              <a:cxnLst>
-                <a:cxn ang="0">
-                  <a:pos x="T0" y="T1"/>
-                </a:cxn>
-                <a:cxn ang="0">
-                  <a:pos x="T2" y="T3"/>
-                </a:cxn>
-                <a:cxn ang="0">
-                  <a:pos x="T4" y="T5"/>
-                </a:cxn>
-                <a:cxn ang="0">
-                  <a:pos x="T6" y="T7"/>
-                </a:cxn>
-              </a:cxnLst>
-              <a:rect l="0" t="0" r="r" b="b"/>
-              <a:pathLst>
-                <a:path w="2853" h="213">
-                  <a:moveTo>
-                    <a:pt x="0" y="213"/>
-                  </a:moveTo>
-                  <a:lnTo>
-                    <a:pt x="4" y="1"/>
-                  </a:lnTo>
-                  <a:lnTo>
-                    <a:pt x="2849" y="0"/>
-                  </a:lnTo>
-                  <a:lnTo>
-                    <a:pt x="2853" y="213"/>
-                  </a:lnTo>
-                </a:path>
-              </a:pathLst>
-            </a:custGeom>
-            <a:solidFill>
-              <a:srgbClr val="E6E6E6"/>
-            </a:solidFill>
-            <a:ln w="3175" cap="flat">
-              <a:solidFill>
-                <a:srgbClr val="7B7B79"/>
-              </a:solidFill>
-              <a:prstDash val="solid"/>
-              <a:miter lim="800000"/>
-              <a:headEnd/>
-              <a:tailEnd/>
-            </a:ln>
-          </p:spPr>
-          <p:txBody>
-            <a:bodyPr vert="horz" wrap="square" lIns="91440" tIns="45720" rIns="91440" bIns="45720" numCol="1" anchor="t" anchorCtr="0" compatLnSpc="1">
-              <a:prstTxWarp prst="textNoShape">
-                <a:avLst/>
-              </a:prstTxWarp>
-            </a:bodyPr>
-            <a:lstStyle/>
-            <a:p>
-              <a:endParaRPr lang="en-US"/>
-            </a:p>
-          </p:txBody>
-        </p:sp>
-        <p:sp>
-          <p:nvSpPr>
-            <p:cNvPr id="937" name="Freeform 19"/>
-            <p:cNvSpPr>
-              <a:spLocks/>
-            </p:cNvSpPr>
-            <p:nvPr/>
-          </p:nvSpPr>
-          <p:spPr bwMode="auto">
-            <a:xfrm>
-              <a:off x="2089401" y="962879"/>
-              <a:ext cx="504468" cy="30900"/>
-            </a:xfrm>
-            <a:custGeom>
-              <a:avLst/>
-              <a:gdLst>
-                <a:gd name="T0" fmla="*/ 3290 w 3295"/>
-                <a:gd name="T1" fmla="*/ 0 h 197"/>
-                <a:gd name="T2" fmla="*/ 3295 w 3295"/>
-                <a:gd name="T3" fmla="*/ 197 h 197"/>
-                <a:gd name="T4" fmla="*/ 0 w 3295"/>
-                <a:gd name="T5" fmla="*/ 196 h 197"/>
-                <a:gd name="T6" fmla="*/ 4 w 3295"/>
-                <a:gd name="T7" fmla="*/ 1 h 197"/>
-                <a:gd name="T8" fmla="*/ 3290 w 3295"/>
-                <a:gd name="T9" fmla="*/ 0 h 197"/>
-              </a:gdLst>
-              <a:ahLst/>
-              <a:cxnLst>
-                <a:cxn ang="0">
-                  <a:pos x="T0" y="T1"/>
-                </a:cxn>
-                <a:cxn ang="0">
-                  <a:pos x="T2" y="T3"/>
-                </a:cxn>
-                <a:cxn ang="0">
-                  <a:pos x="T4" y="T5"/>
-                </a:cxn>
-                <a:cxn ang="0">
-                  <a:pos x="T6" y="T7"/>
-                </a:cxn>
-                <a:cxn ang="0">
-                  <a:pos x="T8" y="T9"/>
-                </a:cxn>
-              </a:cxnLst>
-              <a:rect l="0" t="0" r="r" b="b"/>
-              <a:pathLst>
-                <a:path w="3295" h="197">
-                  <a:moveTo>
-                    <a:pt x="3290" y="0"/>
-                  </a:moveTo>
-                  <a:lnTo>
-                    <a:pt x="3295" y="197"/>
-                  </a:lnTo>
-                  <a:lnTo>
-                    <a:pt x="0" y="196"/>
-                  </a:lnTo>
-                  <a:lnTo>
-                    <a:pt x="4" y="1"/>
-                  </a:lnTo>
-                  <a:lnTo>
-                    <a:pt x="3290" y="0"/>
-                  </a:lnTo>
-                  <a:close/>
-                </a:path>
-              </a:pathLst>
-            </a:custGeom>
-            <a:solidFill>
-              <a:srgbClr val="E6E6E6"/>
-            </a:solidFill>
-            <a:ln w="3175" cap="flat">
-              <a:solidFill>
-                <a:srgbClr val="7B7B79"/>
-              </a:solidFill>
-              <a:prstDash val="solid"/>
-              <a:miter lim="800000"/>
-              <a:headEnd/>
-              <a:tailEnd/>
-            </a:ln>
-          </p:spPr>
-          <p:txBody>
-            <a:bodyPr vert="horz" wrap="square" lIns="91440" tIns="45720" rIns="91440" bIns="45720" numCol="1" anchor="t" anchorCtr="0" compatLnSpc="1">
-              <a:prstTxWarp prst="textNoShape">
-                <a:avLst/>
-              </a:prstTxWarp>
-            </a:bodyPr>
-            <a:lstStyle/>
-            <a:p>
-              <a:endParaRPr lang="en-US"/>
-            </a:p>
-          </p:txBody>
-        </p:sp>
-        <p:sp>
-          <p:nvSpPr>
-            <p:cNvPr id="938" name="Line 20"/>
-            <p:cNvSpPr>
-              <a:spLocks noChangeShapeType="1"/>
-            </p:cNvSpPr>
-            <p:nvPr/>
-          </p:nvSpPr>
-          <p:spPr bwMode="auto">
-            <a:xfrm>
-              <a:off x="2105677" y="711495"/>
-              <a:ext cx="465350" cy="0"/>
-            </a:xfrm>
-            <a:prstGeom prst="line">
-              <a:avLst/>
-            </a:prstGeom>
-            <a:noFill/>
-            <a:ln w="3175" cap="flat">
-              <a:solidFill>
-                <a:srgbClr val="7B7B79"/>
-              </a:solidFill>
-              <a:prstDash val="solid"/>
-              <a:miter lim="800000"/>
-              <a:headEnd/>
-              <a:tailEnd/>
-            </a:ln>
-            <a:extLst>
-              <a:ext uri="{909E8E84-426E-40DD-AFC4-6F175D3DCCD1}">
-                <a14:hiddenFill xmlns:a14="http://schemas.microsoft.com/office/drawing/2010/main">
-                  <a:noFill/>
-                </a14:hiddenFill>
-              </a:ext>
-            </a:extLst>
-          </p:spPr>
-          <p:txBody>
-            <a:bodyPr vert="horz" wrap="square" lIns="91440" tIns="45720" rIns="91440" bIns="45720" numCol="1" anchor="t" anchorCtr="0" compatLnSpc="1">
-              <a:prstTxWarp prst="textNoShape">
-                <a:avLst/>
-              </a:prstTxWarp>
-            </a:bodyPr>
-            <a:lstStyle/>
-            <a:p>
-              <a:endParaRPr lang="en-US"/>
-            </a:p>
-          </p:txBody>
-        </p:sp>
       </p:grpSp>
       <p:sp>
         <p:nvSpPr>
@@ -31521,7 +30442,7 @@
           <p:nvPr/>
         </p:nvPicPr>
         <p:blipFill>
-          <a:blip r:embed="rId12" cstate="print">
+          <a:blip r:embed="rId11" cstate="print">
             <a:extLst>
               <a:ext uri="{28A0092B-C50C-407E-A947-70E740481C1C}">
                 <a14:useLocalDpi xmlns:a14="http://schemas.microsoft.com/office/drawing/2010/main" val="0"/>
@@ -31626,6 +30547,1314 @@
           </a:p>
         </p:txBody>
       </p:sp>
+      <p:pic>
+        <p:nvPicPr>
+          <p:cNvPr id="2" name="Picture 1"/>
+          <p:cNvPicPr>
+            <a:picLocks noChangeAspect="1"/>
+          </p:cNvPicPr>
+          <p:nvPr/>
+        </p:nvPicPr>
+        <p:blipFill>
+          <a:blip r:embed="rId12" cstate="print">
+            <a:extLst>
+              <a:ext uri="{28A0092B-C50C-407E-A947-70E740481C1C}">
+                <a14:useLocalDpi xmlns:a14="http://schemas.microsoft.com/office/drawing/2010/main" val="0"/>
+              </a:ext>
+            </a:extLst>
+          </a:blip>
+          <a:stretch>
+            <a:fillRect/>
+          </a:stretch>
+        </p:blipFill>
+        <p:spPr>
+          <a:xfrm>
+            <a:off x="1261006" y="2941369"/>
+            <a:ext cx="744996" cy="552793"/>
+          </a:xfrm>
+          <a:prstGeom prst="rect">
+            <a:avLst/>
+          </a:prstGeom>
+          <a:effectLst>
+            <a:outerShdw blurRad="50800" dist="38100" dir="2700000" algn="tl" rotWithShape="0">
+              <a:prstClr val="black">
+                <a:alpha val="40000"/>
+              </a:prstClr>
+            </a:outerShdw>
+          </a:effectLst>
+        </p:spPr>
+      </p:pic>
+      <p:pic>
+        <p:nvPicPr>
+          <p:cNvPr id="147" name="Picture 146"/>
+          <p:cNvPicPr>
+            <a:picLocks noChangeAspect="1"/>
+          </p:cNvPicPr>
+          <p:nvPr/>
+        </p:nvPicPr>
+        <p:blipFill>
+          <a:blip r:embed="rId12" cstate="print">
+            <a:extLst>
+              <a:ext uri="{28A0092B-C50C-407E-A947-70E740481C1C}">
+                <a14:useLocalDpi xmlns:a14="http://schemas.microsoft.com/office/drawing/2010/main" val="0"/>
+              </a:ext>
+            </a:extLst>
+          </a:blip>
+          <a:stretch>
+            <a:fillRect/>
+          </a:stretch>
+        </p:blipFill>
+        <p:spPr>
+          <a:xfrm>
+            <a:off x="7585665" y="2939509"/>
+            <a:ext cx="744996" cy="552793"/>
+          </a:xfrm>
+          <a:prstGeom prst="rect">
+            <a:avLst/>
+          </a:prstGeom>
+          <a:effectLst>
+            <a:outerShdw blurRad="50800" dist="38100" dir="2700000" algn="tl" rotWithShape="0">
+              <a:prstClr val="black">
+                <a:alpha val="40000"/>
+              </a:prstClr>
+            </a:outerShdw>
+          </a:effectLst>
+        </p:spPr>
+      </p:pic>
+      <p:grpSp>
+        <p:nvGrpSpPr>
+          <p:cNvPr id="5" name="Group 4"/>
+          <p:cNvGrpSpPr/>
+          <p:nvPr/>
+        </p:nvGrpSpPr>
+        <p:grpSpPr>
+          <a:xfrm>
+            <a:off x="3321759" y="524071"/>
+            <a:ext cx="557162" cy="447881"/>
+            <a:chOff x="3321759" y="524071"/>
+            <a:chExt cx="557162" cy="447881"/>
+          </a:xfrm>
+        </p:grpSpPr>
+        <p:grpSp>
+          <p:nvGrpSpPr>
+            <p:cNvPr id="187" name="Group 186"/>
+            <p:cNvGrpSpPr/>
+            <p:nvPr/>
+          </p:nvGrpSpPr>
+          <p:grpSpPr>
+            <a:xfrm>
+              <a:off x="3351221" y="692783"/>
+              <a:ext cx="510782" cy="279169"/>
+              <a:chOff x="1397693" y="2654334"/>
+              <a:chExt cx="510782" cy="279169"/>
+            </a:xfrm>
+            <a:effectLst>
+              <a:outerShdw blurRad="50800" dist="38100" dir="2700000" algn="tl" rotWithShape="0">
+                <a:prstClr val="black">
+                  <a:alpha val="40000"/>
+                </a:prstClr>
+              </a:outerShdw>
+            </a:effectLst>
+          </p:grpSpPr>
+          <p:sp>
+            <p:nvSpPr>
+              <p:cNvPr id="207" name="Rectangle 206"/>
+              <p:cNvSpPr/>
+              <p:nvPr/>
+            </p:nvSpPr>
+            <p:spPr>
+              <a:xfrm>
+                <a:off x="1441019" y="2654334"/>
+                <a:ext cx="426379" cy="261961"/>
+              </a:xfrm>
+              <a:prstGeom prst="rect">
+                <a:avLst/>
+              </a:prstGeom>
+              <a:gradFill>
+                <a:gsLst>
+                  <a:gs pos="625">
+                    <a:srgbClr val="E6E6E6"/>
+                  </a:gs>
+                  <a:gs pos="49000">
+                    <a:schemeClr val="bg1"/>
+                  </a:gs>
+                  <a:gs pos="100000">
+                    <a:schemeClr val="bg1">
+                      <a:lumMod val="95000"/>
+                    </a:schemeClr>
+                  </a:gs>
+                  <a:gs pos="100000">
+                    <a:srgbClr val="E6E6E6"/>
+                  </a:gs>
+                </a:gsLst>
+                <a:lin ang="2700000" scaled="0"/>
+              </a:gradFill>
+              <a:ln w="6350">
+                <a:solidFill>
+                  <a:schemeClr val="bg1">
+                    <a:lumMod val="50000"/>
+                  </a:schemeClr>
+                </a:solidFill>
+              </a:ln>
+              <a:effectLst/>
+            </p:spPr>
+            <p:style>
+              <a:lnRef idx="2">
+                <a:schemeClr val="accent1">
+                  <a:shade val="50000"/>
+                </a:schemeClr>
+              </a:lnRef>
+              <a:fillRef idx="1">
+                <a:schemeClr val="accent1"/>
+              </a:fillRef>
+              <a:effectRef idx="0">
+                <a:schemeClr val="accent1"/>
+              </a:effectRef>
+              <a:fontRef idx="minor">
+                <a:schemeClr val="lt1"/>
+              </a:fontRef>
+            </p:style>
+            <p:txBody>
+              <a:bodyPr rtlCol="0" anchor="ctr"/>
+              <a:lstStyle/>
+              <a:p>
+                <a:pPr algn="ctr"/>
+                <a:endParaRPr lang="en-US"/>
+              </a:p>
+            </p:txBody>
+          </p:sp>
+          <p:sp>
+            <p:nvSpPr>
+              <p:cNvPr id="208" name="Rectangle 207"/>
+              <p:cNvSpPr/>
+              <p:nvPr/>
+            </p:nvSpPr>
+            <p:spPr>
+              <a:xfrm>
+                <a:off x="1475921" y="2730705"/>
+                <a:ext cx="92836" cy="195722"/>
+              </a:xfrm>
+              <a:prstGeom prst="rect">
+                <a:avLst/>
+              </a:prstGeom>
+              <a:solidFill>
+                <a:schemeClr val="accent3">
+                  <a:lumMod val="20000"/>
+                  <a:lumOff val="80000"/>
+                </a:schemeClr>
+              </a:solidFill>
+              <a:ln w="9525">
+                <a:solidFill>
+                  <a:schemeClr val="bg1">
+                    <a:lumMod val="50000"/>
+                  </a:schemeClr>
+                </a:solidFill>
+              </a:ln>
+            </p:spPr>
+            <p:style>
+              <a:lnRef idx="2">
+                <a:schemeClr val="accent1">
+                  <a:shade val="50000"/>
+                </a:schemeClr>
+              </a:lnRef>
+              <a:fillRef idx="1">
+                <a:schemeClr val="accent1"/>
+              </a:fillRef>
+              <a:effectRef idx="0">
+                <a:schemeClr val="accent1"/>
+              </a:effectRef>
+              <a:fontRef idx="minor">
+                <a:schemeClr val="lt1"/>
+              </a:fontRef>
+            </p:style>
+            <p:txBody>
+              <a:bodyPr rtlCol="0" anchor="ctr"/>
+              <a:lstStyle/>
+              <a:p>
+                <a:pPr algn="ctr"/>
+                <a:endParaRPr lang="en-US"/>
+              </a:p>
+            </p:txBody>
+          </p:sp>
+          <p:sp>
+            <p:nvSpPr>
+              <p:cNvPr id="209" name="Rectangle 208"/>
+              <p:cNvSpPr/>
+              <p:nvPr/>
+            </p:nvSpPr>
+            <p:spPr>
+              <a:xfrm rot="5400000" flipH="1">
+                <a:off x="1651193" y="2695673"/>
+                <a:ext cx="136911" cy="206976"/>
+              </a:xfrm>
+              <a:prstGeom prst="rect">
+                <a:avLst/>
+              </a:prstGeom>
+              <a:solidFill>
+                <a:schemeClr val="accent1">
+                  <a:lumMod val="20000"/>
+                  <a:lumOff val="80000"/>
+                </a:schemeClr>
+              </a:solidFill>
+              <a:ln w="15875">
+                <a:solidFill>
+                  <a:schemeClr val="tx2">
+                    <a:lumMod val="40000"/>
+                    <a:lumOff val="60000"/>
+                  </a:schemeClr>
+                </a:solidFill>
+              </a:ln>
+            </p:spPr>
+            <p:style>
+              <a:lnRef idx="2">
+                <a:schemeClr val="accent1">
+                  <a:shade val="50000"/>
+                </a:schemeClr>
+              </a:lnRef>
+              <a:fillRef idx="1">
+                <a:schemeClr val="accent1"/>
+              </a:fillRef>
+              <a:effectRef idx="0">
+                <a:schemeClr val="accent1"/>
+              </a:effectRef>
+              <a:fontRef idx="minor">
+                <a:schemeClr val="lt1"/>
+              </a:fontRef>
+            </p:style>
+            <p:txBody>
+              <a:bodyPr rtlCol="0" anchor="ctr"/>
+              <a:lstStyle/>
+              <a:p>
+                <a:pPr algn="ctr"/>
+                <a:endParaRPr lang="en-US"/>
+              </a:p>
+            </p:txBody>
+          </p:sp>
+          <p:cxnSp>
+            <p:nvCxnSpPr>
+              <p:cNvPr id="210" name="Straight Connector 209"/>
+              <p:cNvCxnSpPr>
+                <a:stCxn id="208" idx="3"/>
+                <a:endCxn id="208" idx="3"/>
+              </p:cNvCxnSpPr>
+              <p:nvPr/>
+            </p:nvCxnSpPr>
+            <p:spPr>
+              <a:xfrm>
+                <a:off x="1568757" y="2828566"/>
+                <a:ext cx="0" cy="0"/>
+              </a:xfrm>
+              <a:prstGeom prst="line">
+                <a:avLst/>
+              </a:prstGeom>
+            </p:spPr>
+            <p:style>
+              <a:lnRef idx="1">
+                <a:schemeClr val="accent1"/>
+              </a:lnRef>
+              <a:fillRef idx="0">
+                <a:schemeClr val="accent1"/>
+              </a:fillRef>
+              <a:effectRef idx="0">
+                <a:schemeClr val="accent1"/>
+              </a:effectRef>
+              <a:fontRef idx="minor">
+                <a:schemeClr val="tx1"/>
+              </a:fontRef>
+            </p:style>
+          </p:cxnSp>
+          <p:sp>
+            <p:nvSpPr>
+              <p:cNvPr id="212" name="Rectangle 211"/>
+              <p:cNvSpPr/>
+              <p:nvPr/>
+            </p:nvSpPr>
+            <p:spPr>
+              <a:xfrm>
+                <a:off x="1397693" y="2915503"/>
+                <a:ext cx="510782" cy="18000"/>
+              </a:xfrm>
+              <a:prstGeom prst="rect">
+                <a:avLst/>
+              </a:prstGeom>
+              <a:solidFill>
+                <a:srgbClr val="FDFAC7"/>
+              </a:solidFill>
+              <a:ln w="6350">
+                <a:solidFill>
+                  <a:schemeClr val="bg1">
+                    <a:lumMod val="50000"/>
+                  </a:schemeClr>
+                </a:solidFill>
+              </a:ln>
+            </p:spPr>
+            <p:style>
+              <a:lnRef idx="2">
+                <a:schemeClr val="accent1">
+                  <a:shade val="50000"/>
+                </a:schemeClr>
+              </a:lnRef>
+              <a:fillRef idx="1">
+                <a:schemeClr val="accent1"/>
+              </a:fillRef>
+              <a:effectRef idx="0">
+                <a:schemeClr val="accent1"/>
+              </a:effectRef>
+              <a:fontRef idx="minor">
+                <a:schemeClr val="lt1"/>
+              </a:fontRef>
+            </p:style>
+            <p:txBody>
+              <a:bodyPr rtlCol="0" anchor="ctr"/>
+              <a:lstStyle/>
+              <a:p>
+                <a:pPr algn="ctr"/>
+                <a:endParaRPr lang="en-US"/>
+              </a:p>
+            </p:txBody>
+          </p:sp>
+        </p:grpSp>
+        <p:grpSp>
+          <p:nvGrpSpPr>
+            <p:cNvPr id="188" name="Group 187"/>
+            <p:cNvGrpSpPr/>
+            <p:nvPr/>
+          </p:nvGrpSpPr>
+          <p:grpSpPr>
+            <a:xfrm>
+              <a:off x="3321759" y="524071"/>
+              <a:ext cx="557162" cy="182081"/>
+              <a:chOff x="1727752" y="1773016"/>
+              <a:chExt cx="5562290" cy="2016024"/>
+            </a:xfrm>
+            <a:effectLst>
+              <a:outerShdw blurRad="50800" dist="38100" dir="2700000" algn="tl" rotWithShape="0">
+                <a:prstClr val="black">
+                  <a:alpha val="40000"/>
+                </a:prstClr>
+              </a:outerShdw>
+            </a:effectLst>
+          </p:grpSpPr>
+          <p:sp>
+            <p:nvSpPr>
+              <p:cNvPr id="189" name="Oval 188"/>
+              <p:cNvSpPr/>
+              <p:nvPr/>
+            </p:nvSpPr>
+            <p:spPr>
+              <a:xfrm>
+                <a:off x="1727752" y="3429000"/>
+                <a:ext cx="612000" cy="360040"/>
+              </a:xfrm>
+              <a:prstGeom prst="ellipse">
+                <a:avLst/>
+              </a:prstGeom>
+              <a:solidFill>
+                <a:srgbClr val="FF0000"/>
+              </a:solidFill>
+              <a:ln w="6350">
+                <a:solidFill>
+                  <a:schemeClr val="tx1">
+                    <a:lumMod val="50000"/>
+                    <a:lumOff val="50000"/>
+                  </a:schemeClr>
+                </a:solidFill>
+              </a:ln>
+            </p:spPr>
+            <p:style>
+              <a:lnRef idx="2">
+                <a:schemeClr val="accent1">
+                  <a:shade val="50000"/>
+                </a:schemeClr>
+              </a:lnRef>
+              <a:fillRef idx="1">
+                <a:schemeClr val="accent1"/>
+              </a:fillRef>
+              <a:effectRef idx="0">
+                <a:schemeClr val="accent1"/>
+              </a:effectRef>
+              <a:fontRef idx="minor">
+                <a:schemeClr val="lt1"/>
+              </a:fontRef>
+            </p:style>
+            <p:txBody>
+              <a:bodyPr rtlCol="0" anchor="ctr"/>
+              <a:lstStyle/>
+              <a:p>
+                <a:pPr algn="ctr"/>
+                <a:endParaRPr lang="en-US"/>
+              </a:p>
+            </p:txBody>
+          </p:sp>
+          <p:sp>
+            <p:nvSpPr>
+              <p:cNvPr id="190" name="Oval 189"/>
+              <p:cNvSpPr/>
+              <p:nvPr/>
+            </p:nvSpPr>
+            <p:spPr>
+              <a:xfrm>
+                <a:off x="2965324" y="3429000"/>
+                <a:ext cx="612000" cy="360040"/>
+              </a:xfrm>
+              <a:prstGeom prst="ellipse">
+                <a:avLst/>
+              </a:prstGeom>
+              <a:solidFill>
+                <a:srgbClr val="FF0000"/>
+              </a:solidFill>
+              <a:ln w="6350">
+                <a:solidFill>
+                  <a:schemeClr val="tx1">
+                    <a:lumMod val="50000"/>
+                    <a:lumOff val="50000"/>
+                  </a:schemeClr>
+                </a:solidFill>
+              </a:ln>
+            </p:spPr>
+            <p:style>
+              <a:lnRef idx="2">
+                <a:schemeClr val="accent1">
+                  <a:shade val="50000"/>
+                </a:schemeClr>
+              </a:lnRef>
+              <a:fillRef idx="1">
+                <a:schemeClr val="accent1"/>
+              </a:fillRef>
+              <a:effectRef idx="0">
+                <a:schemeClr val="accent1"/>
+              </a:effectRef>
+              <a:fontRef idx="minor">
+                <a:schemeClr val="lt1"/>
+              </a:fontRef>
+            </p:style>
+            <p:txBody>
+              <a:bodyPr rtlCol="0" anchor="ctr"/>
+              <a:lstStyle/>
+              <a:p>
+                <a:pPr algn="ctr"/>
+                <a:endParaRPr lang="en-US"/>
+              </a:p>
+            </p:txBody>
+          </p:sp>
+          <p:sp>
+            <p:nvSpPr>
+              <p:cNvPr id="191" name="Oval 190"/>
+              <p:cNvSpPr/>
+              <p:nvPr/>
+            </p:nvSpPr>
+            <p:spPr>
+              <a:xfrm>
+                <a:off x="4202896" y="3429000"/>
+                <a:ext cx="612000" cy="360040"/>
+              </a:xfrm>
+              <a:prstGeom prst="ellipse">
+                <a:avLst/>
+              </a:prstGeom>
+              <a:solidFill>
+                <a:srgbClr val="FF0000"/>
+              </a:solidFill>
+              <a:ln w="6350">
+                <a:solidFill>
+                  <a:schemeClr val="tx1">
+                    <a:lumMod val="50000"/>
+                    <a:lumOff val="50000"/>
+                  </a:schemeClr>
+                </a:solidFill>
+              </a:ln>
+            </p:spPr>
+            <p:style>
+              <a:lnRef idx="2">
+                <a:schemeClr val="accent1">
+                  <a:shade val="50000"/>
+                </a:schemeClr>
+              </a:lnRef>
+              <a:fillRef idx="1">
+                <a:schemeClr val="accent1"/>
+              </a:fillRef>
+              <a:effectRef idx="0">
+                <a:schemeClr val="accent1"/>
+              </a:effectRef>
+              <a:fontRef idx="minor">
+                <a:schemeClr val="lt1"/>
+              </a:fontRef>
+            </p:style>
+            <p:txBody>
+              <a:bodyPr rtlCol="0" anchor="ctr"/>
+              <a:lstStyle/>
+              <a:p>
+                <a:pPr algn="ctr"/>
+                <a:endParaRPr lang="en-US"/>
+              </a:p>
+            </p:txBody>
+          </p:sp>
+          <p:sp>
+            <p:nvSpPr>
+              <p:cNvPr id="192" name="Oval 191"/>
+              <p:cNvSpPr/>
+              <p:nvPr/>
+            </p:nvSpPr>
+            <p:spPr>
+              <a:xfrm>
+                <a:off x="5440468" y="3429000"/>
+                <a:ext cx="612000" cy="360040"/>
+              </a:xfrm>
+              <a:prstGeom prst="ellipse">
+                <a:avLst/>
+              </a:prstGeom>
+              <a:solidFill>
+                <a:srgbClr val="FF0000"/>
+              </a:solidFill>
+              <a:ln w="6350">
+                <a:solidFill>
+                  <a:schemeClr val="tx1">
+                    <a:lumMod val="50000"/>
+                    <a:lumOff val="50000"/>
+                  </a:schemeClr>
+                </a:solidFill>
+              </a:ln>
+            </p:spPr>
+            <p:style>
+              <a:lnRef idx="2">
+                <a:schemeClr val="accent1">
+                  <a:shade val="50000"/>
+                </a:schemeClr>
+              </a:lnRef>
+              <a:fillRef idx="1">
+                <a:schemeClr val="accent1"/>
+              </a:fillRef>
+              <a:effectRef idx="0">
+                <a:schemeClr val="accent1"/>
+              </a:effectRef>
+              <a:fontRef idx="minor">
+                <a:schemeClr val="lt1"/>
+              </a:fontRef>
+            </p:style>
+            <p:txBody>
+              <a:bodyPr rtlCol="0" anchor="ctr"/>
+              <a:lstStyle/>
+              <a:p>
+                <a:pPr algn="ctr"/>
+                <a:endParaRPr lang="en-US"/>
+              </a:p>
+            </p:txBody>
+          </p:sp>
+          <p:sp>
+            <p:nvSpPr>
+              <p:cNvPr id="193" name="Oval 192"/>
+              <p:cNvSpPr/>
+              <p:nvPr/>
+            </p:nvSpPr>
+            <p:spPr>
+              <a:xfrm>
+                <a:off x="6678042" y="3429000"/>
+                <a:ext cx="612000" cy="360040"/>
+              </a:xfrm>
+              <a:prstGeom prst="ellipse">
+                <a:avLst/>
+              </a:prstGeom>
+              <a:solidFill>
+                <a:srgbClr val="FF0000"/>
+              </a:solidFill>
+              <a:ln w="6350">
+                <a:solidFill>
+                  <a:schemeClr val="tx1">
+                    <a:lumMod val="50000"/>
+                    <a:lumOff val="50000"/>
+                  </a:schemeClr>
+                </a:solidFill>
+              </a:ln>
+            </p:spPr>
+            <p:style>
+              <a:lnRef idx="2">
+                <a:schemeClr val="accent1">
+                  <a:shade val="50000"/>
+                </a:schemeClr>
+              </a:lnRef>
+              <a:fillRef idx="1">
+                <a:schemeClr val="accent1"/>
+              </a:fillRef>
+              <a:effectRef idx="0">
+                <a:schemeClr val="accent1"/>
+              </a:effectRef>
+              <a:fontRef idx="minor">
+                <a:schemeClr val="lt1"/>
+              </a:fontRef>
+            </p:style>
+            <p:txBody>
+              <a:bodyPr rtlCol="0" anchor="ctr"/>
+              <a:lstStyle/>
+              <a:p>
+                <a:pPr algn="ctr"/>
+                <a:endParaRPr lang="en-US"/>
+              </a:p>
+            </p:txBody>
+          </p:sp>
+          <p:sp>
+            <p:nvSpPr>
+              <p:cNvPr id="194" name="Oval 193"/>
+              <p:cNvSpPr/>
+              <p:nvPr/>
+            </p:nvSpPr>
+            <p:spPr>
+              <a:xfrm>
+                <a:off x="2346538" y="3429000"/>
+                <a:ext cx="612000" cy="360040"/>
+              </a:xfrm>
+              <a:prstGeom prst="ellipse">
+                <a:avLst/>
+              </a:prstGeom>
+              <a:solidFill>
+                <a:schemeClr val="bg1"/>
+              </a:solidFill>
+              <a:ln w="6350">
+                <a:solidFill>
+                  <a:schemeClr val="tx1">
+                    <a:lumMod val="50000"/>
+                    <a:lumOff val="50000"/>
+                  </a:schemeClr>
+                </a:solidFill>
+              </a:ln>
+            </p:spPr>
+            <p:style>
+              <a:lnRef idx="2">
+                <a:schemeClr val="accent1">
+                  <a:shade val="50000"/>
+                </a:schemeClr>
+              </a:lnRef>
+              <a:fillRef idx="1">
+                <a:schemeClr val="accent1"/>
+              </a:fillRef>
+              <a:effectRef idx="0">
+                <a:schemeClr val="accent1"/>
+              </a:effectRef>
+              <a:fontRef idx="minor">
+                <a:schemeClr val="lt1"/>
+              </a:fontRef>
+            </p:style>
+            <p:txBody>
+              <a:bodyPr rtlCol="0" anchor="ctr"/>
+              <a:lstStyle/>
+              <a:p>
+                <a:pPr algn="ctr"/>
+                <a:endParaRPr lang="en-US"/>
+              </a:p>
+            </p:txBody>
+          </p:sp>
+          <p:sp>
+            <p:nvSpPr>
+              <p:cNvPr id="195" name="Oval 194"/>
+              <p:cNvSpPr/>
+              <p:nvPr/>
+            </p:nvSpPr>
+            <p:spPr>
+              <a:xfrm>
+                <a:off x="3584110" y="3429000"/>
+                <a:ext cx="612000" cy="360040"/>
+              </a:xfrm>
+              <a:prstGeom prst="ellipse">
+                <a:avLst/>
+              </a:prstGeom>
+              <a:solidFill>
+                <a:schemeClr val="bg1"/>
+              </a:solidFill>
+              <a:ln w="6350">
+                <a:solidFill>
+                  <a:schemeClr val="tx1">
+                    <a:lumMod val="50000"/>
+                    <a:lumOff val="50000"/>
+                  </a:schemeClr>
+                </a:solidFill>
+              </a:ln>
+            </p:spPr>
+            <p:style>
+              <a:lnRef idx="2">
+                <a:schemeClr val="accent1">
+                  <a:shade val="50000"/>
+                </a:schemeClr>
+              </a:lnRef>
+              <a:fillRef idx="1">
+                <a:schemeClr val="accent1"/>
+              </a:fillRef>
+              <a:effectRef idx="0">
+                <a:schemeClr val="accent1"/>
+              </a:effectRef>
+              <a:fontRef idx="minor">
+                <a:schemeClr val="lt1"/>
+              </a:fontRef>
+            </p:style>
+            <p:txBody>
+              <a:bodyPr rtlCol="0" anchor="ctr"/>
+              <a:lstStyle/>
+              <a:p>
+                <a:pPr algn="ctr"/>
+                <a:endParaRPr lang="en-US"/>
+              </a:p>
+            </p:txBody>
+          </p:sp>
+          <p:sp>
+            <p:nvSpPr>
+              <p:cNvPr id="196" name="Oval 195"/>
+              <p:cNvSpPr/>
+              <p:nvPr/>
+            </p:nvSpPr>
+            <p:spPr>
+              <a:xfrm>
+                <a:off x="4821682" y="3429000"/>
+                <a:ext cx="612000" cy="360040"/>
+              </a:xfrm>
+              <a:prstGeom prst="ellipse">
+                <a:avLst/>
+              </a:prstGeom>
+              <a:solidFill>
+                <a:schemeClr val="bg1"/>
+              </a:solidFill>
+              <a:ln w="6350">
+                <a:solidFill>
+                  <a:schemeClr val="tx1">
+                    <a:lumMod val="50000"/>
+                    <a:lumOff val="50000"/>
+                  </a:schemeClr>
+                </a:solidFill>
+              </a:ln>
+            </p:spPr>
+            <p:style>
+              <a:lnRef idx="2">
+                <a:schemeClr val="accent1">
+                  <a:shade val="50000"/>
+                </a:schemeClr>
+              </a:lnRef>
+              <a:fillRef idx="1">
+                <a:schemeClr val="accent1"/>
+              </a:fillRef>
+              <a:effectRef idx="0">
+                <a:schemeClr val="accent1"/>
+              </a:effectRef>
+              <a:fontRef idx="minor">
+                <a:schemeClr val="lt1"/>
+              </a:fontRef>
+            </p:style>
+            <p:txBody>
+              <a:bodyPr rtlCol="0" anchor="ctr"/>
+              <a:lstStyle/>
+              <a:p>
+                <a:pPr algn="ctr"/>
+                <a:endParaRPr lang="en-US"/>
+              </a:p>
+            </p:txBody>
+          </p:sp>
+          <p:sp>
+            <p:nvSpPr>
+              <p:cNvPr id="197" name="Oval 196"/>
+              <p:cNvSpPr/>
+              <p:nvPr/>
+            </p:nvSpPr>
+            <p:spPr>
+              <a:xfrm>
+                <a:off x="6059254" y="3429000"/>
+                <a:ext cx="612000" cy="360040"/>
+              </a:xfrm>
+              <a:prstGeom prst="ellipse">
+                <a:avLst/>
+              </a:prstGeom>
+              <a:solidFill>
+                <a:schemeClr val="bg1"/>
+              </a:solidFill>
+              <a:ln w="6350">
+                <a:solidFill>
+                  <a:schemeClr val="tx1">
+                    <a:lumMod val="50000"/>
+                    <a:lumOff val="50000"/>
+                  </a:schemeClr>
+                </a:solidFill>
+              </a:ln>
+            </p:spPr>
+            <p:style>
+              <a:lnRef idx="2">
+                <a:schemeClr val="accent1">
+                  <a:shade val="50000"/>
+                </a:schemeClr>
+              </a:lnRef>
+              <a:fillRef idx="1">
+                <a:schemeClr val="accent1"/>
+              </a:fillRef>
+              <a:effectRef idx="0">
+                <a:schemeClr val="accent1"/>
+              </a:effectRef>
+              <a:fontRef idx="minor">
+                <a:schemeClr val="lt1"/>
+              </a:fontRef>
+            </p:style>
+            <p:txBody>
+              <a:bodyPr rtlCol="0" anchor="ctr"/>
+              <a:lstStyle/>
+              <a:p>
+                <a:pPr algn="ctr"/>
+                <a:endParaRPr lang="en-US"/>
+              </a:p>
+            </p:txBody>
+          </p:sp>
+          <p:sp>
+            <p:nvSpPr>
+              <p:cNvPr id="198" name="Right Triangle 197"/>
+              <p:cNvSpPr/>
+              <p:nvPr/>
+            </p:nvSpPr>
+            <p:spPr>
+              <a:xfrm flipH="1">
+                <a:off x="1727752" y="1773016"/>
+                <a:ext cx="612000" cy="1800000"/>
+              </a:xfrm>
+              <a:prstGeom prst="rtTriangle">
+                <a:avLst/>
+              </a:prstGeom>
+              <a:solidFill>
+                <a:srgbClr val="FF0000"/>
+              </a:solidFill>
+              <a:ln w="6350">
+                <a:solidFill>
+                  <a:schemeClr val="tx1">
+                    <a:lumMod val="50000"/>
+                    <a:lumOff val="50000"/>
+                  </a:schemeClr>
+                </a:solidFill>
+              </a:ln>
+            </p:spPr>
+            <p:style>
+              <a:lnRef idx="2">
+                <a:schemeClr val="accent1">
+                  <a:shade val="50000"/>
+                </a:schemeClr>
+              </a:lnRef>
+              <a:fillRef idx="1">
+                <a:schemeClr val="accent1"/>
+              </a:fillRef>
+              <a:effectRef idx="0">
+                <a:schemeClr val="accent1"/>
+              </a:effectRef>
+              <a:fontRef idx="minor">
+                <a:schemeClr val="lt1"/>
+              </a:fontRef>
+            </p:style>
+            <p:txBody>
+              <a:bodyPr rtlCol="0" anchor="ctr"/>
+              <a:lstStyle/>
+              <a:p>
+                <a:pPr algn="ctr"/>
+                <a:endParaRPr lang="en-US"/>
+              </a:p>
+            </p:txBody>
+          </p:sp>
+          <p:sp>
+            <p:nvSpPr>
+              <p:cNvPr id="199" name="Rectangle 198"/>
+              <p:cNvSpPr/>
+              <p:nvPr/>
+            </p:nvSpPr>
+            <p:spPr>
+              <a:xfrm>
+                <a:off x="2965324" y="1773016"/>
+                <a:ext cx="612000" cy="1800000"/>
+              </a:xfrm>
+              <a:prstGeom prst="rect">
+                <a:avLst/>
+              </a:prstGeom>
+              <a:solidFill>
+                <a:srgbClr val="FF0000"/>
+              </a:solidFill>
+              <a:ln w="6350">
+                <a:solidFill>
+                  <a:schemeClr val="tx1">
+                    <a:lumMod val="50000"/>
+                    <a:lumOff val="50000"/>
+                  </a:schemeClr>
+                </a:solidFill>
+              </a:ln>
+            </p:spPr>
+            <p:style>
+              <a:lnRef idx="2">
+                <a:schemeClr val="accent1">
+                  <a:shade val="50000"/>
+                </a:schemeClr>
+              </a:lnRef>
+              <a:fillRef idx="1">
+                <a:schemeClr val="accent1"/>
+              </a:fillRef>
+              <a:effectRef idx="0">
+                <a:schemeClr val="accent1"/>
+              </a:effectRef>
+              <a:fontRef idx="minor">
+                <a:schemeClr val="lt1"/>
+              </a:fontRef>
+            </p:style>
+            <p:txBody>
+              <a:bodyPr rtlCol="0" anchor="ctr"/>
+              <a:lstStyle/>
+              <a:p>
+                <a:pPr algn="ctr"/>
+                <a:endParaRPr lang="en-US"/>
+              </a:p>
+            </p:txBody>
+          </p:sp>
+          <p:sp>
+            <p:nvSpPr>
+              <p:cNvPr id="200" name="Rectangle 199"/>
+              <p:cNvSpPr/>
+              <p:nvPr/>
+            </p:nvSpPr>
+            <p:spPr>
+              <a:xfrm>
+                <a:off x="4202896" y="1773016"/>
+                <a:ext cx="612000" cy="1800000"/>
+              </a:xfrm>
+              <a:prstGeom prst="rect">
+                <a:avLst/>
+              </a:prstGeom>
+              <a:solidFill>
+                <a:srgbClr val="FF0000"/>
+              </a:solidFill>
+              <a:ln w="6350">
+                <a:solidFill>
+                  <a:schemeClr val="tx1">
+                    <a:lumMod val="50000"/>
+                    <a:lumOff val="50000"/>
+                  </a:schemeClr>
+                </a:solidFill>
+              </a:ln>
+            </p:spPr>
+            <p:style>
+              <a:lnRef idx="2">
+                <a:schemeClr val="accent1">
+                  <a:shade val="50000"/>
+                </a:schemeClr>
+              </a:lnRef>
+              <a:fillRef idx="1">
+                <a:schemeClr val="accent1"/>
+              </a:fillRef>
+              <a:effectRef idx="0">
+                <a:schemeClr val="accent1"/>
+              </a:effectRef>
+              <a:fontRef idx="minor">
+                <a:schemeClr val="lt1"/>
+              </a:fontRef>
+            </p:style>
+            <p:txBody>
+              <a:bodyPr rtlCol="0" anchor="ctr"/>
+              <a:lstStyle/>
+              <a:p>
+                <a:pPr algn="ctr"/>
+                <a:endParaRPr lang="en-US"/>
+              </a:p>
+            </p:txBody>
+          </p:sp>
+          <p:sp>
+            <p:nvSpPr>
+              <p:cNvPr id="201" name="Rectangle 200"/>
+              <p:cNvSpPr/>
+              <p:nvPr/>
+            </p:nvSpPr>
+            <p:spPr>
+              <a:xfrm>
+                <a:off x="5440468" y="1773016"/>
+                <a:ext cx="612000" cy="1800000"/>
+              </a:xfrm>
+              <a:prstGeom prst="rect">
+                <a:avLst/>
+              </a:prstGeom>
+              <a:solidFill>
+                <a:srgbClr val="FF0000"/>
+              </a:solidFill>
+              <a:ln w="6350">
+                <a:solidFill>
+                  <a:schemeClr val="tx1">
+                    <a:lumMod val="50000"/>
+                    <a:lumOff val="50000"/>
+                  </a:schemeClr>
+                </a:solidFill>
+              </a:ln>
+            </p:spPr>
+            <p:style>
+              <a:lnRef idx="2">
+                <a:schemeClr val="accent1">
+                  <a:shade val="50000"/>
+                </a:schemeClr>
+              </a:lnRef>
+              <a:fillRef idx="1">
+                <a:schemeClr val="accent1"/>
+              </a:fillRef>
+              <a:effectRef idx="0">
+                <a:schemeClr val="accent1"/>
+              </a:effectRef>
+              <a:fontRef idx="minor">
+                <a:schemeClr val="lt1"/>
+              </a:fontRef>
+            </p:style>
+            <p:txBody>
+              <a:bodyPr rtlCol="0" anchor="ctr"/>
+              <a:lstStyle/>
+              <a:p>
+                <a:pPr algn="ctr"/>
+                <a:endParaRPr lang="en-US"/>
+              </a:p>
+            </p:txBody>
+          </p:sp>
+          <p:sp>
+            <p:nvSpPr>
+              <p:cNvPr id="202" name="Right Triangle 201"/>
+              <p:cNvSpPr/>
+              <p:nvPr/>
+            </p:nvSpPr>
+            <p:spPr>
+              <a:xfrm>
+                <a:off x="6678042" y="1773016"/>
+                <a:ext cx="612000" cy="1800000"/>
+              </a:xfrm>
+              <a:prstGeom prst="rtTriangle">
+                <a:avLst/>
+              </a:prstGeom>
+              <a:solidFill>
+                <a:srgbClr val="FF0000"/>
+              </a:solidFill>
+              <a:ln w="6350">
+                <a:solidFill>
+                  <a:schemeClr val="tx1">
+                    <a:lumMod val="50000"/>
+                    <a:lumOff val="50000"/>
+                  </a:schemeClr>
+                </a:solidFill>
+              </a:ln>
+            </p:spPr>
+            <p:style>
+              <a:lnRef idx="2">
+                <a:schemeClr val="accent1">
+                  <a:shade val="50000"/>
+                </a:schemeClr>
+              </a:lnRef>
+              <a:fillRef idx="1">
+                <a:schemeClr val="accent1"/>
+              </a:fillRef>
+              <a:effectRef idx="0">
+                <a:schemeClr val="accent1"/>
+              </a:effectRef>
+              <a:fontRef idx="minor">
+                <a:schemeClr val="lt1"/>
+              </a:fontRef>
+            </p:style>
+            <p:txBody>
+              <a:bodyPr rtlCol="0" anchor="ctr"/>
+              <a:lstStyle/>
+              <a:p>
+                <a:pPr algn="ctr"/>
+                <a:endParaRPr lang="en-US"/>
+              </a:p>
+            </p:txBody>
+          </p:sp>
+          <p:sp>
+            <p:nvSpPr>
+              <p:cNvPr id="203" name="Rectangle 202"/>
+              <p:cNvSpPr/>
+              <p:nvPr/>
+            </p:nvSpPr>
+            <p:spPr>
+              <a:xfrm>
+                <a:off x="2346538" y="1773016"/>
+                <a:ext cx="612000" cy="1800000"/>
+              </a:xfrm>
+              <a:prstGeom prst="rect">
+                <a:avLst/>
+              </a:prstGeom>
+              <a:solidFill>
+                <a:schemeClr val="bg1"/>
+              </a:solidFill>
+              <a:ln w="6350">
+                <a:solidFill>
+                  <a:schemeClr val="tx1">
+                    <a:lumMod val="50000"/>
+                    <a:lumOff val="50000"/>
+                  </a:schemeClr>
+                </a:solidFill>
+              </a:ln>
+            </p:spPr>
+            <p:style>
+              <a:lnRef idx="2">
+                <a:schemeClr val="accent1">
+                  <a:shade val="50000"/>
+                </a:schemeClr>
+              </a:lnRef>
+              <a:fillRef idx="1">
+                <a:schemeClr val="accent1"/>
+              </a:fillRef>
+              <a:effectRef idx="0">
+                <a:schemeClr val="accent1"/>
+              </a:effectRef>
+              <a:fontRef idx="minor">
+                <a:schemeClr val="lt1"/>
+              </a:fontRef>
+            </p:style>
+            <p:txBody>
+              <a:bodyPr rtlCol="0" anchor="ctr"/>
+              <a:lstStyle/>
+              <a:p>
+                <a:pPr algn="ctr"/>
+                <a:endParaRPr lang="en-US"/>
+              </a:p>
+            </p:txBody>
+          </p:sp>
+          <p:sp>
+            <p:nvSpPr>
+              <p:cNvPr id="204" name="Rectangle 203"/>
+              <p:cNvSpPr/>
+              <p:nvPr/>
+            </p:nvSpPr>
+            <p:spPr>
+              <a:xfrm>
+                <a:off x="3584110" y="1773016"/>
+                <a:ext cx="612000" cy="1800000"/>
+              </a:xfrm>
+              <a:prstGeom prst="rect">
+                <a:avLst/>
+              </a:prstGeom>
+              <a:solidFill>
+                <a:schemeClr val="bg1"/>
+              </a:solidFill>
+              <a:ln w="6350">
+                <a:solidFill>
+                  <a:schemeClr val="tx1">
+                    <a:lumMod val="50000"/>
+                    <a:lumOff val="50000"/>
+                  </a:schemeClr>
+                </a:solidFill>
+              </a:ln>
+            </p:spPr>
+            <p:style>
+              <a:lnRef idx="2">
+                <a:schemeClr val="accent1">
+                  <a:shade val="50000"/>
+                </a:schemeClr>
+              </a:lnRef>
+              <a:fillRef idx="1">
+                <a:schemeClr val="accent1"/>
+              </a:fillRef>
+              <a:effectRef idx="0">
+                <a:schemeClr val="accent1"/>
+              </a:effectRef>
+              <a:fontRef idx="minor">
+                <a:schemeClr val="lt1"/>
+              </a:fontRef>
+            </p:style>
+            <p:txBody>
+              <a:bodyPr rtlCol="0" anchor="ctr"/>
+              <a:lstStyle/>
+              <a:p>
+                <a:pPr algn="ctr"/>
+                <a:endParaRPr lang="en-US"/>
+              </a:p>
+            </p:txBody>
+          </p:sp>
+          <p:sp>
+            <p:nvSpPr>
+              <p:cNvPr id="205" name="Rectangle 204"/>
+              <p:cNvSpPr/>
+              <p:nvPr/>
+            </p:nvSpPr>
+            <p:spPr>
+              <a:xfrm>
+                <a:off x="4821682" y="1773016"/>
+                <a:ext cx="612000" cy="1800000"/>
+              </a:xfrm>
+              <a:prstGeom prst="rect">
+                <a:avLst/>
+              </a:prstGeom>
+              <a:solidFill>
+                <a:schemeClr val="bg1"/>
+              </a:solidFill>
+              <a:ln w="6350">
+                <a:solidFill>
+                  <a:schemeClr val="tx1">
+                    <a:lumMod val="50000"/>
+                    <a:lumOff val="50000"/>
+                  </a:schemeClr>
+                </a:solidFill>
+              </a:ln>
+            </p:spPr>
+            <p:style>
+              <a:lnRef idx="2">
+                <a:schemeClr val="accent1">
+                  <a:shade val="50000"/>
+                </a:schemeClr>
+              </a:lnRef>
+              <a:fillRef idx="1">
+                <a:schemeClr val="accent1"/>
+              </a:fillRef>
+              <a:effectRef idx="0">
+                <a:schemeClr val="accent1"/>
+              </a:effectRef>
+              <a:fontRef idx="minor">
+                <a:schemeClr val="lt1"/>
+              </a:fontRef>
+            </p:style>
+            <p:txBody>
+              <a:bodyPr rtlCol="0" anchor="ctr"/>
+              <a:lstStyle/>
+              <a:p>
+                <a:pPr algn="ctr"/>
+                <a:endParaRPr lang="en-US"/>
+              </a:p>
+            </p:txBody>
+          </p:sp>
+          <p:sp>
+            <p:nvSpPr>
+              <p:cNvPr id="206" name="Rectangle 205"/>
+              <p:cNvSpPr/>
+              <p:nvPr/>
+            </p:nvSpPr>
+            <p:spPr>
+              <a:xfrm>
+                <a:off x="6059254" y="1773016"/>
+                <a:ext cx="612000" cy="1800000"/>
+              </a:xfrm>
+              <a:prstGeom prst="rect">
+                <a:avLst/>
+              </a:prstGeom>
+              <a:solidFill>
+                <a:schemeClr val="bg1"/>
+              </a:solidFill>
+              <a:ln w="6350">
+                <a:solidFill>
+                  <a:schemeClr val="tx1">
+                    <a:lumMod val="50000"/>
+                    <a:lumOff val="50000"/>
+                  </a:schemeClr>
+                </a:solidFill>
+              </a:ln>
+            </p:spPr>
+            <p:style>
+              <a:lnRef idx="2">
+                <a:schemeClr val="accent1">
+                  <a:shade val="50000"/>
+                </a:schemeClr>
+              </a:lnRef>
+              <a:fillRef idx="1">
+                <a:schemeClr val="accent1"/>
+              </a:fillRef>
+              <a:effectRef idx="0">
+                <a:schemeClr val="accent1"/>
+              </a:effectRef>
+              <a:fontRef idx="minor">
+                <a:schemeClr val="lt1"/>
+              </a:fontRef>
+            </p:style>
+            <p:txBody>
+              <a:bodyPr rtlCol="0" anchor="ctr"/>
+              <a:lstStyle/>
+              <a:p>
+                <a:pPr algn="ctr"/>
+                <a:endParaRPr lang="en-US"/>
+              </a:p>
+            </p:txBody>
+          </p:sp>
+        </p:grpSp>
+      </p:grpSp>
     </p:spTree>
     <p:extLst>
       <p:ext uri="{BB962C8B-B14F-4D97-AF65-F5344CB8AC3E}">

</xml_diff>

<commit_message>
Added authorization types to the Presentation/Specification
</commit_message>
<xml_diff>
--- a/saturn/saturn-authorization.pptx
+++ b/saturn/saturn-authorization.pptx
@@ -309,7 +309,7 @@
           <a:p>
             <a:fld id="{E3744D7E-A5BB-4306-A750-C25515017678}" type="datetimeFigureOut">
               <a:rPr lang="en-US" smtClean="0"/>
-              <a:t>2017-10-13</a:t>
+              <a:t>2017-11-10</a:t>
             </a:fld>
             <a:endParaRPr lang="en-US"/>
           </a:p>
@@ -519,7 +519,7 @@
           <a:p>
             <a:fld id="{E3744D7E-A5BB-4306-A750-C25515017678}" type="datetimeFigureOut">
               <a:rPr lang="en-US" smtClean="0"/>
-              <a:t>2017-10-13</a:t>
+              <a:t>2017-11-10</a:t>
             </a:fld>
             <a:endParaRPr lang="en-US"/>
           </a:p>
@@ -736,7 +736,7 @@
           <a:p>
             <a:fld id="{E3744D7E-A5BB-4306-A750-C25515017678}" type="datetimeFigureOut">
               <a:rPr lang="en-US" smtClean="0"/>
-              <a:t>2017-10-13</a:t>
+              <a:t>2017-11-10</a:t>
             </a:fld>
             <a:endParaRPr lang="en-US"/>
           </a:p>
@@ -1001,7 +1001,7 @@
           <a:p>
             <a:fld id="{B880F04E-B60C-4530-BE27-DE08322B2422}" type="datetimeFigureOut">
               <a:rPr lang="en-US" smtClean="0"/>
-              <a:t>2017-10-13</a:t>
+              <a:t>2017-11-10</a:t>
             </a:fld>
             <a:endParaRPr lang="en-US"/>
           </a:p>
@@ -1171,7 +1171,7 @@
           <a:p>
             <a:fld id="{B880F04E-B60C-4530-BE27-DE08322B2422}" type="datetimeFigureOut">
               <a:rPr lang="en-US" smtClean="0"/>
-              <a:t>2017-10-13</a:t>
+              <a:t>2017-11-10</a:t>
             </a:fld>
             <a:endParaRPr lang="en-US"/>
           </a:p>
@@ -1417,7 +1417,7 @@
           <a:p>
             <a:fld id="{B880F04E-B60C-4530-BE27-DE08322B2422}" type="datetimeFigureOut">
               <a:rPr lang="en-US" smtClean="0"/>
-              <a:t>2017-10-13</a:t>
+              <a:t>2017-11-10</a:t>
             </a:fld>
             <a:endParaRPr lang="en-US"/>
           </a:p>
@@ -1705,7 +1705,7 @@
           <a:p>
             <a:fld id="{B880F04E-B60C-4530-BE27-DE08322B2422}" type="datetimeFigureOut">
               <a:rPr lang="en-US" smtClean="0"/>
-              <a:t>2017-10-13</a:t>
+              <a:t>2017-11-10</a:t>
             </a:fld>
             <a:endParaRPr lang="en-US"/>
           </a:p>
@@ -2127,7 +2127,7 @@
           <a:p>
             <a:fld id="{B880F04E-B60C-4530-BE27-DE08322B2422}" type="datetimeFigureOut">
               <a:rPr lang="en-US" smtClean="0"/>
-              <a:t>2017-10-13</a:t>
+              <a:t>2017-11-10</a:t>
             </a:fld>
             <a:endParaRPr lang="en-US"/>
           </a:p>
@@ -2245,7 +2245,7 @@
           <a:p>
             <a:fld id="{B880F04E-B60C-4530-BE27-DE08322B2422}" type="datetimeFigureOut">
               <a:rPr lang="en-US" smtClean="0"/>
-              <a:t>2017-10-13</a:t>
+              <a:t>2017-11-10</a:t>
             </a:fld>
             <a:endParaRPr lang="en-US"/>
           </a:p>
@@ -2340,7 +2340,7 @@
           <a:p>
             <a:fld id="{B880F04E-B60C-4530-BE27-DE08322B2422}" type="datetimeFigureOut">
               <a:rPr lang="en-US" smtClean="0"/>
-              <a:t>2017-10-13</a:t>
+              <a:t>2017-11-10</a:t>
             </a:fld>
             <a:endParaRPr lang="en-US"/>
           </a:p>
@@ -2617,7 +2617,7 @@
           <a:p>
             <a:fld id="{B880F04E-B60C-4530-BE27-DE08322B2422}" type="datetimeFigureOut">
               <a:rPr lang="en-US" smtClean="0"/>
-              <a:t>2017-10-13</a:t>
+              <a:t>2017-11-10</a:t>
             </a:fld>
             <a:endParaRPr lang="en-US"/>
           </a:p>
@@ -2811,7 +2811,7 @@
           <a:p>
             <a:fld id="{E3744D7E-A5BB-4306-A750-C25515017678}" type="datetimeFigureOut">
               <a:rPr lang="en-US" smtClean="0"/>
-              <a:t>2017-10-13</a:t>
+              <a:t>2017-11-10</a:t>
             </a:fld>
             <a:endParaRPr lang="en-US"/>
           </a:p>
@@ -3080,7 +3080,7 @@
           <a:p>
             <a:fld id="{B880F04E-B60C-4530-BE27-DE08322B2422}" type="datetimeFigureOut">
               <a:rPr lang="en-US" smtClean="0"/>
-              <a:t>2017-10-13</a:t>
+              <a:t>2017-11-10</a:t>
             </a:fld>
             <a:endParaRPr lang="en-US"/>
           </a:p>
@@ -3250,7 +3250,7 @@
           <a:p>
             <a:fld id="{B880F04E-B60C-4530-BE27-DE08322B2422}" type="datetimeFigureOut">
               <a:rPr lang="en-US" smtClean="0"/>
-              <a:t>2017-10-13</a:t>
+              <a:t>2017-11-10</a:t>
             </a:fld>
             <a:endParaRPr lang="en-US"/>
           </a:p>
@@ -3430,7 +3430,7 @@
           <a:p>
             <a:fld id="{B880F04E-B60C-4530-BE27-DE08322B2422}" type="datetimeFigureOut">
               <a:rPr lang="en-US" smtClean="0"/>
-              <a:t>2017-10-13</a:t>
+              <a:t>2017-11-10</a:t>
             </a:fld>
             <a:endParaRPr lang="en-US"/>
           </a:p>
@@ -3672,7 +3672,7 @@
           <a:p>
             <a:fld id="{C5690C41-1B19-4491-A062-33F2F29E9A8D}" type="datetimeFigureOut">
               <a:rPr lang="en-US" smtClean="0"/>
-              <a:t>2017-10-13</a:t>
+              <a:t>2017-11-10</a:t>
             </a:fld>
             <a:endParaRPr lang="en-US"/>
           </a:p>
@@ -3842,7 +3842,7 @@
           <a:p>
             <a:fld id="{C5690C41-1B19-4491-A062-33F2F29E9A8D}" type="datetimeFigureOut">
               <a:rPr lang="en-US" smtClean="0"/>
-              <a:t>2017-10-13</a:t>
+              <a:t>2017-11-10</a:t>
             </a:fld>
             <a:endParaRPr lang="en-US"/>
           </a:p>
@@ -4088,7 +4088,7 @@
           <a:p>
             <a:fld id="{C5690C41-1B19-4491-A062-33F2F29E9A8D}" type="datetimeFigureOut">
               <a:rPr lang="en-US" smtClean="0"/>
-              <a:t>2017-10-13</a:t>
+              <a:t>2017-11-10</a:t>
             </a:fld>
             <a:endParaRPr lang="en-US"/>
           </a:p>
@@ -4376,7 +4376,7 @@
           <a:p>
             <a:fld id="{C5690C41-1B19-4491-A062-33F2F29E9A8D}" type="datetimeFigureOut">
               <a:rPr lang="en-US" smtClean="0"/>
-              <a:t>2017-10-13</a:t>
+              <a:t>2017-11-10</a:t>
             </a:fld>
             <a:endParaRPr lang="en-US"/>
           </a:p>
@@ -4798,7 +4798,7 @@
           <a:p>
             <a:fld id="{C5690C41-1B19-4491-A062-33F2F29E9A8D}" type="datetimeFigureOut">
               <a:rPr lang="en-US" smtClean="0"/>
-              <a:t>2017-10-13</a:t>
+              <a:t>2017-11-10</a:t>
             </a:fld>
             <a:endParaRPr lang="en-US"/>
           </a:p>
@@ -4916,7 +4916,7 @@
           <a:p>
             <a:fld id="{C5690C41-1B19-4491-A062-33F2F29E9A8D}" type="datetimeFigureOut">
               <a:rPr lang="en-US" smtClean="0"/>
-              <a:t>2017-10-13</a:t>
+              <a:t>2017-11-10</a:t>
             </a:fld>
             <a:endParaRPr lang="en-US"/>
           </a:p>
@@ -5011,7 +5011,7 @@
           <a:p>
             <a:fld id="{C5690C41-1B19-4491-A062-33F2F29E9A8D}" type="datetimeFigureOut">
               <a:rPr lang="en-US" smtClean="0"/>
-              <a:t>2017-10-13</a:t>
+              <a:t>2017-11-10</a:t>
             </a:fld>
             <a:endParaRPr lang="en-US"/>
           </a:p>
@@ -5271,7 +5271,7 @@
           <a:p>
             <a:fld id="{E3744D7E-A5BB-4306-A750-C25515017678}" type="datetimeFigureOut">
               <a:rPr lang="en-US" smtClean="0"/>
-              <a:t>2017-10-13</a:t>
+              <a:t>2017-11-10</a:t>
             </a:fld>
             <a:endParaRPr lang="en-US"/>
           </a:p>
@@ -5564,7 +5564,7 @@
           <a:p>
             <a:fld id="{C5690C41-1B19-4491-A062-33F2F29E9A8D}" type="datetimeFigureOut">
               <a:rPr lang="en-US" smtClean="0"/>
-              <a:t>2017-10-13</a:t>
+              <a:t>2017-11-10</a:t>
             </a:fld>
             <a:endParaRPr lang="en-US"/>
           </a:p>
@@ -5817,7 +5817,7 @@
           <a:p>
             <a:fld id="{C5690C41-1B19-4491-A062-33F2F29E9A8D}" type="datetimeFigureOut">
               <a:rPr lang="en-US" smtClean="0"/>
-              <a:t>2017-10-13</a:t>
+              <a:t>2017-11-10</a:t>
             </a:fld>
             <a:endParaRPr lang="en-US"/>
           </a:p>
@@ -5987,7 +5987,7 @@
           <a:p>
             <a:fld id="{C5690C41-1B19-4491-A062-33F2F29E9A8D}" type="datetimeFigureOut">
               <a:rPr lang="en-US" smtClean="0"/>
-              <a:t>2017-10-13</a:t>
+              <a:t>2017-11-10</a:t>
             </a:fld>
             <a:endParaRPr lang="en-US"/>
           </a:p>
@@ -6167,7 +6167,7 @@
           <a:p>
             <a:fld id="{C5690C41-1B19-4491-A062-33F2F29E9A8D}" type="datetimeFigureOut">
               <a:rPr lang="en-US" smtClean="0"/>
-              <a:t>2017-10-13</a:t>
+              <a:t>2017-11-10</a:t>
             </a:fld>
             <a:endParaRPr lang="en-US"/>
           </a:p>
@@ -6409,7 +6409,7 @@
           <a:p>
             <a:fld id="{23D18025-B22E-453D-AA62-4A08DAEF541F}" type="datetimeFigureOut">
               <a:rPr lang="en-US" smtClean="0"/>
-              <a:t>2017-10-13</a:t>
+              <a:t>2017-11-10</a:t>
             </a:fld>
             <a:endParaRPr lang="en-US"/>
           </a:p>
@@ -6579,7 +6579,7 @@
           <a:p>
             <a:fld id="{23D18025-B22E-453D-AA62-4A08DAEF541F}" type="datetimeFigureOut">
               <a:rPr lang="en-US" smtClean="0"/>
-              <a:t>2017-10-13</a:t>
+              <a:t>2017-11-10</a:t>
             </a:fld>
             <a:endParaRPr lang="en-US"/>
           </a:p>
@@ -6825,7 +6825,7 @@
           <a:p>
             <a:fld id="{23D18025-B22E-453D-AA62-4A08DAEF541F}" type="datetimeFigureOut">
               <a:rPr lang="en-US" smtClean="0"/>
-              <a:t>2017-10-13</a:t>
+              <a:t>2017-11-10</a:t>
             </a:fld>
             <a:endParaRPr lang="en-US"/>
           </a:p>
@@ -7113,7 +7113,7 @@
           <a:p>
             <a:fld id="{23D18025-B22E-453D-AA62-4A08DAEF541F}" type="datetimeFigureOut">
               <a:rPr lang="en-US" smtClean="0"/>
-              <a:t>2017-10-13</a:t>
+              <a:t>2017-11-10</a:t>
             </a:fld>
             <a:endParaRPr lang="en-US"/>
           </a:p>
@@ -7535,7 +7535,7 @@
           <a:p>
             <a:fld id="{23D18025-B22E-453D-AA62-4A08DAEF541F}" type="datetimeFigureOut">
               <a:rPr lang="en-US" smtClean="0"/>
-              <a:t>2017-10-13</a:t>
+              <a:t>2017-11-10</a:t>
             </a:fld>
             <a:endParaRPr lang="en-US"/>
           </a:p>
@@ -7653,7 +7653,7 @@
           <a:p>
             <a:fld id="{23D18025-B22E-453D-AA62-4A08DAEF541F}" type="datetimeFigureOut">
               <a:rPr lang="en-US" smtClean="0"/>
-              <a:t>2017-10-13</a:t>
+              <a:t>2017-11-10</a:t>
             </a:fld>
             <a:endParaRPr lang="en-US"/>
           </a:p>
@@ -7963,7 +7963,7 @@
           <a:p>
             <a:fld id="{E3744D7E-A5BB-4306-A750-C25515017678}" type="datetimeFigureOut">
               <a:rPr lang="en-US" smtClean="0"/>
-              <a:t>2017-10-13</a:t>
+              <a:t>2017-11-10</a:t>
             </a:fld>
             <a:endParaRPr lang="en-US"/>
           </a:p>
@@ -8074,7 +8074,7 @@
           <a:p>
             <a:fld id="{23D18025-B22E-453D-AA62-4A08DAEF541F}" type="datetimeFigureOut">
               <a:rPr lang="en-US" smtClean="0"/>
-              <a:t>2017-10-13</a:t>
+              <a:t>2017-11-10</a:t>
             </a:fld>
             <a:endParaRPr lang="en-US"/>
           </a:p>
@@ -8351,7 +8351,7 @@
           <a:p>
             <a:fld id="{23D18025-B22E-453D-AA62-4A08DAEF541F}" type="datetimeFigureOut">
               <a:rPr lang="en-US" smtClean="0"/>
-              <a:t>2017-10-13</a:t>
+              <a:t>2017-11-10</a:t>
             </a:fld>
             <a:endParaRPr lang="en-US"/>
           </a:p>
@@ -8604,7 +8604,7 @@
           <a:p>
             <a:fld id="{23D18025-B22E-453D-AA62-4A08DAEF541F}" type="datetimeFigureOut">
               <a:rPr lang="en-US" smtClean="0"/>
-              <a:t>2017-10-13</a:t>
+              <a:t>2017-11-10</a:t>
             </a:fld>
             <a:endParaRPr lang="en-US"/>
           </a:p>
@@ -8774,7 +8774,7 @@
           <a:p>
             <a:fld id="{23D18025-B22E-453D-AA62-4A08DAEF541F}" type="datetimeFigureOut">
               <a:rPr lang="en-US" smtClean="0"/>
-              <a:t>2017-10-13</a:t>
+              <a:t>2017-11-10</a:t>
             </a:fld>
             <a:endParaRPr lang="en-US"/>
           </a:p>
@@ -8954,7 +8954,7 @@
           <a:p>
             <a:fld id="{23D18025-B22E-453D-AA62-4A08DAEF541F}" type="datetimeFigureOut">
               <a:rPr lang="en-US" smtClean="0"/>
-              <a:t>2017-10-13</a:t>
+              <a:t>2017-11-10</a:t>
             </a:fld>
             <a:endParaRPr lang="en-US"/>
           </a:p>
@@ -9196,7 +9196,7 @@
           <a:p>
             <a:fld id="{5A29F1F3-0306-4ADD-8575-5F845BC34EA0}" type="datetimeFigureOut">
               <a:rPr lang="en-US" smtClean="0"/>
-              <a:t>2017-10-13</a:t>
+              <a:t>2017-11-10</a:t>
             </a:fld>
             <a:endParaRPr lang="en-US"/>
           </a:p>
@@ -9366,7 +9366,7 @@
           <a:p>
             <a:fld id="{5A29F1F3-0306-4ADD-8575-5F845BC34EA0}" type="datetimeFigureOut">
               <a:rPr lang="en-US" smtClean="0"/>
-              <a:t>2017-10-13</a:t>
+              <a:t>2017-11-10</a:t>
             </a:fld>
             <a:endParaRPr lang="en-US"/>
           </a:p>
@@ -9612,7 +9612,7 @@
           <a:p>
             <a:fld id="{5A29F1F3-0306-4ADD-8575-5F845BC34EA0}" type="datetimeFigureOut">
               <a:rPr lang="en-US" smtClean="0"/>
-              <a:t>2017-10-13</a:t>
+              <a:t>2017-11-10</a:t>
             </a:fld>
             <a:endParaRPr lang="en-US"/>
           </a:p>
@@ -9900,7 +9900,7 @@
           <a:p>
             <a:fld id="{5A29F1F3-0306-4ADD-8575-5F845BC34EA0}" type="datetimeFigureOut">
               <a:rPr lang="en-US" smtClean="0"/>
-              <a:t>2017-10-13</a:t>
+              <a:t>2017-11-10</a:t>
             </a:fld>
             <a:endParaRPr lang="en-US"/>
           </a:p>
@@ -10322,7 +10322,7 @@
           <a:p>
             <a:fld id="{5A29F1F3-0306-4ADD-8575-5F845BC34EA0}" type="datetimeFigureOut">
               <a:rPr lang="en-US" smtClean="0"/>
-              <a:t>2017-10-13</a:t>
+              <a:t>2017-11-10</a:t>
             </a:fld>
             <a:endParaRPr lang="en-US"/>
           </a:p>
@@ -10772,7 +10772,7 @@
           <a:p>
             <a:fld id="{E3744D7E-A5BB-4306-A750-C25515017678}" type="datetimeFigureOut">
               <a:rPr lang="en-US" smtClean="0"/>
-              <a:t>2017-10-13</a:t>
+              <a:t>2017-11-10</a:t>
             </a:fld>
             <a:endParaRPr lang="en-US"/>
           </a:p>
@@ -10906,7 +10906,7 @@
           <a:p>
             <a:fld id="{5A29F1F3-0306-4ADD-8575-5F845BC34EA0}" type="datetimeFigureOut">
               <a:rPr lang="en-US" smtClean="0"/>
-              <a:t>2017-10-13</a:t>
+              <a:t>2017-11-10</a:t>
             </a:fld>
             <a:endParaRPr lang="en-US"/>
           </a:p>
@@ -11001,7 +11001,7 @@
           <a:p>
             <a:fld id="{5A29F1F3-0306-4ADD-8575-5F845BC34EA0}" type="datetimeFigureOut">
               <a:rPr lang="en-US" smtClean="0"/>
-              <a:t>2017-10-13</a:t>
+              <a:t>2017-11-10</a:t>
             </a:fld>
             <a:endParaRPr lang="en-US"/>
           </a:p>
@@ -11278,7 +11278,7 @@
           <a:p>
             <a:fld id="{5A29F1F3-0306-4ADD-8575-5F845BC34EA0}" type="datetimeFigureOut">
               <a:rPr lang="en-US" smtClean="0"/>
-              <a:t>2017-10-13</a:t>
+              <a:t>2017-11-10</a:t>
             </a:fld>
             <a:endParaRPr lang="en-US"/>
           </a:p>
@@ -11531,7 +11531,7 @@
           <a:p>
             <a:fld id="{5A29F1F3-0306-4ADD-8575-5F845BC34EA0}" type="datetimeFigureOut">
               <a:rPr lang="en-US" smtClean="0"/>
-              <a:t>2017-10-13</a:t>
+              <a:t>2017-11-10</a:t>
             </a:fld>
             <a:endParaRPr lang="en-US"/>
           </a:p>
@@ -11701,7 +11701,7 @@
           <a:p>
             <a:fld id="{5A29F1F3-0306-4ADD-8575-5F845BC34EA0}" type="datetimeFigureOut">
               <a:rPr lang="en-US" smtClean="0"/>
-              <a:t>2017-10-13</a:t>
+              <a:t>2017-11-10</a:t>
             </a:fld>
             <a:endParaRPr lang="en-US"/>
           </a:p>
@@ -11881,7 +11881,7 @@
           <a:p>
             <a:fld id="{5A29F1F3-0306-4ADD-8575-5F845BC34EA0}" type="datetimeFigureOut">
               <a:rPr lang="en-US" smtClean="0"/>
-              <a:t>2017-10-13</a:t>
+              <a:t>2017-11-10</a:t>
             </a:fld>
             <a:endParaRPr lang="en-US"/>
           </a:p>
@@ -12123,7 +12123,7 @@
           <a:p>
             <a:fld id="{2CD378D0-82C9-47C6-BEE5-E347AC6F0A5E}" type="datetimeFigureOut">
               <a:rPr lang="en-US" smtClean="0"/>
-              <a:t>2017-10-13</a:t>
+              <a:t>2017-11-10</a:t>
             </a:fld>
             <a:endParaRPr lang="en-US"/>
           </a:p>
@@ -12293,7 +12293,7 @@
           <a:p>
             <a:fld id="{2CD378D0-82C9-47C6-BEE5-E347AC6F0A5E}" type="datetimeFigureOut">
               <a:rPr lang="en-US" smtClean="0"/>
-              <a:t>2017-10-13</a:t>
+              <a:t>2017-11-10</a:t>
             </a:fld>
             <a:endParaRPr lang="en-US"/>
           </a:p>
@@ -12539,7 +12539,7 @@
           <a:p>
             <a:fld id="{2CD378D0-82C9-47C6-BEE5-E347AC6F0A5E}" type="datetimeFigureOut">
               <a:rPr lang="en-US" smtClean="0"/>
-              <a:t>2017-10-13</a:t>
+              <a:t>2017-11-10</a:t>
             </a:fld>
             <a:endParaRPr lang="en-US"/>
           </a:p>
@@ -12827,7 +12827,7 @@
           <a:p>
             <a:fld id="{2CD378D0-82C9-47C6-BEE5-E347AC6F0A5E}" type="datetimeFigureOut">
               <a:rPr lang="en-US" smtClean="0"/>
-              <a:t>2017-10-13</a:t>
+              <a:t>2017-11-10</a:t>
             </a:fld>
             <a:endParaRPr lang="en-US"/>
           </a:p>
@@ -12961,7 +12961,7 @@
           <a:p>
             <a:fld id="{E3744D7E-A5BB-4306-A750-C25515017678}" type="datetimeFigureOut">
               <a:rPr lang="en-US" smtClean="0"/>
-              <a:t>2017-10-13</a:t>
+              <a:t>2017-11-10</a:t>
             </a:fld>
             <a:endParaRPr lang="en-US"/>
           </a:p>
@@ -13399,7 +13399,7 @@
           <a:p>
             <a:fld id="{2CD378D0-82C9-47C6-BEE5-E347AC6F0A5E}" type="datetimeFigureOut">
               <a:rPr lang="en-US" smtClean="0"/>
-              <a:t>2017-10-13</a:t>
+              <a:t>2017-11-10</a:t>
             </a:fld>
             <a:endParaRPr lang="en-US"/>
           </a:p>
@@ -13517,7 +13517,7 @@
           <a:p>
             <a:fld id="{2CD378D0-82C9-47C6-BEE5-E347AC6F0A5E}" type="datetimeFigureOut">
               <a:rPr lang="en-US" smtClean="0"/>
-              <a:t>2017-10-13</a:t>
+              <a:t>2017-11-10</a:t>
             </a:fld>
             <a:endParaRPr lang="en-US"/>
           </a:p>
@@ -13612,7 +13612,7 @@
           <a:p>
             <a:fld id="{2CD378D0-82C9-47C6-BEE5-E347AC6F0A5E}" type="datetimeFigureOut">
               <a:rPr lang="en-US" smtClean="0"/>
-              <a:t>2017-10-13</a:t>
+              <a:t>2017-11-10</a:t>
             </a:fld>
             <a:endParaRPr lang="en-US"/>
           </a:p>
@@ -13889,7 +13889,7 @@
           <a:p>
             <a:fld id="{2CD378D0-82C9-47C6-BEE5-E347AC6F0A5E}" type="datetimeFigureOut">
               <a:rPr lang="en-US" smtClean="0"/>
-              <a:t>2017-10-13</a:t>
+              <a:t>2017-11-10</a:t>
             </a:fld>
             <a:endParaRPr lang="en-US"/>
           </a:p>
@@ -14142,7 +14142,7 @@
           <a:p>
             <a:fld id="{2CD378D0-82C9-47C6-BEE5-E347AC6F0A5E}" type="datetimeFigureOut">
               <a:rPr lang="en-US" smtClean="0"/>
-              <a:t>2017-10-13</a:t>
+              <a:t>2017-11-10</a:t>
             </a:fld>
             <a:endParaRPr lang="en-US"/>
           </a:p>
@@ -14312,7 +14312,7 @@
           <a:p>
             <a:fld id="{2CD378D0-82C9-47C6-BEE5-E347AC6F0A5E}" type="datetimeFigureOut">
               <a:rPr lang="en-US" smtClean="0"/>
-              <a:t>2017-10-13</a:t>
+              <a:t>2017-11-10</a:t>
             </a:fld>
             <a:endParaRPr lang="en-US"/>
           </a:p>
@@ -14492,7 +14492,7 @@
           <a:p>
             <a:fld id="{2CD378D0-82C9-47C6-BEE5-E347AC6F0A5E}" type="datetimeFigureOut">
               <a:rPr lang="en-US" smtClean="0"/>
-              <a:t>2017-10-13</a:t>
+              <a:t>2017-11-10</a:t>
             </a:fld>
             <a:endParaRPr lang="en-US"/>
           </a:p>
@@ -14734,7 +14734,7 @@
           <a:p>
             <a:fld id="{B96FFCCF-F4AB-4D56-AEE8-39DF7F28FF62}" type="datetimeFigureOut">
               <a:rPr lang="en-US" smtClean="0"/>
-              <a:t>2017-10-13</a:t>
+              <a:t>2017-11-10</a:t>
             </a:fld>
             <a:endParaRPr lang="en-US"/>
           </a:p>
@@ -14904,7 +14904,7 @@
           <a:p>
             <a:fld id="{B96FFCCF-F4AB-4D56-AEE8-39DF7F28FF62}" type="datetimeFigureOut">
               <a:rPr lang="en-US" smtClean="0"/>
-              <a:t>2017-10-13</a:t>
+              <a:t>2017-11-10</a:t>
             </a:fld>
             <a:endParaRPr lang="en-US"/>
           </a:p>
@@ -15150,7 +15150,7 @@
           <a:p>
             <a:fld id="{B96FFCCF-F4AB-4D56-AEE8-39DF7F28FF62}" type="datetimeFigureOut">
               <a:rPr lang="en-US" smtClean="0"/>
-              <a:t>2017-10-13</a:t>
+              <a:t>2017-11-10</a:t>
             </a:fld>
             <a:endParaRPr lang="en-US"/>
           </a:p>
@@ -15253,7 +15253,7 @@
           <a:p>
             <a:fld id="{E3744D7E-A5BB-4306-A750-C25515017678}" type="datetimeFigureOut">
               <a:rPr lang="en-US" smtClean="0"/>
-              <a:t>2017-10-13</a:t>
+              <a:t>2017-11-10</a:t>
             </a:fld>
             <a:endParaRPr lang="en-US"/>
           </a:p>
@@ -15564,7 +15564,7 @@
           <a:p>
             <a:fld id="{B96FFCCF-F4AB-4D56-AEE8-39DF7F28FF62}" type="datetimeFigureOut">
               <a:rPr lang="en-US" smtClean="0"/>
-              <a:t>2017-10-13</a:t>
+              <a:t>2017-11-10</a:t>
             </a:fld>
             <a:endParaRPr lang="en-US"/>
           </a:p>
@@ -15986,7 +15986,7 @@
           <a:p>
             <a:fld id="{B96FFCCF-F4AB-4D56-AEE8-39DF7F28FF62}" type="datetimeFigureOut">
               <a:rPr lang="en-US" smtClean="0"/>
-              <a:t>2017-10-13</a:t>
+              <a:t>2017-11-10</a:t>
             </a:fld>
             <a:endParaRPr lang="en-US"/>
           </a:p>
@@ -16104,7 +16104,7 @@
           <a:p>
             <a:fld id="{B96FFCCF-F4AB-4D56-AEE8-39DF7F28FF62}" type="datetimeFigureOut">
               <a:rPr lang="en-US" smtClean="0"/>
-              <a:t>2017-10-13</a:t>
+              <a:t>2017-11-10</a:t>
             </a:fld>
             <a:endParaRPr lang="en-US"/>
           </a:p>
@@ -16199,7 +16199,7 @@
           <a:p>
             <a:fld id="{B96FFCCF-F4AB-4D56-AEE8-39DF7F28FF62}" type="datetimeFigureOut">
               <a:rPr lang="en-US" smtClean="0"/>
-              <a:t>2017-10-13</a:t>
+              <a:t>2017-11-10</a:t>
             </a:fld>
             <a:endParaRPr lang="en-US"/>
           </a:p>
@@ -16476,7 +16476,7 @@
           <a:p>
             <a:fld id="{B96FFCCF-F4AB-4D56-AEE8-39DF7F28FF62}" type="datetimeFigureOut">
               <a:rPr lang="en-US" smtClean="0"/>
-              <a:t>2017-10-13</a:t>
+              <a:t>2017-11-10</a:t>
             </a:fld>
             <a:endParaRPr lang="en-US"/>
           </a:p>
@@ -16729,7 +16729,7 @@
           <a:p>
             <a:fld id="{B96FFCCF-F4AB-4D56-AEE8-39DF7F28FF62}" type="datetimeFigureOut">
               <a:rPr lang="en-US" smtClean="0"/>
-              <a:t>2017-10-13</a:t>
+              <a:t>2017-11-10</a:t>
             </a:fld>
             <a:endParaRPr lang="en-US"/>
           </a:p>
@@ -16899,7 +16899,7 @@
           <a:p>
             <a:fld id="{B96FFCCF-F4AB-4D56-AEE8-39DF7F28FF62}" type="datetimeFigureOut">
               <a:rPr lang="en-US" smtClean="0"/>
-              <a:t>2017-10-13</a:t>
+              <a:t>2017-11-10</a:t>
             </a:fld>
             <a:endParaRPr lang="en-US"/>
           </a:p>
@@ -17079,7 +17079,7 @@
           <a:p>
             <a:fld id="{B96FFCCF-F4AB-4D56-AEE8-39DF7F28FF62}" type="datetimeFigureOut">
               <a:rPr lang="en-US" smtClean="0"/>
-              <a:t>2017-10-13</a:t>
+              <a:t>2017-11-10</a:t>
             </a:fld>
             <a:endParaRPr lang="en-US"/>
           </a:p>
@@ -17321,7 +17321,7 @@
           <a:p>
             <a:fld id="{E90DB797-294B-4B2B-9A48-229F3ACF3E1A}" type="datetimeFigureOut">
               <a:rPr lang="en-US" smtClean="0"/>
-              <a:t>2017-10-13</a:t>
+              <a:t>2017-11-10</a:t>
             </a:fld>
             <a:endParaRPr lang="en-US"/>
           </a:p>
@@ -17491,7 +17491,7 @@
           <a:p>
             <a:fld id="{E90DB797-294B-4B2B-9A48-229F3ACF3E1A}" type="datetimeFigureOut">
               <a:rPr lang="en-US" smtClean="0"/>
-              <a:t>2017-10-13</a:t>
+              <a:t>2017-11-10</a:t>
             </a:fld>
             <a:endParaRPr lang="en-US"/>
           </a:p>
@@ -17785,7 +17785,7 @@
           <a:p>
             <a:fld id="{E3744D7E-A5BB-4306-A750-C25515017678}" type="datetimeFigureOut">
               <a:rPr lang="en-US" smtClean="0"/>
-              <a:t>2017-10-13</a:t>
+              <a:t>2017-11-10</a:t>
             </a:fld>
             <a:endParaRPr lang="en-US"/>
           </a:p>
@@ -18047,7 +18047,7 @@
           <a:p>
             <a:fld id="{E90DB797-294B-4B2B-9A48-229F3ACF3E1A}" type="datetimeFigureOut">
               <a:rPr lang="en-US" smtClean="0"/>
-              <a:t>2017-10-13</a:t>
+              <a:t>2017-11-10</a:t>
             </a:fld>
             <a:endParaRPr lang="en-US"/>
           </a:p>
@@ -18335,7 +18335,7 @@
           <a:p>
             <a:fld id="{E90DB797-294B-4B2B-9A48-229F3ACF3E1A}" type="datetimeFigureOut">
               <a:rPr lang="en-US" smtClean="0"/>
-              <a:t>2017-10-13</a:t>
+              <a:t>2017-11-10</a:t>
             </a:fld>
             <a:endParaRPr lang="en-US"/>
           </a:p>
@@ -18757,7 +18757,7 @@
           <a:p>
             <a:fld id="{E90DB797-294B-4B2B-9A48-229F3ACF3E1A}" type="datetimeFigureOut">
               <a:rPr lang="en-US" smtClean="0"/>
-              <a:t>2017-10-13</a:t>
+              <a:t>2017-11-10</a:t>
             </a:fld>
             <a:endParaRPr lang="en-US"/>
           </a:p>
@@ -18875,7 +18875,7 @@
           <a:p>
             <a:fld id="{E90DB797-294B-4B2B-9A48-229F3ACF3E1A}" type="datetimeFigureOut">
               <a:rPr lang="en-US" smtClean="0"/>
-              <a:t>2017-10-13</a:t>
+              <a:t>2017-11-10</a:t>
             </a:fld>
             <a:endParaRPr lang="en-US"/>
           </a:p>
@@ -18970,7 +18970,7 @@
           <a:p>
             <a:fld id="{E90DB797-294B-4B2B-9A48-229F3ACF3E1A}" type="datetimeFigureOut">
               <a:rPr lang="en-US" smtClean="0"/>
-              <a:t>2017-10-13</a:t>
+              <a:t>2017-11-10</a:t>
             </a:fld>
             <a:endParaRPr lang="en-US"/>
           </a:p>
@@ -19247,7 +19247,7 @@
           <a:p>
             <a:fld id="{E90DB797-294B-4B2B-9A48-229F3ACF3E1A}" type="datetimeFigureOut">
               <a:rPr lang="en-US" smtClean="0"/>
-              <a:t>2017-10-13</a:t>
+              <a:t>2017-11-10</a:t>
             </a:fld>
             <a:endParaRPr lang="en-US"/>
           </a:p>
@@ -19500,7 +19500,7 @@
           <a:p>
             <a:fld id="{E90DB797-294B-4B2B-9A48-229F3ACF3E1A}" type="datetimeFigureOut">
               <a:rPr lang="en-US" smtClean="0"/>
-              <a:t>2017-10-13</a:t>
+              <a:t>2017-11-10</a:t>
             </a:fld>
             <a:endParaRPr lang="en-US"/>
           </a:p>
@@ -19670,7 +19670,7 @@
           <a:p>
             <a:fld id="{E90DB797-294B-4B2B-9A48-229F3ACF3E1A}" type="datetimeFigureOut">
               <a:rPr lang="en-US" smtClean="0"/>
-              <a:t>2017-10-13</a:t>
+              <a:t>2017-11-10</a:t>
             </a:fld>
             <a:endParaRPr lang="en-US"/>
           </a:p>
@@ -19850,7 +19850,7 @@
           <a:p>
             <a:fld id="{E90DB797-294B-4B2B-9A48-229F3ACF3E1A}" type="datetimeFigureOut">
               <a:rPr lang="en-US" smtClean="0"/>
-              <a:t>2017-10-13</a:t>
+              <a:t>2017-11-10</a:t>
             </a:fld>
             <a:endParaRPr lang="en-US"/>
           </a:p>
@@ -20120,7 +20120,7 @@
           <a:p>
             <a:fld id="{E3744D7E-A5BB-4306-A750-C25515017678}" type="datetimeFigureOut">
               <a:rPr lang="en-US" smtClean="0"/>
-              <a:t>2017-10-13</a:t>
+              <a:t>2017-11-10</a:t>
             </a:fld>
             <a:endParaRPr lang="en-US"/>
           </a:p>
@@ -20652,7 +20652,7 @@
           <a:p>
             <a:fld id="{B880F04E-B60C-4530-BE27-DE08322B2422}" type="datetimeFigureOut">
               <a:rPr lang="en-US" smtClean="0"/>
-              <a:t>2017-10-13</a:t>
+              <a:t>2017-11-10</a:t>
             </a:fld>
             <a:endParaRPr lang="en-US"/>
           </a:p>
@@ -21162,7 +21162,7 @@
           <a:p>
             <a:fld id="{C5690C41-1B19-4491-A062-33F2F29E9A8D}" type="datetimeFigureOut">
               <a:rPr lang="en-US" smtClean="0"/>
-              <a:t>2017-10-13</a:t>
+              <a:t>2017-11-10</a:t>
             </a:fld>
             <a:endParaRPr lang="en-US"/>
           </a:p>
@@ -21672,7 +21672,7 @@
           <a:p>
             <a:fld id="{23D18025-B22E-453D-AA62-4A08DAEF541F}" type="datetimeFigureOut">
               <a:rPr lang="en-US" smtClean="0"/>
-              <a:t>2017-10-13</a:t>
+              <a:t>2017-11-10</a:t>
             </a:fld>
             <a:endParaRPr lang="en-US"/>
           </a:p>
@@ -22182,7 +22182,7 @@
           <a:p>
             <a:fld id="{5A29F1F3-0306-4ADD-8575-5F845BC34EA0}" type="datetimeFigureOut">
               <a:rPr lang="en-US" smtClean="0"/>
-              <a:t>2017-10-13</a:t>
+              <a:t>2017-11-10</a:t>
             </a:fld>
             <a:endParaRPr lang="en-US"/>
           </a:p>
@@ -22692,7 +22692,7 @@
           <a:p>
             <a:fld id="{2CD378D0-82C9-47C6-BEE5-E347AC6F0A5E}" type="datetimeFigureOut">
               <a:rPr lang="en-US" smtClean="0"/>
-              <a:t>2017-10-13</a:t>
+              <a:t>2017-11-10</a:t>
             </a:fld>
             <a:endParaRPr lang="en-US"/>
           </a:p>
@@ -23202,7 +23202,7 @@
           <a:p>
             <a:fld id="{B96FFCCF-F4AB-4D56-AEE8-39DF7F28FF62}" type="datetimeFigureOut">
               <a:rPr lang="en-US" smtClean="0"/>
-              <a:t>2017-10-13</a:t>
+              <a:t>2017-11-10</a:t>
             </a:fld>
             <a:endParaRPr lang="en-US"/>
           </a:p>
@@ -23712,7 +23712,7 @@
           <a:p>
             <a:fld id="{E90DB797-294B-4B2B-9A48-229F3ACF3E1A}" type="datetimeFigureOut">
               <a:rPr lang="en-US" smtClean="0"/>
-              <a:t>2017-10-13</a:t>
+              <a:t>2017-11-10</a:t>
             </a:fld>
             <a:endParaRPr lang="en-US"/>
           </a:p>
@@ -24096,6 +24096,44 @@
       </p:grpSpPr>
       <p:cxnSp>
         <p:nvCxnSpPr>
+          <p:cNvPr id="920" name="Straight Arrow Connector 919"/>
+          <p:cNvCxnSpPr/>
+          <p:nvPr/>
+        </p:nvCxnSpPr>
+        <p:spPr>
+          <a:xfrm flipH="1">
+            <a:off x="3636762" y="1257351"/>
+            <a:ext cx="2916000" cy="0"/>
+          </a:xfrm>
+          <a:prstGeom prst="straightConnector1">
+            <a:avLst/>
+          </a:prstGeom>
+          <a:ln w="22225">
+            <a:solidFill>
+              <a:schemeClr val="accent1"/>
+            </a:solidFill>
+            <a:prstDash val="solid"/>
+            <a:headEnd type="none"/>
+            <a:tailEnd type="triangle"/>
+          </a:ln>
+        </p:spPr>
+        <p:style>
+          <a:lnRef idx="1">
+            <a:schemeClr val="accent1"/>
+          </a:lnRef>
+          <a:fillRef idx="0">
+            <a:schemeClr val="accent1"/>
+          </a:fillRef>
+          <a:effectRef idx="0">
+            <a:schemeClr val="accent1"/>
+          </a:effectRef>
+          <a:fontRef idx="minor">
+            <a:schemeClr val="tx1"/>
+          </a:fontRef>
+        </p:style>
+      </p:cxnSp>
+      <p:cxnSp>
+        <p:nvCxnSpPr>
           <p:cNvPr id="818" name="Straight Arrow Connector 817"/>
           <p:cNvCxnSpPr/>
           <p:nvPr/>
@@ -24513,7 +24551,7 @@
         </p:nvCxnSpPr>
         <p:spPr>
           <a:xfrm>
-            <a:off x="6443711" y="981316"/>
+            <a:off x="6561194" y="981316"/>
             <a:ext cx="0" cy="2880000"/>
           </a:xfrm>
           <a:prstGeom prst="line">
@@ -24549,10 +24587,10 @@
         </p:nvGrpSpPr>
         <p:grpSpPr>
           <a:xfrm>
-            <a:off x="5927266" y="1928507"/>
-            <a:ext cx="1030391" cy="1103526"/>
-            <a:chOff x="4558170" y="1856548"/>
-            <a:chExt cx="1030391" cy="1103526"/>
+            <a:off x="6046332" y="1928507"/>
+            <a:ext cx="1031501" cy="1103526"/>
+            <a:chOff x="4559753" y="1856548"/>
+            <a:chExt cx="1031501" cy="1103526"/>
           </a:xfrm>
         </p:grpSpPr>
         <p:sp>
@@ -24839,7 +24877,7 @@
           </p:nvSpPr>
           <p:spPr>
             <a:xfrm>
-              <a:off x="5082450" y="2462159"/>
+              <a:off x="5127935" y="2462159"/>
               <a:ext cx="463319" cy="199207"/>
             </a:xfrm>
             <a:prstGeom prst="rect">
@@ -24894,7 +24932,7 @@
           </p:nvSpPr>
           <p:spPr>
             <a:xfrm>
-              <a:off x="4558170" y="2432612"/>
+              <a:off x="4591511" y="2432612"/>
               <a:ext cx="659156" cy="246221"/>
             </a:xfrm>
             <a:prstGeom prst="rect">
@@ -24932,8 +24970,8 @@
         </p:nvCxnSpPr>
         <p:spPr>
           <a:xfrm flipV="1">
-            <a:off x="6537073" y="1187455"/>
-            <a:ext cx="648000" cy="1089352"/>
+            <a:off x="6651385" y="1187455"/>
+            <a:ext cx="612000" cy="1089352"/>
           </a:xfrm>
           <a:prstGeom prst="bentConnector2">
             <a:avLst/>
@@ -24943,6 +24981,8 @@
               <a:schemeClr val="tx1"/>
             </a:solidFill>
             <a:prstDash val="dash"/>
+            <a:headEnd type="none" w="sm" len="sm"/>
+            <a:tailEnd type="none"/>
           </a:ln>
         </p:spPr>
         <p:style>
@@ -25408,7 +25448,7 @@
         </p:nvSpPr>
         <p:spPr>
           <a:xfrm>
-            <a:off x="4087615" y="3058589"/>
+            <a:off x="4149534" y="3058589"/>
             <a:ext cx="1582484" cy="276999"/>
           </a:xfrm>
           <a:prstGeom prst="rect">
@@ -25458,7 +25498,7 @@
         </p:nvSpPr>
         <p:spPr>
           <a:xfrm>
-            <a:off x="3664604" y="3320053"/>
+            <a:off x="3712234" y="3320053"/>
             <a:ext cx="2672526" cy="430887"/>
           </a:xfrm>
           <a:prstGeom prst="rect">
@@ -25636,7 +25676,7 @@
         </p:nvSpPr>
         <p:spPr>
           <a:xfrm>
-            <a:off x="5634419" y="188591"/>
+            <a:off x="5751902" y="188591"/>
             <a:ext cx="1105495" cy="276999"/>
           </a:xfrm>
           <a:prstGeom prst="rect">
@@ -25933,7 +25973,7 @@
         <p:spPr>
           <a:xfrm>
             <a:off x="3770296" y="1761733"/>
-            <a:ext cx="2664000" cy="0"/>
+            <a:ext cx="2772000" cy="0"/>
           </a:xfrm>
           <a:prstGeom prst="straightConnector1">
             <a:avLst/>
@@ -26139,7 +26179,7 @@
         <p:spPr>
           <a:xfrm flipH="1">
             <a:off x="3633264" y="3344652"/>
-            <a:ext cx="2664000" cy="0"/>
+            <a:ext cx="2772000" cy="0"/>
           </a:xfrm>
           <a:prstGeom prst="straightConnector1">
             <a:avLst/>
@@ -26347,7 +26387,7 @@
         </p:nvSpPr>
         <p:spPr>
           <a:xfrm>
-            <a:off x="5558613" y="3059209"/>
+            <a:off x="5637992" y="3059209"/>
             <a:ext cx="389850" cy="276999"/>
           </a:xfrm>
           <a:prstGeom prst="rect">
@@ -26413,7 +26453,7 @@
         </p:nvSpPr>
         <p:spPr>
           <a:xfrm>
-            <a:off x="5425957" y="971347"/>
+            <a:off x="5448097" y="971347"/>
             <a:ext cx="389850" cy="276999"/>
           </a:xfrm>
           <a:prstGeom prst="rect">
@@ -26461,7 +26501,7 @@
         </p:blipFill>
         <p:spPr bwMode="auto">
           <a:xfrm rot="10800000">
-            <a:off x="6256201" y="503981"/>
+            <a:off x="6373684" y="503981"/>
             <a:ext cx="355673" cy="502719"/>
           </a:xfrm>
           <a:prstGeom prst="rect">
@@ -26530,7 +26570,7 @@
         </p:nvSpPr>
         <p:spPr>
           <a:xfrm>
-            <a:off x="6235981" y="3225135"/>
+            <a:off x="6353464" y="3225135"/>
             <a:ext cx="414109" cy="237600"/>
           </a:xfrm>
           <a:prstGeom prst="parallelogram">
@@ -26577,43 +26617,6 @@
           <a:p>
             <a:pPr algn="ctr"/>
             <a:endParaRPr lang="en-US"/>
-          </a:p>
-        </p:txBody>
-      </p:sp>
-      <p:sp>
-        <p:nvSpPr>
-          <p:cNvPr id="877" name="TextBox 876"/>
-          <p:cNvSpPr txBox="1"/>
-          <p:nvPr/>
-        </p:nvSpPr>
-        <p:spPr>
-          <a:xfrm>
-            <a:off x="5236548" y="2602953"/>
-            <a:ext cx="723275" cy="246221"/>
-          </a:xfrm>
-          <a:prstGeom prst="rect">
-            <a:avLst/>
-          </a:prstGeom>
-          <a:noFill/>
-        </p:spPr>
-        <p:txBody>
-          <a:bodyPr wrap="none" rtlCol="0">
-            <a:spAutoFit/>
-          </a:bodyPr>
-          <a:lstStyle/>
-          <a:p>
-            <a:pPr algn="r"/>
-            <a:r>
-              <a:rPr lang="en-US" sz="1000" i="1" dirty="0" smtClean="0">
-                <a:latin typeface="Arial" panose="020B0604020202020204" pitchFamily="34" charset="0"/>
-                <a:cs typeface="Arial" panose="020B0604020202020204" pitchFamily="34" charset="0"/>
-              </a:rPr>
-              <a:t>Authorize</a:t>
-            </a:r>
-            <a:endParaRPr lang="en-US" sz="1000" i="1" dirty="0">
-              <a:latin typeface="Arial" panose="020B0604020202020204" pitchFamily="34" charset="0"/>
-              <a:cs typeface="Arial" panose="020B0604020202020204" pitchFamily="34" charset="0"/>
-            </a:endParaRPr>
           </a:p>
         </p:txBody>
       </p:sp>
@@ -26949,7 +26952,7 @@
         </p:nvSpPr>
         <p:spPr>
           <a:xfrm>
-            <a:off x="6717309" y="547877"/>
+            <a:off x="6790598" y="547877"/>
             <a:ext cx="923651" cy="246221"/>
           </a:xfrm>
           <a:prstGeom prst="rect">
@@ -27023,7 +27026,7 @@
         </p:nvGrpSpPr>
         <p:grpSpPr>
           <a:xfrm>
-            <a:off x="6835729" y="804053"/>
+            <a:off x="6909018" y="804053"/>
             <a:ext cx="668317" cy="452870"/>
             <a:chOff x="5303954" y="804102"/>
             <a:chExt cx="668317" cy="452870"/>
@@ -27829,8 +27832,8 @@
         </p:nvCxnSpPr>
         <p:spPr>
           <a:xfrm flipV="1">
-            <a:off x="7440847" y="547880"/>
-            <a:ext cx="470296" cy="306940"/>
+            <a:off x="7516167" y="547880"/>
+            <a:ext cx="394976" cy="302450"/>
           </a:xfrm>
           <a:prstGeom prst="line">
             <a:avLst/>
@@ -28825,44 +28828,6 @@
           </a:p>
         </p:txBody>
       </p:sp>
-      <p:cxnSp>
-        <p:nvCxnSpPr>
-          <p:cNvPr id="920" name="Straight Arrow Connector 919"/>
-          <p:cNvCxnSpPr/>
-          <p:nvPr/>
-        </p:nvCxnSpPr>
-        <p:spPr>
-          <a:xfrm flipH="1">
-            <a:off x="3636762" y="1257351"/>
-            <a:ext cx="2808000" cy="0"/>
-          </a:xfrm>
-          <a:prstGeom prst="straightConnector1">
-            <a:avLst/>
-          </a:prstGeom>
-          <a:ln w="22225">
-            <a:solidFill>
-              <a:schemeClr val="accent1"/>
-            </a:solidFill>
-            <a:prstDash val="solid"/>
-            <a:headEnd type="none"/>
-            <a:tailEnd type="triangle"/>
-          </a:ln>
-        </p:spPr>
-        <p:style>
-          <a:lnRef idx="1">
-            <a:schemeClr val="accent1"/>
-          </a:lnRef>
-          <a:fillRef idx="0">
-            <a:schemeClr val="accent1"/>
-          </a:fillRef>
-          <a:effectRef idx="0">
-            <a:schemeClr val="accent1"/>
-          </a:effectRef>
-          <a:fontRef idx="minor">
-            <a:schemeClr val="tx1"/>
-          </a:fontRef>
-        </p:style>
-      </p:cxnSp>
       <p:sp>
         <p:nvSpPr>
           <p:cNvPr id="921" name="TextBox 920"/>
@@ -28871,7 +28836,7 @@
         </p:nvSpPr>
         <p:spPr>
           <a:xfrm>
-            <a:off x="5490964" y="3966161"/>
+            <a:off x="5610905" y="3966161"/>
             <a:ext cx="1915909" cy="246221"/>
           </a:xfrm>
           <a:prstGeom prst="rect">
@@ -30456,7 +30421,7 @@
         </p:blipFill>
         <p:spPr bwMode="auto">
           <a:xfrm>
-            <a:off x="5751709" y="504496"/>
+            <a:off x="5869192" y="504496"/>
             <a:ext cx="459335" cy="459335"/>
           </a:xfrm>
           <a:prstGeom prst="rect">
@@ -31855,6 +31820,186 @@
           </p:sp>
         </p:grpSp>
       </p:grpSp>
+      <p:sp>
+        <p:nvSpPr>
+          <p:cNvPr id="157" name="TextBox 156"/>
+          <p:cNvSpPr txBox="1"/>
+          <p:nvPr/>
+        </p:nvSpPr>
+        <p:spPr>
+          <a:xfrm>
+            <a:off x="4717476" y="2737597"/>
+            <a:ext cx="1133528" cy="237548"/>
+          </a:xfrm>
+          <a:prstGeom prst="roundRect">
+            <a:avLst>
+              <a:gd name="adj" fmla="val 8156"/>
+            </a:avLst>
+          </a:prstGeom>
+          <a:solidFill>
+            <a:schemeClr val="bg1">
+              <a:lumMod val="95000"/>
+            </a:schemeClr>
+          </a:solidFill>
+          <a:ln>
+            <a:solidFill>
+              <a:schemeClr val="tx1"/>
+            </a:solidFill>
+            <a:prstDash val="solid"/>
+          </a:ln>
+        </p:spPr>
+        <p:txBody>
+          <a:bodyPr wrap="none" lIns="36000" tIns="36000" rIns="36000" bIns="36000" rtlCol="0" anchor="ctr" anchorCtr="1">
+            <a:spAutoFit/>
+          </a:bodyPr>
+          <a:lstStyle/>
+          <a:p>
+            <a:pPr>
+              <a:spcBef>
+                <a:spcPts val="600"/>
+              </a:spcBef>
+            </a:pPr>
+            <a:r>
+              <a:rPr lang="en-US" sz="1000" i="1" dirty="0" smtClean="0">
+                <a:latin typeface="Arial" panose="020B0604020202020204" pitchFamily="34" charset="0"/>
+                <a:cs typeface="Arial" panose="020B0604020202020204" pitchFamily="34" charset="0"/>
+              </a:rPr>
+              <a:t>User Authorization</a:t>
+            </a:r>
+            <a:endParaRPr lang="en-US" sz="1000" i="1" dirty="0">
+              <a:latin typeface="Arial" panose="020B0604020202020204" pitchFamily="34" charset="0"/>
+              <a:cs typeface="Arial" panose="020B0604020202020204" pitchFamily="34" charset="0"/>
+            </a:endParaRPr>
+          </a:p>
+        </p:txBody>
+      </p:sp>
+      <p:sp>
+        <p:nvSpPr>
+          <p:cNvPr id="158" name="TextBox 157"/>
+          <p:cNvSpPr txBox="1"/>
+          <p:nvPr/>
+        </p:nvSpPr>
+        <p:spPr>
+          <a:xfrm>
+            <a:off x="3885154" y="2388914"/>
+            <a:ext cx="1965850" cy="237548"/>
+          </a:xfrm>
+          <a:prstGeom prst="roundRect">
+            <a:avLst>
+              <a:gd name="adj" fmla="val 8156"/>
+            </a:avLst>
+          </a:prstGeom>
+          <a:solidFill>
+            <a:schemeClr val="bg1">
+              <a:lumMod val="95000"/>
+            </a:schemeClr>
+          </a:solidFill>
+          <a:ln>
+            <a:solidFill>
+              <a:schemeClr val="tx1"/>
+            </a:solidFill>
+            <a:prstDash val="solid"/>
+          </a:ln>
+        </p:spPr>
+        <p:txBody>
+          <a:bodyPr wrap="none" lIns="36000" tIns="36000" rIns="36000" bIns="36000" rtlCol="0" anchor="ctr" anchorCtr="1">
+            <a:spAutoFit/>
+          </a:bodyPr>
+          <a:lstStyle/>
+          <a:p>
+            <a:pPr>
+              <a:spcBef>
+                <a:spcPts val="600"/>
+              </a:spcBef>
+            </a:pPr>
+            <a:r>
+              <a:rPr lang="en-US" sz="1000" i="1" dirty="0">
+                <a:latin typeface="Arial" panose="020B0604020202020204" pitchFamily="34" charset="0"/>
+                <a:cs typeface="Arial" panose="020B0604020202020204" pitchFamily="34" charset="0"/>
+              </a:rPr>
+              <a:t>Direct, Booking, Reservation, etc.</a:t>
+            </a:r>
+          </a:p>
+        </p:txBody>
+      </p:sp>
+      <p:cxnSp>
+        <p:nvCxnSpPr>
+          <p:cNvPr id="159" name="Elbow Connector 158"/>
+          <p:cNvCxnSpPr>
+            <a:stCxn id="158" idx="3"/>
+          </p:cNvCxnSpPr>
+          <p:nvPr/>
+        </p:nvCxnSpPr>
+        <p:spPr>
+          <a:xfrm>
+            <a:off x="5851004" y="2507688"/>
+            <a:ext cx="290240" cy="116450"/>
+          </a:xfrm>
+          <a:prstGeom prst="straightConnector1">
+            <a:avLst/>
+          </a:prstGeom>
+          <a:ln w="3175">
+            <a:solidFill>
+              <a:schemeClr val="tx1"/>
+            </a:solidFill>
+            <a:prstDash val="dash"/>
+            <a:tailEnd type="none" w="sm" len="sm"/>
+          </a:ln>
+        </p:spPr>
+        <p:style>
+          <a:lnRef idx="1">
+            <a:schemeClr val="accent1"/>
+          </a:lnRef>
+          <a:fillRef idx="0">
+            <a:schemeClr val="accent1"/>
+          </a:fillRef>
+          <a:effectRef idx="0">
+            <a:schemeClr val="accent1"/>
+          </a:effectRef>
+          <a:fontRef idx="minor">
+            <a:schemeClr val="tx1"/>
+          </a:fontRef>
+        </p:style>
+      </p:cxnSp>
+      <p:cxnSp>
+        <p:nvCxnSpPr>
+          <p:cNvPr id="169" name="Elbow Connector 158"/>
+          <p:cNvCxnSpPr>
+            <a:stCxn id="157" idx="3"/>
+          </p:cNvCxnSpPr>
+          <p:nvPr/>
+        </p:nvCxnSpPr>
+        <p:spPr>
+          <a:xfrm flipV="1">
+            <a:off x="5851004" y="2855119"/>
+            <a:ext cx="283096" cy="1252"/>
+          </a:xfrm>
+          <a:prstGeom prst="straightConnector1">
+            <a:avLst/>
+          </a:prstGeom>
+          <a:ln w="3175">
+            <a:solidFill>
+              <a:schemeClr val="tx1"/>
+            </a:solidFill>
+            <a:prstDash val="dash"/>
+            <a:tailEnd type="none" w="sm" len="sm"/>
+          </a:ln>
+        </p:spPr>
+        <p:style>
+          <a:lnRef idx="1">
+            <a:schemeClr val="accent1"/>
+          </a:lnRef>
+          <a:fillRef idx="0">
+            <a:schemeClr val="accent1"/>
+          </a:fillRef>
+          <a:effectRef idx="0">
+            <a:schemeClr val="accent1"/>
+          </a:effectRef>
+          <a:fontRef idx="minor">
+            <a:schemeClr val="tx1"/>
+          </a:fontRef>
+        </p:style>
+      </p:cxnSp>
     </p:spTree>
     <p:extLst>
       <p:ext uri="{BB962C8B-B14F-4D97-AF65-F5344CB8AC3E}">

</xml_diff>

<commit_message>
"Uncrammed" up the wallet part
</commit_message>
<xml_diff>
--- a/saturn/saturn-authorization.pptx
+++ b/saturn/saturn-authorization.pptx
@@ -24140,7 +24140,7 @@
         </p:nvCxnSpPr>
         <p:spPr>
           <a:xfrm>
-            <a:off x="3618342" y="4414376"/>
+            <a:off x="3618342" y="4575122"/>
             <a:ext cx="4302000" cy="0"/>
           </a:xfrm>
           <a:prstGeom prst="straightConnector1">
@@ -24180,7 +24180,7 @@
         </p:nvSpPr>
         <p:spPr>
           <a:xfrm>
-            <a:off x="3618756" y="4278744"/>
+            <a:off x="3618756" y="4439490"/>
             <a:ext cx="902811" cy="246221"/>
           </a:xfrm>
           <a:prstGeom prst="rect">
@@ -24226,7 +24226,7 @@
         <p:spPr>
           <a:xfrm>
             <a:off x="3617747" y="933507"/>
-            <a:ext cx="0" cy="9000000"/>
+            <a:ext cx="0" cy="9072000"/>
           </a:xfrm>
           <a:prstGeom prst="line">
             <a:avLst/>
@@ -24261,7 +24261,7 @@
         </p:nvCxnSpPr>
         <p:spPr>
           <a:xfrm flipH="1">
-            <a:off x="1623961" y="7784550"/>
+            <a:off x="1623961" y="7945296"/>
             <a:ext cx="6318000" cy="0"/>
           </a:xfrm>
           <a:prstGeom prst="straightConnector1">
@@ -24301,7 +24301,7 @@
         </p:nvCxnSpPr>
         <p:spPr>
           <a:xfrm>
-            <a:off x="1602532" y="8080966"/>
+            <a:off x="1602532" y="8241712"/>
             <a:ext cx="6318000" cy="0"/>
           </a:xfrm>
           <a:prstGeom prst="straightConnector1">
@@ -24341,7 +24341,7 @@
         </p:nvCxnSpPr>
         <p:spPr>
           <a:xfrm flipH="1">
-            <a:off x="1623961" y="8576638"/>
+            <a:off x="1623961" y="8737384"/>
             <a:ext cx="6318000" cy="0"/>
           </a:xfrm>
           <a:prstGeom prst="straightConnector1">
@@ -24381,7 +24381,7 @@
         </p:nvCxnSpPr>
         <p:spPr>
           <a:xfrm>
-            <a:off x="1602532" y="8873054"/>
+            <a:off x="1602532" y="9033800"/>
             <a:ext cx="6318000" cy="0"/>
           </a:xfrm>
           <a:prstGeom prst="straightConnector1">
@@ -24421,7 +24421,7 @@
         </p:nvSpPr>
         <p:spPr>
           <a:xfrm flipH="1">
-            <a:off x="7031663" y="8441006"/>
+            <a:off x="7031663" y="8601752"/>
             <a:ext cx="902811" cy="246221"/>
           </a:xfrm>
           <a:prstGeom prst="rect">
@@ -24466,7 +24466,7 @@
         </p:nvSpPr>
         <p:spPr>
           <a:xfrm flipH="1">
-            <a:off x="7031663" y="7648918"/>
+            <a:off x="7031663" y="7809664"/>
             <a:ext cx="902811" cy="246221"/>
           </a:xfrm>
           <a:prstGeom prst="rect">
@@ -24511,7 +24511,7 @@
         </p:nvCxnSpPr>
         <p:spPr>
           <a:xfrm flipH="1">
-            <a:off x="3637236" y="4710792"/>
+            <a:off x="3637236" y="4871538"/>
             <a:ext cx="4302000" cy="0"/>
           </a:xfrm>
           <a:prstGeom prst="straightConnector1">
@@ -24552,7 +24552,7 @@
         <p:spPr>
           <a:xfrm>
             <a:off x="6561194" y="981316"/>
-            <a:ext cx="0" cy="2880000"/>
+            <a:ext cx="0" cy="3132000"/>
           </a:xfrm>
           <a:prstGeom prst="line">
             <a:avLst/>
@@ -24587,7 +24587,7 @@
         </p:nvGrpSpPr>
         <p:grpSpPr>
           <a:xfrm>
-            <a:off x="6046332" y="1928507"/>
+            <a:off x="6046332" y="2100744"/>
             <a:ext cx="1031501" cy="1103526"/>
             <a:chOff x="4559753" y="1856548"/>
             <a:chExt cx="1031501" cy="1103526"/>
@@ -24971,7 +24971,7 @@
         <p:spPr>
           <a:xfrm flipV="1">
             <a:off x="6651385" y="1187455"/>
-            <a:ext cx="612000" cy="1089352"/>
+            <a:ext cx="612000" cy="1260000"/>
           </a:xfrm>
           <a:prstGeom prst="bentConnector2">
             <a:avLst/>
@@ -24980,7 +24980,7 @@
             <a:solidFill>
               <a:schemeClr val="tx1"/>
             </a:solidFill>
-            <a:prstDash val="dash"/>
+            <a:prstDash val="sysDot"/>
             <a:headEnd type="none" w="sm" len="sm"/>
             <a:tailEnd type="none"/>
           </a:ln>
@@ -25008,7 +25008,7 @@
         </p:nvCxnSpPr>
         <p:spPr>
           <a:xfrm>
-            <a:off x="376834" y="4822581"/>
+            <a:off x="376834" y="4983327"/>
             <a:ext cx="0" cy="684000"/>
           </a:xfrm>
           <a:prstGeom prst="line">
@@ -25046,7 +25046,7 @@
         </p:nvCxnSpPr>
         <p:spPr>
           <a:xfrm>
-            <a:off x="3784197" y="6994396"/>
+            <a:off x="3784197" y="7155142"/>
             <a:ext cx="4140000" cy="0"/>
           </a:xfrm>
           <a:prstGeom prst="straightConnector1">
@@ -25366,7 +25366,7 @@
             <a:solidFill>
               <a:schemeClr val="tx1"/>
             </a:solidFill>
-            <a:prstDash val="dash"/>
+            <a:prstDash val="sysDot"/>
           </a:ln>
         </p:spPr>
         <p:style>
@@ -25402,7 +25402,7 @@
         </p:nvSpPr>
         <p:spPr>
           <a:xfrm>
-            <a:off x="5006692" y="6716830"/>
+            <a:off x="5006692" y="6877576"/>
             <a:ext cx="1889235" cy="276999"/>
           </a:xfrm>
           <a:prstGeom prst="rect">
@@ -25448,7 +25448,7 @@
         </p:nvSpPr>
         <p:spPr>
           <a:xfrm>
-            <a:off x="4149534" y="3058589"/>
+            <a:off x="4149534" y="3376015"/>
             <a:ext cx="1582484" cy="276999"/>
           </a:xfrm>
           <a:prstGeom prst="rect">
@@ -25498,7 +25498,7 @@
         </p:nvSpPr>
         <p:spPr>
           <a:xfrm>
-            <a:off x="3754542" y="3320053"/>
+            <a:off x="3754542" y="3637479"/>
             <a:ext cx="2672526" cy="430887"/>
           </a:xfrm>
           <a:prstGeom prst="rect">
@@ -25604,7 +25604,7 @@
         <p:spPr>
           <a:xfrm>
             <a:off x="7933042" y="3348000"/>
-            <a:ext cx="0" cy="6588000"/>
+            <a:ext cx="0" cy="6660000"/>
           </a:xfrm>
           <a:prstGeom prst="line">
             <a:avLst/>
@@ -26178,7 +26178,7 @@
         </p:nvCxnSpPr>
         <p:spPr>
           <a:xfrm flipH="1">
-            <a:off x="3633264" y="3344652"/>
+            <a:off x="3633264" y="3662078"/>
             <a:ext cx="2772000" cy="0"/>
           </a:xfrm>
           <a:prstGeom prst="straightConnector1">
@@ -26239,7 +26239,7 @@
         </p:blipFill>
         <p:spPr bwMode="auto">
           <a:xfrm>
-            <a:off x="2925412" y="6802324"/>
+            <a:off x="2925412" y="6963070"/>
             <a:ext cx="360040" cy="356341"/>
           </a:xfrm>
           <a:prstGeom prst="rect">
@@ -26278,7 +26278,7 @@
         </p:nvSpPr>
         <p:spPr>
           <a:xfrm>
-            <a:off x="8117877" y="8570789"/>
+            <a:off x="8117877" y="8731535"/>
             <a:ext cx="1117343" cy="241931"/>
           </a:xfrm>
           <a:prstGeom prst="roundRect">
@@ -26387,7 +26387,7 @@
         </p:nvSpPr>
         <p:spPr>
           <a:xfrm>
-            <a:off x="5623703" y="3059209"/>
+            <a:off x="5623703" y="3376635"/>
             <a:ext cx="389850" cy="276999"/>
           </a:xfrm>
           <a:prstGeom prst="rect">
@@ -26420,7 +26420,7 @@
         </p:nvSpPr>
         <p:spPr>
           <a:xfrm>
-            <a:off x="4729667" y="6710626"/>
+            <a:off x="4729667" y="6871372"/>
             <a:ext cx="389850" cy="276999"/>
           </a:xfrm>
           <a:prstGeom prst="rect">
@@ -26534,7 +26534,7 @@
         </p:nvSpPr>
         <p:spPr>
           <a:xfrm>
-            <a:off x="5254822" y="6988757"/>
+            <a:off x="5254822" y="7149503"/>
             <a:ext cx="1074333" cy="246221"/>
           </a:xfrm>
           <a:prstGeom prst="rect">
@@ -26570,7 +26570,7 @@
         </p:nvSpPr>
         <p:spPr>
           <a:xfrm>
-            <a:off x="6353464" y="3225135"/>
+            <a:off x="6353464" y="3542561"/>
             <a:ext cx="414109" cy="237600"/>
           </a:xfrm>
           <a:prstGeom prst="parallelogram">
@@ -26852,7 +26852,7 @@
         </p:nvSpPr>
         <p:spPr>
           <a:xfrm>
-            <a:off x="2235474" y="6778372"/>
+            <a:off x="2235474" y="6939118"/>
             <a:ext cx="729687" cy="400110"/>
           </a:xfrm>
           <a:prstGeom prst="rect">
@@ -28081,8 +28081,8 @@
           </p:nvSpPr>
           <p:spPr>
             <a:xfrm>
-              <a:off x="7624737" y="1538993"/>
-              <a:ext cx="984565" cy="246221"/>
+              <a:off x="7624737" y="1458308"/>
+              <a:ext cx="1071127" cy="400110"/>
             </a:xfrm>
             <a:prstGeom prst="rect">
               <a:avLst/>
@@ -28100,7 +28100,41 @@
                   <a:latin typeface="Arial" panose="020B0604020202020204" pitchFamily="34" charset="0"/>
                   <a:cs typeface="Arial" panose="020B0604020202020204" pitchFamily="34" charset="0"/>
                 </a:rPr>
-                <a:t>Signature Key</a:t>
+                <a:t>Authorization</a:t>
+              </a:r>
+              <a:br>
+                <a:rPr lang="en-US" sz="1000" dirty="0" smtClean="0">
+                  <a:latin typeface="Arial" panose="020B0604020202020204" pitchFamily="34" charset="0"/>
+                  <a:cs typeface="Arial" panose="020B0604020202020204" pitchFamily="34" charset="0"/>
+                </a:rPr>
+              </a:br>
+              <a:r>
+                <a:rPr lang="en-US" sz="1000" dirty="0" smtClean="0">
+                  <a:latin typeface="Arial" panose="020B0604020202020204" pitchFamily="34" charset="0"/>
+                  <a:cs typeface="Arial" panose="020B0604020202020204" pitchFamily="34" charset="0"/>
+                </a:rPr>
+                <a:t>(</a:t>
+              </a:r>
+              <a:r>
+                <a:rPr lang="en-US" sz="1000" i="1" dirty="0" smtClean="0">
+                  <a:latin typeface="Arial" panose="020B0604020202020204" pitchFamily="34" charset="0"/>
+                  <a:cs typeface="Arial" panose="020B0604020202020204" pitchFamily="34" charset="0"/>
+                </a:rPr>
+                <a:t>Signature</a:t>
+              </a:r>
+              <a:r>
+                <a:rPr lang="en-US" sz="1000" dirty="0" smtClean="0">
+                  <a:latin typeface="Arial" panose="020B0604020202020204" pitchFamily="34" charset="0"/>
+                  <a:cs typeface="Arial" panose="020B0604020202020204" pitchFamily="34" charset="0"/>
+                </a:rPr>
+                <a:t>) </a:t>
+              </a:r>
+              <a:r>
+                <a:rPr lang="en-US" sz="1000" dirty="0" smtClean="0">
+                  <a:latin typeface="Arial" panose="020B0604020202020204" pitchFamily="34" charset="0"/>
+                  <a:cs typeface="Arial" panose="020B0604020202020204" pitchFamily="34" charset="0"/>
+                </a:rPr>
+                <a:t>Key</a:t>
               </a:r>
               <a:endParaRPr lang="en-US" sz="1000" dirty="0">
                 <a:latin typeface="Arial" panose="020B0604020202020204" pitchFamily="34" charset="0"/>
@@ -28279,7 +28313,7 @@
         </p:nvGrpSpPr>
         <p:grpSpPr>
           <a:xfrm>
-            <a:off x="3265687" y="6545879"/>
+            <a:off x="3265687" y="6706625"/>
             <a:ext cx="714205" cy="922858"/>
             <a:chOff x="1896591" y="5170438"/>
             <a:chExt cx="714205" cy="922858"/>
@@ -28533,7 +28567,7 @@
         </p:nvCxnSpPr>
         <p:spPr>
           <a:xfrm>
-            <a:off x="415412" y="5158424"/>
+            <a:off x="415412" y="5319170"/>
             <a:ext cx="9108000" cy="0"/>
           </a:xfrm>
           <a:prstGeom prst="line">
@@ -28571,7 +28605,7 @@
         </p:nvSpPr>
         <p:spPr>
           <a:xfrm>
-            <a:off x="321580" y="5101054"/>
+            <a:off x="321580" y="5261800"/>
             <a:ext cx="108000" cy="108000"/>
           </a:xfrm>
           <a:prstGeom prst="ellipse">
@@ -28619,7 +28653,7 @@
         </p:nvSpPr>
         <p:spPr>
           <a:xfrm rot="16200000">
-            <a:off x="-741918" y="3587626"/>
+            <a:off x="-741918" y="3748372"/>
             <a:ext cx="2241319" cy="276999"/>
           </a:xfrm>
           <a:prstGeom prst="rect">
@@ -28671,7 +28705,7 @@
         </p:nvSpPr>
         <p:spPr>
           <a:xfrm rot="16200000">
-            <a:off x="-936132" y="6743240"/>
+            <a:off x="-936132" y="6824933"/>
             <a:ext cx="2618024" cy="276999"/>
           </a:xfrm>
           <a:prstGeom prst="rect">
@@ -28826,8 +28860,8 @@
         </p:nvSpPr>
         <p:spPr>
           <a:xfrm>
-            <a:off x="8612214" y="10233062"/>
-            <a:ext cx="1224136" cy="215444"/>
+            <a:off x="8443292" y="10233062"/>
+            <a:ext cx="1393058" cy="215444"/>
           </a:xfrm>
           <a:prstGeom prst="rect">
             <a:avLst/>
@@ -28846,7 +28880,14 @@
                 <a:latin typeface="Arial" panose="020B0604020202020204" pitchFamily="34" charset="0"/>
                 <a:cs typeface="Arial" panose="020B0604020202020204" pitchFamily="34" charset="0"/>
               </a:rPr>
-              <a:t>WebPKI.org 2017</a:t>
+              <a:t>WebPKI.org </a:t>
+            </a:r>
+            <a:r>
+              <a:rPr lang="en-US" sz="800" dirty="0" smtClean="0">
+                <a:latin typeface="Arial" panose="020B0604020202020204" pitchFamily="34" charset="0"/>
+                <a:cs typeface="Arial" panose="020B0604020202020204" pitchFamily="34" charset="0"/>
+              </a:rPr>
+              <a:t>2017-11-10</a:t>
             </a:r>
             <a:endParaRPr lang="en-US" sz="800" dirty="0">
               <a:latin typeface="Arial" panose="020B0604020202020204" pitchFamily="34" charset="0"/>
@@ -28863,7 +28904,7 @@
         </p:nvSpPr>
         <p:spPr>
           <a:xfrm>
-            <a:off x="5610905" y="3966161"/>
+            <a:off x="5610905" y="4110177"/>
             <a:ext cx="1915909" cy="246221"/>
           </a:xfrm>
           <a:prstGeom prst="rect">
@@ -28899,7 +28940,7 @@
         </p:nvCxnSpPr>
         <p:spPr>
           <a:xfrm>
-            <a:off x="2278225" y="6114658"/>
+            <a:off x="2278225" y="6275404"/>
             <a:ext cx="1188000" cy="1188000"/>
           </a:xfrm>
           <a:prstGeom prst="bentConnector3">
@@ -28911,7 +28952,7 @@
             <a:solidFill>
               <a:schemeClr val="tx1"/>
             </a:solidFill>
-            <a:prstDash val="dash"/>
+            <a:prstDash val="sysDot"/>
             <a:tailEnd type="none" w="sm" len="sm"/>
           </a:ln>
         </p:spPr>
@@ -28938,7 +28979,7 @@
         </p:nvSpPr>
         <p:spPr>
           <a:xfrm>
-            <a:off x="2099445" y="5508526"/>
+            <a:off x="2099445" y="5669272"/>
             <a:ext cx="1323493" cy="802202"/>
           </a:xfrm>
           <a:prstGeom prst="roundRect">
@@ -29094,7 +29135,7 @@
         <p:spPr>
           <a:xfrm>
             <a:off x="1604525" y="3348000"/>
-            <a:ext cx="0" cy="6588000"/>
+            <a:ext cx="0" cy="6660000"/>
           </a:xfrm>
           <a:prstGeom prst="line">
             <a:avLst/>
@@ -29276,7 +29317,7 @@
         </p:nvSpPr>
         <p:spPr>
           <a:xfrm>
-            <a:off x="2216911" y="4428718"/>
+            <a:off x="2216911" y="4589464"/>
             <a:ext cx="1206027" cy="237548"/>
           </a:xfrm>
           <a:prstGeom prst="roundRect">
@@ -29350,7 +29391,7 @@
         </p:nvSpPr>
         <p:spPr>
           <a:xfrm>
-            <a:off x="5159092" y="4433793"/>
+            <a:off x="5159092" y="4594539"/>
             <a:ext cx="1889235" cy="276999"/>
           </a:xfrm>
           <a:prstGeom prst="rect">
@@ -29400,7 +29441,7 @@
         </p:nvSpPr>
         <p:spPr>
           <a:xfrm flipH="1">
-            <a:off x="5159506" y="7803967"/>
+            <a:off x="5159506" y="7964713"/>
             <a:ext cx="1889235" cy="276999"/>
           </a:xfrm>
           <a:prstGeom prst="rect">
@@ -29450,7 +29491,7 @@
         </p:nvSpPr>
         <p:spPr>
           <a:xfrm flipH="1">
-            <a:off x="5104373" y="8596055"/>
+            <a:off x="5104373" y="8756801"/>
             <a:ext cx="1889235" cy="276999"/>
           </a:xfrm>
           <a:prstGeom prst="rect">
@@ -29500,7 +29541,7 @@
         </p:nvSpPr>
         <p:spPr>
           <a:xfrm>
-            <a:off x="8117877" y="7763784"/>
+            <a:off x="8117877" y="7924530"/>
             <a:ext cx="1173990" cy="241931"/>
           </a:xfrm>
           <a:prstGeom prst="roundRect">
@@ -29581,7 +29622,7 @@
         </p:nvSpPr>
         <p:spPr>
           <a:xfrm>
-            <a:off x="8117877" y="9072378"/>
+            <a:off x="8117877" y="9233124"/>
             <a:ext cx="1155243" cy="570544"/>
           </a:xfrm>
           <a:prstGeom prst="roundRect">
@@ -29655,7 +29696,7 @@
         </p:nvSpPr>
         <p:spPr>
           <a:xfrm>
-            <a:off x="7598795" y="4576107"/>
+            <a:off x="7598795" y="4736853"/>
             <a:ext cx="669093" cy="252000"/>
           </a:xfrm>
           <a:prstGeom prst="ellipse">
@@ -29733,7 +29774,7 @@
         </p:nvSpPr>
         <p:spPr>
           <a:xfrm>
-            <a:off x="1270485" y="8740943"/>
+            <a:off x="1270485" y="8901689"/>
             <a:ext cx="669093" cy="252000"/>
           </a:xfrm>
           <a:prstGeom prst="ellipse">
@@ -29811,7 +29852,7 @@
         </p:nvSpPr>
         <p:spPr>
           <a:xfrm>
-            <a:off x="1272050" y="7951236"/>
+            <a:off x="1272050" y="8111982"/>
             <a:ext cx="669093" cy="252000"/>
           </a:xfrm>
           <a:prstGeom prst="ellipse">
@@ -29899,7 +29940,7 @@
         </p:nvSpPr>
         <p:spPr>
           <a:xfrm flipH="1">
-            <a:off x="3659923" y="9484174"/>
+            <a:off x="3659923" y="9468966"/>
             <a:ext cx="4241758" cy="400110"/>
           </a:xfrm>
           <a:prstGeom prst="rect">
@@ -29953,7 +29994,7 @@
         </p:nvGrpSpPr>
         <p:grpSpPr>
           <a:xfrm>
-            <a:off x="8380249" y="4329083"/>
+            <a:off x="8380249" y="4489829"/>
             <a:ext cx="445844" cy="603379"/>
             <a:chOff x="8232155" y="587661"/>
             <a:chExt cx="445844" cy="603379"/>
@@ -30063,7 +30104,7 @@
         </p:nvSpPr>
         <p:spPr>
           <a:xfrm>
-            <a:off x="8810785" y="4483812"/>
+            <a:off x="8810785" y="4644558"/>
             <a:ext cx="785792" cy="400110"/>
           </a:xfrm>
           <a:prstGeom prst="rect">
@@ -30113,7 +30154,7 @@
         </p:nvGrpSpPr>
         <p:grpSpPr>
           <a:xfrm>
-            <a:off x="735752" y="7768674"/>
+            <a:off x="735752" y="7929420"/>
             <a:ext cx="445844" cy="603379"/>
             <a:chOff x="8232155" y="587661"/>
             <a:chExt cx="445844" cy="603379"/>
@@ -30223,7 +30264,7 @@
         </p:nvGrpSpPr>
         <p:grpSpPr>
           <a:xfrm>
-            <a:off x="735752" y="8548857"/>
+            <a:off x="735752" y="8709603"/>
             <a:ext cx="445844" cy="603379"/>
             <a:chOff x="8232155" y="587661"/>
             <a:chExt cx="445844" cy="603379"/>
@@ -30333,7 +30374,7 @@
         </p:nvSpPr>
         <p:spPr>
           <a:xfrm>
-            <a:off x="561771" y="9193007"/>
+            <a:off x="561771" y="9353753"/>
             <a:ext cx="793807" cy="400110"/>
           </a:xfrm>
           <a:prstGeom prst="rect">
@@ -30383,7 +30424,7 @@
         </p:nvSpPr>
         <p:spPr>
           <a:xfrm>
-            <a:off x="561771" y="7356659"/>
+            <a:off x="561771" y="7517405"/>
             <a:ext cx="793807" cy="400110"/>
           </a:xfrm>
           <a:prstGeom prst="rect">
@@ -31862,7 +31903,7 @@
         </p:nvSpPr>
         <p:spPr>
           <a:xfrm>
-            <a:off x="4042248" y="2744819"/>
+            <a:off x="4042248" y="2917056"/>
             <a:ext cx="1808756" cy="237548"/>
           </a:xfrm>
           <a:prstGeom prst="roundRect">
@@ -31929,7 +31970,7 @@
         </p:nvSpPr>
         <p:spPr>
           <a:xfrm>
-            <a:off x="3885154" y="2388914"/>
+            <a:off x="3885154" y="2561151"/>
             <a:ext cx="1965850" cy="237548"/>
           </a:xfrm>
           <a:prstGeom prst="roundRect">
@@ -32029,7 +32070,7 @@
         </p:nvCxnSpPr>
         <p:spPr>
           <a:xfrm>
-            <a:off x="5851004" y="2507688"/>
+            <a:off x="5851004" y="2679925"/>
             <a:ext cx="290240" cy="116450"/>
           </a:xfrm>
           <a:prstGeom prst="straightConnector1">
@@ -32039,7 +32080,7 @@
             <a:solidFill>
               <a:schemeClr val="tx1"/>
             </a:solidFill>
-            <a:prstDash val="dash"/>
+            <a:prstDash val="sysDot"/>
             <a:tailEnd type="none" w="sm" len="sm"/>
           </a:ln>
         </p:spPr>
@@ -32068,7 +32109,7 @@
         </p:nvCxnSpPr>
         <p:spPr>
           <a:xfrm flipV="1">
-            <a:off x="5851004" y="2863453"/>
+            <a:off x="5851004" y="3035690"/>
             <a:ext cx="291430" cy="140"/>
           </a:xfrm>
           <a:prstGeom prst="straightConnector1">
@@ -32078,7 +32119,7 @@
             <a:solidFill>
               <a:schemeClr val="tx1"/>
             </a:solidFill>
-            <a:prstDash val="dash"/>
+            <a:prstDash val="sysDot"/>
             <a:tailEnd type="none" w="sm" len="sm"/>
           </a:ln>
         </p:spPr>

</xml_diff>

<commit_message>
Update to match the recent PAO changes
</commit_message>
<xml_diff>
--- a/saturn/saturn-authorization.pptx
+++ b/saturn/saturn-authorization.pptx
@@ -24094,6 +24094,115 @@
           <a:chExt cx="0" cy="0"/>
         </a:xfrm>
       </p:grpSpPr>
+      <p:sp>
+        <p:nvSpPr>
+          <p:cNvPr id="3" name="Rectangle 2"/>
+          <p:cNvSpPr/>
+          <p:nvPr/>
+        </p:nvSpPr>
+        <p:spPr>
+          <a:xfrm>
+            <a:off x="9128603" y="1035194"/>
+            <a:ext cx="396000" cy="2088000"/>
+          </a:xfrm>
+          <a:custGeom>
+            <a:avLst/>
+            <a:gdLst>
+              <a:gd name="connsiteX0" fmla="*/ 0 w 689979"/>
+              <a:gd name="connsiteY0" fmla="*/ 0 h 443132"/>
+              <a:gd name="connsiteX1" fmla="*/ 689979 w 689979"/>
+              <a:gd name="connsiteY1" fmla="*/ 0 h 443132"/>
+              <a:gd name="connsiteX2" fmla="*/ 689979 w 689979"/>
+              <a:gd name="connsiteY2" fmla="*/ 443132 h 443132"/>
+              <a:gd name="connsiteX3" fmla="*/ 0 w 689979"/>
+              <a:gd name="connsiteY3" fmla="*/ 443132 h 443132"/>
+              <a:gd name="connsiteX4" fmla="*/ 0 w 689979"/>
+              <a:gd name="connsiteY4" fmla="*/ 0 h 443132"/>
+              <a:gd name="connsiteX0" fmla="*/ 0 w 689979"/>
+              <a:gd name="connsiteY0" fmla="*/ 0 h 443132"/>
+              <a:gd name="connsiteX1" fmla="*/ 689979 w 689979"/>
+              <a:gd name="connsiteY1" fmla="*/ 0 h 443132"/>
+              <a:gd name="connsiteX2" fmla="*/ 689979 w 689979"/>
+              <a:gd name="connsiteY2" fmla="*/ 443132 h 443132"/>
+              <a:gd name="connsiteX3" fmla="*/ 0 w 689979"/>
+              <a:gd name="connsiteY3" fmla="*/ 443132 h 443132"/>
+              <a:gd name="connsiteX4" fmla="*/ 91440 w 689979"/>
+              <a:gd name="connsiteY4" fmla="*/ 91440 h 443132"/>
+              <a:gd name="connsiteX0" fmla="*/ 0 w 689979"/>
+              <a:gd name="connsiteY0" fmla="*/ 0 h 443132"/>
+              <a:gd name="connsiteX1" fmla="*/ 689979 w 689979"/>
+              <a:gd name="connsiteY1" fmla="*/ 0 h 443132"/>
+              <a:gd name="connsiteX2" fmla="*/ 689979 w 689979"/>
+              <a:gd name="connsiteY2" fmla="*/ 443132 h 443132"/>
+              <a:gd name="connsiteX3" fmla="*/ 0 w 689979"/>
+              <a:gd name="connsiteY3" fmla="*/ 443132 h 443132"/>
+            </a:gdLst>
+            <a:ahLst/>
+            <a:cxnLst>
+              <a:cxn ang="0">
+                <a:pos x="connsiteX0" y="connsiteY0"/>
+              </a:cxn>
+              <a:cxn ang="0">
+                <a:pos x="connsiteX1" y="connsiteY1"/>
+              </a:cxn>
+              <a:cxn ang="0">
+                <a:pos x="connsiteX2" y="connsiteY2"/>
+              </a:cxn>
+              <a:cxn ang="0">
+                <a:pos x="connsiteX3" y="connsiteY3"/>
+              </a:cxn>
+            </a:cxnLst>
+            <a:rect l="l" t="t" r="r" b="b"/>
+            <a:pathLst>
+              <a:path w="689979" h="443132">
+                <a:moveTo>
+                  <a:pt x="0" y="0"/>
+                </a:moveTo>
+                <a:lnTo>
+                  <a:pt x="689979" y="0"/>
+                </a:lnTo>
+                <a:lnTo>
+                  <a:pt x="689979" y="443132"/>
+                </a:lnTo>
+                <a:lnTo>
+                  <a:pt x="0" y="443132"/>
+                </a:lnTo>
+              </a:path>
+            </a:pathLst>
+          </a:custGeom>
+          <a:noFill/>
+          <a:ln w="3175">
+            <a:solidFill>
+              <a:schemeClr val="tx1"/>
+            </a:solidFill>
+            <a:prstDash val="sysDot"/>
+          </a:ln>
+        </p:spPr>
+        <p:style>
+          <a:lnRef idx="2">
+            <a:schemeClr val="accent1">
+              <a:shade val="50000"/>
+            </a:schemeClr>
+          </a:lnRef>
+          <a:fillRef idx="1">
+            <a:schemeClr val="accent1"/>
+          </a:fillRef>
+          <a:effectRef idx="0">
+            <a:schemeClr val="accent1"/>
+          </a:effectRef>
+          <a:fontRef idx="minor">
+            <a:schemeClr val="lt1"/>
+          </a:fontRef>
+        </p:style>
+        <p:txBody>
+          <a:bodyPr rtlCol="0" anchor="ctr"/>
+          <a:lstStyle/>
+          <a:p>
+            <a:pPr algn="ctr"/>
+            <a:endParaRPr lang="en-US"/>
+          </a:p>
+        </p:txBody>
+      </p:sp>
       <p:cxnSp>
         <p:nvCxnSpPr>
           <p:cNvPr id="920" name="Straight Arrow Connector 919"/>
@@ -24261,7 +24370,7 @@
         </p:nvCxnSpPr>
         <p:spPr>
           <a:xfrm flipH="1">
-            <a:off x="1623961" y="7945296"/>
+            <a:off x="1623961" y="7784550"/>
             <a:ext cx="6318000" cy="0"/>
           </a:xfrm>
           <a:prstGeom prst="straightConnector1">
@@ -24301,7 +24410,7 @@
         </p:nvCxnSpPr>
         <p:spPr>
           <a:xfrm>
-            <a:off x="1602532" y="8241712"/>
+            <a:off x="1602532" y="8080966"/>
             <a:ext cx="6318000" cy="0"/>
           </a:xfrm>
           <a:prstGeom prst="straightConnector1">
@@ -24341,7 +24450,7 @@
         </p:nvCxnSpPr>
         <p:spPr>
           <a:xfrm flipH="1">
-            <a:off x="1623961" y="8737384"/>
+            <a:off x="1623961" y="8576638"/>
             <a:ext cx="6318000" cy="0"/>
           </a:xfrm>
           <a:prstGeom prst="straightConnector1">
@@ -24381,7 +24490,7 @@
         </p:nvCxnSpPr>
         <p:spPr>
           <a:xfrm>
-            <a:off x="1602532" y="9033800"/>
+            <a:off x="1602532" y="8873054"/>
             <a:ext cx="6318000" cy="0"/>
           </a:xfrm>
           <a:prstGeom prst="straightConnector1">
@@ -24421,7 +24530,7 @@
         </p:nvSpPr>
         <p:spPr>
           <a:xfrm flipH="1">
-            <a:off x="7031663" y="8601752"/>
+            <a:off x="7031663" y="8441006"/>
             <a:ext cx="902811" cy="246221"/>
           </a:xfrm>
           <a:prstGeom prst="rect">
@@ -24466,7 +24575,7 @@
         </p:nvSpPr>
         <p:spPr>
           <a:xfrm flipH="1">
-            <a:off x="7031663" y="7809664"/>
+            <a:off x="7031663" y="7648918"/>
             <a:ext cx="902811" cy="246221"/>
           </a:xfrm>
           <a:prstGeom prst="rect">
@@ -25008,7 +25117,7 @@
         </p:nvCxnSpPr>
         <p:spPr>
           <a:xfrm>
-            <a:off x="376834" y="4983327"/>
+            <a:off x="376834" y="4917329"/>
             <a:ext cx="0" cy="684000"/>
           </a:xfrm>
           <a:prstGeom prst="line">
@@ -25046,7 +25155,7 @@
         </p:nvCxnSpPr>
         <p:spPr>
           <a:xfrm>
-            <a:off x="3784197" y="7155142"/>
+            <a:off x="3784197" y="6994396"/>
             <a:ext cx="4140000" cy="0"/>
           </a:xfrm>
           <a:prstGeom prst="straightConnector1">
@@ -25077,332 +25186,13 @@
       </p:cxnSp>
       <p:sp>
         <p:nvSpPr>
-          <p:cNvPr id="840" name="Freeform 839"/>
-          <p:cNvSpPr/>
-          <p:nvPr/>
-        </p:nvSpPr>
-        <p:spPr>
-          <a:xfrm rot="2212763">
-            <a:off x="8550324" y="1119201"/>
-            <a:ext cx="1548000" cy="1959823"/>
-          </a:xfrm>
-          <a:custGeom>
-            <a:avLst/>
-            <a:gdLst>
-              <a:gd name="connsiteX0" fmla="*/ 0 w 159026"/>
-              <a:gd name="connsiteY0" fmla="*/ 0 h 0"/>
-              <a:gd name="connsiteX1" fmla="*/ 159026 w 159026"/>
-              <a:gd name="connsiteY1" fmla="*/ 0 h 0"/>
-              <a:gd name="connsiteX0" fmla="*/ 0 w 10000"/>
-              <a:gd name="connsiteY0" fmla="*/ 0 h 453"/>
-              <a:gd name="connsiteX1" fmla="*/ 3966 w 10000"/>
-              <a:gd name="connsiteY1" fmla="*/ 453 h 453"/>
-              <a:gd name="connsiteX2" fmla="*/ 10000 w 10000"/>
-              <a:gd name="connsiteY2" fmla="*/ 0 h 453"/>
-              <a:gd name="connsiteX0" fmla="*/ 0 w 10543"/>
-              <a:gd name="connsiteY0" fmla="*/ 0 h 167832"/>
-              <a:gd name="connsiteX1" fmla="*/ 3966 w 10543"/>
-              <a:gd name="connsiteY1" fmla="*/ 10000 h 167832"/>
-              <a:gd name="connsiteX2" fmla="*/ 10183 w 10543"/>
-              <a:gd name="connsiteY2" fmla="*/ 167819 h 167832"/>
-              <a:gd name="connsiteX3" fmla="*/ 10000 w 10543"/>
-              <a:gd name="connsiteY3" fmla="*/ 0 h 167832"/>
-              <a:gd name="connsiteX0" fmla="*/ 0 w 63618"/>
-              <a:gd name="connsiteY0" fmla="*/ 0 h 1383313"/>
-              <a:gd name="connsiteX1" fmla="*/ 3966 w 63618"/>
-              <a:gd name="connsiteY1" fmla="*/ 10000 h 1383313"/>
-              <a:gd name="connsiteX2" fmla="*/ 10183 w 63618"/>
-              <a:gd name="connsiteY2" fmla="*/ 167819 h 1383313"/>
-              <a:gd name="connsiteX3" fmla="*/ 63618 w 63618"/>
-              <a:gd name="connsiteY3" fmla="*/ 1383313 h 1383313"/>
-              <a:gd name="connsiteX0" fmla="*/ 0 w 63618"/>
-              <a:gd name="connsiteY0" fmla="*/ 0 h 1383313"/>
-              <a:gd name="connsiteX1" fmla="*/ 3966 w 63618"/>
-              <a:gd name="connsiteY1" fmla="*/ 10000 h 1383313"/>
-              <a:gd name="connsiteX2" fmla="*/ 63618 w 63618"/>
-              <a:gd name="connsiteY2" fmla="*/ 1383313 h 1383313"/>
-              <a:gd name="connsiteX0" fmla="*/ 0 w 74268"/>
-              <a:gd name="connsiteY0" fmla="*/ 191618 h 1373313"/>
-              <a:gd name="connsiteX1" fmla="*/ 14616 w 74268"/>
-              <a:gd name="connsiteY1" fmla="*/ 0 h 1373313"/>
-              <a:gd name="connsiteX2" fmla="*/ 74268 w 74268"/>
-              <a:gd name="connsiteY2" fmla="*/ 1373313 h 1373313"/>
-              <a:gd name="connsiteX0" fmla="*/ 0 w 74268"/>
-              <a:gd name="connsiteY0" fmla="*/ 188147 h 1369842"/>
-              <a:gd name="connsiteX1" fmla="*/ 14843 w 74268"/>
-              <a:gd name="connsiteY1" fmla="*/ 0 h 1369842"/>
-              <a:gd name="connsiteX2" fmla="*/ 74268 w 74268"/>
-              <a:gd name="connsiteY2" fmla="*/ 1369842 h 1369842"/>
-              <a:gd name="connsiteX0" fmla="*/ 0 w 74268"/>
-              <a:gd name="connsiteY0" fmla="*/ 188147 h 1369842"/>
-              <a:gd name="connsiteX1" fmla="*/ 14843 w 74268"/>
-              <a:gd name="connsiteY1" fmla="*/ 0 h 1369842"/>
-              <a:gd name="connsiteX2" fmla="*/ 74268 w 74268"/>
-              <a:gd name="connsiteY2" fmla="*/ 1369842 h 1369842"/>
-              <a:gd name="connsiteX0" fmla="*/ 0 w 74268"/>
-              <a:gd name="connsiteY0" fmla="*/ 188147 h 1369842"/>
-              <a:gd name="connsiteX1" fmla="*/ 14843 w 74268"/>
-              <a:gd name="connsiteY1" fmla="*/ 0 h 1369842"/>
-              <a:gd name="connsiteX2" fmla="*/ 67291 w 74268"/>
-              <a:gd name="connsiteY2" fmla="*/ 1210006 h 1369842"/>
-              <a:gd name="connsiteX3" fmla="*/ 74268 w 74268"/>
-              <a:gd name="connsiteY3" fmla="*/ 1369842 h 1369842"/>
-              <a:gd name="connsiteX0" fmla="*/ 0 w 70543"/>
-              <a:gd name="connsiteY0" fmla="*/ 188147 h 1551650"/>
-              <a:gd name="connsiteX1" fmla="*/ 14843 w 70543"/>
-              <a:gd name="connsiteY1" fmla="*/ 0 h 1551650"/>
-              <a:gd name="connsiteX2" fmla="*/ 67291 w 70543"/>
-              <a:gd name="connsiteY2" fmla="*/ 1210006 h 1551650"/>
-              <a:gd name="connsiteX3" fmla="*/ 62375 w 70543"/>
-              <a:gd name="connsiteY3" fmla="*/ 1551650 h 1551650"/>
-              <a:gd name="connsiteX0" fmla="*/ 0 w 73012"/>
-              <a:gd name="connsiteY0" fmla="*/ 188147 h 1551650"/>
-              <a:gd name="connsiteX1" fmla="*/ 14843 w 73012"/>
-              <a:gd name="connsiteY1" fmla="*/ 0 h 1551650"/>
-              <a:gd name="connsiteX2" fmla="*/ 67291 w 73012"/>
-              <a:gd name="connsiteY2" fmla="*/ 1210006 h 1551650"/>
-              <a:gd name="connsiteX3" fmla="*/ 62375 w 73012"/>
-              <a:gd name="connsiteY3" fmla="*/ 1551650 h 1551650"/>
-              <a:gd name="connsiteX0" fmla="*/ 0 w 77152"/>
-              <a:gd name="connsiteY0" fmla="*/ 188147 h 1551650"/>
-              <a:gd name="connsiteX1" fmla="*/ 14843 w 77152"/>
-              <a:gd name="connsiteY1" fmla="*/ 0 h 1551650"/>
-              <a:gd name="connsiteX2" fmla="*/ 72995 w 77152"/>
-              <a:gd name="connsiteY2" fmla="*/ 1329675 h 1551650"/>
-              <a:gd name="connsiteX3" fmla="*/ 62375 w 77152"/>
-              <a:gd name="connsiteY3" fmla="*/ 1551650 h 1551650"/>
-              <a:gd name="connsiteX0" fmla="*/ 0 w 77152"/>
-              <a:gd name="connsiteY0" fmla="*/ 188147 h 1551650"/>
-              <a:gd name="connsiteX1" fmla="*/ 14843 w 77152"/>
-              <a:gd name="connsiteY1" fmla="*/ 0 h 1551650"/>
-              <a:gd name="connsiteX2" fmla="*/ 72995 w 77152"/>
-              <a:gd name="connsiteY2" fmla="*/ 1329675 h 1551650"/>
-              <a:gd name="connsiteX3" fmla="*/ 62375 w 77152"/>
-              <a:gd name="connsiteY3" fmla="*/ 1551650 h 1551650"/>
-              <a:gd name="connsiteX0" fmla="*/ 0 w 77348"/>
-              <a:gd name="connsiteY0" fmla="*/ 188147 h 1551650"/>
-              <a:gd name="connsiteX1" fmla="*/ 14843 w 77348"/>
-              <a:gd name="connsiteY1" fmla="*/ 0 h 1551650"/>
-              <a:gd name="connsiteX2" fmla="*/ 72995 w 77348"/>
-              <a:gd name="connsiteY2" fmla="*/ 1329675 h 1551650"/>
-              <a:gd name="connsiteX3" fmla="*/ 62375 w 77348"/>
-              <a:gd name="connsiteY3" fmla="*/ 1551650 h 1551650"/>
-              <a:gd name="connsiteX0" fmla="*/ 0 w 73125"/>
-              <a:gd name="connsiteY0" fmla="*/ 188147 h 1551650"/>
-              <a:gd name="connsiteX1" fmla="*/ 14843 w 73125"/>
-              <a:gd name="connsiteY1" fmla="*/ 0 h 1551650"/>
-              <a:gd name="connsiteX2" fmla="*/ 72995 w 73125"/>
-              <a:gd name="connsiteY2" fmla="*/ 1329675 h 1551650"/>
-              <a:gd name="connsiteX3" fmla="*/ 62375 w 73125"/>
-              <a:gd name="connsiteY3" fmla="*/ 1551650 h 1551650"/>
-              <a:gd name="connsiteX0" fmla="*/ 0 w 73125"/>
-              <a:gd name="connsiteY0" fmla="*/ 188147 h 1551650"/>
-              <a:gd name="connsiteX1" fmla="*/ 14843 w 73125"/>
-              <a:gd name="connsiteY1" fmla="*/ 0 h 1551650"/>
-              <a:gd name="connsiteX2" fmla="*/ 72995 w 73125"/>
-              <a:gd name="connsiteY2" fmla="*/ 1329675 h 1551650"/>
-              <a:gd name="connsiteX3" fmla="*/ 62375 w 73125"/>
-              <a:gd name="connsiteY3" fmla="*/ 1551650 h 1551650"/>
-              <a:gd name="connsiteX0" fmla="*/ 0 w 73055"/>
-              <a:gd name="connsiteY0" fmla="*/ 188147 h 1551650"/>
-              <a:gd name="connsiteX1" fmla="*/ 14843 w 73055"/>
-              <a:gd name="connsiteY1" fmla="*/ 0 h 1551650"/>
-              <a:gd name="connsiteX2" fmla="*/ 72995 w 73055"/>
-              <a:gd name="connsiteY2" fmla="*/ 1329675 h 1551650"/>
-              <a:gd name="connsiteX3" fmla="*/ 62375 w 73055"/>
-              <a:gd name="connsiteY3" fmla="*/ 1551650 h 1551650"/>
-              <a:gd name="connsiteX0" fmla="*/ 0 w 72995"/>
-              <a:gd name="connsiteY0" fmla="*/ 188147 h 1551650"/>
-              <a:gd name="connsiteX1" fmla="*/ 14843 w 72995"/>
-              <a:gd name="connsiteY1" fmla="*/ 0 h 1551650"/>
-              <a:gd name="connsiteX2" fmla="*/ 72995 w 72995"/>
-              <a:gd name="connsiteY2" fmla="*/ 1329675 h 1551650"/>
-              <a:gd name="connsiteX3" fmla="*/ 62375 w 72995"/>
-              <a:gd name="connsiteY3" fmla="*/ 1551650 h 1551650"/>
-              <a:gd name="connsiteX0" fmla="*/ 0 w 72995"/>
-              <a:gd name="connsiteY0" fmla="*/ 188147 h 1551650"/>
-              <a:gd name="connsiteX1" fmla="*/ 14843 w 72995"/>
-              <a:gd name="connsiteY1" fmla="*/ 0 h 1551650"/>
-              <a:gd name="connsiteX2" fmla="*/ 72995 w 72995"/>
-              <a:gd name="connsiteY2" fmla="*/ 1329675 h 1551650"/>
-              <a:gd name="connsiteX3" fmla="*/ 62375 w 72995"/>
-              <a:gd name="connsiteY3" fmla="*/ 1551650 h 1551650"/>
-              <a:gd name="connsiteX0" fmla="*/ 0 w 75183"/>
-              <a:gd name="connsiteY0" fmla="*/ 188147 h 1551650"/>
-              <a:gd name="connsiteX1" fmla="*/ 14843 w 75183"/>
-              <a:gd name="connsiteY1" fmla="*/ 0 h 1551650"/>
-              <a:gd name="connsiteX2" fmla="*/ 75183 w 75183"/>
-              <a:gd name="connsiteY2" fmla="*/ 1374399 h 1551650"/>
-              <a:gd name="connsiteX3" fmla="*/ 62375 w 75183"/>
-              <a:gd name="connsiteY3" fmla="*/ 1551650 h 1551650"/>
-              <a:gd name="connsiteX0" fmla="*/ 0 w 75506"/>
-              <a:gd name="connsiteY0" fmla="*/ 188147 h 1551650"/>
-              <a:gd name="connsiteX1" fmla="*/ 14843 w 75506"/>
-              <a:gd name="connsiteY1" fmla="*/ 0 h 1551650"/>
-              <a:gd name="connsiteX2" fmla="*/ 75506 w 75506"/>
-              <a:gd name="connsiteY2" fmla="*/ 1386857 h 1551650"/>
-              <a:gd name="connsiteX3" fmla="*/ 62375 w 75506"/>
-              <a:gd name="connsiteY3" fmla="*/ 1551650 h 1551650"/>
-              <a:gd name="connsiteX0" fmla="*/ 0 w 75506"/>
-              <a:gd name="connsiteY0" fmla="*/ 188147 h 1551650"/>
-              <a:gd name="connsiteX1" fmla="*/ 14843 w 75506"/>
-              <a:gd name="connsiteY1" fmla="*/ 0 h 1551650"/>
-              <a:gd name="connsiteX2" fmla="*/ 75506 w 75506"/>
-              <a:gd name="connsiteY2" fmla="*/ 1386857 h 1551650"/>
-              <a:gd name="connsiteX3" fmla="*/ 62375 w 75506"/>
-              <a:gd name="connsiteY3" fmla="*/ 1551650 h 1551650"/>
-              <a:gd name="connsiteX0" fmla="*/ 0 w 75506"/>
-              <a:gd name="connsiteY0" fmla="*/ 188147 h 1600884"/>
-              <a:gd name="connsiteX1" fmla="*/ 14843 w 75506"/>
-              <a:gd name="connsiteY1" fmla="*/ 0 h 1600884"/>
-              <a:gd name="connsiteX2" fmla="*/ 75506 w 75506"/>
-              <a:gd name="connsiteY2" fmla="*/ 1386857 h 1600884"/>
-              <a:gd name="connsiteX3" fmla="*/ 58335 w 75506"/>
-              <a:gd name="connsiteY3" fmla="*/ 1600884 h 1600884"/>
-              <a:gd name="connsiteX0" fmla="*/ 0 w 75506"/>
-              <a:gd name="connsiteY0" fmla="*/ 188147 h 1600884"/>
-              <a:gd name="connsiteX1" fmla="*/ 14843 w 75506"/>
-              <a:gd name="connsiteY1" fmla="*/ 0 h 1600884"/>
-              <a:gd name="connsiteX2" fmla="*/ 75506 w 75506"/>
-              <a:gd name="connsiteY2" fmla="*/ 1386857 h 1600884"/>
-              <a:gd name="connsiteX3" fmla="*/ 58335 w 75506"/>
-              <a:gd name="connsiteY3" fmla="*/ 1600884 h 1600884"/>
-              <a:gd name="connsiteX0" fmla="*/ 0 w 75506"/>
-              <a:gd name="connsiteY0" fmla="*/ 188147 h 1600884"/>
-              <a:gd name="connsiteX1" fmla="*/ 14843 w 75506"/>
-              <a:gd name="connsiteY1" fmla="*/ 0 h 1600884"/>
-              <a:gd name="connsiteX2" fmla="*/ 75506 w 75506"/>
-              <a:gd name="connsiteY2" fmla="*/ 1386857 h 1600884"/>
-              <a:gd name="connsiteX3" fmla="*/ 58335 w 75506"/>
-              <a:gd name="connsiteY3" fmla="*/ 1600884 h 1600884"/>
-              <a:gd name="connsiteX0" fmla="*/ 0 w 75506"/>
-              <a:gd name="connsiteY0" fmla="*/ 188147 h 1600884"/>
-              <a:gd name="connsiteX1" fmla="*/ 14843 w 75506"/>
-              <a:gd name="connsiteY1" fmla="*/ 0 h 1600884"/>
-              <a:gd name="connsiteX2" fmla="*/ 75506 w 75506"/>
-              <a:gd name="connsiteY2" fmla="*/ 1386857 h 1600884"/>
-              <a:gd name="connsiteX3" fmla="*/ 58335 w 75506"/>
-              <a:gd name="connsiteY3" fmla="*/ 1600884 h 1600884"/>
-              <a:gd name="connsiteX0" fmla="*/ 0 w 75506"/>
-              <a:gd name="connsiteY0" fmla="*/ 188147 h 1622537"/>
-              <a:gd name="connsiteX1" fmla="*/ 14843 w 75506"/>
-              <a:gd name="connsiteY1" fmla="*/ 0 h 1622537"/>
-              <a:gd name="connsiteX2" fmla="*/ 75506 w 75506"/>
-              <a:gd name="connsiteY2" fmla="*/ 1386857 h 1622537"/>
-              <a:gd name="connsiteX3" fmla="*/ 57044 w 75506"/>
-              <a:gd name="connsiteY3" fmla="*/ 1622537 h 1622537"/>
-              <a:gd name="connsiteX0" fmla="*/ 0 w 75506"/>
-              <a:gd name="connsiteY0" fmla="*/ 188147 h 1621312"/>
-              <a:gd name="connsiteX1" fmla="*/ 14843 w 75506"/>
-              <a:gd name="connsiteY1" fmla="*/ 0 h 1621312"/>
-              <a:gd name="connsiteX2" fmla="*/ 75506 w 75506"/>
-              <a:gd name="connsiteY2" fmla="*/ 1386857 h 1621312"/>
-              <a:gd name="connsiteX3" fmla="*/ 56841 w 75506"/>
-              <a:gd name="connsiteY3" fmla="*/ 1621312 h 1621312"/>
-              <a:gd name="connsiteX0" fmla="*/ 0 w 75506"/>
-              <a:gd name="connsiteY0" fmla="*/ 188147 h 1621312"/>
-              <a:gd name="connsiteX1" fmla="*/ 14843 w 75506"/>
-              <a:gd name="connsiteY1" fmla="*/ 0 h 1621312"/>
-              <a:gd name="connsiteX2" fmla="*/ 75506 w 75506"/>
-              <a:gd name="connsiteY2" fmla="*/ 1386857 h 1621312"/>
-              <a:gd name="connsiteX3" fmla="*/ 56841 w 75506"/>
-              <a:gd name="connsiteY3" fmla="*/ 1621312 h 1621312"/>
-              <a:gd name="connsiteX0" fmla="*/ 0 w 75506"/>
-              <a:gd name="connsiteY0" fmla="*/ 188147 h 1621312"/>
-              <a:gd name="connsiteX1" fmla="*/ 14843 w 75506"/>
-              <a:gd name="connsiteY1" fmla="*/ 0 h 1621312"/>
-              <a:gd name="connsiteX2" fmla="*/ 75506 w 75506"/>
-              <a:gd name="connsiteY2" fmla="*/ 1386857 h 1621312"/>
-              <a:gd name="connsiteX3" fmla="*/ 56841 w 75506"/>
-              <a:gd name="connsiteY3" fmla="*/ 1621312 h 1621312"/>
-              <a:gd name="connsiteX0" fmla="*/ 0 w 75470"/>
-              <a:gd name="connsiteY0" fmla="*/ 188147 h 1621312"/>
-              <a:gd name="connsiteX1" fmla="*/ 14843 w 75470"/>
-              <a:gd name="connsiteY1" fmla="*/ 0 h 1621312"/>
-              <a:gd name="connsiteX2" fmla="*/ 75470 w 75470"/>
-              <a:gd name="connsiteY2" fmla="*/ 1386040 h 1621312"/>
-              <a:gd name="connsiteX3" fmla="*/ 56841 w 75470"/>
-              <a:gd name="connsiteY3" fmla="*/ 1621312 h 1621312"/>
-            </a:gdLst>
-            <a:ahLst/>
-            <a:cxnLst>
-              <a:cxn ang="0">
-                <a:pos x="connsiteX0" y="connsiteY0"/>
-              </a:cxn>
-              <a:cxn ang="0">
-                <a:pos x="connsiteX1" y="connsiteY1"/>
-              </a:cxn>
-              <a:cxn ang="0">
-                <a:pos x="connsiteX2" y="connsiteY2"/>
-              </a:cxn>
-              <a:cxn ang="0">
-                <a:pos x="connsiteX3" y="connsiteY3"/>
-              </a:cxn>
-            </a:cxnLst>
-            <a:rect l="l" t="t" r="r" b="b"/>
-            <a:pathLst>
-              <a:path w="75470" h="1621312">
-                <a:moveTo>
-                  <a:pt x="0" y="188147"/>
-                </a:moveTo>
-                <a:lnTo>
-                  <a:pt x="14843" y="0"/>
-                </a:lnTo>
-                <a:cubicBezTo>
-                  <a:pt x="40474" y="581953"/>
-                  <a:pt x="75534" y="1383067"/>
-                  <a:pt x="75470" y="1386040"/>
-                </a:cubicBezTo>
-                <a:cubicBezTo>
-                  <a:pt x="75430" y="1386220"/>
-                  <a:pt x="66879" y="1495791"/>
-                  <a:pt x="56841" y="1621312"/>
-                </a:cubicBezTo>
-              </a:path>
-            </a:pathLst>
-          </a:custGeom>
-          <a:noFill/>
-          <a:ln w="3175">
-            <a:solidFill>
-              <a:schemeClr val="tx1"/>
-            </a:solidFill>
-            <a:prstDash val="sysDot"/>
-          </a:ln>
-        </p:spPr>
-        <p:style>
-          <a:lnRef idx="2">
-            <a:schemeClr val="accent1">
-              <a:shade val="50000"/>
-            </a:schemeClr>
-          </a:lnRef>
-          <a:fillRef idx="1">
-            <a:schemeClr val="accent1"/>
-          </a:fillRef>
-          <a:effectRef idx="0">
-            <a:schemeClr val="accent1"/>
-          </a:effectRef>
-          <a:fontRef idx="minor">
-            <a:schemeClr val="lt1"/>
-          </a:fontRef>
-        </p:style>
-        <p:txBody>
-          <a:bodyPr rtlCol="0" anchor="ctr"/>
-          <a:lstStyle/>
-          <a:p>
-            <a:pPr algn="ctr"/>
-            <a:endParaRPr lang="en-US"/>
-          </a:p>
-        </p:txBody>
-      </p:sp>
-      <p:sp>
-        <p:nvSpPr>
           <p:cNvPr id="841" name="TextBox 840"/>
           <p:cNvSpPr txBox="1"/>
           <p:nvPr/>
         </p:nvSpPr>
         <p:spPr>
           <a:xfrm>
-            <a:off x="5006692" y="6877576"/>
+            <a:off x="5006692" y="6716830"/>
             <a:ext cx="1889235" cy="276999"/>
           </a:xfrm>
           <a:prstGeom prst="rect">
@@ -26239,7 +26029,7 @@
         </p:blipFill>
         <p:spPr bwMode="auto">
           <a:xfrm>
-            <a:off x="2925412" y="6963070"/>
+            <a:off x="2925412" y="6802324"/>
             <a:ext cx="360040" cy="356341"/>
           </a:xfrm>
           <a:prstGeom prst="rect">
@@ -26278,7 +26068,7 @@
         </p:nvSpPr>
         <p:spPr>
           <a:xfrm>
-            <a:off x="8117877" y="8731535"/>
+            <a:off x="8117877" y="8756873"/>
             <a:ext cx="1117343" cy="241931"/>
           </a:xfrm>
           <a:prstGeom prst="roundRect">
@@ -26420,7 +26210,7 @@
         </p:nvSpPr>
         <p:spPr>
           <a:xfrm>
-            <a:off x="4729667" y="6871372"/>
+            <a:off x="4729667" y="6710626"/>
             <a:ext cx="389850" cy="276999"/>
           </a:xfrm>
           <a:prstGeom prst="rect">
@@ -26501,7 +26291,7 @@
         </p:blipFill>
         <p:spPr bwMode="auto">
           <a:xfrm rot="10800000">
-            <a:off x="6373684" y="503981"/>
+            <a:off x="6373684" y="499779"/>
             <a:ext cx="355673" cy="502719"/>
           </a:xfrm>
           <a:prstGeom prst="rect">
@@ -26534,7 +26324,7 @@
         </p:nvSpPr>
         <p:spPr>
           <a:xfrm>
-            <a:off x="5254822" y="7149503"/>
+            <a:off x="5254822" y="6988757"/>
             <a:ext cx="1074333" cy="246221"/>
           </a:xfrm>
           <a:prstGeom prst="rect">
@@ -26718,76 +26508,6 @@
           </a:p>
         </p:txBody>
       </p:sp>
-      <p:pic>
-        <p:nvPicPr>
-          <p:cNvPr id="880" name="Picture 8" descr="key"/>
-          <p:cNvPicPr>
-            <a:picLocks noChangeAspect="1" noChangeArrowheads="1"/>
-          </p:cNvPicPr>
-          <p:nvPr/>
-        </p:nvPicPr>
-        <p:blipFill>
-          <a:blip r:embed="rId8">
-            <a:duotone>
-              <a:prstClr val="black"/>
-              <a:srgbClr val="D9C3A5">
-                <a:tint val="50000"/>
-                <a:satMod val="180000"/>
-              </a:srgbClr>
-            </a:duotone>
-            <a:extLst>
-              <a:ext uri="{BEBA8EAE-BF5A-486C-A8C5-ECC9F3942E4B}">
-                <a14:imgProps xmlns:a14="http://schemas.microsoft.com/office/drawing/2010/main">
-                  <a14:imgLayer r:embed="rId5">
-                    <a14:imgEffect>
-                      <a14:saturation sat="182000"/>
-                    </a14:imgEffect>
-                  </a14:imgLayer>
-                </a14:imgProps>
-              </a:ext>
-              <a:ext uri="{28A0092B-C50C-407E-A947-70E740481C1C}">
-                <a14:useLocalDpi xmlns:a14="http://schemas.microsoft.com/office/drawing/2010/main" val="0"/>
-              </a:ext>
-            </a:extLst>
-          </a:blip>
-          <a:srcRect/>
-          <a:stretch>
-            <a:fillRect/>
-          </a:stretch>
-        </p:blipFill>
-        <p:spPr bwMode="auto">
-          <a:xfrm>
-            <a:off x="8984159" y="2964265"/>
-            <a:ext cx="360040" cy="356341"/>
-          </a:xfrm>
-          <a:prstGeom prst="rect">
-            <a:avLst/>
-          </a:prstGeom>
-          <a:noFill/>
-          <a:ln>
-            <a:noFill/>
-          </a:ln>
-          <a:extLst>
-            <a:ext uri="{909E8E84-426E-40DD-AFC4-6F175D3DCCD1}">
-              <a14:hiddenFill xmlns:a14="http://schemas.microsoft.com/office/drawing/2010/main">
-                <a:solidFill>
-                  <a:srgbClr val="FFFFFF"/>
-                </a:solidFill>
-              </a14:hiddenFill>
-            </a:ext>
-            <a:ext uri="{91240B29-F687-4F45-9708-019B960494DF}">
-              <a14:hiddenLine xmlns:a14="http://schemas.microsoft.com/office/drawing/2010/main" w="9525">
-                <a:solidFill>
-                  <a:srgbClr val="000000"/>
-                </a:solidFill>
-                <a:miter lim="800000"/>
-                <a:headEnd/>
-                <a:tailEnd/>
-              </a14:hiddenLine>
-            </a:ext>
-          </a:extLst>
-        </p:spPr>
-      </p:pic>
       <p:sp>
         <p:nvSpPr>
           <p:cNvPr id="881" name="TextBox 880"/>
@@ -26852,7 +26572,7 @@
         </p:nvSpPr>
         <p:spPr>
           <a:xfrm>
-            <a:off x="2235474" y="6939118"/>
+            <a:off x="2235474" y="6778372"/>
             <a:ext cx="729687" cy="400110"/>
           </a:xfrm>
           <a:prstGeom prst="rect">
@@ -27838,10 +27558,11 @@
           <a:prstGeom prst="line">
             <a:avLst/>
           </a:prstGeom>
-          <a:ln w="6350">
+          <a:ln w="3175">
             <a:solidFill>
               <a:schemeClr val="tx1"/>
             </a:solidFill>
+            <a:prstDash val="sysDot"/>
             <a:headEnd type="none" w="sm" len="sm"/>
             <a:tailEnd type="none"/>
           </a:ln>
@@ -28127,14 +27848,7 @@
                   <a:latin typeface="Arial" panose="020B0604020202020204" pitchFamily="34" charset="0"/>
                   <a:cs typeface="Arial" panose="020B0604020202020204" pitchFamily="34" charset="0"/>
                 </a:rPr>
-                <a:t>) </a:t>
-              </a:r>
-              <a:r>
-                <a:rPr lang="en-US" sz="1000" dirty="0" smtClean="0">
-                  <a:latin typeface="Arial" panose="020B0604020202020204" pitchFamily="34" charset="0"/>
-                  <a:cs typeface="Arial" panose="020B0604020202020204" pitchFamily="34" charset="0"/>
-                </a:rPr>
-                <a:t>Key</a:t>
+                <a:t>) Key</a:t>
               </a:r>
               <a:endParaRPr lang="en-US" sz="1000" dirty="0">
                 <a:latin typeface="Arial" panose="020B0604020202020204" pitchFamily="34" charset="0"/>
@@ -28313,7 +28027,7 @@
         </p:nvGrpSpPr>
         <p:grpSpPr>
           <a:xfrm>
-            <a:off x="3265687" y="6706625"/>
+            <a:off x="3265687" y="6545879"/>
             <a:ext cx="714205" cy="922858"/>
             <a:chOff x="1896591" y="5170438"/>
             <a:chExt cx="714205" cy="922858"/>
@@ -28567,7 +28281,7 @@
         </p:nvCxnSpPr>
         <p:spPr>
           <a:xfrm>
-            <a:off x="415412" y="5319170"/>
+            <a:off x="415412" y="5253172"/>
             <a:ext cx="9108000" cy="0"/>
           </a:xfrm>
           <a:prstGeom prst="line">
@@ -28605,7 +28319,7 @@
         </p:nvSpPr>
         <p:spPr>
           <a:xfrm>
-            <a:off x="321580" y="5261800"/>
+            <a:off x="321580" y="5195802"/>
             <a:ext cx="108000" cy="108000"/>
           </a:xfrm>
           <a:prstGeom prst="ellipse">
@@ -28653,7 +28367,7 @@
         </p:nvSpPr>
         <p:spPr>
           <a:xfrm rot="16200000">
-            <a:off x="-741918" y="3748372"/>
+            <a:off x="-741918" y="3682374"/>
             <a:ext cx="2241319" cy="276999"/>
           </a:xfrm>
           <a:prstGeom prst="rect">
@@ -28705,7 +28419,7 @@
         </p:nvSpPr>
         <p:spPr>
           <a:xfrm rot="16200000">
-            <a:off x="-936132" y="6824933"/>
+            <a:off x="-936132" y="6758935"/>
             <a:ext cx="2618024" cy="276999"/>
           </a:xfrm>
           <a:prstGeom prst="rect">
@@ -28841,7 +28555,7 @@
               <a:rPr lang="en-US" sz="1000" dirty="0" smtClean="0">
                 <a:latin typeface="Arial" panose="020B0604020202020204" pitchFamily="34" charset="0"/>
                 <a:cs typeface="Arial" panose="020B0604020202020204" pitchFamily="34" charset="0"/>
-                <a:hlinkClick r:id="rId9"/>
+                <a:hlinkClick r:id="rId8"/>
               </a:rPr>
               <a:t>Authority Objects</a:t>
             </a:r>
@@ -28880,14 +28594,7 @@
                 <a:latin typeface="Arial" panose="020B0604020202020204" pitchFamily="34" charset="0"/>
                 <a:cs typeface="Arial" panose="020B0604020202020204" pitchFamily="34" charset="0"/>
               </a:rPr>
-              <a:t>WebPKI.org </a:t>
-            </a:r>
-            <a:r>
-              <a:rPr lang="en-US" sz="800" dirty="0" smtClean="0">
-                <a:latin typeface="Arial" panose="020B0604020202020204" pitchFamily="34" charset="0"/>
-                <a:cs typeface="Arial" panose="020B0604020202020204" pitchFamily="34" charset="0"/>
-              </a:rPr>
-              <a:t>2017-11-10</a:t>
+              <a:t>WebPKI.org 2017-11-10</a:t>
             </a:r>
             <a:endParaRPr lang="en-US" sz="800" dirty="0">
               <a:latin typeface="Arial" panose="020B0604020202020204" pitchFamily="34" charset="0"/>
@@ -28940,7 +28647,7 @@
         </p:nvCxnSpPr>
         <p:spPr>
           <a:xfrm>
-            <a:off x="2278225" y="6275404"/>
+            <a:off x="2278225" y="6114658"/>
             <a:ext cx="1188000" cy="1188000"/>
           </a:xfrm>
           <a:prstGeom prst="bentConnector3">
@@ -28979,7 +28686,7 @@
         </p:nvSpPr>
         <p:spPr>
           <a:xfrm>
-            <a:off x="2099445" y="5669272"/>
+            <a:off x="2099445" y="5508526"/>
             <a:ext cx="1323493" cy="802202"/>
           </a:xfrm>
           <a:prstGeom prst="roundRect">
@@ -29105,7 +28812,7 @@
           <p:nvPr/>
         </p:nvPicPr>
         <p:blipFill>
-          <a:blip r:embed="rId10" cstate="print">
+          <a:blip r:embed="rId9" cstate="print">
             <a:extLst>
               <a:ext uri="{28A0092B-C50C-407E-A947-70E740481C1C}">
                 <a14:useLocalDpi xmlns:a14="http://schemas.microsoft.com/office/drawing/2010/main" val="0"/>
@@ -29317,7 +29024,7 @@
         </p:nvSpPr>
         <p:spPr>
           <a:xfrm>
-            <a:off x="2216911" y="4589464"/>
+            <a:off x="2216911" y="4752633"/>
             <a:ext cx="1206027" cy="237548"/>
           </a:xfrm>
           <a:prstGeom prst="roundRect">
@@ -29391,7 +29098,7 @@
         </p:nvSpPr>
         <p:spPr>
           <a:xfrm>
-            <a:off x="5159092" y="4594539"/>
+            <a:off x="4842892" y="4594539"/>
             <a:ext cx="1889235" cy="276999"/>
           </a:xfrm>
           <a:prstGeom prst="rect">
@@ -29405,6 +29112,7 @@
           </a:bodyPr>
           <a:lstStyle/>
           <a:p>
+            <a:pPr algn="ctr"/>
             <a:r>
               <a:rPr lang="en-US" sz="1200" dirty="0" smtClean="0">
                 <a:latin typeface="Arial" panose="020B0604020202020204" pitchFamily="34" charset="0"/>
@@ -29441,7 +29149,7 @@
         </p:nvSpPr>
         <p:spPr>
           <a:xfrm flipH="1">
-            <a:off x="5159506" y="7964713"/>
+            <a:off x="4842892" y="7803967"/>
             <a:ext cx="1889235" cy="276999"/>
           </a:xfrm>
           <a:prstGeom prst="rect">
@@ -29455,6 +29163,7 @@
           </a:bodyPr>
           <a:lstStyle/>
           <a:p>
+            <a:pPr algn="ctr"/>
             <a:r>
               <a:rPr lang="en-US" sz="1200" dirty="0" smtClean="0">
                 <a:latin typeface="Arial" panose="020B0604020202020204" pitchFamily="34" charset="0"/>
@@ -29491,7 +29200,7 @@
         </p:nvSpPr>
         <p:spPr>
           <a:xfrm flipH="1">
-            <a:off x="5104373" y="8756801"/>
+            <a:off x="4842892" y="8596055"/>
             <a:ext cx="1889235" cy="276999"/>
           </a:xfrm>
           <a:prstGeom prst="rect">
@@ -29505,6 +29214,7 @@
           </a:bodyPr>
           <a:lstStyle/>
           <a:p>
+            <a:pPr algn="ctr"/>
             <a:r>
               <a:rPr lang="en-US" sz="1200" dirty="0" smtClean="0">
                 <a:latin typeface="Arial" panose="020B0604020202020204" pitchFamily="34" charset="0"/>
@@ -29541,7 +29251,7 @@
         </p:nvSpPr>
         <p:spPr>
           <a:xfrm>
-            <a:off x="8117877" y="7924530"/>
+            <a:off x="8117877" y="7949868"/>
             <a:ext cx="1173990" cy="241931"/>
           </a:xfrm>
           <a:prstGeom prst="roundRect">
@@ -29622,7 +29332,7 @@
         </p:nvSpPr>
         <p:spPr>
           <a:xfrm>
-            <a:off x="8117877" y="9233124"/>
+            <a:off x="8117877" y="9180934"/>
             <a:ext cx="1155243" cy="570544"/>
           </a:xfrm>
           <a:prstGeom prst="roundRect">
@@ -29774,7 +29484,7 @@
         </p:nvSpPr>
         <p:spPr>
           <a:xfrm>
-            <a:off x="1270485" y="8901689"/>
+            <a:off x="1270485" y="8740943"/>
             <a:ext cx="669093" cy="252000"/>
           </a:xfrm>
           <a:prstGeom prst="ellipse">
@@ -29852,7 +29562,7 @@
         </p:nvSpPr>
         <p:spPr>
           <a:xfrm>
-            <a:off x="1272050" y="8111982"/>
+            <a:off x="1272050" y="7951236"/>
             <a:ext cx="669093" cy="252000"/>
           </a:xfrm>
           <a:prstGeom prst="ellipse">
@@ -29940,7 +29650,7 @@
         </p:nvSpPr>
         <p:spPr>
           <a:xfrm flipH="1">
-            <a:off x="3659923" y="9468966"/>
+            <a:off x="3659923" y="9308220"/>
             <a:ext cx="4241758" cy="400110"/>
           </a:xfrm>
           <a:prstGeom prst="rect">
@@ -30146,116 +29856,60 @@
           </a:p>
         </p:txBody>
       </p:sp>
-      <p:grpSp>
-        <p:nvGrpSpPr>
-          <p:cNvPr id="953" name="Group 952"/>
-          <p:cNvGrpSpPr/>
+      <p:pic>
+        <p:nvPicPr>
+          <p:cNvPr id="955" name="Picture 8" descr="key"/>
+          <p:cNvPicPr>
+            <a:picLocks noChangeAspect="1" noChangeArrowheads="1"/>
+          </p:cNvPicPr>
           <p:nvPr/>
-        </p:nvGrpSpPr>
-        <p:grpSpPr>
-          <a:xfrm>
-            <a:off x="735752" y="7929420"/>
-            <a:ext cx="445844" cy="603379"/>
-            <a:chOff x="8232155" y="587661"/>
-            <a:chExt cx="445844" cy="603379"/>
-          </a:xfrm>
-        </p:grpSpPr>
-        <p:pic>
-          <p:nvPicPr>
-            <p:cNvPr id="954" name="Picture 953"/>
-            <p:cNvPicPr>
-              <a:picLocks noChangeAspect="1" noChangeArrowheads="1"/>
-            </p:cNvPicPr>
-            <p:nvPr/>
-          </p:nvPicPr>
-          <p:blipFill>
-            <a:blip r:embed="rId2" cstate="print">
-              <a:extLst>
-                <a:ext uri="{28A0092B-C50C-407E-A947-70E740481C1C}">
-                  <a14:useLocalDpi xmlns:a14="http://schemas.microsoft.com/office/drawing/2010/main" val="0"/>
-                </a:ext>
-              </a:extLst>
-            </a:blip>
-            <a:srcRect/>
-            <a:stretch>
-              <a:fillRect/>
-            </a:stretch>
-          </p:blipFill>
-          <p:spPr bwMode="auto">
-            <a:xfrm>
-              <a:off x="8232155" y="796517"/>
-              <a:ext cx="324060" cy="394523"/>
-            </a:xfrm>
-            <a:prstGeom prst="rect">
-              <a:avLst/>
-            </a:prstGeom>
-            <a:noFill/>
+        </p:nvPicPr>
+        <p:blipFill>
+          <a:blip r:embed="rId3">
             <a:extLst>
-              <a:ext uri="{909E8E84-426E-40DD-AFC4-6F175D3DCCD1}">
-                <a14:hiddenFill xmlns:a14="http://schemas.microsoft.com/office/drawing/2010/main">
-                  <a:solidFill>
-                    <a:srgbClr val="FFFFFF"/>
-                  </a:solidFill>
-                </a14:hiddenFill>
+              <a:ext uri="{28A0092B-C50C-407E-A947-70E740481C1C}">
+                <a14:useLocalDpi xmlns:a14="http://schemas.microsoft.com/office/drawing/2010/main" val="0"/>
               </a:ext>
             </a:extLst>
-          </p:spPr>
-        </p:pic>
-        <p:pic>
-          <p:nvPicPr>
-            <p:cNvPr id="955" name="Picture 8" descr="key"/>
-            <p:cNvPicPr>
-              <a:picLocks noChangeAspect="1" noChangeArrowheads="1"/>
-            </p:cNvPicPr>
-            <p:nvPr/>
-          </p:nvPicPr>
-          <p:blipFill>
-            <a:blip r:embed="rId3">
-              <a:extLst>
-                <a:ext uri="{28A0092B-C50C-407E-A947-70E740481C1C}">
-                  <a14:useLocalDpi xmlns:a14="http://schemas.microsoft.com/office/drawing/2010/main" val="0"/>
-                </a:ext>
-              </a:extLst>
-            </a:blip>
-            <a:srcRect/>
-            <a:stretch>
-              <a:fillRect/>
-            </a:stretch>
-          </p:blipFill>
-          <p:spPr bwMode="auto">
-            <a:xfrm>
-              <a:off x="8317959" y="587661"/>
-              <a:ext cx="360040" cy="356341"/>
-            </a:xfrm>
-            <a:prstGeom prst="rect">
-              <a:avLst/>
-            </a:prstGeom>
+          </a:blip>
+          <a:srcRect/>
+          <a:stretch>
+            <a:fillRect/>
+          </a:stretch>
+        </p:blipFill>
+        <p:spPr bwMode="auto">
+          <a:xfrm>
+            <a:off x="821556" y="7920035"/>
+            <a:ext cx="360040" cy="356341"/>
+          </a:xfrm>
+          <a:prstGeom prst="rect">
+            <a:avLst/>
+          </a:prstGeom>
+          <a:noFill/>
+          <a:ln>
             <a:noFill/>
-            <a:ln>
-              <a:noFill/>
-            </a:ln>
-            <a:extLst>
-              <a:ext uri="{909E8E84-426E-40DD-AFC4-6F175D3DCCD1}">
-                <a14:hiddenFill xmlns:a14="http://schemas.microsoft.com/office/drawing/2010/main">
-                  <a:solidFill>
-                    <a:srgbClr val="FFFFFF"/>
-                  </a:solidFill>
-                </a14:hiddenFill>
-              </a:ext>
-              <a:ext uri="{91240B29-F687-4F45-9708-019B960494DF}">
-                <a14:hiddenLine xmlns:a14="http://schemas.microsoft.com/office/drawing/2010/main" w="9525">
-                  <a:solidFill>
-                    <a:srgbClr val="000000"/>
-                  </a:solidFill>
-                  <a:miter lim="800000"/>
-                  <a:headEnd/>
-                  <a:tailEnd/>
-                </a14:hiddenLine>
-              </a:ext>
-            </a:extLst>
-          </p:spPr>
-        </p:pic>
-      </p:grpSp>
+          </a:ln>
+          <a:extLst>
+            <a:ext uri="{909E8E84-426E-40DD-AFC4-6F175D3DCCD1}">
+              <a14:hiddenFill xmlns:a14="http://schemas.microsoft.com/office/drawing/2010/main">
+                <a:solidFill>
+                  <a:srgbClr val="FFFFFF"/>
+                </a:solidFill>
+              </a14:hiddenFill>
+            </a:ext>
+            <a:ext uri="{91240B29-F687-4F45-9708-019B960494DF}">
+              <a14:hiddenLine xmlns:a14="http://schemas.microsoft.com/office/drawing/2010/main" w="9525">
+                <a:solidFill>
+                  <a:srgbClr val="000000"/>
+                </a:solidFill>
+                <a:miter lim="800000"/>
+                <a:headEnd/>
+                <a:tailEnd/>
+              </a14:hiddenLine>
+            </a:ext>
+          </a:extLst>
+        </p:spPr>
+      </p:pic>
       <p:grpSp>
         <p:nvGrpSpPr>
           <p:cNvPr id="956" name="Group 955"/>
@@ -30264,7 +29918,7 @@
         </p:nvGrpSpPr>
         <p:grpSpPr>
           <a:xfrm>
-            <a:off x="735752" y="8709603"/>
+            <a:off x="735752" y="8548857"/>
             <a:ext cx="445844" cy="603379"/>
             <a:chOff x="8232155" y="587661"/>
             <a:chExt cx="445844" cy="603379"/>
@@ -30374,7 +30028,7 @@
         </p:nvSpPr>
         <p:spPr>
           <a:xfrm>
-            <a:off x="561771" y="9353753"/>
+            <a:off x="561771" y="9193007"/>
             <a:ext cx="793807" cy="400110"/>
           </a:xfrm>
           <a:prstGeom prst="rect">
@@ -30424,7 +30078,7 @@
         </p:nvSpPr>
         <p:spPr>
           <a:xfrm>
-            <a:off x="561771" y="7517405"/>
+            <a:off x="561771" y="7508020"/>
             <a:ext cx="793807" cy="400110"/>
           </a:xfrm>
           <a:prstGeom prst="rect">
@@ -30475,7 +30129,7 @@
           <p:nvPr/>
         </p:nvPicPr>
         <p:blipFill>
-          <a:blip r:embed="rId11" cstate="print">
+          <a:blip r:embed="rId10" cstate="print">
             <a:extLst>
               <a:ext uri="{28A0092B-C50C-407E-A947-70E740481C1C}">
                 <a14:useLocalDpi xmlns:a14="http://schemas.microsoft.com/office/drawing/2010/main" val="0"/>
@@ -30489,7 +30143,7 @@
         </p:blipFill>
         <p:spPr bwMode="auto">
           <a:xfrm>
-            <a:off x="5869191" y="494969"/>
+            <a:off x="5869191" y="490767"/>
             <a:ext cx="468000" cy="468000"/>
           </a:xfrm>
           <a:prstGeom prst="rect">
@@ -30596,7 +30250,7 @@
           <p:nvPr/>
         </p:nvPicPr>
         <p:blipFill>
-          <a:blip r:embed="rId12" cstate="print">
+          <a:blip r:embed="rId11" cstate="print">
             <a:extLst>
               <a:ext uri="{28A0092B-C50C-407E-A947-70E740481C1C}">
                 <a14:useLocalDpi xmlns:a14="http://schemas.microsoft.com/office/drawing/2010/main" val="0"/>
@@ -30633,7 +30287,7 @@
           <p:nvPr/>
         </p:nvPicPr>
         <p:blipFill>
-          <a:blip r:embed="rId12" cstate="print">
+          <a:blip r:embed="rId11" cstate="print">
             <a:extLst>
               <a:ext uri="{28A0092B-C50C-407E-A947-70E740481C1C}">
                 <a14:useLocalDpi xmlns:a14="http://schemas.microsoft.com/office/drawing/2010/main" val="0"/>
@@ -32138,6 +31792,76 @@
           </a:fontRef>
         </p:style>
       </p:cxnSp>
+      <p:pic>
+        <p:nvPicPr>
+          <p:cNvPr id="880" name="Picture 8" descr="key"/>
+          <p:cNvPicPr>
+            <a:picLocks noChangeAspect="1" noChangeArrowheads="1"/>
+          </p:cNvPicPr>
+          <p:nvPr/>
+        </p:nvPicPr>
+        <p:blipFill>
+          <a:blip r:embed="rId12">
+            <a:duotone>
+              <a:prstClr val="black"/>
+              <a:srgbClr val="D9C3A5">
+                <a:tint val="50000"/>
+                <a:satMod val="180000"/>
+              </a:srgbClr>
+            </a:duotone>
+            <a:extLst>
+              <a:ext uri="{BEBA8EAE-BF5A-486C-A8C5-ECC9F3942E4B}">
+                <a14:imgProps xmlns:a14="http://schemas.microsoft.com/office/drawing/2010/main">
+                  <a14:imgLayer r:embed="rId5">
+                    <a14:imgEffect>
+                      <a14:saturation sat="182000"/>
+                    </a14:imgEffect>
+                  </a14:imgLayer>
+                </a14:imgProps>
+              </a:ext>
+              <a:ext uri="{28A0092B-C50C-407E-A947-70E740481C1C}">
+                <a14:useLocalDpi xmlns:a14="http://schemas.microsoft.com/office/drawing/2010/main" val="0"/>
+              </a:ext>
+            </a:extLst>
+          </a:blip>
+          <a:srcRect/>
+          <a:stretch>
+            <a:fillRect/>
+          </a:stretch>
+        </p:blipFill>
+        <p:spPr bwMode="auto">
+          <a:xfrm>
+            <a:off x="8984159" y="2964265"/>
+            <a:ext cx="360040" cy="356341"/>
+          </a:xfrm>
+          <a:prstGeom prst="rect">
+            <a:avLst/>
+          </a:prstGeom>
+          <a:noFill/>
+          <a:ln>
+            <a:noFill/>
+          </a:ln>
+          <a:extLst>
+            <a:ext uri="{909E8E84-426E-40DD-AFC4-6F175D3DCCD1}">
+              <a14:hiddenFill xmlns:a14="http://schemas.microsoft.com/office/drawing/2010/main">
+                <a:solidFill>
+                  <a:srgbClr val="FFFFFF"/>
+                </a:solidFill>
+              </a14:hiddenFill>
+            </a:ext>
+            <a:ext uri="{91240B29-F687-4F45-9708-019B960494DF}">
+              <a14:hiddenLine xmlns:a14="http://schemas.microsoft.com/office/drawing/2010/main" w="9525">
+                <a:solidFill>
+                  <a:srgbClr val="000000"/>
+                </a:solidFill>
+                <a:miter lim="800000"/>
+                <a:headEnd/>
+                <a:tailEnd/>
+              </a14:hiddenLine>
+            </a:ext>
+          </a:extLst>
+        </p:spPr>
+      </p:pic>
     </p:spTree>
     <p:extLst>
       <p:ext uri="{BB962C8B-B14F-4D97-AF65-F5344CB8AC3E}">

</xml_diff>

<commit_message>
Minor graphical error correction
</commit_message>
<xml_diff>
--- a/saturn/saturn-authorization.pptx
+++ b/saturn/saturn-authorization.pptx
@@ -26068,7 +26068,7 @@
         </p:nvSpPr>
         <p:spPr>
           <a:xfrm>
-            <a:off x="8117877" y="8756873"/>
+            <a:off x="8117877" y="8595975"/>
             <a:ext cx="1117343" cy="241931"/>
           </a:xfrm>
           <a:prstGeom prst="roundRect">
@@ -29024,7 +29024,7 @@
         </p:nvSpPr>
         <p:spPr>
           <a:xfrm>
-            <a:off x="2216911" y="4752633"/>
+            <a:off x="2220520" y="4587357"/>
             <a:ext cx="1206027" cy="237548"/>
           </a:xfrm>
           <a:prstGeom prst="roundRect">
@@ -29251,7 +29251,7 @@
         </p:nvSpPr>
         <p:spPr>
           <a:xfrm>
-            <a:off x="8117877" y="7949868"/>
+            <a:off x="8117877" y="7790796"/>
             <a:ext cx="1173990" cy="241931"/>
           </a:xfrm>
           <a:prstGeom prst="roundRect">
@@ -29332,7 +29332,7 @@
         </p:nvSpPr>
         <p:spPr>
           <a:xfrm>
-            <a:off x="8117877" y="9180934"/>
+            <a:off x="8117877" y="9114446"/>
             <a:ext cx="1155243" cy="570544"/>
           </a:xfrm>
           <a:prstGeom prst="roundRect">

</xml_diff>

<commit_message>
Saturn Auth minor fix
</commit_message>
<xml_diff>
--- a/saturn/saturn-authorization.pptx
+++ b/saturn/saturn-authorization.pptx
@@ -309,7 +309,7 @@
           <a:p>
             <a:fld id="{E3744D7E-A5BB-4306-A750-C25515017678}" type="datetimeFigureOut">
               <a:rPr lang="en-US" smtClean="0"/>
-              <a:t>2017-11-10</a:t>
+              <a:t>2019-09-06</a:t>
             </a:fld>
             <a:endParaRPr lang="en-US"/>
           </a:p>
@@ -519,7 +519,7 @@
           <a:p>
             <a:fld id="{E3744D7E-A5BB-4306-A750-C25515017678}" type="datetimeFigureOut">
               <a:rPr lang="en-US" smtClean="0"/>
-              <a:t>2017-11-10</a:t>
+              <a:t>2019-09-06</a:t>
             </a:fld>
             <a:endParaRPr lang="en-US"/>
           </a:p>
@@ -736,7 +736,7 @@
           <a:p>
             <a:fld id="{E3744D7E-A5BB-4306-A750-C25515017678}" type="datetimeFigureOut">
               <a:rPr lang="en-US" smtClean="0"/>
-              <a:t>2017-11-10</a:t>
+              <a:t>2019-09-06</a:t>
             </a:fld>
             <a:endParaRPr lang="en-US"/>
           </a:p>
@@ -1001,7 +1001,7 @@
           <a:p>
             <a:fld id="{B880F04E-B60C-4530-BE27-DE08322B2422}" type="datetimeFigureOut">
               <a:rPr lang="en-US" smtClean="0"/>
-              <a:t>2017-11-10</a:t>
+              <a:t>2019-09-06</a:t>
             </a:fld>
             <a:endParaRPr lang="en-US"/>
           </a:p>
@@ -1171,7 +1171,7 @@
           <a:p>
             <a:fld id="{B880F04E-B60C-4530-BE27-DE08322B2422}" type="datetimeFigureOut">
               <a:rPr lang="en-US" smtClean="0"/>
-              <a:t>2017-11-10</a:t>
+              <a:t>2019-09-06</a:t>
             </a:fld>
             <a:endParaRPr lang="en-US"/>
           </a:p>
@@ -1417,7 +1417,7 @@
           <a:p>
             <a:fld id="{B880F04E-B60C-4530-BE27-DE08322B2422}" type="datetimeFigureOut">
               <a:rPr lang="en-US" smtClean="0"/>
-              <a:t>2017-11-10</a:t>
+              <a:t>2019-09-06</a:t>
             </a:fld>
             <a:endParaRPr lang="en-US"/>
           </a:p>
@@ -1705,7 +1705,7 @@
           <a:p>
             <a:fld id="{B880F04E-B60C-4530-BE27-DE08322B2422}" type="datetimeFigureOut">
               <a:rPr lang="en-US" smtClean="0"/>
-              <a:t>2017-11-10</a:t>
+              <a:t>2019-09-06</a:t>
             </a:fld>
             <a:endParaRPr lang="en-US"/>
           </a:p>
@@ -2127,7 +2127,7 @@
           <a:p>
             <a:fld id="{B880F04E-B60C-4530-BE27-DE08322B2422}" type="datetimeFigureOut">
               <a:rPr lang="en-US" smtClean="0"/>
-              <a:t>2017-11-10</a:t>
+              <a:t>2019-09-06</a:t>
             </a:fld>
             <a:endParaRPr lang="en-US"/>
           </a:p>
@@ -2245,7 +2245,7 @@
           <a:p>
             <a:fld id="{B880F04E-B60C-4530-BE27-DE08322B2422}" type="datetimeFigureOut">
               <a:rPr lang="en-US" smtClean="0"/>
-              <a:t>2017-11-10</a:t>
+              <a:t>2019-09-06</a:t>
             </a:fld>
             <a:endParaRPr lang="en-US"/>
           </a:p>
@@ -2340,7 +2340,7 @@
           <a:p>
             <a:fld id="{B880F04E-B60C-4530-BE27-DE08322B2422}" type="datetimeFigureOut">
               <a:rPr lang="en-US" smtClean="0"/>
-              <a:t>2017-11-10</a:t>
+              <a:t>2019-09-06</a:t>
             </a:fld>
             <a:endParaRPr lang="en-US"/>
           </a:p>
@@ -2617,7 +2617,7 @@
           <a:p>
             <a:fld id="{B880F04E-B60C-4530-BE27-DE08322B2422}" type="datetimeFigureOut">
               <a:rPr lang="en-US" smtClean="0"/>
-              <a:t>2017-11-10</a:t>
+              <a:t>2019-09-06</a:t>
             </a:fld>
             <a:endParaRPr lang="en-US"/>
           </a:p>
@@ -2811,7 +2811,7 @@
           <a:p>
             <a:fld id="{E3744D7E-A5BB-4306-A750-C25515017678}" type="datetimeFigureOut">
               <a:rPr lang="en-US" smtClean="0"/>
-              <a:t>2017-11-10</a:t>
+              <a:t>2019-09-06</a:t>
             </a:fld>
             <a:endParaRPr lang="en-US"/>
           </a:p>
@@ -3080,7 +3080,7 @@
           <a:p>
             <a:fld id="{B880F04E-B60C-4530-BE27-DE08322B2422}" type="datetimeFigureOut">
               <a:rPr lang="en-US" smtClean="0"/>
-              <a:t>2017-11-10</a:t>
+              <a:t>2019-09-06</a:t>
             </a:fld>
             <a:endParaRPr lang="en-US"/>
           </a:p>
@@ -3250,7 +3250,7 @@
           <a:p>
             <a:fld id="{B880F04E-B60C-4530-BE27-DE08322B2422}" type="datetimeFigureOut">
               <a:rPr lang="en-US" smtClean="0"/>
-              <a:t>2017-11-10</a:t>
+              <a:t>2019-09-06</a:t>
             </a:fld>
             <a:endParaRPr lang="en-US"/>
           </a:p>
@@ -3430,7 +3430,7 @@
           <a:p>
             <a:fld id="{B880F04E-B60C-4530-BE27-DE08322B2422}" type="datetimeFigureOut">
               <a:rPr lang="en-US" smtClean="0"/>
-              <a:t>2017-11-10</a:t>
+              <a:t>2019-09-06</a:t>
             </a:fld>
             <a:endParaRPr lang="en-US"/>
           </a:p>
@@ -3672,7 +3672,7 @@
           <a:p>
             <a:fld id="{C5690C41-1B19-4491-A062-33F2F29E9A8D}" type="datetimeFigureOut">
               <a:rPr lang="en-US" smtClean="0"/>
-              <a:t>2017-11-10</a:t>
+              <a:t>2019-09-06</a:t>
             </a:fld>
             <a:endParaRPr lang="en-US"/>
           </a:p>
@@ -3842,7 +3842,7 @@
           <a:p>
             <a:fld id="{C5690C41-1B19-4491-A062-33F2F29E9A8D}" type="datetimeFigureOut">
               <a:rPr lang="en-US" smtClean="0"/>
-              <a:t>2017-11-10</a:t>
+              <a:t>2019-09-06</a:t>
             </a:fld>
             <a:endParaRPr lang="en-US"/>
           </a:p>
@@ -4088,7 +4088,7 @@
           <a:p>
             <a:fld id="{C5690C41-1B19-4491-A062-33F2F29E9A8D}" type="datetimeFigureOut">
               <a:rPr lang="en-US" smtClean="0"/>
-              <a:t>2017-11-10</a:t>
+              <a:t>2019-09-06</a:t>
             </a:fld>
             <a:endParaRPr lang="en-US"/>
           </a:p>
@@ -4376,7 +4376,7 @@
           <a:p>
             <a:fld id="{C5690C41-1B19-4491-A062-33F2F29E9A8D}" type="datetimeFigureOut">
               <a:rPr lang="en-US" smtClean="0"/>
-              <a:t>2017-11-10</a:t>
+              <a:t>2019-09-06</a:t>
             </a:fld>
             <a:endParaRPr lang="en-US"/>
           </a:p>
@@ -4798,7 +4798,7 @@
           <a:p>
             <a:fld id="{C5690C41-1B19-4491-A062-33F2F29E9A8D}" type="datetimeFigureOut">
               <a:rPr lang="en-US" smtClean="0"/>
-              <a:t>2017-11-10</a:t>
+              <a:t>2019-09-06</a:t>
             </a:fld>
             <a:endParaRPr lang="en-US"/>
           </a:p>
@@ -4916,7 +4916,7 @@
           <a:p>
             <a:fld id="{C5690C41-1B19-4491-A062-33F2F29E9A8D}" type="datetimeFigureOut">
               <a:rPr lang="en-US" smtClean="0"/>
-              <a:t>2017-11-10</a:t>
+              <a:t>2019-09-06</a:t>
             </a:fld>
             <a:endParaRPr lang="en-US"/>
           </a:p>
@@ -5011,7 +5011,7 @@
           <a:p>
             <a:fld id="{C5690C41-1B19-4491-A062-33F2F29E9A8D}" type="datetimeFigureOut">
               <a:rPr lang="en-US" smtClean="0"/>
-              <a:t>2017-11-10</a:t>
+              <a:t>2019-09-06</a:t>
             </a:fld>
             <a:endParaRPr lang="en-US"/>
           </a:p>
@@ -5271,7 +5271,7 @@
           <a:p>
             <a:fld id="{E3744D7E-A5BB-4306-A750-C25515017678}" type="datetimeFigureOut">
               <a:rPr lang="en-US" smtClean="0"/>
-              <a:t>2017-11-10</a:t>
+              <a:t>2019-09-06</a:t>
             </a:fld>
             <a:endParaRPr lang="en-US"/>
           </a:p>
@@ -5564,7 +5564,7 @@
           <a:p>
             <a:fld id="{C5690C41-1B19-4491-A062-33F2F29E9A8D}" type="datetimeFigureOut">
               <a:rPr lang="en-US" smtClean="0"/>
-              <a:t>2017-11-10</a:t>
+              <a:t>2019-09-06</a:t>
             </a:fld>
             <a:endParaRPr lang="en-US"/>
           </a:p>
@@ -5817,7 +5817,7 @@
           <a:p>
             <a:fld id="{C5690C41-1B19-4491-A062-33F2F29E9A8D}" type="datetimeFigureOut">
               <a:rPr lang="en-US" smtClean="0"/>
-              <a:t>2017-11-10</a:t>
+              <a:t>2019-09-06</a:t>
             </a:fld>
             <a:endParaRPr lang="en-US"/>
           </a:p>
@@ -5987,7 +5987,7 @@
           <a:p>
             <a:fld id="{C5690C41-1B19-4491-A062-33F2F29E9A8D}" type="datetimeFigureOut">
               <a:rPr lang="en-US" smtClean="0"/>
-              <a:t>2017-11-10</a:t>
+              <a:t>2019-09-06</a:t>
             </a:fld>
             <a:endParaRPr lang="en-US"/>
           </a:p>
@@ -6167,7 +6167,7 @@
           <a:p>
             <a:fld id="{C5690C41-1B19-4491-A062-33F2F29E9A8D}" type="datetimeFigureOut">
               <a:rPr lang="en-US" smtClean="0"/>
-              <a:t>2017-11-10</a:t>
+              <a:t>2019-09-06</a:t>
             </a:fld>
             <a:endParaRPr lang="en-US"/>
           </a:p>
@@ -6409,7 +6409,7 @@
           <a:p>
             <a:fld id="{23D18025-B22E-453D-AA62-4A08DAEF541F}" type="datetimeFigureOut">
               <a:rPr lang="en-US" smtClean="0"/>
-              <a:t>2017-11-10</a:t>
+              <a:t>2019-09-06</a:t>
             </a:fld>
             <a:endParaRPr lang="en-US"/>
           </a:p>
@@ -6579,7 +6579,7 @@
           <a:p>
             <a:fld id="{23D18025-B22E-453D-AA62-4A08DAEF541F}" type="datetimeFigureOut">
               <a:rPr lang="en-US" smtClean="0"/>
-              <a:t>2017-11-10</a:t>
+              <a:t>2019-09-06</a:t>
             </a:fld>
             <a:endParaRPr lang="en-US"/>
           </a:p>
@@ -6825,7 +6825,7 @@
           <a:p>
             <a:fld id="{23D18025-B22E-453D-AA62-4A08DAEF541F}" type="datetimeFigureOut">
               <a:rPr lang="en-US" smtClean="0"/>
-              <a:t>2017-11-10</a:t>
+              <a:t>2019-09-06</a:t>
             </a:fld>
             <a:endParaRPr lang="en-US"/>
           </a:p>
@@ -7113,7 +7113,7 @@
           <a:p>
             <a:fld id="{23D18025-B22E-453D-AA62-4A08DAEF541F}" type="datetimeFigureOut">
               <a:rPr lang="en-US" smtClean="0"/>
-              <a:t>2017-11-10</a:t>
+              <a:t>2019-09-06</a:t>
             </a:fld>
             <a:endParaRPr lang="en-US"/>
           </a:p>
@@ -7535,7 +7535,7 @@
           <a:p>
             <a:fld id="{23D18025-B22E-453D-AA62-4A08DAEF541F}" type="datetimeFigureOut">
               <a:rPr lang="en-US" smtClean="0"/>
-              <a:t>2017-11-10</a:t>
+              <a:t>2019-09-06</a:t>
             </a:fld>
             <a:endParaRPr lang="en-US"/>
           </a:p>
@@ -7653,7 +7653,7 @@
           <a:p>
             <a:fld id="{23D18025-B22E-453D-AA62-4A08DAEF541F}" type="datetimeFigureOut">
               <a:rPr lang="en-US" smtClean="0"/>
-              <a:t>2017-11-10</a:t>
+              <a:t>2019-09-06</a:t>
             </a:fld>
             <a:endParaRPr lang="en-US"/>
           </a:p>
@@ -7963,7 +7963,7 @@
           <a:p>
             <a:fld id="{E3744D7E-A5BB-4306-A750-C25515017678}" type="datetimeFigureOut">
               <a:rPr lang="en-US" smtClean="0"/>
-              <a:t>2017-11-10</a:t>
+              <a:t>2019-09-06</a:t>
             </a:fld>
             <a:endParaRPr lang="en-US"/>
           </a:p>
@@ -8074,7 +8074,7 @@
           <a:p>
             <a:fld id="{23D18025-B22E-453D-AA62-4A08DAEF541F}" type="datetimeFigureOut">
               <a:rPr lang="en-US" smtClean="0"/>
-              <a:t>2017-11-10</a:t>
+              <a:t>2019-09-06</a:t>
             </a:fld>
             <a:endParaRPr lang="en-US"/>
           </a:p>
@@ -8351,7 +8351,7 @@
           <a:p>
             <a:fld id="{23D18025-B22E-453D-AA62-4A08DAEF541F}" type="datetimeFigureOut">
               <a:rPr lang="en-US" smtClean="0"/>
-              <a:t>2017-11-10</a:t>
+              <a:t>2019-09-06</a:t>
             </a:fld>
             <a:endParaRPr lang="en-US"/>
           </a:p>
@@ -8604,7 +8604,7 @@
           <a:p>
             <a:fld id="{23D18025-B22E-453D-AA62-4A08DAEF541F}" type="datetimeFigureOut">
               <a:rPr lang="en-US" smtClean="0"/>
-              <a:t>2017-11-10</a:t>
+              <a:t>2019-09-06</a:t>
             </a:fld>
             <a:endParaRPr lang="en-US"/>
           </a:p>
@@ -8774,7 +8774,7 @@
           <a:p>
             <a:fld id="{23D18025-B22E-453D-AA62-4A08DAEF541F}" type="datetimeFigureOut">
               <a:rPr lang="en-US" smtClean="0"/>
-              <a:t>2017-11-10</a:t>
+              <a:t>2019-09-06</a:t>
             </a:fld>
             <a:endParaRPr lang="en-US"/>
           </a:p>
@@ -8954,7 +8954,7 @@
           <a:p>
             <a:fld id="{23D18025-B22E-453D-AA62-4A08DAEF541F}" type="datetimeFigureOut">
               <a:rPr lang="en-US" smtClean="0"/>
-              <a:t>2017-11-10</a:t>
+              <a:t>2019-09-06</a:t>
             </a:fld>
             <a:endParaRPr lang="en-US"/>
           </a:p>
@@ -9196,7 +9196,7 @@
           <a:p>
             <a:fld id="{5A29F1F3-0306-4ADD-8575-5F845BC34EA0}" type="datetimeFigureOut">
               <a:rPr lang="en-US" smtClean="0"/>
-              <a:t>2017-11-10</a:t>
+              <a:t>2019-09-06</a:t>
             </a:fld>
             <a:endParaRPr lang="en-US"/>
           </a:p>
@@ -9366,7 +9366,7 @@
           <a:p>
             <a:fld id="{5A29F1F3-0306-4ADD-8575-5F845BC34EA0}" type="datetimeFigureOut">
               <a:rPr lang="en-US" smtClean="0"/>
-              <a:t>2017-11-10</a:t>
+              <a:t>2019-09-06</a:t>
             </a:fld>
             <a:endParaRPr lang="en-US"/>
           </a:p>
@@ -9612,7 +9612,7 @@
           <a:p>
             <a:fld id="{5A29F1F3-0306-4ADD-8575-5F845BC34EA0}" type="datetimeFigureOut">
               <a:rPr lang="en-US" smtClean="0"/>
-              <a:t>2017-11-10</a:t>
+              <a:t>2019-09-06</a:t>
             </a:fld>
             <a:endParaRPr lang="en-US"/>
           </a:p>
@@ -9900,7 +9900,7 @@
           <a:p>
             <a:fld id="{5A29F1F3-0306-4ADD-8575-5F845BC34EA0}" type="datetimeFigureOut">
               <a:rPr lang="en-US" smtClean="0"/>
-              <a:t>2017-11-10</a:t>
+              <a:t>2019-09-06</a:t>
             </a:fld>
             <a:endParaRPr lang="en-US"/>
           </a:p>
@@ -10322,7 +10322,7 @@
           <a:p>
             <a:fld id="{5A29F1F3-0306-4ADD-8575-5F845BC34EA0}" type="datetimeFigureOut">
               <a:rPr lang="en-US" smtClean="0"/>
-              <a:t>2017-11-10</a:t>
+              <a:t>2019-09-06</a:t>
             </a:fld>
             <a:endParaRPr lang="en-US"/>
           </a:p>
@@ -10772,7 +10772,7 @@
           <a:p>
             <a:fld id="{E3744D7E-A5BB-4306-A750-C25515017678}" type="datetimeFigureOut">
               <a:rPr lang="en-US" smtClean="0"/>
-              <a:t>2017-11-10</a:t>
+              <a:t>2019-09-06</a:t>
             </a:fld>
             <a:endParaRPr lang="en-US"/>
           </a:p>
@@ -10906,7 +10906,7 @@
           <a:p>
             <a:fld id="{5A29F1F3-0306-4ADD-8575-5F845BC34EA0}" type="datetimeFigureOut">
               <a:rPr lang="en-US" smtClean="0"/>
-              <a:t>2017-11-10</a:t>
+              <a:t>2019-09-06</a:t>
             </a:fld>
             <a:endParaRPr lang="en-US"/>
           </a:p>
@@ -11001,7 +11001,7 @@
           <a:p>
             <a:fld id="{5A29F1F3-0306-4ADD-8575-5F845BC34EA0}" type="datetimeFigureOut">
               <a:rPr lang="en-US" smtClean="0"/>
-              <a:t>2017-11-10</a:t>
+              <a:t>2019-09-06</a:t>
             </a:fld>
             <a:endParaRPr lang="en-US"/>
           </a:p>
@@ -11278,7 +11278,7 @@
           <a:p>
             <a:fld id="{5A29F1F3-0306-4ADD-8575-5F845BC34EA0}" type="datetimeFigureOut">
               <a:rPr lang="en-US" smtClean="0"/>
-              <a:t>2017-11-10</a:t>
+              <a:t>2019-09-06</a:t>
             </a:fld>
             <a:endParaRPr lang="en-US"/>
           </a:p>
@@ -11531,7 +11531,7 @@
           <a:p>
             <a:fld id="{5A29F1F3-0306-4ADD-8575-5F845BC34EA0}" type="datetimeFigureOut">
               <a:rPr lang="en-US" smtClean="0"/>
-              <a:t>2017-11-10</a:t>
+              <a:t>2019-09-06</a:t>
             </a:fld>
             <a:endParaRPr lang="en-US"/>
           </a:p>
@@ -11701,7 +11701,7 @@
           <a:p>
             <a:fld id="{5A29F1F3-0306-4ADD-8575-5F845BC34EA0}" type="datetimeFigureOut">
               <a:rPr lang="en-US" smtClean="0"/>
-              <a:t>2017-11-10</a:t>
+              <a:t>2019-09-06</a:t>
             </a:fld>
             <a:endParaRPr lang="en-US"/>
           </a:p>
@@ -11881,7 +11881,7 @@
           <a:p>
             <a:fld id="{5A29F1F3-0306-4ADD-8575-5F845BC34EA0}" type="datetimeFigureOut">
               <a:rPr lang="en-US" smtClean="0"/>
-              <a:t>2017-11-10</a:t>
+              <a:t>2019-09-06</a:t>
             </a:fld>
             <a:endParaRPr lang="en-US"/>
           </a:p>
@@ -12123,7 +12123,7 @@
           <a:p>
             <a:fld id="{2CD378D0-82C9-47C6-BEE5-E347AC6F0A5E}" type="datetimeFigureOut">
               <a:rPr lang="en-US" smtClean="0"/>
-              <a:t>2017-11-10</a:t>
+              <a:t>2019-09-06</a:t>
             </a:fld>
             <a:endParaRPr lang="en-US"/>
           </a:p>
@@ -12293,7 +12293,7 @@
           <a:p>
             <a:fld id="{2CD378D0-82C9-47C6-BEE5-E347AC6F0A5E}" type="datetimeFigureOut">
               <a:rPr lang="en-US" smtClean="0"/>
-              <a:t>2017-11-10</a:t>
+              <a:t>2019-09-06</a:t>
             </a:fld>
             <a:endParaRPr lang="en-US"/>
           </a:p>
@@ -12539,7 +12539,7 @@
           <a:p>
             <a:fld id="{2CD378D0-82C9-47C6-BEE5-E347AC6F0A5E}" type="datetimeFigureOut">
               <a:rPr lang="en-US" smtClean="0"/>
-              <a:t>2017-11-10</a:t>
+              <a:t>2019-09-06</a:t>
             </a:fld>
             <a:endParaRPr lang="en-US"/>
           </a:p>
@@ -12827,7 +12827,7 @@
           <a:p>
             <a:fld id="{2CD378D0-82C9-47C6-BEE5-E347AC6F0A5E}" type="datetimeFigureOut">
               <a:rPr lang="en-US" smtClean="0"/>
-              <a:t>2017-11-10</a:t>
+              <a:t>2019-09-06</a:t>
             </a:fld>
             <a:endParaRPr lang="en-US"/>
           </a:p>
@@ -12961,7 +12961,7 @@
           <a:p>
             <a:fld id="{E3744D7E-A5BB-4306-A750-C25515017678}" type="datetimeFigureOut">
               <a:rPr lang="en-US" smtClean="0"/>
-              <a:t>2017-11-10</a:t>
+              <a:t>2019-09-06</a:t>
             </a:fld>
             <a:endParaRPr lang="en-US"/>
           </a:p>
@@ -13399,7 +13399,7 @@
           <a:p>
             <a:fld id="{2CD378D0-82C9-47C6-BEE5-E347AC6F0A5E}" type="datetimeFigureOut">
               <a:rPr lang="en-US" smtClean="0"/>
-              <a:t>2017-11-10</a:t>
+              <a:t>2019-09-06</a:t>
             </a:fld>
             <a:endParaRPr lang="en-US"/>
           </a:p>
@@ -13517,7 +13517,7 @@
           <a:p>
             <a:fld id="{2CD378D0-82C9-47C6-BEE5-E347AC6F0A5E}" type="datetimeFigureOut">
               <a:rPr lang="en-US" smtClean="0"/>
-              <a:t>2017-11-10</a:t>
+              <a:t>2019-09-06</a:t>
             </a:fld>
             <a:endParaRPr lang="en-US"/>
           </a:p>
@@ -13612,7 +13612,7 @@
           <a:p>
             <a:fld id="{2CD378D0-82C9-47C6-BEE5-E347AC6F0A5E}" type="datetimeFigureOut">
               <a:rPr lang="en-US" smtClean="0"/>
-              <a:t>2017-11-10</a:t>
+              <a:t>2019-09-06</a:t>
             </a:fld>
             <a:endParaRPr lang="en-US"/>
           </a:p>
@@ -13889,7 +13889,7 @@
           <a:p>
             <a:fld id="{2CD378D0-82C9-47C6-BEE5-E347AC6F0A5E}" type="datetimeFigureOut">
               <a:rPr lang="en-US" smtClean="0"/>
-              <a:t>2017-11-10</a:t>
+              <a:t>2019-09-06</a:t>
             </a:fld>
             <a:endParaRPr lang="en-US"/>
           </a:p>
@@ -14142,7 +14142,7 @@
           <a:p>
             <a:fld id="{2CD378D0-82C9-47C6-BEE5-E347AC6F0A5E}" type="datetimeFigureOut">
               <a:rPr lang="en-US" smtClean="0"/>
-              <a:t>2017-11-10</a:t>
+              <a:t>2019-09-06</a:t>
             </a:fld>
             <a:endParaRPr lang="en-US"/>
           </a:p>
@@ -14312,7 +14312,7 @@
           <a:p>
             <a:fld id="{2CD378D0-82C9-47C6-BEE5-E347AC6F0A5E}" type="datetimeFigureOut">
               <a:rPr lang="en-US" smtClean="0"/>
-              <a:t>2017-11-10</a:t>
+              <a:t>2019-09-06</a:t>
             </a:fld>
             <a:endParaRPr lang="en-US"/>
           </a:p>
@@ -14492,7 +14492,7 @@
           <a:p>
             <a:fld id="{2CD378D0-82C9-47C6-BEE5-E347AC6F0A5E}" type="datetimeFigureOut">
               <a:rPr lang="en-US" smtClean="0"/>
-              <a:t>2017-11-10</a:t>
+              <a:t>2019-09-06</a:t>
             </a:fld>
             <a:endParaRPr lang="en-US"/>
           </a:p>
@@ -14734,7 +14734,7 @@
           <a:p>
             <a:fld id="{B96FFCCF-F4AB-4D56-AEE8-39DF7F28FF62}" type="datetimeFigureOut">
               <a:rPr lang="en-US" smtClean="0"/>
-              <a:t>2017-11-10</a:t>
+              <a:t>2019-09-06</a:t>
             </a:fld>
             <a:endParaRPr lang="en-US"/>
           </a:p>
@@ -14904,7 +14904,7 @@
           <a:p>
             <a:fld id="{B96FFCCF-F4AB-4D56-AEE8-39DF7F28FF62}" type="datetimeFigureOut">
               <a:rPr lang="en-US" smtClean="0"/>
-              <a:t>2017-11-10</a:t>
+              <a:t>2019-09-06</a:t>
             </a:fld>
             <a:endParaRPr lang="en-US"/>
           </a:p>
@@ -15150,7 +15150,7 @@
           <a:p>
             <a:fld id="{B96FFCCF-F4AB-4D56-AEE8-39DF7F28FF62}" type="datetimeFigureOut">
               <a:rPr lang="en-US" smtClean="0"/>
-              <a:t>2017-11-10</a:t>
+              <a:t>2019-09-06</a:t>
             </a:fld>
             <a:endParaRPr lang="en-US"/>
           </a:p>
@@ -15253,7 +15253,7 @@
           <a:p>
             <a:fld id="{E3744D7E-A5BB-4306-A750-C25515017678}" type="datetimeFigureOut">
               <a:rPr lang="en-US" smtClean="0"/>
-              <a:t>2017-11-10</a:t>
+              <a:t>2019-09-06</a:t>
             </a:fld>
             <a:endParaRPr lang="en-US"/>
           </a:p>
@@ -15564,7 +15564,7 @@
           <a:p>
             <a:fld id="{B96FFCCF-F4AB-4D56-AEE8-39DF7F28FF62}" type="datetimeFigureOut">
               <a:rPr lang="en-US" smtClean="0"/>
-              <a:t>2017-11-10</a:t>
+              <a:t>2019-09-06</a:t>
             </a:fld>
             <a:endParaRPr lang="en-US"/>
           </a:p>
@@ -15986,7 +15986,7 @@
           <a:p>
             <a:fld id="{B96FFCCF-F4AB-4D56-AEE8-39DF7F28FF62}" type="datetimeFigureOut">
               <a:rPr lang="en-US" smtClean="0"/>
-              <a:t>2017-11-10</a:t>
+              <a:t>2019-09-06</a:t>
             </a:fld>
             <a:endParaRPr lang="en-US"/>
           </a:p>
@@ -16104,7 +16104,7 @@
           <a:p>
             <a:fld id="{B96FFCCF-F4AB-4D56-AEE8-39DF7F28FF62}" type="datetimeFigureOut">
               <a:rPr lang="en-US" smtClean="0"/>
-              <a:t>2017-11-10</a:t>
+              <a:t>2019-09-06</a:t>
             </a:fld>
             <a:endParaRPr lang="en-US"/>
           </a:p>
@@ -16199,7 +16199,7 @@
           <a:p>
             <a:fld id="{B96FFCCF-F4AB-4D56-AEE8-39DF7F28FF62}" type="datetimeFigureOut">
               <a:rPr lang="en-US" smtClean="0"/>
-              <a:t>2017-11-10</a:t>
+              <a:t>2019-09-06</a:t>
             </a:fld>
             <a:endParaRPr lang="en-US"/>
           </a:p>
@@ -16476,7 +16476,7 @@
           <a:p>
             <a:fld id="{B96FFCCF-F4AB-4D56-AEE8-39DF7F28FF62}" type="datetimeFigureOut">
               <a:rPr lang="en-US" smtClean="0"/>
-              <a:t>2017-11-10</a:t>
+              <a:t>2019-09-06</a:t>
             </a:fld>
             <a:endParaRPr lang="en-US"/>
           </a:p>
@@ -16729,7 +16729,7 @@
           <a:p>
             <a:fld id="{B96FFCCF-F4AB-4D56-AEE8-39DF7F28FF62}" type="datetimeFigureOut">
               <a:rPr lang="en-US" smtClean="0"/>
-              <a:t>2017-11-10</a:t>
+              <a:t>2019-09-06</a:t>
             </a:fld>
             <a:endParaRPr lang="en-US"/>
           </a:p>
@@ -16899,7 +16899,7 @@
           <a:p>
             <a:fld id="{B96FFCCF-F4AB-4D56-AEE8-39DF7F28FF62}" type="datetimeFigureOut">
               <a:rPr lang="en-US" smtClean="0"/>
-              <a:t>2017-11-10</a:t>
+              <a:t>2019-09-06</a:t>
             </a:fld>
             <a:endParaRPr lang="en-US"/>
           </a:p>
@@ -17079,7 +17079,7 @@
           <a:p>
             <a:fld id="{B96FFCCF-F4AB-4D56-AEE8-39DF7F28FF62}" type="datetimeFigureOut">
               <a:rPr lang="en-US" smtClean="0"/>
-              <a:t>2017-11-10</a:t>
+              <a:t>2019-09-06</a:t>
             </a:fld>
             <a:endParaRPr lang="en-US"/>
           </a:p>
@@ -17321,7 +17321,7 @@
           <a:p>
             <a:fld id="{E90DB797-294B-4B2B-9A48-229F3ACF3E1A}" type="datetimeFigureOut">
               <a:rPr lang="en-US" smtClean="0"/>
-              <a:t>2017-11-10</a:t>
+              <a:t>2019-09-06</a:t>
             </a:fld>
             <a:endParaRPr lang="en-US"/>
           </a:p>
@@ -17491,7 +17491,7 @@
           <a:p>
             <a:fld id="{E90DB797-294B-4B2B-9A48-229F3ACF3E1A}" type="datetimeFigureOut">
               <a:rPr lang="en-US" smtClean="0"/>
-              <a:t>2017-11-10</a:t>
+              <a:t>2019-09-06</a:t>
             </a:fld>
             <a:endParaRPr lang="en-US"/>
           </a:p>
@@ -17785,7 +17785,7 @@
           <a:p>
             <a:fld id="{E3744D7E-A5BB-4306-A750-C25515017678}" type="datetimeFigureOut">
               <a:rPr lang="en-US" smtClean="0"/>
-              <a:t>2017-11-10</a:t>
+              <a:t>2019-09-06</a:t>
             </a:fld>
             <a:endParaRPr lang="en-US"/>
           </a:p>
@@ -18047,7 +18047,7 @@
           <a:p>
             <a:fld id="{E90DB797-294B-4B2B-9A48-229F3ACF3E1A}" type="datetimeFigureOut">
               <a:rPr lang="en-US" smtClean="0"/>
-              <a:t>2017-11-10</a:t>
+              <a:t>2019-09-06</a:t>
             </a:fld>
             <a:endParaRPr lang="en-US"/>
           </a:p>
@@ -18335,7 +18335,7 @@
           <a:p>
             <a:fld id="{E90DB797-294B-4B2B-9A48-229F3ACF3E1A}" type="datetimeFigureOut">
               <a:rPr lang="en-US" smtClean="0"/>
-              <a:t>2017-11-10</a:t>
+              <a:t>2019-09-06</a:t>
             </a:fld>
             <a:endParaRPr lang="en-US"/>
           </a:p>
@@ -18757,7 +18757,7 @@
           <a:p>
             <a:fld id="{E90DB797-294B-4B2B-9A48-229F3ACF3E1A}" type="datetimeFigureOut">
               <a:rPr lang="en-US" smtClean="0"/>
-              <a:t>2017-11-10</a:t>
+              <a:t>2019-09-06</a:t>
             </a:fld>
             <a:endParaRPr lang="en-US"/>
           </a:p>
@@ -18875,7 +18875,7 @@
           <a:p>
             <a:fld id="{E90DB797-294B-4B2B-9A48-229F3ACF3E1A}" type="datetimeFigureOut">
               <a:rPr lang="en-US" smtClean="0"/>
-              <a:t>2017-11-10</a:t>
+              <a:t>2019-09-06</a:t>
             </a:fld>
             <a:endParaRPr lang="en-US"/>
           </a:p>
@@ -18970,7 +18970,7 @@
           <a:p>
             <a:fld id="{E90DB797-294B-4B2B-9A48-229F3ACF3E1A}" type="datetimeFigureOut">
               <a:rPr lang="en-US" smtClean="0"/>
-              <a:t>2017-11-10</a:t>
+              <a:t>2019-09-06</a:t>
             </a:fld>
             <a:endParaRPr lang="en-US"/>
           </a:p>
@@ -19247,7 +19247,7 @@
           <a:p>
             <a:fld id="{E90DB797-294B-4B2B-9A48-229F3ACF3E1A}" type="datetimeFigureOut">
               <a:rPr lang="en-US" smtClean="0"/>
-              <a:t>2017-11-10</a:t>
+              <a:t>2019-09-06</a:t>
             </a:fld>
             <a:endParaRPr lang="en-US"/>
           </a:p>
@@ -19500,7 +19500,7 @@
           <a:p>
             <a:fld id="{E90DB797-294B-4B2B-9A48-229F3ACF3E1A}" type="datetimeFigureOut">
               <a:rPr lang="en-US" smtClean="0"/>
-              <a:t>2017-11-10</a:t>
+              <a:t>2019-09-06</a:t>
             </a:fld>
             <a:endParaRPr lang="en-US"/>
           </a:p>
@@ -19670,7 +19670,7 @@
           <a:p>
             <a:fld id="{E90DB797-294B-4B2B-9A48-229F3ACF3E1A}" type="datetimeFigureOut">
               <a:rPr lang="en-US" smtClean="0"/>
-              <a:t>2017-11-10</a:t>
+              <a:t>2019-09-06</a:t>
             </a:fld>
             <a:endParaRPr lang="en-US"/>
           </a:p>
@@ -19850,7 +19850,7 @@
           <a:p>
             <a:fld id="{E90DB797-294B-4B2B-9A48-229F3ACF3E1A}" type="datetimeFigureOut">
               <a:rPr lang="en-US" smtClean="0"/>
-              <a:t>2017-11-10</a:t>
+              <a:t>2019-09-06</a:t>
             </a:fld>
             <a:endParaRPr lang="en-US"/>
           </a:p>
@@ -20120,7 +20120,7 @@
           <a:p>
             <a:fld id="{E3744D7E-A5BB-4306-A750-C25515017678}" type="datetimeFigureOut">
               <a:rPr lang="en-US" smtClean="0"/>
-              <a:t>2017-11-10</a:t>
+              <a:t>2019-09-06</a:t>
             </a:fld>
             <a:endParaRPr lang="en-US"/>
           </a:p>
@@ -20652,7 +20652,7 @@
           <a:p>
             <a:fld id="{B880F04E-B60C-4530-BE27-DE08322B2422}" type="datetimeFigureOut">
               <a:rPr lang="en-US" smtClean="0"/>
-              <a:t>2017-11-10</a:t>
+              <a:t>2019-09-06</a:t>
             </a:fld>
             <a:endParaRPr lang="en-US"/>
           </a:p>
@@ -21162,7 +21162,7 @@
           <a:p>
             <a:fld id="{C5690C41-1B19-4491-A062-33F2F29E9A8D}" type="datetimeFigureOut">
               <a:rPr lang="en-US" smtClean="0"/>
-              <a:t>2017-11-10</a:t>
+              <a:t>2019-09-06</a:t>
             </a:fld>
             <a:endParaRPr lang="en-US"/>
           </a:p>
@@ -21672,7 +21672,7 @@
           <a:p>
             <a:fld id="{23D18025-B22E-453D-AA62-4A08DAEF541F}" type="datetimeFigureOut">
               <a:rPr lang="en-US" smtClean="0"/>
-              <a:t>2017-11-10</a:t>
+              <a:t>2019-09-06</a:t>
             </a:fld>
             <a:endParaRPr lang="en-US"/>
           </a:p>
@@ -22182,7 +22182,7 @@
           <a:p>
             <a:fld id="{5A29F1F3-0306-4ADD-8575-5F845BC34EA0}" type="datetimeFigureOut">
               <a:rPr lang="en-US" smtClean="0"/>
-              <a:t>2017-11-10</a:t>
+              <a:t>2019-09-06</a:t>
             </a:fld>
             <a:endParaRPr lang="en-US"/>
           </a:p>
@@ -22692,7 +22692,7 @@
           <a:p>
             <a:fld id="{2CD378D0-82C9-47C6-BEE5-E347AC6F0A5E}" type="datetimeFigureOut">
               <a:rPr lang="en-US" smtClean="0"/>
-              <a:t>2017-11-10</a:t>
+              <a:t>2019-09-06</a:t>
             </a:fld>
             <a:endParaRPr lang="en-US"/>
           </a:p>
@@ -23202,7 +23202,7 @@
           <a:p>
             <a:fld id="{B96FFCCF-F4AB-4D56-AEE8-39DF7F28FF62}" type="datetimeFigureOut">
               <a:rPr lang="en-US" smtClean="0"/>
-              <a:t>2017-11-10</a:t>
+              <a:t>2019-09-06</a:t>
             </a:fld>
             <a:endParaRPr lang="en-US"/>
           </a:p>
@@ -23712,7 +23712,7 @@
           <a:p>
             <a:fld id="{E90DB797-294B-4B2B-9A48-229F3ACF3E1A}" type="datetimeFigureOut">
               <a:rPr lang="en-US" smtClean="0"/>
-              <a:t>2017-11-10</a:t>
+              <a:t>2019-09-06</a:t>
             </a:fld>
             <a:endParaRPr lang="en-US"/>
           </a:p>
@@ -24688,427 +24688,321 @@
           </a:fontRef>
         </p:style>
       </p:cxnSp>
-      <p:grpSp>
-        <p:nvGrpSpPr>
-          <p:cNvPr id="829" name="Group 828"/>
-          <p:cNvGrpSpPr/>
+      <p:sp>
+        <p:nvSpPr>
+          <p:cNvPr id="830" name="Rectangle 829"/>
+          <p:cNvSpPr/>
           <p:nvPr/>
-        </p:nvGrpSpPr>
-        <p:grpSpPr>
+        </p:nvSpPr>
+        <p:spPr>
           <a:xfrm>
-            <a:off x="6046332" y="2100744"/>
-            <a:ext cx="1031501" cy="1103526"/>
-            <a:chOff x="4559753" y="1856548"/>
-            <a:chExt cx="1031501" cy="1103526"/>
+            <a:off x="6046332" y="2078610"/>
+            <a:ext cx="1028808" cy="1165864"/>
           </a:xfrm>
-        </p:grpSpPr>
-        <p:sp>
-          <p:nvSpPr>
-            <p:cNvPr id="830" name="Rectangle 829"/>
-            <p:cNvSpPr/>
-            <p:nvPr/>
-          </p:nvSpPr>
-          <p:spPr>
-            <a:xfrm>
-              <a:off x="4559753" y="1856548"/>
-              <a:ext cx="1028808" cy="1103526"/>
-            </a:xfrm>
-            <a:prstGeom prst="rect">
-              <a:avLst/>
-            </a:prstGeom>
-            <a:gradFill flip="none" rotWithShape="1">
-              <a:gsLst>
-                <a:gs pos="0">
-                  <a:schemeClr val="accent1">
-                    <a:tint val="66000"/>
-                    <a:satMod val="160000"/>
-                  </a:schemeClr>
-                </a:gs>
-                <a:gs pos="50000">
-                  <a:srgbClr val="DFE7F5"/>
-                </a:gs>
-                <a:gs pos="100000">
-                  <a:srgbClr val="B4C6E6"/>
-                </a:gs>
-              </a:gsLst>
-              <a:lin ang="2700000" scaled="1"/>
-              <a:tileRect/>
-            </a:gradFill>
-            <a:ln w="22225" cmpd="dbl">
-              <a:solidFill>
-                <a:schemeClr val="bg1">
-                  <a:lumMod val="65000"/>
-                </a:schemeClr>
-              </a:solidFill>
-            </a:ln>
-            <a:effectLst>
-              <a:outerShdw blurRad="50800" dist="38100" dir="2700000" algn="tl" rotWithShape="0">
-                <a:prstClr val="black">
-                  <a:alpha val="40000"/>
-                </a:prstClr>
-              </a:outerShdw>
-            </a:effectLst>
-          </p:spPr>
-          <p:style>
-            <a:lnRef idx="2">
-              <a:schemeClr val="accent1">
-                <a:shade val="50000"/>
-              </a:schemeClr>
-            </a:lnRef>
-            <a:fillRef idx="1">
-              <a:schemeClr val="accent1"/>
-            </a:fillRef>
-            <a:effectRef idx="0">
-              <a:schemeClr val="accent1"/>
-            </a:effectRef>
-            <a:fontRef idx="minor">
-              <a:schemeClr val="lt1"/>
-            </a:fontRef>
-          </p:style>
-          <p:txBody>
-            <a:bodyPr lIns="72000" tIns="72000" rIns="72000" bIns="108000" rtlCol="0" anchor="ctr" anchorCtr="1">
-              <a:noAutofit/>
-            </a:bodyPr>
-            <a:lstStyle/>
-            <a:p>
-              <a:pPr algn="ctr"/>
-              <a:endParaRPr lang="en-US" sz="1200" dirty="0" smtClean="0">
-                <a:solidFill>
-                  <a:schemeClr val="tx1"/>
-                </a:solidFill>
-                <a:latin typeface="Arial" panose="020B0604020202020204" pitchFamily="34" charset="0"/>
-                <a:cs typeface="Arial" panose="020B0604020202020204" pitchFamily="34" charset="0"/>
-              </a:endParaRPr>
-            </a:p>
-          </p:txBody>
-        </p:sp>
-        <p:sp>
-          <p:nvSpPr>
-            <p:cNvPr id="831" name="Rounded Rectangle 830"/>
-            <p:cNvSpPr>
-              <a:spLocks noChangeAspect="1"/>
-            </p:cNvSpPr>
-            <p:nvPr/>
-          </p:nvSpPr>
-          <p:spPr>
-            <a:xfrm>
-              <a:off x="4892146" y="2094308"/>
-              <a:ext cx="352515" cy="216000"/>
-            </a:xfrm>
-            <a:prstGeom prst="roundRect">
-              <a:avLst/>
-            </a:prstGeom>
-            <a:solidFill>
-              <a:schemeClr val="bg1"/>
-            </a:solidFill>
-            <a:ln w="9525">
-              <a:solidFill>
-                <a:schemeClr val="bg1">
-                  <a:lumMod val="65000"/>
-                </a:schemeClr>
-              </a:solidFill>
-            </a:ln>
-            <a:effectLst/>
-          </p:spPr>
-          <p:style>
-            <a:lnRef idx="2">
-              <a:schemeClr val="accent1">
-                <a:shade val="50000"/>
-              </a:schemeClr>
-            </a:lnRef>
-            <a:fillRef idx="1">
-              <a:schemeClr val="accent1"/>
-            </a:fillRef>
-            <a:effectRef idx="0">
-              <a:schemeClr val="accent1"/>
-            </a:effectRef>
-            <a:fontRef idx="minor">
-              <a:schemeClr val="lt1"/>
-            </a:fontRef>
-          </p:style>
-          <p:txBody>
-            <a:bodyPr rtlCol="0" anchor="ctr"/>
-            <a:lstStyle/>
-            <a:p>
-              <a:pPr algn="ctr"/>
-              <a:endParaRPr lang="en-US"/>
-            </a:p>
-          </p:txBody>
-        </p:sp>
-        <p:sp>
-          <p:nvSpPr>
-            <p:cNvPr id="832" name="TextBox 831"/>
-            <p:cNvSpPr txBox="1"/>
-            <p:nvPr/>
-          </p:nvSpPr>
-          <p:spPr>
-            <a:xfrm>
-              <a:off x="4638418" y="1868909"/>
-              <a:ext cx="851515" cy="246221"/>
-            </a:xfrm>
-            <a:prstGeom prst="rect">
-              <a:avLst/>
-            </a:prstGeom>
-            <a:noFill/>
-          </p:spPr>
-          <p:txBody>
-            <a:bodyPr wrap="none" rtlCol="0">
-              <a:spAutoFit/>
-            </a:bodyPr>
-            <a:lstStyle/>
-            <a:p>
-              <a:pPr algn="ctr"/>
-              <a:r>
-                <a:rPr lang="en-US" sz="1000" i="1" dirty="0" smtClean="0">
-                  <a:latin typeface="Arial" panose="020B0604020202020204" pitchFamily="34" charset="0"/>
-                  <a:cs typeface="Arial" panose="020B0604020202020204" pitchFamily="34" charset="0"/>
-                </a:rPr>
-                <a:t>Select Card</a:t>
-              </a:r>
-              <a:endParaRPr lang="en-US" sz="1000" i="1" dirty="0">
-                <a:latin typeface="Arial" panose="020B0604020202020204" pitchFamily="34" charset="0"/>
-                <a:cs typeface="Arial" panose="020B0604020202020204" pitchFamily="34" charset="0"/>
-              </a:endParaRPr>
-            </a:p>
-          </p:txBody>
-        </p:sp>
-        <p:sp>
-          <p:nvSpPr>
-            <p:cNvPr id="833" name="TextBox 832"/>
-            <p:cNvSpPr txBox="1"/>
-            <p:nvPr/>
-          </p:nvSpPr>
-          <p:spPr>
-            <a:xfrm>
-              <a:off x="4965080" y="2716487"/>
-              <a:ext cx="445685" cy="137651"/>
-            </a:xfrm>
-            <a:prstGeom prst="rect">
-              <a:avLst/>
-            </a:prstGeom>
-            <a:solidFill>
-              <a:schemeClr val="bg1"/>
-            </a:solidFill>
-            <a:ln w="6350">
-              <a:solidFill>
-                <a:schemeClr val="tx2">
-                  <a:lumMod val="60000"/>
-                  <a:lumOff val="40000"/>
-                </a:schemeClr>
-              </a:solidFill>
-              <a:prstDash val="solid"/>
-            </a:ln>
-          </p:spPr>
-          <p:txBody>
-            <a:bodyPr wrap="none" lIns="54000" tIns="0" rIns="54000" bIns="14400" rtlCol="0" anchor="ctr" anchorCtr="1">
-              <a:spAutoFit/>
-            </a:bodyPr>
-            <a:lstStyle/>
-            <a:p>
-              <a:pPr algn="ctr"/>
-              <a:r>
-                <a:rPr lang="en-US" sz="800" dirty="0" smtClean="0">
-                  <a:latin typeface="Arial" panose="020B0604020202020204" pitchFamily="34" charset="0"/>
-                  <a:cs typeface="Arial" panose="020B0604020202020204" pitchFamily="34" charset="0"/>
-                </a:rPr>
-                <a:t>● ●</a:t>
-              </a:r>
-              <a:r>
-                <a:rPr lang="en-US" sz="800" dirty="0">
-                  <a:latin typeface="Arial" panose="020B0604020202020204" pitchFamily="34" charset="0"/>
-                  <a:cs typeface="Arial" panose="020B0604020202020204" pitchFamily="34" charset="0"/>
-                </a:rPr>
-                <a:t> </a:t>
-              </a:r>
-              <a:r>
-                <a:rPr lang="en-US" sz="800" dirty="0" smtClean="0">
-                  <a:latin typeface="Arial" panose="020B0604020202020204" pitchFamily="34" charset="0"/>
-                  <a:cs typeface="Arial" panose="020B0604020202020204" pitchFamily="34" charset="0"/>
-                </a:rPr>
-                <a:t>●</a:t>
-              </a:r>
-              <a:r>
-                <a:rPr lang="en-US" sz="800" dirty="0">
-                  <a:latin typeface="Arial" panose="020B0604020202020204" pitchFamily="34" charset="0"/>
-                  <a:cs typeface="Arial" panose="020B0604020202020204" pitchFamily="34" charset="0"/>
-                </a:rPr>
-                <a:t> ●</a:t>
-              </a:r>
-              <a:endParaRPr lang="en-US" sz="800" b="1" i="1" dirty="0">
-                <a:latin typeface="Arial" panose="020B0604020202020204" pitchFamily="34" charset="0"/>
-                <a:cs typeface="Arial" panose="020B0604020202020204" pitchFamily="34" charset="0"/>
-              </a:endParaRPr>
-            </a:p>
-          </p:txBody>
-        </p:sp>
-        <p:sp>
-          <p:nvSpPr>
-            <p:cNvPr id="834" name="TextBox 833"/>
-            <p:cNvSpPr txBox="1"/>
-            <p:nvPr/>
-          </p:nvSpPr>
-          <p:spPr>
-            <a:xfrm>
-              <a:off x="4603675" y="2661137"/>
-              <a:ext cx="433132" cy="246221"/>
-            </a:xfrm>
-            <a:prstGeom prst="rect">
-              <a:avLst/>
-            </a:prstGeom>
-            <a:noFill/>
-          </p:spPr>
-          <p:txBody>
-            <a:bodyPr wrap="none" rtlCol="0">
-              <a:spAutoFit/>
-            </a:bodyPr>
-            <a:lstStyle/>
-            <a:p>
-              <a:pPr algn="ctr"/>
-              <a:r>
-                <a:rPr lang="en-US" sz="1000" dirty="0" smtClean="0">
-                  <a:latin typeface="Arial" panose="020B0604020202020204" pitchFamily="34" charset="0"/>
-                  <a:cs typeface="Arial" panose="020B0604020202020204" pitchFamily="34" charset="0"/>
-                </a:rPr>
-                <a:t>PIN:</a:t>
-              </a:r>
-              <a:endParaRPr lang="en-US" sz="1000" dirty="0">
-                <a:latin typeface="Arial" panose="020B0604020202020204" pitchFamily="34" charset="0"/>
-                <a:cs typeface="Arial" panose="020B0604020202020204" pitchFamily="34" charset="0"/>
-              </a:endParaRPr>
-            </a:p>
-          </p:txBody>
-        </p:sp>
-        <p:sp>
-          <p:nvSpPr>
-            <p:cNvPr id="835" name="TextBox 834"/>
-            <p:cNvSpPr txBox="1"/>
-            <p:nvPr/>
-          </p:nvSpPr>
-          <p:spPr>
-            <a:xfrm>
-              <a:off x="5127935" y="2462159"/>
-              <a:ext cx="463319" cy="199207"/>
-            </a:xfrm>
-            <a:prstGeom prst="rect">
-              <a:avLst/>
-            </a:prstGeom>
-            <a:noFill/>
-            <a:ln w="6350">
-              <a:noFill/>
-              <a:prstDash val="solid"/>
-            </a:ln>
-          </p:spPr>
-          <p:txBody>
-            <a:bodyPr wrap="none" lIns="54000" tIns="0" rIns="54000" bIns="14400" rtlCol="0" anchor="ctr" anchorCtr="1">
-              <a:spAutoFit/>
-            </a:bodyPr>
-            <a:lstStyle/>
-            <a:p>
-              <a:pPr algn="ctr"/>
-              <a:r>
-                <a:rPr lang="en-US" sz="1200" dirty="0" smtClean="0">
-                  <a:latin typeface="Arial" panose="020B0604020202020204" pitchFamily="34" charset="0"/>
-                  <a:cs typeface="Arial" panose="020B0604020202020204" pitchFamily="34" charset="0"/>
-                </a:rPr>
-                <a:t>$</a:t>
-              </a:r>
-              <a:r>
-                <a:rPr lang="en-US" sz="400" dirty="0" smtClean="0">
-                  <a:latin typeface="Arial" panose="020B0604020202020204" pitchFamily="34" charset="0"/>
-                  <a:cs typeface="Arial" panose="020B0604020202020204" pitchFamily="34" charset="0"/>
-                </a:rPr>
-                <a:t> </a:t>
-              </a:r>
-              <a:r>
-                <a:rPr lang="en-US" sz="1200" dirty="0" smtClean="0">
-                  <a:latin typeface="Arial" panose="020B0604020202020204" pitchFamily="34" charset="0"/>
-                  <a:cs typeface="Arial" panose="020B0604020202020204" pitchFamily="34" charset="0"/>
-                </a:rPr>
-                <a:t>200</a:t>
-              </a:r>
-              <a:endParaRPr lang="en-US" sz="1200" b="1" i="1" dirty="0">
-                <a:latin typeface="Arial" panose="020B0604020202020204" pitchFamily="34" charset="0"/>
-                <a:cs typeface="Arial" panose="020B0604020202020204" pitchFamily="34" charset="0"/>
-              </a:endParaRPr>
-            </a:p>
-          </p:txBody>
-        </p:sp>
-        <p:sp>
-          <p:nvSpPr>
-            <p:cNvPr id="836" name="TextBox 835"/>
-            <p:cNvSpPr txBox="1"/>
-            <p:nvPr/>
-          </p:nvSpPr>
-          <p:spPr>
-            <a:xfrm>
-              <a:off x="4591511" y="2432612"/>
-              <a:ext cx="659156" cy="246221"/>
-            </a:xfrm>
-            <a:prstGeom prst="rect">
-              <a:avLst/>
-            </a:prstGeom>
-            <a:noFill/>
-          </p:spPr>
-          <p:txBody>
-            <a:bodyPr wrap="none" rtlCol="0">
-              <a:spAutoFit/>
-            </a:bodyPr>
-            <a:lstStyle/>
-            <a:p>
-              <a:pPr algn="ctr"/>
-              <a:r>
-                <a:rPr lang="en-US" sz="1000" dirty="0" smtClean="0">
-                  <a:latin typeface="Arial" panose="020B0604020202020204" pitchFamily="34" charset="0"/>
-                  <a:cs typeface="Arial" panose="020B0604020202020204" pitchFamily="34" charset="0"/>
-                </a:rPr>
-                <a:t>Amount:</a:t>
-              </a:r>
-              <a:endParaRPr lang="en-US" sz="1000" dirty="0">
-                <a:latin typeface="Arial" panose="020B0604020202020204" pitchFamily="34" charset="0"/>
-                <a:cs typeface="Arial" panose="020B0604020202020204" pitchFamily="34" charset="0"/>
-              </a:endParaRPr>
-            </a:p>
-          </p:txBody>
-        </p:sp>
-      </p:grpSp>
-      <p:cxnSp>
-        <p:nvCxnSpPr>
-          <p:cNvPr id="837" name="Elbow Connector 836"/>
-          <p:cNvCxnSpPr/>
-          <p:nvPr/>
-        </p:nvCxnSpPr>
-        <p:spPr>
-          <a:xfrm flipV="1">
-            <a:off x="6651385" y="1187455"/>
-            <a:ext cx="612000" cy="1260000"/>
-          </a:xfrm>
-          <a:prstGeom prst="bentConnector2">
+          <a:prstGeom prst="rect">
             <a:avLst/>
           </a:prstGeom>
-          <a:ln w="3175">
+          <a:gradFill flip="none" rotWithShape="1">
+            <a:gsLst>
+              <a:gs pos="0">
+                <a:schemeClr val="accent1">
+                  <a:tint val="66000"/>
+                  <a:satMod val="160000"/>
+                </a:schemeClr>
+              </a:gs>
+              <a:gs pos="50000">
+                <a:srgbClr val="DFE7F5"/>
+              </a:gs>
+              <a:gs pos="100000">
+                <a:srgbClr val="B4C6E6"/>
+              </a:gs>
+            </a:gsLst>
+            <a:lin ang="2700000" scaled="1"/>
+            <a:tileRect/>
+          </a:gradFill>
+          <a:ln w="22225" cmpd="dbl">
             <a:solidFill>
-              <a:schemeClr val="tx1"/>
+              <a:schemeClr val="bg1">
+                <a:lumMod val="65000"/>
+              </a:schemeClr>
             </a:solidFill>
-            <a:prstDash val="sysDot"/>
-            <a:headEnd type="none" w="sm" len="sm"/>
-            <a:tailEnd type="none"/>
           </a:ln>
+          <a:effectLst>
+            <a:outerShdw blurRad="50800" dist="38100" dir="2700000" algn="tl" rotWithShape="0">
+              <a:prstClr val="black">
+                <a:alpha val="40000"/>
+              </a:prstClr>
+            </a:outerShdw>
+          </a:effectLst>
         </p:spPr>
         <p:style>
-          <a:lnRef idx="1">
-            <a:schemeClr val="accent1"/>
+          <a:lnRef idx="2">
+            <a:schemeClr val="accent1">
+              <a:shade val="50000"/>
+            </a:schemeClr>
           </a:lnRef>
-          <a:fillRef idx="0">
+          <a:fillRef idx="1">
             <a:schemeClr val="accent1"/>
           </a:fillRef>
           <a:effectRef idx="0">
             <a:schemeClr val="accent1"/>
           </a:effectRef>
           <a:fontRef idx="minor">
-            <a:schemeClr val="tx1"/>
+            <a:schemeClr val="lt1"/>
           </a:fontRef>
         </p:style>
-      </p:cxnSp>
+        <p:txBody>
+          <a:bodyPr lIns="72000" tIns="72000" rIns="72000" bIns="108000" rtlCol="0" anchor="ctr" anchorCtr="1">
+            <a:noAutofit/>
+          </a:bodyPr>
+          <a:lstStyle/>
+          <a:p>
+            <a:pPr algn="ctr"/>
+            <a:endParaRPr lang="en-US" sz="1200" dirty="0" smtClean="0">
+              <a:solidFill>
+                <a:schemeClr val="tx1"/>
+              </a:solidFill>
+              <a:latin typeface="Arial" panose="020B0604020202020204" pitchFamily="34" charset="0"/>
+              <a:cs typeface="Arial" panose="020B0604020202020204" pitchFamily="34" charset="0"/>
+            </a:endParaRPr>
+          </a:p>
+        </p:txBody>
+      </p:sp>
+      <p:sp>
+        <p:nvSpPr>
+          <p:cNvPr id="832" name="TextBox 831"/>
+          <p:cNvSpPr txBox="1"/>
+          <p:nvPr/>
+        </p:nvSpPr>
+        <p:spPr>
+          <a:xfrm>
+            <a:off x="6124997" y="2108248"/>
+            <a:ext cx="851515" cy="246221"/>
+          </a:xfrm>
+          <a:prstGeom prst="rect">
+            <a:avLst/>
+          </a:prstGeom>
+          <a:noFill/>
+        </p:spPr>
+        <p:txBody>
+          <a:bodyPr wrap="none" rtlCol="0">
+            <a:spAutoFit/>
+          </a:bodyPr>
+          <a:lstStyle/>
+          <a:p>
+            <a:pPr algn="ctr"/>
+            <a:r>
+              <a:rPr lang="en-US" sz="1000" i="1" dirty="0" smtClean="0">
+                <a:latin typeface="Arial" panose="020B0604020202020204" pitchFamily="34" charset="0"/>
+                <a:cs typeface="Arial" panose="020B0604020202020204" pitchFamily="34" charset="0"/>
+              </a:rPr>
+              <a:t>Select Card</a:t>
+            </a:r>
+            <a:endParaRPr lang="en-US" sz="1000" i="1" dirty="0">
+              <a:latin typeface="Arial" panose="020B0604020202020204" pitchFamily="34" charset="0"/>
+              <a:cs typeface="Arial" panose="020B0604020202020204" pitchFamily="34" charset="0"/>
+            </a:endParaRPr>
+          </a:p>
+        </p:txBody>
+      </p:sp>
+      <p:sp>
+        <p:nvSpPr>
+          <p:cNvPr id="833" name="TextBox 832"/>
+          <p:cNvSpPr txBox="1"/>
+          <p:nvPr/>
+        </p:nvSpPr>
+        <p:spPr>
+          <a:xfrm>
+            <a:off x="6451659" y="3000887"/>
+            <a:ext cx="445685" cy="137651"/>
+          </a:xfrm>
+          <a:prstGeom prst="rect">
+            <a:avLst/>
+          </a:prstGeom>
+          <a:solidFill>
+            <a:schemeClr val="bg1"/>
+          </a:solidFill>
+          <a:ln w="6350">
+            <a:solidFill>
+              <a:schemeClr val="tx2">
+                <a:lumMod val="60000"/>
+                <a:lumOff val="40000"/>
+              </a:schemeClr>
+            </a:solidFill>
+            <a:prstDash val="solid"/>
+          </a:ln>
+        </p:spPr>
+        <p:txBody>
+          <a:bodyPr wrap="none" lIns="54000" tIns="0" rIns="54000" bIns="14400" rtlCol="0" anchor="ctr" anchorCtr="1">
+            <a:spAutoFit/>
+          </a:bodyPr>
+          <a:lstStyle/>
+          <a:p>
+            <a:pPr algn="ctr"/>
+            <a:r>
+              <a:rPr lang="en-US" sz="800" dirty="0" smtClean="0">
+                <a:latin typeface="Arial" panose="020B0604020202020204" pitchFamily="34" charset="0"/>
+                <a:cs typeface="Arial" panose="020B0604020202020204" pitchFamily="34" charset="0"/>
+              </a:rPr>
+              <a:t>● ●</a:t>
+            </a:r>
+            <a:r>
+              <a:rPr lang="en-US" sz="800" dirty="0">
+                <a:latin typeface="Arial" panose="020B0604020202020204" pitchFamily="34" charset="0"/>
+                <a:cs typeface="Arial" panose="020B0604020202020204" pitchFamily="34" charset="0"/>
+              </a:rPr>
+              <a:t> </a:t>
+            </a:r>
+            <a:r>
+              <a:rPr lang="en-US" sz="800" dirty="0" smtClean="0">
+                <a:latin typeface="Arial" panose="020B0604020202020204" pitchFamily="34" charset="0"/>
+                <a:cs typeface="Arial" panose="020B0604020202020204" pitchFamily="34" charset="0"/>
+              </a:rPr>
+              <a:t>●</a:t>
+            </a:r>
+            <a:r>
+              <a:rPr lang="en-US" sz="800" dirty="0">
+                <a:latin typeface="Arial" panose="020B0604020202020204" pitchFamily="34" charset="0"/>
+                <a:cs typeface="Arial" panose="020B0604020202020204" pitchFamily="34" charset="0"/>
+              </a:rPr>
+              <a:t> ●</a:t>
+            </a:r>
+            <a:endParaRPr lang="en-US" sz="800" b="1" i="1" dirty="0">
+              <a:latin typeface="Arial" panose="020B0604020202020204" pitchFamily="34" charset="0"/>
+              <a:cs typeface="Arial" panose="020B0604020202020204" pitchFamily="34" charset="0"/>
+            </a:endParaRPr>
+          </a:p>
+        </p:txBody>
+      </p:sp>
+      <p:sp>
+        <p:nvSpPr>
+          <p:cNvPr id="834" name="TextBox 833"/>
+          <p:cNvSpPr txBox="1"/>
+          <p:nvPr/>
+        </p:nvSpPr>
+        <p:spPr>
+          <a:xfrm>
+            <a:off x="6090254" y="2945537"/>
+            <a:ext cx="433132" cy="246221"/>
+          </a:xfrm>
+          <a:prstGeom prst="rect">
+            <a:avLst/>
+          </a:prstGeom>
+          <a:noFill/>
+        </p:spPr>
+        <p:txBody>
+          <a:bodyPr wrap="none" rtlCol="0">
+            <a:spAutoFit/>
+          </a:bodyPr>
+          <a:lstStyle/>
+          <a:p>
+            <a:pPr algn="ctr"/>
+            <a:r>
+              <a:rPr lang="en-US" sz="1000" dirty="0" smtClean="0">
+                <a:latin typeface="Arial" panose="020B0604020202020204" pitchFamily="34" charset="0"/>
+                <a:cs typeface="Arial" panose="020B0604020202020204" pitchFamily="34" charset="0"/>
+              </a:rPr>
+              <a:t>PIN:</a:t>
+            </a:r>
+            <a:endParaRPr lang="en-US" sz="1000" dirty="0">
+              <a:latin typeface="Arial" panose="020B0604020202020204" pitchFamily="34" charset="0"/>
+              <a:cs typeface="Arial" panose="020B0604020202020204" pitchFamily="34" charset="0"/>
+            </a:endParaRPr>
+          </a:p>
+        </p:txBody>
+      </p:sp>
+      <p:sp>
+        <p:nvSpPr>
+          <p:cNvPr id="835" name="TextBox 834"/>
+          <p:cNvSpPr txBox="1"/>
+          <p:nvPr/>
+        </p:nvSpPr>
+        <p:spPr>
+          <a:xfrm>
+            <a:off x="6614514" y="2746559"/>
+            <a:ext cx="463319" cy="199207"/>
+          </a:xfrm>
+          <a:prstGeom prst="rect">
+            <a:avLst/>
+          </a:prstGeom>
+          <a:noFill/>
+          <a:ln w="6350">
+            <a:noFill/>
+            <a:prstDash val="solid"/>
+          </a:ln>
+        </p:spPr>
+        <p:txBody>
+          <a:bodyPr wrap="none" lIns="54000" tIns="0" rIns="54000" bIns="14400" rtlCol="0" anchor="ctr" anchorCtr="1">
+            <a:spAutoFit/>
+          </a:bodyPr>
+          <a:lstStyle/>
+          <a:p>
+            <a:pPr algn="ctr"/>
+            <a:r>
+              <a:rPr lang="en-US" sz="1200" dirty="0" smtClean="0">
+                <a:latin typeface="Arial" panose="020B0604020202020204" pitchFamily="34" charset="0"/>
+                <a:cs typeface="Arial" panose="020B0604020202020204" pitchFamily="34" charset="0"/>
+              </a:rPr>
+              <a:t>$</a:t>
+            </a:r>
+            <a:r>
+              <a:rPr lang="en-US" sz="400" dirty="0" smtClean="0">
+                <a:latin typeface="Arial" panose="020B0604020202020204" pitchFamily="34" charset="0"/>
+                <a:cs typeface="Arial" panose="020B0604020202020204" pitchFamily="34" charset="0"/>
+              </a:rPr>
+              <a:t> </a:t>
+            </a:r>
+            <a:r>
+              <a:rPr lang="en-US" sz="1200" dirty="0" smtClean="0">
+                <a:latin typeface="Arial" panose="020B0604020202020204" pitchFamily="34" charset="0"/>
+                <a:cs typeface="Arial" panose="020B0604020202020204" pitchFamily="34" charset="0"/>
+              </a:rPr>
+              <a:t>200</a:t>
+            </a:r>
+            <a:endParaRPr lang="en-US" sz="1200" b="1" i="1" dirty="0">
+              <a:latin typeface="Arial" panose="020B0604020202020204" pitchFamily="34" charset="0"/>
+              <a:cs typeface="Arial" panose="020B0604020202020204" pitchFamily="34" charset="0"/>
+            </a:endParaRPr>
+          </a:p>
+        </p:txBody>
+      </p:sp>
+      <p:sp>
+        <p:nvSpPr>
+          <p:cNvPr id="836" name="TextBox 835"/>
+          <p:cNvSpPr txBox="1"/>
+          <p:nvPr/>
+        </p:nvSpPr>
+        <p:spPr>
+          <a:xfrm>
+            <a:off x="6078090" y="2717012"/>
+            <a:ext cx="659156" cy="246221"/>
+          </a:xfrm>
+          <a:prstGeom prst="rect">
+            <a:avLst/>
+          </a:prstGeom>
+          <a:noFill/>
+        </p:spPr>
+        <p:txBody>
+          <a:bodyPr wrap="none" rtlCol="0">
+            <a:spAutoFit/>
+          </a:bodyPr>
+          <a:lstStyle/>
+          <a:p>
+            <a:pPr algn="ctr"/>
+            <a:r>
+              <a:rPr lang="en-US" sz="1000" dirty="0" smtClean="0">
+                <a:latin typeface="Arial" panose="020B0604020202020204" pitchFamily="34" charset="0"/>
+                <a:cs typeface="Arial" panose="020B0604020202020204" pitchFamily="34" charset="0"/>
+              </a:rPr>
+              <a:t>Amount:</a:t>
+            </a:r>
+            <a:endParaRPr lang="en-US" sz="1000" dirty="0">
+              <a:latin typeface="Arial" panose="020B0604020202020204" pitchFamily="34" charset="0"/>
+              <a:cs typeface="Arial" panose="020B0604020202020204" pitchFamily="34" charset="0"/>
+            </a:endParaRPr>
+          </a:p>
+        </p:txBody>
+      </p:sp>
       <p:cxnSp>
         <p:nvCxnSpPr>
           <p:cNvPr id="838" name="Straight Connector 837"/>
@@ -26738,812 +26632,815 @@
           </a:p>
         </p:txBody>
       </p:sp>
+      <p:sp>
+        <p:nvSpPr>
+          <p:cNvPr id="887" name="Rounded Rectangle 886"/>
+          <p:cNvSpPr/>
+          <p:nvPr/>
+        </p:nvSpPr>
+        <p:spPr>
+          <a:xfrm>
+            <a:off x="6909018" y="948069"/>
+            <a:ext cx="504055" cy="308854"/>
+          </a:xfrm>
+          <a:prstGeom prst="roundRect">
+            <a:avLst/>
+          </a:prstGeom>
+          <a:solidFill>
+            <a:schemeClr val="accent5">
+              <a:lumMod val="20000"/>
+              <a:lumOff val="80000"/>
+            </a:schemeClr>
+          </a:solidFill>
+          <a:ln w="9525">
+            <a:solidFill>
+              <a:schemeClr val="bg1">
+                <a:lumMod val="65000"/>
+              </a:schemeClr>
+            </a:solidFill>
+          </a:ln>
+          <a:effectLst>
+            <a:outerShdw blurRad="50800" dist="38100" dir="2700000" algn="tl" rotWithShape="0">
+              <a:prstClr val="black">
+                <a:alpha val="40000"/>
+              </a:prstClr>
+            </a:outerShdw>
+          </a:effectLst>
+        </p:spPr>
+        <p:style>
+          <a:lnRef idx="2">
+            <a:schemeClr val="accent1">
+              <a:shade val="50000"/>
+            </a:schemeClr>
+          </a:lnRef>
+          <a:fillRef idx="1">
+            <a:schemeClr val="accent1"/>
+          </a:fillRef>
+          <a:effectRef idx="0">
+            <a:schemeClr val="accent1"/>
+          </a:effectRef>
+          <a:fontRef idx="minor">
+            <a:schemeClr val="lt1"/>
+          </a:fontRef>
+        </p:style>
+        <p:txBody>
+          <a:bodyPr rtlCol="0" anchor="ctr"/>
+          <a:lstStyle/>
+          <a:p>
+            <a:pPr algn="ctr"/>
+            <a:endParaRPr lang="en-US"/>
+          </a:p>
+        </p:txBody>
+      </p:sp>
+      <p:sp>
+        <p:nvSpPr>
+          <p:cNvPr id="888" name="Rounded Rectangle 887"/>
+          <p:cNvSpPr/>
+          <p:nvPr/>
+        </p:nvSpPr>
+        <p:spPr>
+          <a:xfrm>
+            <a:off x="6989655" y="876061"/>
+            <a:ext cx="504055" cy="308854"/>
+          </a:xfrm>
+          <a:prstGeom prst="roundRect">
+            <a:avLst/>
+          </a:prstGeom>
+          <a:solidFill>
+            <a:srgbClr val="FDFAC7"/>
+          </a:solidFill>
+          <a:ln w="9525">
+            <a:solidFill>
+              <a:schemeClr val="bg1">
+                <a:lumMod val="65000"/>
+              </a:schemeClr>
+            </a:solidFill>
+          </a:ln>
+          <a:effectLst>
+            <a:outerShdw blurRad="50800" dist="38100" dir="2700000" algn="tl" rotWithShape="0">
+              <a:prstClr val="black">
+                <a:alpha val="40000"/>
+              </a:prstClr>
+            </a:outerShdw>
+          </a:effectLst>
+        </p:spPr>
+        <p:style>
+          <a:lnRef idx="2">
+            <a:schemeClr val="accent1">
+              <a:shade val="50000"/>
+            </a:schemeClr>
+          </a:lnRef>
+          <a:fillRef idx="1">
+            <a:schemeClr val="accent1"/>
+          </a:fillRef>
+          <a:effectRef idx="0">
+            <a:schemeClr val="accent1"/>
+          </a:effectRef>
+          <a:fontRef idx="minor">
+            <a:schemeClr val="lt1"/>
+          </a:fontRef>
+        </p:style>
+        <p:txBody>
+          <a:bodyPr rtlCol="0" anchor="ctr"/>
+          <a:lstStyle/>
+          <a:p>
+            <a:pPr algn="ctr"/>
+            <a:endParaRPr lang="en-US"/>
+          </a:p>
+        </p:txBody>
+      </p:sp>
+      <p:sp>
+        <p:nvSpPr>
+          <p:cNvPr id="889" name="Rounded Rectangle 888"/>
+          <p:cNvSpPr/>
+          <p:nvPr/>
+        </p:nvSpPr>
+        <p:spPr>
+          <a:xfrm>
+            <a:off x="7073280" y="804053"/>
+            <a:ext cx="504055" cy="308854"/>
+          </a:xfrm>
+          <a:prstGeom prst="roundRect">
+            <a:avLst/>
+          </a:prstGeom>
+          <a:solidFill>
+            <a:schemeClr val="accent3">
+              <a:lumMod val="20000"/>
+              <a:lumOff val="80000"/>
+            </a:schemeClr>
+          </a:solidFill>
+          <a:ln w="9525">
+            <a:solidFill>
+              <a:schemeClr val="bg1">
+                <a:lumMod val="65000"/>
+              </a:schemeClr>
+            </a:solidFill>
+          </a:ln>
+          <a:effectLst>
+            <a:outerShdw blurRad="50800" dist="38100" dir="2700000" algn="tl" rotWithShape="0">
+              <a:prstClr val="black">
+                <a:alpha val="40000"/>
+              </a:prstClr>
+            </a:outerShdw>
+          </a:effectLst>
+        </p:spPr>
+        <p:style>
+          <a:lnRef idx="2">
+            <a:schemeClr val="accent1">
+              <a:shade val="50000"/>
+            </a:schemeClr>
+          </a:lnRef>
+          <a:fillRef idx="1">
+            <a:schemeClr val="accent1"/>
+          </a:fillRef>
+          <a:effectRef idx="0">
+            <a:schemeClr val="accent1"/>
+          </a:effectRef>
+          <a:fontRef idx="minor">
+            <a:schemeClr val="lt1"/>
+          </a:fontRef>
+        </p:style>
+        <p:txBody>
+          <a:bodyPr rtlCol="0" anchor="ctr"/>
+          <a:lstStyle/>
+          <a:p>
+            <a:pPr algn="ctr"/>
+            <a:endParaRPr lang="en-US"/>
+          </a:p>
+        </p:txBody>
+      </p:sp>
       <p:grpSp>
         <p:nvGrpSpPr>
-          <p:cNvPr id="886" name="Group 885"/>
-          <p:cNvGrpSpPr/>
+          <p:cNvPr id="890" name="Group 889"/>
+          <p:cNvGrpSpPr>
+            <a:grpSpLocks noChangeAspect="1"/>
+          </p:cNvGrpSpPr>
           <p:nvPr/>
         </p:nvGrpSpPr>
         <p:grpSpPr>
           <a:xfrm>
-            <a:off x="6909018" y="804053"/>
-            <a:ext cx="668317" cy="452870"/>
-            <a:chOff x="5303954" y="804102"/>
-            <a:chExt cx="668317" cy="452870"/>
+            <a:off x="7130976" y="854565"/>
+            <a:ext cx="183121" cy="132037"/>
+            <a:chOff x="2089401" y="630040"/>
+            <a:chExt cx="504468" cy="363739"/>
           </a:xfrm>
+          <a:effectLst/>
         </p:grpSpPr>
         <p:sp>
           <p:nvSpPr>
-            <p:cNvPr id="887" name="Rounded Rectangle 886"/>
-            <p:cNvSpPr/>
+            <p:cNvPr id="894" name="Rectangle 893"/>
+            <p:cNvSpPr>
+              <a:spLocks noChangeArrowheads="1"/>
+            </p:cNvSpPr>
             <p:nvPr/>
           </p:nvSpPr>
-          <p:spPr>
+          <p:spPr bwMode="auto">
             <a:xfrm>
-              <a:off x="5303954" y="948118"/>
-              <a:ext cx="504055" cy="308854"/>
+              <a:off x="2470474" y="737128"/>
+              <a:ext cx="60698" cy="203641"/>
             </a:xfrm>
-            <a:prstGeom prst="roundRect">
+            <a:prstGeom prst="rect">
               <a:avLst/>
             </a:prstGeom>
-            <a:solidFill>
-              <a:schemeClr val="accent5">
-                <a:lumMod val="20000"/>
-                <a:lumOff val="80000"/>
-              </a:schemeClr>
-            </a:solidFill>
-            <a:ln w="9525">
+            <a:gradFill>
+              <a:gsLst>
+                <a:gs pos="0">
+                  <a:schemeClr val="bg1">
+                    <a:lumMod val="50000"/>
+                  </a:schemeClr>
+                </a:gs>
+                <a:gs pos="47000">
+                  <a:schemeClr val="bg1">
+                    <a:lumMod val="95000"/>
+                  </a:schemeClr>
+                </a:gs>
+                <a:gs pos="100000">
+                  <a:schemeClr val="bg1">
+                    <a:lumMod val="50000"/>
+                  </a:schemeClr>
+                </a:gs>
+              </a:gsLst>
+              <a:lin ang="10800000" scaled="0"/>
+            </a:gradFill>
+            <a:ln w="3175" cap="flat">
               <a:solidFill>
-                <a:schemeClr val="bg1">
-                  <a:lumMod val="65000"/>
-                </a:schemeClr>
+                <a:schemeClr val="tx1"/>
               </a:solidFill>
+              <a:prstDash val="solid"/>
+              <a:miter lim="800000"/>
+              <a:headEnd/>
+              <a:tailEnd/>
             </a:ln>
           </p:spPr>
-          <p:style>
-            <a:lnRef idx="2">
-              <a:schemeClr val="accent1">
-                <a:shade val="50000"/>
-              </a:schemeClr>
-            </a:lnRef>
-            <a:fillRef idx="1">
-              <a:schemeClr val="accent1"/>
-            </a:fillRef>
-            <a:effectRef idx="0">
-              <a:schemeClr val="accent1"/>
-            </a:effectRef>
-            <a:fontRef idx="minor">
-              <a:schemeClr val="lt1"/>
-            </a:fontRef>
-          </p:style>
           <p:txBody>
-            <a:bodyPr rtlCol="0" anchor="ctr"/>
+            <a:bodyPr vert="horz" wrap="square" lIns="91440" tIns="45720" rIns="91440" bIns="45720" numCol="1" anchor="t" anchorCtr="0" compatLnSpc="1">
+              <a:prstTxWarp prst="textNoShape">
+                <a:avLst/>
+              </a:prstTxWarp>
+            </a:bodyPr>
             <a:lstStyle/>
             <a:p>
-              <a:pPr algn="ctr"/>
               <a:endParaRPr lang="en-US"/>
             </a:p>
           </p:txBody>
         </p:sp>
         <p:sp>
           <p:nvSpPr>
-            <p:cNvPr id="888" name="Rounded Rectangle 887"/>
-            <p:cNvSpPr/>
+            <p:cNvPr id="895" name="Rectangle 894"/>
+            <p:cNvSpPr>
+              <a:spLocks noChangeArrowheads="1"/>
+            </p:cNvSpPr>
             <p:nvPr/>
           </p:nvSpPr>
-          <p:spPr>
+          <p:spPr bwMode="auto">
             <a:xfrm>
-              <a:off x="5384591" y="876110"/>
-              <a:ext cx="504055" cy="308854"/>
+              <a:off x="2308857" y="737128"/>
+              <a:ext cx="60698" cy="203641"/>
             </a:xfrm>
-            <a:prstGeom prst="roundRect">
+            <a:prstGeom prst="rect">
               <a:avLst/>
             </a:prstGeom>
-            <a:solidFill>
-              <a:schemeClr val="accent6">
-                <a:lumMod val="20000"/>
-                <a:lumOff val="80000"/>
-              </a:schemeClr>
-            </a:solidFill>
-            <a:ln w="9525">
+            <a:gradFill>
+              <a:gsLst>
+                <a:gs pos="0">
+                  <a:schemeClr val="bg1">
+                    <a:lumMod val="50000"/>
+                  </a:schemeClr>
+                </a:gs>
+                <a:gs pos="47000">
+                  <a:schemeClr val="bg1">
+                    <a:lumMod val="95000"/>
+                  </a:schemeClr>
+                </a:gs>
+                <a:gs pos="100000">
+                  <a:schemeClr val="bg1">
+                    <a:lumMod val="50000"/>
+                  </a:schemeClr>
+                </a:gs>
+              </a:gsLst>
+              <a:lin ang="10800000" scaled="0"/>
+            </a:gradFill>
+            <a:ln w="3175" cap="flat">
               <a:solidFill>
-                <a:schemeClr val="bg1">
-                  <a:lumMod val="65000"/>
-                </a:schemeClr>
+                <a:schemeClr val="tx1"/>
               </a:solidFill>
+              <a:prstDash val="solid"/>
+              <a:miter lim="800000"/>
+              <a:headEnd/>
+              <a:tailEnd/>
             </a:ln>
           </p:spPr>
-          <p:style>
-            <a:lnRef idx="2">
-              <a:schemeClr val="accent1">
-                <a:shade val="50000"/>
-              </a:schemeClr>
-            </a:lnRef>
-            <a:fillRef idx="1">
-              <a:schemeClr val="accent1"/>
-            </a:fillRef>
-            <a:effectRef idx="0">
-              <a:schemeClr val="accent1"/>
-            </a:effectRef>
-            <a:fontRef idx="minor">
-              <a:schemeClr val="lt1"/>
-            </a:fontRef>
-          </p:style>
           <p:txBody>
-            <a:bodyPr rtlCol="0" anchor="ctr"/>
+            <a:bodyPr vert="horz" wrap="square" lIns="91440" tIns="45720" rIns="91440" bIns="45720" numCol="1" anchor="t" anchorCtr="0" compatLnSpc="1">
+              <a:prstTxWarp prst="textNoShape">
+                <a:avLst/>
+              </a:prstTxWarp>
+            </a:bodyPr>
             <a:lstStyle/>
             <a:p>
-              <a:pPr algn="ctr"/>
               <a:endParaRPr lang="en-US"/>
             </a:p>
           </p:txBody>
         </p:sp>
         <p:sp>
           <p:nvSpPr>
-            <p:cNvPr id="889" name="Rounded Rectangle 888"/>
-            <p:cNvSpPr/>
+            <p:cNvPr id="896" name="Rectangle 895"/>
+            <p:cNvSpPr>
+              <a:spLocks noChangeArrowheads="1"/>
+            </p:cNvSpPr>
             <p:nvPr/>
           </p:nvSpPr>
-          <p:spPr>
+          <p:spPr bwMode="auto">
             <a:xfrm>
-              <a:off x="5468216" y="804102"/>
-              <a:ext cx="504055" cy="308854"/>
+              <a:off x="2147398" y="737128"/>
+              <a:ext cx="60698" cy="203641"/>
             </a:xfrm>
-            <a:prstGeom prst="roundRect">
+            <a:prstGeom prst="rect">
               <a:avLst/>
             </a:prstGeom>
-            <a:solidFill>
-              <a:schemeClr val="accent3">
-                <a:lumMod val="20000"/>
-                <a:lumOff val="80000"/>
-              </a:schemeClr>
-            </a:solidFill>
-            <a:ln w="9525">
+            <a:gradFill>
+              <a:gsLst>
+                <a:gs pos="0">
+                  <a:schemeClr val="bg1">
+                    <a:lumMod val="50000"/>
+                  </a:schemeClr>
+                </a:gs>
+                <a:gs pos="47000">
+                  <a:schemeClr val="bg1">
+                    <a:lumMod val="95000"/>
+                  </a:schemeClr>
+                </a:gs>
+                <a:gs pos="100000">
+                  <a:schemeClr val="bg1">
+                    <a:lumMod val="65000"/>
+                  </a:schemeClr>
+                </a:gs>
+              </a:gsLst>
+              <a:lin ang="10800000" scaled="0"/>
+            </a:gradFill>
+            <a:ln w="3175" cap="flat">
               <a:solidFill>
-                <a:schemeClr val="bg1">
-                  <a:lumMod val="65000"/>
-                </a:schemeClr>
+                <a:schemeClr val="tx1"/>
               </a:solidFill>
+              <a:prstDash val="solid"/>
+              <a:miter lim="800000"/>
+              <a:headEnd/>
+              <a:tailEnd/>
             </a:ln>
           </p:spPr>
-          <p:style>
-            <a:lnRef idx="2">
-              <a:schemeClr val="accent1">
-                <a:shade val="50000"/>
-              </a:schemeClr>
-            </a:lnRef>
-            <a:fillRef idx="1">
-              <a:schemeClr val="accent1"/>
-            </a:fillRef>
-            <a:effectRef idx="0">
-              <a:schemeClr val="accent1"/>
-            </a:effectRef>
-            <a:fontRef idx="minor">
-              <a:schemeClr val="lt1"/>
-            </a:fontRef>
-          </p:style>
           <p:txBody>
-            <a:bodyPr rtlCol="0" anchor="ctr"/>
+            <a:bodyPr vert="horz" wrap="square" lIns="91440" tIns="45720" rIns="91440" bIns="45720" numCol="1" anchor="t" anchorCtr="0" compatLnSpc="1">
+              <a:prstTxWarp prst="textNoShape">
+                <a:avLst/>
+              </a:prstTxWarp>
+            </a:bodyPr>
             <a:lstStyle/>
             <a:p>
-              <a:pPr algn="ctr"/>
               <a:endParaRPr lang="en-US"/>
             </a:p>
           </p:txBody>
         </p:sp>
-        <p:grpSp>
-          <p:nvGrpSpPr>
-            <p:cNvPr id="890" name="Group 889"/>
-            <p:cNvGrpSpPr>
-              <a:grpSpLocks noChangeAspect="1"/>
-            </p:cNvGrpSpPr>
+        <p:sp>
+          <p:nvSpPr>
+            <p:cNvPr id="897" name="Freeform 16"/>
+            <p:cNvSpPr>
+              <a:spLocks/>
+            </p:cNvSpPr>
             <p:nvPr/>
-          </p:nvGrpSpPr>
-          <p:grpSpPr>
+          </p:nvSpPr>
+          <p:spPr bwMode="auto">
             <a:xfrm>
-              <a:off x="5525912" y="854614"/>
-              <a:ext cx="183121" cy="132037"/>
-              <a:chOff x="2089401" y="630040"/>
-              <a:chExt cx="504468" cy="363739"/>
+              <a:off x="2101635" y="630040"/>
+              <a:ext cx="472098" cy="120781"/>
             </a:xfrm>
-            <a:effectLst/>
-          </p:grpSpPr>
-          <p:sp>
-            <p:nvSpPr>
-              <p:cNvPr id="894" name="Rectangle 893"/>
-              <p:cNvSpPr>
-                <a:spLocks noChangeArrowheads="1"/>
-              </p:cNvSpPr>
-              <p:nvPr/>
-            </p:nvSpPr>
-            <p:spPr bwMode="auto">
-              <a:xfrm>
-                <a:off x="2470474" y="737128"/>
-                <a:ext cx="60698" cy="203641"/>
-              </a:xfrm>
-              <a:prstGeom prst="rect">
+            <a:custGeom>
+              <a:avLst/>
+              <a:gdLst>
+                <a:gd name="T0" fmla="*/ 6 w 3093"/>
+                <a:gd name="T1" fmla="*/ 451 h 764"/>
+                <a:gd name="T2" fmla="*/ 1523 w 3093"/>
+                <a:gd name="T3" fmla="*/ 0 h 764"/>
+                <a:gd name="T4" fmla="*/ 3093 w 3093"/>
+                <a:gd name="T5" fmla="*/ 468 h 764"/>
+                <a:gd name="T6" fmla="*/ 3089 w 3093"/>
+                <a:gd name="T7" fmla="*/ 764 h 764"/>
+                <a:gd name="T8" fmla="*/ 0 w 3093"/>
+                <a:gd name="T9" fmla="*/ 754 h 764"/>
+                <a:gd name="T10" fmla="*/ 6 w 3093"/>
+                <a:gd name="T11" fmla="*/ 451 h 764"/>
+              </a:gdLst>
+              <a:ahLst/>
+              <a:cxnLst>
+                <a:cxn ang="0">
+                  <a:pos x="T0" y="T1"/>
+                </a:cxn>
+                <a:cxn ang="0">
+                  <a:pos x="T2" y="T3"/>
+                </a:cxn>
+                <a:cxn ang="0">
+                  <a:pos x="T4" y="T5"/>
+                </a:cxn>
+                <a:cxn ang="0">
+                  <a:pos x="T6" y="T7"/>
+                </a:cxn>
+                <a:cxn ang="0">
+                  <a:pos x="T8" y="T9"/>
+                </a:cxn>
+                <a:cxn ang="0">
+                  <a:pos x="T10" y="T11"/>
+                </a:cxn>
+              </a:cxnLst>
+              <a:rect l="0" t="0" r="r" b="b"/>
+              <a:pathLst>
+                <a:path w="3093" h="764">
+                  <a:moveTo>
+                    <a:pt x="6" y="451"/>
+                  </a:moveTo>
+                  <a:cubicBezTo>
+                    <a:pt x="86" y="441"/>
+                    <a:pt x="1523" y="0"/>
+                    <a:pt x="1523" y="0"/>
+                  </a:cubicBezTo>
+                  <a:lnTo>
+                    <a:pt x="3093" y="468"/>
+                  </a:lnTo>
+                  <a:lnTo>
+                    <a:pt x="3089" y="764"/>
+                  </a:lnTo>
+                  <a:lnTo>
+                    <a:pt x="0" y="754"/>
+                  </a:lnTo>
+                  <a:lnTo>
+                    <a:pt x="6" y="451"/>
+                  </a:lnTo>
+                  <a:close/>
+                </a:path>
+              </a:pathLst>
+            </a:custGeom>
+            <a:solidFill>
+              <a:srgbClr val="E6E6E6"/>
+            </a:solidFill>
+            <a:ln w="3175" cap="flat">
+              <a:solidFill>
+                <a:srgbClr val="7B7B79"/>
+              </a:solidFill>
+              <a:prstDash val="solid"/>
+              <a:miter lim="800000"/>
+              <a:headEnd/>
+              <a:tailEnd/>
+            </a:ln>
+          </p:spPr>
+          <p:txBody>
+            <a:bodyPr vert="horz" wrap="square" lIns="91440" tIns="45720" rIns="91440" bIns="45720" numCol="1" anchor="t" anchorCtr="0" compatLnSpc="1">
+              <a:prstTxWarp prst="textNoShape">
                 <a:avLst/>
-              </a:prstGeom>
-              <a:gradFill>
-                <a:gsLst>
-                  <a:gs pos="0">
-                    <a:schemeClr val="bg1">
-                      <a:lumMod val="50000"/>
-                    </a:schemeClr>
-                  </a:gs>
-                  <a:gs pos="47000">
-                    <a:schemeClr val="bg1">
-                      <a:lumMod val="95000"/>
-                    </a:schemeClr>
-                  </a:gs>
-                  <a:gs pos="100000">
-                    <a:schemeClr val="bg1">
-                      <a:lumMod val="50000"/>
-                    </a:schemeClr>
-                  </a:gs>
-                </a:gsLst>
-                <a:lin ang="10800000" scaled="0"/>
-              </a:gradFill>
-              <a:ln w="3175" cap="flat">
-                <a:solidFill>
-                  <a:schemeClr val="tx1"/>
-                </a:solidFill>
-                <a:prstDash val="solid"/>
-                <a:miter lim="800000"/>
-                <a:headEnd/>
-                <a:tailEnd/>
-              </a:ln>
-            </p:spPr>
-            <p:txBody>
-              <a:bodyPr vert="horz" wrap="square" lIns="91440" tIns="45720" rIns="91440" bIns="45720" numCol="1" anchor="t" anchorCtr="0" compatLnSpc="1">
-                <a:prstTxWarp prst="textNoShape">
-                  <a:avLst/>
-                </a:prstTxWarp>
-              </a:bodyPr>
-              <a:lstStyle/>
-              <a:p>
-                <a:endParaRPr lang="en-US"/>
-              </a:p>
-            </p:txBody>
-          </p:sp>
-          <p:sp>
-            <p:nvSpPr>
-              <p:cNvPr id="895" name="Rectangle 894"/>
-              <p:cNvSpPr>
-                <a:spLocks noChangeArrowheads="1"/>
-              </p:cNvSpPr>
-              <p:nvPr/>
-            </p:nvSpPr>
-            <p:spPr bwMode="auto">
-              <a:xfrm>
-                <a:off x="2308857" y="737128"/>
-                <a:ext cx="60698" cy="203641"/>
-              </a:xfrm>
-              <a:prstGeom prst="rect">
+              </a:prstTxWarp>
+            </a:bodyPr>
+            <a:lstStyle/>
+            <a:p>
+              <a:endParaRPr lang="en-US"/>
+            </a:p>
+          </p:txBody>
+        </p:sp>
+        <p:sp>
+          <p:nvSpPr>
+            <p:cNvPr id="898" name="Freeform 18"/>
+            <p:cNvSpPr>
+              <a:spLocks/>
+            </p:cNvSpPr>
+            <p:nvPr/>
+          </p:nvSpPr>
+          <p:spPr bwMode="auto">
+            <a:xfrm>
+              <a:off x="2120425" y="929176"/>
+              <a:ext cx="437027" cy="33707"/>
+            </a:xfrm>
+            <a:custGeom>
+              <a:avLst/>
+              <a:gdLst>
+                <a:gd name="T0" fmla="*/ 0 w 2853"/>
+                <a:gd name="T1" fmla="*/ 213 h 213"/>
+                <a:gd name="T2" fmla="*/ 4 w 2853"/>
+                <a:gd name="T3" fmla="*/ 1 h 213"/>
+                <a:gd name="T4" fmla="*/ 2849 w 2853"/>
+                <a:gd name="T5" fmla="*/ 0 h 213"/>
+                <a:gd name="T6" fmla="*/ 2853 w 2853"/>
+                <a:gd name="T7" fmla="*/ 213 h 213"/>
+              </a:gdLst>
+              <a:ahLst/>
+              <a:cxnLst>
+                <a:cxn ang="0">
+                  <a:pos x="T0" y="T1"/>
+                </a:cxn>
+                <a:cxn ang="0">
+                  <a:pos x="T2" y="T3"/>
+                </a:cxn>
+                <a:cxn ang="0">
+                  <a:pos x="T4" y="T5"/>
+                </a:cxn>
+                <a:cxn ang="0">
+                  <a:pos x="T6" y="T7"/>
+                </a:cxn>
+              </a:cxnLst>
+              <a:rect l="0" t="0" r="r" b="b"/>
+              <a:pathLst>
+                <a:path w="2853" h="213">
+                  <a:moveTo>
+                    <a:pt x="0" y="213"/>
+                  </a:moveTo>
+                  <a:lnTo>
+                    <a:pt x="4" y="1"/>
+                  </a:lnTo>
+                  <a:lnTo>
+                    <a:pt x="2849" y="0"/>
+                  </a:lnTo>
+                  <a:lnTo>
+                    <a:pt x="2853" y="213"/>
+                  </a:lnTo>
+                </a:path>
+              </a:pathLst>
+            </a:custGeom>
+            <a:solidFill>
+              <a:srgbClr val="E6E6E6"/>
+            </a:solidFill>
+            <a:ln w="3175" cap="flat">
+              <a:solidFill>
+                <a:srgbClr val="7B7B79"/>
+              </a:solidFill>
+              <a:prstDash val="solid"/>
+              <a:miter lim="800000"/>
+              <a:headEnd/>
+              <a:tailEnd/>
+            </a:ln>
+          </p:spPr>
+          <p:txBody>
+            <a:bodyPr vert="horz" wrap="square" lIns="91440" tIns="45720" rIns="91440" bIns="45720" numCol="1" anchor="t" anchorCtr="0" compatLnSpc="1">
+              <a:prstTxWarp prst="textNoShape">
                 <a:avLst/>
-              </a:prstGeom>
-              <a:gradFill>
-                <a:gsLst>
-                  <a:gs pos="0">
-                    <a:schemeClr val="bg1">
-                      <a:lumMod val="50000"/>
-                    </a:schemeClr>
-                  </a:gs>
-                  <a:gs pos="47000">
-                    <a:schemeClr val="bg1">
-                      <a:lumMod val="95000"/>
-                    </a:schemeClr>
-                  </a:gs>
-                  <a:gs pos="100000">
-                    <a:schemeClr val="bg1">
-                      <a:lumMod val="50000"/>
-                    </a:schemeClr>
-                  </a:gs>
-                </a:gsLst>
-                <a:lin ang="10800000" scaled="0"/>
-              </a:gradFill>
-              <a:ln w="3175" cap="flat">
-                <a:solidFill>
-                  <a:schemeClr val="tx1"/>
-                </a:solidFill>
-                <a:prstDash val="solid"/>
-                <a:miter lim="800000"/>
-                <a:headEnd/>
-                <a:tailEnd/>
-              </a:ln>
-            </p:spPr>
-            <p:txBody>
-              <a:bodyPr vert="horz" wrap="square" lIns="91440" tIns="45720" rIns="91440" bIns="45720" numCol="1" anchor="t" anchorCtr="0" compatLnSpc="1">
-                <a:prstTxWarp prst="textNoShape">
-                  <a:avLst/>
-                </a:prstTxWarp>
-              </a:bodyPr>
-              <a:lstStyle/>
-              <a:p>
-                <a:endParaRPr lang="en-US"/>
-              </a:p>
-            </p:txBody>
-          </p:sp>
-          <p:sp>
-            <p:nvSpPr>
-              <p:cNvPr id="896" name="Rectangle 895"/>
-              <p:cNvSpPr>
-                <a:spLocks noChangeArrowheads="1"/>
-              </p:cNvSpPr>
-              <p:nvPr/>
-            </p:nvSpPr>
-            <p:spPr bwMode="auto">
-              <a:xfrm>
-                <a:off x="2147398" y="737128"/>
-                <a:ext cx="60698" cy="203641"/>
-              </a:xfrm>
-              <a:prstGeom prst="rect">
+              </a:prstTxWarp>
+            </a:bodyPr>
+            <a:lstStyle/>
+            <a:p>
+              <a:endParaRPr lang="en-US"/>
+            </a:p>
+          </p:txBody>
+        </p:sp>
+        <p:sp>
+          <p:nvSpPr>
+            <p:cNvPr id="899" name="Freeform 19"/>
+            <p:cNvSpPr>
+              <a:spLocks/>
+            </p:cNvSpPr>
+            <p:nvPr/>
+          </p:nvSpPr>
+          <p:spPr bwMode="auto">
+            <a:xfrm>
+              <a:off x="2089401" y="962879"/>
+              <a:ext cx="504468" cy="30900"/>
+            </a:xfrm>
+            <a:custGeom>
+              <a:avLst/>
+              <a:gdLst>
+                <a:gd name="T0" fmla="*/ 3290 w 3295"/>
+                <a:gd name="T1" fmla="*/ 0 h 197"/>
+                <a:gd name="T2" fmla="*/ 3295 w 3295"/>
+                <a:gd name="T3" fmla="*/ 197 h 197"/>
+                <a:gd name="T4" fmla="*/ 0 w 3295"/>
+                <a:gd name="T5" fmla="*/ 196 h 197"/>
+                <a:gd name="T6" fmla="*/ 4 w 3295"/>
+                <a:gd name="T7" fmla="*/ 1 h 197"/>
+                <a:gd name="T8" fmla="*/ 3290 w 3295"/>
+                <a:gd name="T9" fmla="*/ 0 h 197"/>
+              </a:gdLst>
+              <a:ahLst/>
+              <a:cxnLst>
+                <a:cxn ang="0">
+                  <a:pos x="T0" y="T1"/>
+                </a:cxn>
+                <a:cxn ang="0">
+                  <a:pos x="T2" y="T3"/>
+                </a:cxn>
+                <a:cxn ang="0">
+                  <a:pos x="T4" y="T5"/>
+                </a:cxn>
+                <a:cxn ang="0">
+                  <a:pos x="T6" y="T7"/>
+                </a:cxn>
+                <a:cxn ang="0">
+                  <a:pos x="T8" y="T9"/>
+                </a:cxn>
+              </a:cxnLst>
+              <a:rect l="0" t="0" r="r" b="b"/>
+              <a:pathLst>
+                <a:path w="3295" h="197">
+                  <a:moveTo>
+                    <a:pt x="3290" y="0"/>
+                  </a:moveTo>
+                  <a:lnTo>
+                    <a:pt x="3295" y="197"/>
+                  </a:lnTo>
+                  <a:lnTo>
+                    <a:pt x="0" y="196"/>
+                  </a:lnTo>
+                  <a:lnTo>
+                    <a:pt x="4" y="1"/>
+                  </a:lnTo>
+                  <a:lnTo>
+                    <a:pt x="3290" y="0"/>
+                  </a:lnTo>
+                  <a:close/>
+                </a:path>
+              </a:pathLst>
+            </a:custGeom>
+            <a:solidFill>
+              <a:srgbClr val="E6E6E6"/>
+            </a:solidFill>
+            <a:ln w="3175" cap="flat">
+              <a:solidFill>
+                <a:srgbClr val="7B7B79"/>
+              </a:solidFill>
+              <a:prstDash val="solid"/>
+              <a:miter lim="800000"/>
+              <a:headEnd/>
+              <a:tailEnd/>
+            </a:ln>
+          </p:spPr>
+          <p:txBody>
+            <a:bodyPr vert="horz" wrap="square" lIns="91440" tIns="45720" rIns="91440" bIns="45720" numCol="1" anchor="t" anchorCtr="0" compatLnSpc="1">
+              <a:prstTxWarp prst="textNoShape">
                 <a:avLst/>
-              </a:prstGeom>
-              <a:gradFill>
-                <a:gsLst>
-                  <a:gs pos="0">
-                    <a:schemeClr val="bg1">
-                      <a:lumMod val="50000"/>
-                    </a:schemeClr>
-                  </a:gs>
-                  <a:gs pos="47000">
-                    <a:schemeClr val="bg1">
-                      <a:lumMod val="95000"/>
-                    </a:schemeClr>
-                  </a:gs>
-                  <a:gs pos="100000">
-                    <a:schemeClr val="bg1">
-                      <a:lumMod val="65000"/>
-                    </a:schemeClr>
-                  </a:gs>
-                </a:gsLst>
-                <a:lin ang="10800000" scaled="0"/>
-              </a:gradFill>
-              <a:ln w="3175" cap="flat">
-                <a:solidFill>
-                  <a:schemeClr val="tx1"/>
-                </a:solidFill>
-                <a:prstDash val="solid"/>
-                <a:miter lim="800000"/>
-                <a:headEnd/>
-                <a:tailEnd/>
-              </a:ln>
-            </p:spPr>
-            <p:txBody>
-              <a:bodyPr vert="horz" wrap="square" lIns="91440" tIns="45720" rIns="91440" bIns="45720" numCol="1" anchor="t" anchorCtr="0" compatLnSpc="1">
-                <a:prstTxWarp prst="textNoShape">
-                  <a:avLst/>
-                </a:prstTxWarp>
-              </a:bodyPr>
-              <a:lstStyle/>
-              <a:p>
-                <a:endParaRPr lang="en-US"/>
-              </a:p>
-            </p:txBody>
-          </p:sp>
-          <p:sp>
-            <p:nvSpPr>
-              <p:cNvPr id="897" name="Freeform 16"/>
-              <p:cNvSpPr>
-                <a:spLocks/>
-              </p:cNvSpPr>
-              <p:nvPr/>
-            </p:nvSpPr>
-            <p:spPr bwMode="auto">
-              <a:xfrm>
-                <a:off x="2101635" y="630040"/>
-                <a:ext cx="472098" cy="120781"/>
-              </a:xfrm>
-              <a:custGeom>
-                <a:avLst/>
-                <a:gdLst>
-                  <a:gd name="T0" fmla="*/ 6 w 3093"/>
-                  <a:gd name="T1" fmla="*/ 451 h 764"/>
-                  <a:gd name="T2" fmla="*/ 1523 w 3093"/>
-                  <a:gd name="T3" fmla="*/ 0 h 764"/>
-                  <a:gd name="T4" fmla="*/ 3093 w 3093"/>
-                  <a:gd name="T5" fmla="*/ 468 h 764"/>
-                  <a:gd name="T6" fmla="*/ 3089 w 3093"/>
-                  <a:gd name="T7" fmla="*/ 764 h 764"/>
-                  <a:gd name="T8" fmla="*/ 0 w 3093"/>
-                  <a:gd name="T9" fmla="*/ 754 h 764"/>
-                  <a:gd name="T10" fmla="*/ 6 w 3093"/>
-                  <a:gd name="T11" fmla="*/ 451 h 764"/>
-                </a:gdLst>
-                <a:ahLst/>
-                <a:cxnLst>
-                  <a:cxn ang="0">
-                    <a:pos x="T0" y="T1"/>
-                  </a:cxn>
-                  <a:cxn ang="0">
-                    <a:pos x="T2" y="T3"/>
-                  </a:cxn>
-                  <a:cxn ang="0">
-                    <a:pos x="T4" y="T5"/>
-                  </a:cxn>
-                  <a:cxn ang="0">
-                    <a:pos x="T6" y="T7"/>
-                  </a:cxn>
-                  <a:cxn ang="0">
-                    <a:pos x="T8" y="T9"/>
-                  </a:cxn>
-                  <a:cxn ang="0">
-                    <a:pos x="T10" y="T11"/>
-                  </a:cxn>
-                </a:cxnLst>
-                <a:rect l="0" t="0" r="r" b="b"/>
-                <a:pathLst>
-                  <a:path w="3093" h="764">
-                    <a:moveTo>
-                      <a:pt x="6" y="451"/>
-                    </a:moveTo>
-                    <a:cubicBezTo>
-                      <a:pt x="86" y="441"/>
-                      <a:pt x="1523" y="0"/>
-                      <a:pt x="1523" y="0"/>
-                    </a:cubicBezTo>
-                    <a:lnTo>
-                      <a:pt x="3093" y="468"/>
-                    </a:lnTo>
-                    <a:lnTo>
-                      <a:pt x="3089" y="764"/>
-                    </a:lnTo>
-                    <a:lnTo>
-                      <a:pt x="0" y="754"/>
-                    </a:lnTo>
-                    <a:lnTo>
-                      <a:pt x="6" y="451"/>
-                    </a:lnTo>
-                    <a:close/>
-                  </a:path>
-                </a:pathLst>
-              </a:custGeom>
-              <a:solidFill>
-                <a:srgbClr val="E6E6E6"/>
-              </a:solidFill>
-              <a:ln w="3175" cap="flat">
-                <a:solidFill>
-                  <a:srgbClr val="7B7B79"/>
-                </a:solidFill>
-                <a:prstDash val="solid"/>
-                <a:miter lim="800000"/>
-                <a:headEnd/>
-                <a:tailEnd/>
-              </a:ln>
-            </p:spPr>
-            <p:txBody>
-              <a:bodyPr vert="horz" wrap="square" lIns="91440" tIns="45720" rIns="91440" bIns="45720" numCol="1" anchor="t" anchorCtr="0" compatLnSpc="1">
-                <a:prstTxWarp prst="textNoShape">
-                  <a:avLst/>
-                </a:prstTxWarp>
-              </a:bodyPr>
-              <a:lstStyle/>
-              <a:p>
-                <a:endParaRPr lang="en-US"/>
-              </a:p>
-            </p:txBody>
-          </p:sp>
-          <p:sp>
-            <p:nvSpPr>
-              <p:cNvPr id="898" name="Freeform 18"/>
-              <p:cNvSpPr>
-                <a:spLocks/>
-              </p:cNvSpPr>
-              <p:nvPr/>
-            </p:nvSpPr>
-            <p:spPr bwMode="auto">
-              <a:xfrm>
-                <a:off x="2120425" y="929176"/>
-                <a:ext cx="437027" cy="33707"/>
-              </a:xfrm>
-              <a:custGeom>
-                <a:avLst/>
-                <a:gdLst>
-                  <a:gd name="T0" fmla="*/ 0 w 2853"/>
-                  <a:gd name="T1" fmla="*/ 213 h 213"/>
-                  <a:gd name="T2" fmla="*/ 4 w 2853"/>
-                  <a:gd name="T3" fmla="*/ 1 h 213"/>
-                  <a:gd name="T4" fmla="*/ 2849 w 2853"/>
-                  <a:gd name="T5" fmla="*/ 0 h 213"/>
-                  <a:gd name="T6" fmla="*/ 2853 w 2853"/>
-                  <a:gd name="T7" fmla="*/ 213 h 213"/>
-                </a:gdLst>
-                <a:ahLst/>
-                <a:cxnLst>
-                  <a:cxn ang="0">
-                    <a:pos x="T0" y="T1"/>
-                  </a:cxn>
-                  <a:cxn ang="0">
-                    <a:pos x="T2" y="T3"/>
-                  </a:cxn>
-                  <a:cxn ang="0">
-                    <a:pos x="T4" y="T5"/>
-                  </a:cxn>
-                  <a:cxn ang="0">
-                    <a:pos x="T6" y="T7"/>
-                  </a:cxn>
-                </a:cxnLst>
-                <a:rect l="0" t="0" r="r" b="b"/>
-                <a:pathLst>
-                  <a:path w="2853" h="213">
-                    <a:moveTo>
-                      <a:pt x="0" y="213"/>
-                    </a:moveTo>
-                    <a:lnTo>
-                      <a:pt x="4" y="1"/>
-                    </a:lnTo>
-                    <a:lnTo>
-                      <a:pt x="2849" y="0"/>
-                    </a:lnTo>
-                    <a:lnTo>
-                      <a:pt x="2853" y="213"/>
-                    </a:lnTo>
-                  </a:path>
-                </a:pathLst>
-              </a:custGeom>
-              <a:solidFill>
-                <a:srgbClr val="E6E6E6"/>
-              </a:solidFill>
-              <a:ln w="3175" cap="flat">
-                <a:solidFill>
-                  <a:srgbClr val="7B7B79"/>
-                </a:solidFill>
-                <a:prstDash val="solid"/>
-                <a:miter lim="800000"/>
-                <a:headEnd/>
-                <a:tailEnd/>
-              </a:ln>
-            </p:spPr>
-            <p:txBody>
-              <a:bodyPr vert="horz" wrap="square" lIns="91440" tIns="45720" rIns="91440" bIns="45720" numCol="1" anchor="t" anchorCtr="0" compatLnSpc="1">
-                <a:prstTxWarp prst="textNoShape">
-                  <a:avLst/>
-                </a:prstTxWarp>
-              </a:bodyPr>
-              <a:lstStyle/>
-              <a:p>
-                <a:endParaRPr lang="en-US"/>
-              </a:p>
-            </p:txBody>
-          </p:sp>
-          <p:sp>
-            <p:nvSpPr>
-              <p:cNvPr id="899" name="Freeform 19"/>
-              <p:cNvSpPr>
-                <a:spLocks/>
-              </p:cNvSpPr>
-              <p:nvPr/>
-            </p:nvSpPr>
-            <p:spPr bwMode="auto">
-              <a:xfrm>
-                <a:off x="2089401" y="962879"/>
-                <a:ext cx="504468" cy="30900"/>
-              </a:xfrm>
-              <a:custGeom>
-                <a:avLst/>
-                <a:gdLst>
-                  <a:gd name="T0" fmla="*/ 3290 w 3295"/>
-                  <a:gd name="T1" fmla="*/ 0 h 197"/>
-                  <a:gd name="T2" fmla="*/ 3295 w 3295"/>
-                  <a:gd name="T3" fmla="*/ 197 h 197"/>
-                  <a:gd name="T4" fmla="*/ 0 w 3295"/>
-                  <a:gd name="T5" fmla="*/ 196 h 197"/>
-                  <a:gd name="T6" fmla="*/ 4 w 3295"/>
-                  <a:gd name="T7" fmla="*/ 1 h 197"/>
-                  <a:gd name="T8" fmla="*/ 3290 w 3295"/>
-                  <a:gd name="T9" fmla="*/ 0 h 197"/>
-                </a:gdLst>
-                <a:ahLst/>
-                <a:cxnLst>
-                  <a:cxn ang="0">
-                    <a:pos x="T0" y="T1"/>
-                  </a:cxn>
-                  <a:cxn ang="0">
-                    <a:pos x="T2" y="T3"/>
-                  </a:cxn>
-                  <a:cxn ang="0">
-                    <a:pos x="T4" y="T5"/>
-                  </a:cxn>
-                  <a:cxn ang="0">
-                    <a:pos x="T6" y="T7"/>
-                  </a:cxn>
-                  <a:cxn ang="0">
-                    <a:pos x="T8" y="T9"/>
-                  </a:cxn>
-                </a:cxnLst>
-                <a:rect l="0" t="0" r="r" b="b"/>
-                <a:pathLst>
-                  <a:path w="3295" h="197">
-                    <a:moveTo>
-                      <a:pt x="3290" y="0"/>
-                    </a:moveTo>
-                    <a:lnTo>
-                      <a:pt x="3295" y="197"/>
-                    </a:lnTo>
-                    <a:lnTo>
-                      <a:pt x="0" y="196"/>
-                    </a:lnTo>
-                    <a:lnTo>
-                      <a:pt x="4" y="1"/>
-                    </a:lnTo>
-                    <a:lnTo>
-                      <a:pt x="3290" y="0"/>
-                    </a:lnTo>
-                    <a:close/>
-                  </a:path>
-                </a:pathLst>
-              </a:custGeom>
-              <a:solidFill>
-                <a:srgbClr val="E6E6E6"/>
-              </a:solidFill>
-              <a:ln w="3175" cap="flat">
-                <a:solidFill>
-                  <a:srgbClr val="7B7B79"/>
-                </a:solidFill>
-                <a:prstDash val="solid"/>
-                <a:miter lim="800000"/>
-                <a:headEnd/>
-                <a:tailEnd/>
-              </a:ln>
-            </p:spPr>
-            <p:txBody>
-              <a:bodyPr vert="horz" wrap="square" lIns="91440" tIns="45720" rIns="91440" bIns="45720" numCol="1" anchor="t" anchorCtr="0" compatLnSpc="1">
-                <a:prstTxWarp prst="textNoShape">
-                  <a:avLst/>
-                </a:prstTxWarp>
-              </a:bodyPr>
-              <a:lstStyle/>
-              <a:p>
-                <a:endParaRPr lang="en-US"/>
-              </a:p>
-            </p:txBody>
-          </p:sp>
-          <p:sp>
-            <p:nvSpPr>
-              <p:cNvPr id="900" name="Line 20"/>
-              <p:cNvSpPr>
-                <a:spLocks noChangeShapeType="1"/>
-              </p:cNvSpPr>
-              <p:nvPr/>
-            </p:nvSpPr>
-            <p:spPr bwMode="auto">
-              <a:xfrm>
-                <a:off x="2105677" y="711495"/>
-                <a:ext cx="465350" cy="0"/>
-              </a:xfrm>
-              <a:prstGeom prst="line">
-                <a:avLst/>
-              </a:prstGeom>
-              <a:noFill/>
-              <a:ln w="3175" cap="flat">
-                <a:solidFill>
-                  <a:srgbClr val="7B7B79"/>
-                </a:solidFill>
-                <a:prstDash val="solid"/>
-                <a:miter lim="800000"/>
-                <a:headEnd/>
-                <a:tailEnd/>
-              </a:ln>
-              <a:extLst>
-                <a:ext uri="{909E8E84-426E-40DD-AFC4-6F175D3DCCD1}">
-                  <a14:hiddenFill xmlns:a14="http://schemas.microsoft.com/office/drawing/2010/main">
-                    <a:noFill/>
-                  </a14:hiddenFill>
-                </a:ext>
-              </a:extLst>
-            </p:spPr>
-            <p:txBody>
-              <a:bodyPr vert="horz" wrap="square" lIns="91440" tIns="45720" rIns="91440" bIns="45720" numCol="1" anchor="t" anchorCtr="0" compatLnSpc="1">
-                <a:prstTxWarp prst="textNoShape">
-                  <a:avLst/>
-                </a:prstTxWarp>
-              </a:bodyPr>
-              <a:lstStyle/>
-              <a:p>
-                <a:endParaRPr lang="en-US"/>
-              </a:p>
-            </p:txBody>
-          </p:sp>
-        </p:grpSp>
-        <p:cxnSp>
-          <p:nvCxnSpPr>
-            <p:cNvPr id="891" name="Straight Connector 890"/>
-            <p:cNvCxnSpPr/>
+              </a:prstTxWarp>
+            </a:bodyPr>
+            <a:lstStyle/>
+            <a:p>
+              <a:endParaRPr lang="en-US"/>
+            </a:p>
+          </p:txBody>
+        </p:sp>
+        <p:sp>
+          <p:nvSpPr>
+            <p:cNvPr id="900" name="Line 20"/>
+            <p:cNvSpPr>
+              <a:spLocks noChangeShapeType="1"/>
+            </p:cNvSpPr>
             <p:nvPr/>
-          </p:nvCxnSpPr>
-          <p:spPr>
+          </p:nvSpPr>
+          <p:spPr bwMode="auto">
             <a:xfrm>
-              <a:off x="5743477" y="890977"/>
-              <a:ext cx="167626" cy="1403"/>
+              <a:off x="2105677" y="711495"/>
+              <a:ext cx="465350" cy="0"/>
             </a:xfrm>
             <a:prstGeom prst="line">
               <a:avLst/>
             </a:prstGeom>
-            <a:ln w="9525">
+            <a:noFill/>
+            <a:ln w="3175" cap="flat">
               <a:solidFill>
-                <a:schemeClr val="bg1">
-                  <a:lumMod val="65000"/>
-                </a:schemeClr>
+                <a:srgbClr val="7B7B79"/>
               </a:solidFill>
-              <a:headEnd type="none"/>
-              <a:tailEnd type="none"/>
+              <a:prstDash val="solid"/>
+              <a:miter lim="800000"/>
+              <a:headEnd/>
+              <a:tailEnd/>
             </a:ln>
+            <a:extLst>
+              <a:ext uri="{909E8E84-426E-40DD-AFC4-6F175D3DCCD1}">
+                <a14:hiddenFill xmlns:a14="http://schemas.microsoft.com/office/drawing/2010/main">
+                  <a:noFill/>
+                </a14:hiddenFill>
+              </a:ext>
+            </a:extLst>
           </p:spPr>
-          <p:style>
-            <a:lnRef idx="1">
-              <a:schemeClr val="accent1"/>
-            </a:lnRef>
-            <a:fillRef idx="0">
-              <a:schemeClr val="accent1"/>
-            </a:fillRef>
-            <a:effectRef idx="0">
-              <a:schemeClr val="accent1"/>
-            </a:effectRef>
-            <a:fontRef idx="minor">
-              <a:schemeClr val="tx1"/>
-            </a:fontRef>
-          </p:style>
-        </p:cxnSp>
-        <p:cxnSp>
-          <p:nvCxnSpPr>
-            <p:cNvPr id="892" name="Straight Connector 891"/>
-            <p:cNvCxnSpPr/>
-            <p:nvPr/>
-          </p:nvCxnSpPr>
-          <p:spPr>
-            <a:xfrm>
-              <a:off x="5743477" y="963504"/>
-              <a:ext cx="167626" cy="1403"/>
-            </a:xfrm>
-            <a:prstGeom prst="line">
-              <a:avLst/>
-            </a:prstGeom>
-            <a:ln w="9525">
-              <a:solidFill>
-                <a:schemeClr val="bg1">
-                  <a:lumMod val="65000"/>
-                </a:schemeClr>
-              </a:solidFill>
-              <a:headEnd type="none"/>
-              <a:tailEnd type="none"/>
-            </a:ln>
-          </p:spPr>
-          <p:style>
-            <a:lnRef idx="1">
-              <a:schemeClr val="accent1"/>
-            </a:lnRef>
-            <a:fillRef idx="0">
-              <a:schemeClr val="accent1"/>
-            </a:fillRef>
-            <a:effectRef idx="0">
-              <a:schemeClr val="accent1"/>
-            </a:effectRef>
-            <a:fontRef idx="minor">
-              <a:schemeClr val="tx1"/>
-            </a:fontRef>
-          </p:style>
-        </p:cxnSp>
-        <p:cxnSp>
-          <p:nvCxnSpPr>
-            <p:cNvPr id="893" name="Straight Connector 892"/>
-            <p:cNvCxnSpPr/>
-            <p:nvPr/>
-          </p:nvCxnSpPr>
-          <p:spPr>
-            <a:xfrm>
-              <a:off x="5529503" y="1036030"/>
-              <a:ext cx="381600" cy="0"/>
-            </a:xfrm>
-            <a:prstGeom prst="line">
-              <a:avLst/>
-            </a:prstGeom>
-            <a:ln w="9525">
-              <a:solidFill>
-                <a:schemeClr val="bg1">
-                  <a:lumMod val="65000"/>
-                </a:schemeClr>
-              </a:solidFill>
-              <a:headEnd type="none"/>
-              <a:tailEnd type="none"/>
-            </a:ln>
-          </p:spPr>
-          <p:style>
-            <a:lnRef idx="1">
-              <a:schemeClr val="accent1"/>
-            </a:lnRef>
-            <a:fillRef idx="0">
-              <a:schemeClr val="accent1"/>
-            </a:fillRef>
-            <a:effectRef idx="0">
-              <a:schemeClr val="accent1"/>
-            </a:effectRef>
-            <a:fontRef idx="minor">
-              <a:schemeClr val="tx1"/>
-            </a:fontRef>
-          </p:style>
-        </p:cxnSp>
+          <p:txBody>
+            <a:bodyPr vert="horz" wrap="square" lIns="91440" tIns="45720" rIns="91440" bIns="45720" numCol="1" anchor="t" anchorCtr="0" compatLnSpc="1">
+              <a:prstTxWarp prst="textNoShape">
+                <a:avLst/>
+              </a:prstTxWarp>
+            </a:bodyPr>
+            <a:lstStyle/>
+            <a:p>
+              <a:endParaRPr lang="en-US"/>
+            </a:p>
+          </p:txBody>
+        </p:sp>
       </p:grpSp>
+      <p:cxnSp>
+        <p:nvCxnSpPr>
+          <p:cNvPr id="891" name="Straight Connector 890"/>
+          <p:cNvCxnSpPr/>
+          <p:nvPr/>
+        </p:nvCxnSpPr>
+        <p:spPr>
+          <a:xfrm>
+            <a:off x="7348541" y="890928"/>
+            <a:ext cx="167626" cy="1403"/>
+          </a:xfrm>
+          <a:prstGeom prst="line">
+            <a:avLst/>
+          </a:prstGeom>
+          <a:ln w="9525">
+            <a:solidFill>
+              <a:schemeClr val="bg1">
+                <a:lumMod val="65000"/>
+              </a:schemeClr>
+            </a:solidFill>
+            <a:headEnd type="none"/>
+            <a:tailEnd type="none"/>
+          </a:ln>
+        </p:spPr>
+        <p:style>
+          <a:lnRef idx="1">
+            <a:schemeClr val="accent1"/>
+          </a:lnRef>
+          <a:fillRef idx="0">
+            <a:schemeClr val="accent1"/>
+          </a:fillRef>
+          <a:effectRef idx="0">
+            <a:schemeClr val="accent1"/>
+          </a:effectRef>
+          <a:fontRef idx="minor">
+            <a:schemeClr val="tx1"/>
+          </a:fontRef>
+        </p:style>
+      </p:cxnSp>
+      <p:cxnSp>
+        <p:nvCxnSpPr>
+          <p:cNvPr id="892" name="Straight Connector 891"/>
+          <p:cNvCxnSpPr/>
+          <p:nvPr/>
+        </p:nvCxnSpPr>
+        <p:spPr>
+          <a:xfrm>
+            <a:off x="7348541" y="963455"/>
+            <a:ext cx="167626" cy="1403"/>
+          </a:xfrm>
+          <a:prstGeom prst="line">
+            <a:avLst/>
+          </a:prstGeom>
+          <a:ln w="9525">
+            <a:solidFill>
+              <a:schemeClr val="bg1">
+                <a:lumMod val="65000"/>
+              </a:schemeClr>
+            </a:solidFill>
+            <a:headEnd type="none"/>
+            <a:tailEnd type="none"/>
+          </a:ln>
+        </p:spPr>
+        <p:style>
+          <a:lnRef idx="1">
+            <a:schemeClr val="accent1"/>
+          </a:lnRef>
+          <a:fillRef idx="0">
+            <a:schemeClr val="accent1"/>
+          </a:fillRef>
+          <a:effectRef idx="0">
+            <a:schemeClr val="accent1"/>
+          </a:effectRef>
+          <a:fontRef idx="minor">
+            <a:schemeClr val="tx1"/>
+          </a:fontRef>
+        </p:style>
+      </p:cxnSp>
+      <p:cxnSp>
+        <p:nvCxnSpPr>
+          <p:cNvPr id="893" name="Straight Connector 892"/>
+          <p:cNvCxnSpPr/>
+          <p:nvPr/>
+        </p:nvCxnSpPr>
+        <p:spPr>
+          <a:xfrm>
+            <a:off x="7134567" y="1035981"/>
+            <a:ext cx="381600" cy="0"/>
+          </a:xfrm>
+          <a:prstGeom prst="line">
+            <a:avLst/>
+          </a:prstGeom>
+          <a:ln w="9525">
+            <a:solidFill>
+              <a:schemeClr val="bg1">
+                <a:lumMod val="65000"/>
+              </a:schemeClr>
+            </a:solidFill>
+            <a:headEnd type="none"/>
+            <a:tailEnd type="none"/>
+          </a:ln>
+        </p:spPr>
+        <p:style>
+          <a:lnRef idx="1">
+            <a:schemeClr val="accent1"/>
+          </a:lnRef>
+          <a:fillRef idx="0">
+            <a:schemeClr val="accent1"/>
+          </a:fillRef>
+          <a:effectRef idx="0">
+            <a:schemeClr val="accent1"/>
+          </a:effectRef>
+          <a:fontRef idx="minor">
+            <a:schemeClr val="tx1"/>
+          </a:fontRef>
+        </p:style>
+      </p:cxnSp>
       <p:cxnSp>
         <p:nvCxnSpPr>
           <p:cNvPr id="901" name="Straight Connector 900"/>
@@ -28437,10 +28334,7 @@
             <a:r>
               <a:rPr lang="en-US" sz="1200" dirty="0" smtClean="0">
                 <a:solidFill>
-                  <a:schemeClr val="tx2">
-                    <a:lumMod val="60000"/>
-                    <a:lumOff val="40000"/>
-                  </a:schemeClr>
+                  <a:srgbClr val="0070C0"/>
                 </a:solidFill>
                 <a:latin typeface="Arial" panose="020B0604020202020204" pitchFamily="34" charset="0"/>
                 <a:cs typeface="Arial" panose="020B0604020202020204" pitchFamily="34" charset="0"/>
@@ -28450,10 +28344,7 @@
             <a:r>
               <a:rPr lang="en-US" sz="1200" i="1" dirty="0" smtClean="0">
                 <a:solidFill>
-                  <a:schemeClr val="tx2">
-                    <a:lumMod val="60000"/>
-                    <a:lumOff val="40000"/>
-                  </a:schemeClr>
+                  <a:srgbClr val="0070C0"/>
                 </a:solidFill>
                 <a:latin typeface="Arial" panose="020B0604020202020204" pitchFamily="34" charset="0"/>
                 <a:cs typeface="Arial" panose="020B0604020202020204" pitchFamily="34" charset="0"/>
@@ -28462,10 +28353,7 @@
             </a:r>
             <a:endParaRPr lang="en-US" sz="1200" i="1" dirty="0">
               <a:solidFill>
-                <a:schemeClr val="tx2">
-                  <a:lumMod val="60000"/>
-                  <a:lumOff val="40000"/>
-                </a:schemeClr>
+                <a:srgbClr val="0070C0"/>
               </a:solidFill>
               <a:latin typeface="Arial" panose="020B0604020202020204" pitchFamily="34" charset="0"/>
               <a:cs typeface="Arial" panose="020B0604020202020204" pitchFamily="34" charset="0"/>
@@ -31557,7 +31445,7 @@
         </p:nvSpPr>
         <p:spPr>
           <a:xfrm>
-            <a:off x="4042248" y="2917056"/>
+            <a:off x="4042248" y="2957260"/>
             <a:ext cx="1808756" cy="237548"/>
           </a:xfrm>
           <a:prstGeom prst="roundRect">
@@ -31624,7 +31512,7 @@
         </p:nvSpPr>
         <p:spPr>
           <a:xfrm>
-            <a:off x="3885154" y="2561151"/>
+            <a:off x="3885154" y="2601355"/>
             <a:ext cx="1965850" cy="237548"/>
           </a:xfrm>
           <a:prstGeom prst="roundRect">
@@ -31724,7 +31612,7 @@
         </p:nvCxnSpPr>
         <p:spPr>
           <a:xfrm>
-            <a:off x="5851004" y="2679925"/>
+            <a:off x="5851004" y="2720129"/>
             <a:ext cx="290240" cy="116450"/>
           </a:xfrm>
           <a:prstGeom prst="straightConnector1">
@@ -31763,7 +31651,7 @@
         </p:nvCxnSpPr>
         <p:spPr>
           <a:xfrm flipV="1">
-            <a:off x="5851004" y="3035690"/>
+            <a:off x="5851004" y="3075894"/>
             <a:ext cx="291430" cy="140"/>
           </a:xfrm>
           <a:prstGeom prst="straightConnector1">
@@ -31862,6 +31750,751 @@
           </a:extLst>
         </p:spPr>
       </p:pic>
+      <p:grpSp>
+        <p:nvGrpSpPr>
+          <p:cNvPr id="4" name="Group 3"/>
+          <p:cNvGrpSpPr/>
+          <p:nvPr/>
+        </p:nvGrpSpPr>
+        <p:grpSpPr>
+          <a:xfrm>
+            <a:off x="6321727" y="2340174"/>
+            <a:ext cx="504055" cy="308854"/>
+            <a:chOff x="7225680" y="2247344"/>
+            <a:chExt cx="504055" cy="308854"/>
+          </a:xfrm>
+        </p:grpSpPr>
+        <p:sp>
+          <p:nvSpPr>
+            <p:cNvPr id="160" name="Rounded Rectangle 159"/>
+            <p:cNvSpPr/>
+            <p:nvPr/>
+          </p:nvSpPr>
+          <p:spPr>
+            <a:xfrm>
+              <a:off x="7225680" y="2247344"/>
+              <a:ext cx="504055" cy="308854"/>
+            </a:xfrm>
+            <a:prstGeom prst="roundRect">
+              <a:avLst/>
+            </a:prstGeom>
+            <a:solidFill>
+              <a:srgbClr val="FDFAC7"/>
+            </a:solidFill>
+            <a:ln w="9525">
+              <a:solidFill>
+                <a:schemeClr val="bg1">
+                  <a:lumMod val="65000"/>
+                </a:schemeClr>
+              </a:solidFill>
+            </a:ln>
+            <a:effectLst>
+              <a:outerShdw blurRad="50800" dist="38100" dir="2700000" algn="tl" rotWithShape="0">
+                <a:prstClr val="black">
+                  <a:alpha val="40000"/>
+                </a:prstClr>
+              </a:outerShdw>
+              <a:softEdge rad="0"/>
+            </a:effectLst>
+          </p:spPr>
+          <p:style>
+            <a:lnRef idx="2">
+              <a:schemeClr val="accent1">
+                <a:shade val="50000"/>
+              </a:schemeClr>
+            </a:lnRef>
+            <a:fillRef idx="1">
+              <a:schemeClr val="accent1"/>
+            </a:fillRef>
+            <a:effectRef idx="0">
+              <a:schemeClr val="accent1"/>
+            </a:effectRef>
+            <a:fontRef idx="minor">
+              <a:schemeClr val="lt1"/>
+            </a:fontRef>
+          </p:style>
+          <p:txBody>
+            <a:bodyPr rtlCol="0" anchor="ctr"/>
+            <a:lstStyle/>
+            <a:p>
+              <a:pPr algn="ctr"/>
+              <a:endParaRPr lang="en-US"/>
+            </a:p>
+          </p:txBody>
+        </p:sp>
+        <p:grpSp>
+          <p:nvGrpSpPr>
+            <p:cNvPr id="161" name="Group 160"/>
+            <p:cNvGrpSpPr>
+              <a:grpSpLocks noChangeAspect="1"/>
+            </p:cNvGrpSpPr>
+            <p:nvPr/>
+          </p:nvGrpSpPr>
+          <p:grpSpPr>
+            <a:xfrm>
+              <a:off x="7283376" y="2297856"/>
+              <a:ext cx="183121" cy="132037"/>
+              <a:chOff x="2089401" y="630040"/>
+              <a:chExt cx="504468" cy="363739"/>
+            </a:xfrm>
+            <a:effectLst/>
+          </p:grpSpPr>
+          <p:sp>
+            <p:nvSpPr>
+              <p:cNvPr id="162" name="Rectangle 161"/>
+              <p:cNvSpPr>
+                <a:spLocks noChangeArrowheads="1"/>
+              </p:cNvSpPr>
+              <p:nvPr/>
+            </p:nvSpPr>
+            <p:spPr bwMode="auto">
+              <a:xfrm>
+                <a:off x="2470474" y="737128"/>
+                <a:ext cx="60698" cy="203641"/>
+              </a:xfrm>
+              <a:prstGeom prst="rect">
+                <a:avLst/>
+              </a:prstGeom>
+              <a:gradFill>
+                <a:gsLst>
+                  <a:gs pos="0">
+                    <a:schemeClr val="bg1">
+                      <a:lumMod val="50000"/>
+                    </a:schemeClr>
+                  </a:gs>
+                  <a:gs pos="47000">
+                    <a:schemeClr val="bg1">
+                      <a:lumMod val="95000"/>
+                    </a:schemeClr>
+                  </a:gs>
+                  <a:gs pos="100000">
+                    <a:schemeClr val="bg1">
+                      <a:lumMod val="50000"/>
+                    </a:schemeClr>
+                  </a:gs>
+                </a:gsLst>
+                <a:lin ang="10800000" scaled="0"/>
+              </a:gradFill>
+              <a:ln w="3175" cap="flat">
+                <a:solidFill>
+                  <a:schemeClr val="tx1"/>
+                </a:solidFill>
+                <a:prstDash val="solid"/>
+                <a:miter lim="800000"/>
+                <a:headEnd/>
+                <a:tailEnd/>
+              </a:ln>
+            </p:spPr>
+            <p:txBody>
+              <a:bodyPr vert="horz" wrap="square" lIns="91440" tIns="45720" rIns="91440" bIns="45720" numCol="1" anchor="t" anchorCtr="0" compatLnSpc="1">
+                <a:prstTxWarp prst="textNoShape">
+                  <a:avLst/>
+                </a:prstTxWarp>
+              </a:bodyPr>
+              <a:lstStyle/>
+              <a:p>
+                <a:endParaRPr lang="en-US"/>
+              </a:p>
+            </p:txBody>
+          </p:sp>
+          <p:sp>
+            <p:nvSpPr>
+              <p:cNvPr id="163" name="Rectangle 162"/>
+              <p:cNvSpPr>
+                <a:spLocks noChangeArrowheads="1"/>
+              </p:cNvSpPr>
+              <p:nvPr/>
+            </p:nvSpPr>
+            <p:spPr bwMode="auto">
+              <a:xfrm>
+                <a:off x="2308857" y="737128"/>
+                <a:ext cx="60698" cy="203641"/>
+              </a:xfrm>
+              <a:prstGeom prst="rect">
+                <a:avLst/>
+              </a:prstGeom>
+              <a:gradFill>
+                <a:gsLst>
+                  <a:gs pos="0">
+                    <a:schemeClr val="bg1">
+                      <a:lumMod val="50000"/>
+                    </a:schemeClr>
+                  </a:gs>
+                  <a:gs pos="47000">
+                    <a:schemeClr val="bg1">
+                      <a:lumMod val="95000"/>
+                    </a:schemeClr>
+                  </a:gs>
+                  <a:gs pos="100000">
+                    <a:schemeClr val="bg1">
+                      <a:lumMod val="50000"/>
+                    </a:schemeClr>
+                  </a:gs>
+                </a:gsLst>
+                <a:lin ang="10800000" scaled="0"/>
+              </a:gradFill>
+              <a:ln w="3175" cap="flat">
+                <a:solidFill>
+                  <a:schemeClr val="tx1"/>
+                </a:solidFill>
+                <a:prstDash val="solid"/>
+                <a:miter lim="800000"/>
+                <a:headEnd/>
+                <a:tailEnd/>
+              </a:ln>
+            </p:spPr>
+            <p:txBody>
+              <a:bodyPr vert="horz" wrap="square" lIns="91440" tIns="45720" rIns="91440" bIns="45720" numCol="1" anchor="t" anchorCtr="0" compatLnSpc="1">
+                <a:prstTxWarp prst="textNoShape">
+                  <a:avLst/>
+                </a:prstTxWarp>
+              </a:bodyPr>
+              <a:lstStyle/>
+              <a:p>
+                <a:endParaRPr lang="en-US"/>
+              </a:p>
+            </p:txBody>
+          </p:sp>
+          <p:sp>
+            <p:nvSpPr>
+              <p:cNvPr id="164" name="Rectangle 163"/>
+              <p:cNvSpPr>
+                <a:spLocks noChangeArrowheads="1"/>
+              </p:cNvSpPr>
+              <p:nvPr/>
+            </p:nvSpPr>
+            <p:spPr bwMode="auto">
+              <a:xfrm>
+                <a:off x="2147398" y="737128"/>
+                <a:ext cx="60698" cy="203641"/>
+              </a:xfrm>
+              <a:prstGeom prst="rect">
+                <a:avLst/>
+              </a:prstGeom>
+              <a:gradFill>
+                <a:gsLst>
+                  <a:gs pos="0">
+                    <a:schemeClr val="bg1">
+                      <a:lumMod val="50000"/>
+                    </a:schemeClr>
+                  </a:gs>
+                  <a:gs pos="47000">
+                    <a:schemeClr val="bg1">
+                      <a:lumMod val="95000"/>
+                    </a:schemeClr>
+                  </a:gs>
+                  <a:gs pos="100000">
+                    <a:schemeClr val="bg1">
+                      <a:lumMod val="65000"/>
+                    </a:schemeClr>
+                  </a:gs>
+                </a:gsLst>
+                <a:lin ang="10800000" scaled="0"/>
+              </a:gradFill>
+              <a:ln w="3175" cap="flat">
+                <a:solidFill>
+                  <a:schemeClr val="tx1"/>
+                </a:solidFill>
+                <a:prstDash val="solid"/>
+                <a:miter lim="800000"/>
+                <a:headEnd/>
+                <a:tailEnd/>
+              </a:ln>
+            </p:spPr>
+            <p:txBody>
+              <a:bodyPr vert="horz" wrap="square" lIns="91440" tIns="45720" rIns="91440" bIns="45720" numCol="1" anchor="t" anchorCtr="0" compatLnSpc="1">
+                <a:prstTxWarp prst="textNoShape">
+                  <a:avLst/>
+                </a:prstTxWarp>
+              </a:bodyPr>
+              <a:lstStyle/>
+              <a:p>
+                <a:endParaRPr lang="en-US"/>
+              </a:p>
+            </p:txBody>
+          </p:sp>
+          <p:sp>
+            <p:nvSpPr>
+              <p:cNvPr id="165" name="Freeform 16"/>
+              <p:cNvSpPr>
+                <a:spLocks/>
+              </p:cNvSpPr>
+              <p:nvPr/>
+            </p:nvSpPr>
+            <p:spPr bwMode="auto">
+              <a:xfrm>
+                <a:off x="2101635" y="630040"/>
+                <a:ext cx="472098" cy="120781"/>
+              </a:xfrm>
+              <a:custGeom>
+                <a:avLst/>
+                <a:gdLst>
+                  <a:gd name="T0" fmla="*/ 6 w 3093"/>
+                  <a:gd name="T1" fmla="*/ 451 h 764"/>
+                  <a:gd name="T2" fmla="*/ 1523 w 3093"/>
+                  <a:gd name="T3" fmla="*/ 0 h 764"/>
+                  <a:gd name="T4" fmla="*/ 3093 w 3093"/>
+                  <a:gd name="T5" fmla="*/ 468 h 764"/>
+                  <a:gd name="T6" fmla="*/ 3089 w 3093"/>
+                  <a:gd name="T7" fmla="*/ 764 h 764"/>
+                  <a:gd name="T8" fmla="*/ 0 w 3093"/>
+                  <a:gd name="T9" fmla="*/ 754 h 764"/>
+                  <a:gd name="T10" fmla="*/ 6 w 3093"/>
+                  <a:gd name="T11" fmla="*/ 451 h 764"/>
+                </a:gdLst>
+                <a:ahLst/>
+                <a:cxnLst>
+                  <a:cxn ang="0">
+                    <a:pos x="T0" y="T1"/>
+                  </a:cxn>
+                  <a:cxn ang="0">
+                    <a:pos x="T2" y="T3"/>
+                  </a:cxn>
+                  <a:cxn ang="0">
+                    <a:pos x="T4" y="T5"/>
+                  </a:cxn>
+                  <a:cxn ang="0">
+                    <a:pos x="T6" y="T7"/>
+                  </a:cxn>
+                  <a:cxn ang="0">
+                    <a:pos x="T8" y="T9"/>
+                  </a:cxn>
+                  <a:cxn ang="0">
+                    <a:pos x="T10" y="T11"/>
+                  </a:cxn>
+                </a:cxnLst>
+                <a:rect l="0" t="0" r="r" b="b"/>
+                <a:pathLst>
+                  <a:path w="3093" h="764">
+                    <a:moveTo>
+                      <a:pt x="6" y="451"/>
+                    </a:moveTo>
+                    <a:cubicBezTo>
+                      <a:pt x="86" y="441"/>
+                      <a:pt x="1523" y="0"/>
+                      <a:pt x="1523" y="0"/>
+                    </a:cubicBezTo>
+                    <a:lnTo>
+                      <a:pt x="3093" y="468"/>
+                    </a:lnTo>
+                    <a:lnTo>
+                      <a:pt x="3089" y="764"/>
+                    </a:lnTo>
+                    <a:lnTo>
+                      <a:pt x="0" y="754"/>
+                    </a:lnTo>
+                    <a:lnTo>
+                      <a:pt x="6" y="451"/>
+                    </a:lnTo>
+                    <a:close/>
+                  </a:path>
+                </a:pathLst>
+              </a:custGeom>
+              <a:solidFill>
+                <a:srgbClr val="E6E6E6"/>
+              </a:solidFill>
+              <a:ln w="3175" cap="flat">
+                <a:solidFill>
+                  <a:srgbClr val="7B7B79"/>
+                </a:solidFill>
+                <a:prstDash val="solid"/>
+                <a:miter lim="800000"/>
+                <a:headEnd/>
+                <a:tailEnd/>
+              </a:ln>
+            </p:spPr>
+            <p:txBody>
+              <a:bodyPr vert="horz" wrap="square" lIns="91440" tIns="45720" rIns="91440" bIns="45720" numCol="1" anchor="t" anchorCtr="0" compatLnSpc="1">
+                <a:prstTxWarp prst="textNoShape">
+                  <a:avLst/>
+                </a:prstTxWarp>
+              </a:bodyPr>
+              <a:lstStyle/>
+              <a:p>
+                <a:endParaRPr lang="en-US"/>
+              </a:p>
+            </p:txBody>
+          </p:sp>
+          <p:sp>
+            <p:nvSpPr>
+              <p:cNvPr id="166" name="Freeform 18"/>
+              <p:cNvSpPr>
+                <a:spLocks/>
+              </p:cNvSpPr>
+              <p:nvPr/>
+            </p:nvSpPr>
+            <p:spPr bwMode="auto">
+              <a:xfrm>
+                <a:off x="2120425" y="929176"/>
+                <a:ext cx="437027" cy="33707"/>
+              </a:xfrm>
+              <a:custGeom>
+                <a:avLst/>
+                <a:gdLst>
+                  <a:gd name="T0" fmla="*/ 0 w 2853"/>
+                  <a:gd name="T1" fmla="*/ 213 h 213"/>
+                  <a:gd name="T2" fmla="*/ 4 w 2853"/>
+                  <a:gd name="T3" fmla="*/ 1 h 213"/>
+                  <a:gd name="T4" fmla="*/ 2849 w 2853"/>
+                  <a:gd name="T5" fmla="*/ 0 h 213"/>
+                  <a:gd name="T6" fmla="*/ 2853 w 2853"/>
+                  <a:gd name="T7" fmla="*/ 213 h 213"/>
+                </a:gdLst>
+                <a:ahLst/>
+                <a:cxnLst>
+                  <a:cxn ang="0">
+                    <a:pos x="T0" y="T1"/>
+                  </a:cxn>
+                  <a:cxn ang="0">
+                    <a:pos x="T2" y="T3"/>
+                  </a:cxn>
+                  <a:cxn ang="0">
+                    <a:pos x="T4" y="T5"/>
+                  </a:cxn>
+                  <a:cxn ang="0">
+                    <a:pos x="T6" y="T7"/>
+                  </a:cxn>
+                </a:cxnLst>
+                <a:rect l="0" t="0" r="r" b="b"/>
+                <a:pathLst>
+                  <a:path w="2853" h="213">
+                    <a:moveTo>
+                      <a:pt x="0" y="213"/>
+                    </a:moveTo>
+                    <a:lnTo>
+                      <a:pt x="4" y="1"/>
+                    </a:lnTo>
+                    <a:lnTo>
+                      <a:pt x="2849" y="0"/>
+                    </a:lnTo>
+                    <a:lnTo>
+                      <a:pt x="2853" y="213"/>
+                    </a:lnTo>
+                  </a:path>
+                </a:pathLst>
+              </a:custGeom>
+              <a:solidFill>
+                <a:srgbClr val="E6E6E6"/>
+              </a:solidFill>
+              <a:ln w="3175" cap="flat">
+                <a:solidFill>
+                  <a:srgbClr val="7B7B79"/>
+                </a:solidFill>
+                <a:prstDash val="solid"/>
+                <a:miter lim="800000"/>
+                <a:headEnd/>
+                <a:tailEnd/>
+              </a:ln>
+            </p:spPr>
+            <p:txBody>
+              <a:bodyPr vert="horz" wrap="square" lIns="91440" tIns="45720" rIns="91440" bIns="45720" numCol="1" anchor="t" anchorCtr="0" compatLnSpc="1">
+                <a:prstTxWarp prst="textNoShape">
+                  <a:avLst/>
+                </a:prstTxWarp>
+              </a:bodyPr>
+              <a:lstStyle/>
+              <a:p>
+                <a:endParaRPr lang="en-US"/>
+              </a:p>
+            </p:txBody>
+          </p:sp>
+          <p:sp>
+            <p:nvSpPr>
+              <p:cNvPr id="167" name="Freeform 19"/>
+              <p:cNvSpPr>
+                <a:spLocks/>
+              </p:cNvSpPr>
+              <p:nvPr/>
+            </p:nvSpPr>
+            <p:spPr bwMode="auto">
+              <a:xfrm>
+                <a:off x="2089401" y="962879"/>
+                <a:ext cx="504468" cy="30900"/>
+              </a:xfrm>
+              <a:custGeom>
+                <a:avLst/>
+                <a:gdLst>
+                  <a:gd name="T0" fmla="*/ 3290 w 3295"/>
+                  <a:gd name="T1" fmla="*/ 0 h 197"/>
+                  <a:gd name="T2" fmla="*/ 3295 w 3295"/>
+                  <a:gd name="T3" fmla="*/ 197 h 197"/>
+                  <a:gd name="T4" fmla="*/ 0 w 3295"/>
+                  <a:gd name="T5" fmla="*/ 196 h 197"/>
+                  <a:gd name="T6" fmla="*/ 4 w 3295"/>
+                  <a:gd name="T7" fmla="*/ 1 h 197"/>
+                  <a:gd name="T8" fmla="*/ 3290 w 3295"/>
+                  <a:gd name="T9" fmla="*/ 0 h 197"/>
+                </a:gdLst>
+                <a:ahLst/>
+                <a:cxnLst>
+                  <a:cxn ang="0">
+                    <a:pos x="T0" y="T1"/>
+                  </a:cxn>
+                  <a:cxn ang="0">
+                    <a:pos x="T2" y="T3"/>
+                  </a:cxn>
+                  <a:cxn ang="0">
+                    <a:pos x="T4" y="T5"/>
+                  </a:cxn>
+                  <a:cxn ang="0">
+                    <a:pos x="T6" y="T7"/>
+                  </a:cxn>
+                  <a:cxn ang="0">
+                    <a:pos x="T8" y="T9"/>
+                  </a:cxn>
+                </a:cxnLst>
+                <a:rect l="0" t="0" r="r" b="b"/>
+                <a:pathLst>
+                  <a:path w="3295" h="197">
+                    <a:moveTo>
+                      <a:pt x="3290" y="0"/>
+                    </a:moveTo>
+                    <a:lnTo>
+                      <a:pt x="3295" y="197"/>
+                    </a:lnTo>
+                    <a:lnTo>
+                      <a:pt x="0" y="196"/>
+                    </a:lnTo>
+                    <a:lnTo>
+                      <a:pt x="4" y="1"/>
+                    </a:lnTo>
+                    <a:lnTo>
+                      <a:pt x="3290" y="0"/>
+                    </a:lnTo>
+                    <a:close/>
+                  </a:path>
+                </a:pathLst>
+              </a:custGeom>
+              <a:solidFill>
+                <a:srgbClr val="E6E6E6"/>
+              </a:solidFill>
+              <a:ln w="3175" cap="flat">
+                <a:solidFill>
+                  <a:srgbClr val="7B7B79"/>
+                </a:solidFill>
+                <a:prstDash val="solid"/>
+                <a:miter lim="800000"/>
+                <a:headEnd/>
+                <a:tailEnd/>
+              </a:ln>
+            </p:spPr>
+            <p:txBody>
+              <a:bodyPr vert="horz" wrap="square" lIns="91440" tIns="45720" rIns="91440" bIns="45720" numCol="1" anchor="t" anchorCtr="0" compatLnSpc="1">
+                <a:prstTxWarp prst="textNoShape">
+                  <a:avLst/>
+                </a:prstTxWarp>
+              </a:bodyPr>
+              <a:lstStyle/>
+              <a:p>
+                <a:endParaRPr lang="en-US"/>
+              </a:p>
+            </p:txBody>
+          </p:sp>
+          <p:sp>
+            <p:nvSpPr>
+              <p:cNvPr id="168" name="Line 20"/>
+              <p:cNvSpPr>
+                <a:spLocks noChangeShapeType="1"/>
+              </p:cNvSpPr>
+              <p:nvPr/>
+            </p:nvSpPr>
+            <p:spPr bwMode="auto">
+              <a:xfrm>
+                <a:off x="2105677" y="711495"/>
+                <a:ext cx="465350" cy="0"/>
+              </a:xfrm>
+              <a:prstGeom prst="line">
+                <a:avLst/>
+              </a:prstGeom>
+              <a:noFill/>
+              <a:ln w="3175" cap="flat">
+                <a:solidFill>
+                  <a:srgbClr val="7B7B79"/>
+                </a:solidFill>
+                <a:prstDash val="solid"/>
+                <a:miter lim="800000"/>
+                <a:headEnd/>
+                <a:tailEnd/>
+              </a:ln>
+              <a:extLst>
+                <a:ext uri="{909E8E84-426E-40DD-AFC4-6F175D3DCCD1}">
+                  <a14:hiddenFill xmlns:a14="http://schemas.microsoft.com/office/drawing/2010/main">
+                    <a:noFill/>
+                  </a14:hiddenFill>
+                </a:ext>
+              </a:extLst>
+            </p:spPr>
+            <p:txBody>
+              <a:bodyPr vert="horz" wrap="square" lIns="91440" tIns="45720" rIns="91440" bIns="45720" numCol="1" anchor="t" anchorCtr="0" compatLnSpc="1">
+                <a:prstTxWarp prst="textNoShape">
+                  <a:avLst/>
+                </a:prstTxWarp>
+              </a:bodyPr>
+              <a:lstStyle/>
+              <a:p>
+                <a:endParaRPr lang="en-US"/>
+              </a:p>
+            </p:txBody>
+          </p:sp>
+        </p:grpSp>
+        <p:cxnSp>
+          <p:nvCxnSpPr>
+            <p:cNvPr id="170" name="Straight Connector 169"/>
+            <p:cNvCxnSpPr/>
+            <p:nvPr/>
+          </p:nvCxnSpPr>
+          <p:spPr>
+            <a:xfrm>
+              <a:off x="7500941" y="2334219"/>
+              <a:ext cx="167626" cy="1403"/>
+            </a:xfrm>
+            <a:prstGeom prst="line">
+              <a:avLst/>
+            </a:prstGeom>
+            <a:ln w="9525">
+              <a:solidFill>
+                <a:schemeClr val="bg1">
+                  <a:lumMod val="65000"/>
+                </a:schemeClr>
+              </a:solidFill>
+              <a:headEnd type="none"/>
+              <a:tailEnd type="none"/>
+            </a:ln>
+          </p:spPr>
+          <p:style>
+            <a:lnRef idx="1">
+              <a:schemeClr val="accent1"/>
+            </a:lnRef>
+            <a:fillRef idx="0">
+              <a:schemeClr val="accent1"/>
+            </a:fillRef>
+            <a:effectRef idx="0">
+              <a:schemeClr val="accent1"/>
+            </a:effectRef>
+            <a:fontRef idx="minor">
+              <a:schemeClr val="tx1"/>
+            </a:fontRef>
+          </p:style>
+        </p:cxnSp>
+        <p:cxnSp>
+          <p:nvCxnSpPr>
+            <p:cNvPr id="171" name="Straight Connector 170"/>
+            <p:cNvCxnSpPr/>
+            <p:nvPr/>
+          </p:nvCxnSpPr>
+          <p:spPr>
+            <a:xfrm>
+              <a:off x="7500941" y="2406746"/>
+              <a:ext cx="167626" cy="1403"/>
+            </a:xfrm>
+            <a:prstGeom prst="line">
+              <a:avLst/>
+            </a:prstGeom>
+            <a:ln w="9525">
+              <a:solidFill>
+                <a:schemeClr val="bg1">
+                  <a:lumMod val="65000"/>
+                </a:schemeClr>
+              </a:solidFill>
+              <a:headEnd type="none"/>
+              <a:tailEnd type="none"/>
+            </a:ln>
+          </p:spPr>
+          <p:style>
+            <a:lnRef idx="1">
+              <a:schemeClr val="accent1"/>
+            </a:lnRef>
+            <a:fillRef idx="0">
+              <a:schemeClr val="accent1"/>
+            </a:fillRef>
+            <a:effectRef idx="0">
+              <a:schemeClr val="accent1"/>
+            </a:effectRef>
+            <a:fontRef idx="minor">
+              <a:schemeClr val="tx1"/>
+            </a:fontRef>
+          </p:style>
+        </p:cxnSp>
+        <p:cxnSp>
+          <p:nvCxnSpPr>
+            <p:cNvPr id="172" name="Straight Connector 171"/>
+            <p:cNvCxnSpPr/>
+            <p:nvPr/>
+          </p:nvCxnSpPr>
+          <p:spPr>
+            <a:xfrm>
+              <a:off x="7286967" y="2479272"/>
+              <a:ext cx="381600" cy="0"/>
+            </a:xfrm>
+            <a:prstGeom prst="line">
+              <a:avLst/>
+            </a:prstGeom>
+            <a:ln w="9525">
+              <a:solidFill>
+                <a:schemeClr val="bg1">
+                  <a:lumMod val="65000"/>
+                </a:schemeClr>
+              </a:solidFill>
+              <a:headEnd type="none"/>
+              <a:tailEnd type="none"/>
+            </a:ln>
+          </p:spPr>
+          <p:style>
+            <a:lnRef idx="1">
+              <a:schemeClr val="accent1"/>
+            </a:lnRef>
+            <a:fillRef idx="0">
+              <a:schemeClr val="accent1"/>
+            </a:fillRef>
+            <a:effectRef idx="0">
+              <a:schemeClr val="accent1"/>
+            </a:effectRef>
+            <a:fontRef idx="minor">
+              <a:schemeClr val="tx1"/>
+            </a:fontRef>
+          </p:style>
+        </p:cxnSp>
+      </p:grpSp>
+      <p:cxnSp>
+        <p:nvCxnSpPr>
+          <p:cNvPr id="837" name="Elbow Connector 836"/>
+          <p:cNvCxnSpPr>
+            <a:stCxn id="160" idx="3"/>
+          </p:cNvCxnSpPr>
+          <p:nvPr/>
+        </p:nvCxnSpPr>
+        <p:spPr>
+          <a:xfrm flipV="1">
+            <a:off x="6825782" y="1208277"/>
+            <a:ext cx="476278" cy="1286324"/>
+          </a:xfrm>
+          <a:prstGeom prst="bentConnector2">
+            <a:avLst/>
+          </a:prstGeom>
+          <a:ln w="3175">
+            <a:solidFill>
+              <a:schemeClr val="tx1"/>
+            </a:solidFill>
+            <a:prstDash val="sysDot"/>
+            <a:headEnd type="none" w="sm" len="sm"/>
+            <a:tailEnd type="none"/>
+          </a:ln>
+        </p:spPr>
+        <p:style>
+          <a:lnRef idx="1">
+            <a:schemeClr val="accent1"/>
+          </a:lnRef>
+          <a:fillRef idx="0">
+            <a:schemeClr val="accent1"/>
+          </a:fillRef>
+          <a:effectRef idx="0">
+            <a:schemeClr val="accent1"/>
+          </a:effectRef>
+          <a:fontRef idx="minor">
+            <a:schemeClr val="tx1"/>
+          </a:fontRef>
+        </p:style>
+      </p:cxnSp>
     </p:spTree>
     <p:extLst>
       <p:ext uri="{BB962C8B-B14F-4D97-AF65-F5344CB8AC3E}">

</xml_diff>

<commit_message>
authorization overview update 0.73
</commit_message>
<xml_diff>
--- a/saturn/saturn-authorization.pptx
+++ b/saturn/saturn-authorization.pptx
@@ -309,7 +309,7 @@
           <a:p>
             <a:fld id="{E3744D7E-A5BB-4306-A750-C25515017678}" type="datetimeFigureOut">
               <a:rPr lang="en-US" smtClean="0"/>
-              <a:t>2020-02-03</a:t>
+              <a:t>2020-04-17</a:t>
             </a:fld>
             <a:endParaRPr lang="en-US"/>
           </a:p>
@@ -519,7 +519,7 @@
           <a:p>
             <a:fld id="{E3744D7E-A5BB-4306-A750-C25515017678}" type="datetimeFigureOut">
               <a:rPr lang="en-US" smtClean="0"/>
-              <a:t>2020-02-03</a:t>
+              <a:t>2020-04-17</a:t>
             </a:fld>
             <a:endParaRPr lang="en-US"/>
           </a:p>
@@ -736,7 +736,7 @@
           <a:p>
             <a:fld id="{E3744D7E-A5BB-4306-A750-C25515017678}" type="datetimeFigureOut">
               <a:rPr lang="en-US" smtClean="0"/>
-              <a:t>2020-02-03</a:t>
+              <a:t>2020-04-17</a:t>
             </a:fld>
             <a:endParaRPr lang="en-US"/>
           </a:p>
@@ -1001,7 +1001,7 @@
           <a:p>
             <a:fld id="{B880F04E-B60C-4530-BE27-DE08322B2422}" type="datetimeFigureOut">
               <a:rPr lang="en-US" smtClean="0"/>
-              <a:t>2020-02-03</a:t>
+              <a:t>2020-04-17</a:t>
             </a:fld>
             <a:endParaRPr lang="en-US"/>
           </a:p>
@@ -1171,7 +1171,7 @@
           <a:p>
             <a:fld id="{B880F04E-B60C-4530-BE27-DE08322B2422}" type="datetimeFigureOut">
               <a:rPr lang="en-US" smtClean="0"/>
-              <a:t>2020-02-03</a:t>
+              <a:t>2020-04-17</a:t>
             </a:fld>
             <a:endParaRPr lang="en-US"/>
           </a:p>
@@ -1417,7 +1417,7 @@
           <a:p>
             <a:fld id="{B880F04E-B60C-4530-BE27-DE08322B2422}" type="datetimeFigureOut">
               <a:rPr lang="en-US" smtClean="0"/>
-              <a:t>2020-02-03</a:t>
+              <a:t>2020-04-17</a:t>
             </a:fld>
             <a:endParaRPr lang="en-US"/>
           </a:p>
@@ -1705,7 +1705,7 @@
           <a:p>
             <a:fld id="{B880F04E-B60C-4530-BE27-DE08322B2422}" type="datetimeFigureOut">
               <a:rPr lang="en-US" smtClean="0"/>
-              <a:t>2020-02-03</a:t>
+              <a:t>2020-04-17</a:t>
             </a:fld>
             <a:endParaRPr lang="en-US"/>
           </a:p>
@@ -2127,7 +2127,7 @@
           <a:p>
             <a:fld id="{B880F04E-B60C-4530-BE27-DE08322B2422}" type="datetimeFigureOut">
               <a:rPr lang="en-US" smtClean="0"/>
-              <a:t>2020-02-03</a:t>
+              <a:t>2020-04-17</a:t>
             </a:fld>
             <a:endParaRPr lang="en-US"/>
           </a:p>
@@ -2245,7 +2245,7 @@
           <a:p>
             <a:fld id="{B880F04E-B60C-4530-BE27-DE08322B2422}" type="datetimeFigureOut">
               <a:rPr lang="en-US" smtClean="0"/>
-              <a:t>2020-02-03</a:t>
+              <a:t>2020-04-17</a:t>
             </a:fld>
             <a:endParaRPr lang="en-US"/>
           </a:p>
@@ -2340,7 +2340,7 @@
           <a:p>
             <a:fld id="{B880F04E-B60C-4530-BE27-DE08322B2422}" type="datetimeFigureOut">
               <a:rPr lang="en-US" smtClean="0"/>
-              <a:t>2020-02-03</a:t>
+              <a:t>2020-04-17</a:t>
             </a:fld>
             <a:endParaRPr lang="en-US"/>
           </a:p>
@@ -2617,7 +2617,7 @@
           <a:p>
             <a:fld id="{B880F04E-B60C-4530-BE27-DE08322B2422}" type="datetimeFigureOut">
               <a:rPr lang="en-US" smtClean="0"/>
-              <a:t>2020-02-03</a:t>
+              <a:t>2020-04-17</a:t>
             </a:fld>
             <a:endParaRPr lang="en-US"/>
           </a:p>
@@ -2811,7 +2811,7 @@
           <a:p>
             <a:fld id="{E3744D7E-A5BB-4306-A750-C25515017678}" type="datetimeFigureOut">
               <a:rPr lang="en-US" smtClean="0"/>
-              <a:t>2020-02-03</a:t>
+              <a:t>2020-04-17</a:t>
             </a:fld>
             <a:endParaRPr lang="en-US"/>
           </a:p>
@@ -3080,7 +3080,7 @@
           <a:p>
             <a:fld id="{B880F04E-B60C-4530-BE27-DE08322B2422}" type="datetimeFigureOut">
               <a:rPr lang="en-US" smtClean="0"/>
-              <a:t>2020-02-03</a:t>
+              <a:t>2020-04-17</a:t>
             </a:fld>
             <a:endParaRPr lang="en-US"/>
           </a:p>
@@ -3250,7 +3250,7 @@
           <a:p>
             <a:fld id="{B880F04E-B60C-4530-BE27-DE08322B2422}" type="datetimeFigureOut">
               <a:rPr lang="en-US" smtClean="0"/>
-              <a:t>2020-02-03</a:t>
+              <a:t>2020-04-17</a:t>
             </a:fld>
             <a:endParaRPr lang="en-US"/>
           </a:p>
@@ -3430,7 +3430,7 @@
           <a:p>
             <a:fld id="{B880F04E-B60C-4530-BE27-DE08322B2422}" type="datetimeFigureOut">
               <a:rPr lang="en-US" smtClean="0"/>
-              <a:t>2020-02-03</a:t>
+              <a:t>2020-04-17</a:t>
             </a:fld>
             <a:endParaRPr lang="en-US"/>
           </a:p>
@@ -3672,7 +3672,7 @@
           <a:p>
             <a:fld id="{C5690C41-1B19-4491-A062-33F2F29E9A8D}" type="datetimeFigureOut">
               <a:rPr lang="en-US" smtClean="0"/>
-              <a:t>2020-02-03</a:t>
+              <a:t>2020-04-17</a:t>
             </a:fld>
             <a:endParaRPr lang="en-US"/>
           </a:p>
@@ -3842,7 +3842,7 @@
           <a:p>
             <a:fld id="{C5690C41-1B19-4491-A062-33F2F29E9A8D}" type="datetimeFigureOut">
               <a:rPr lang="en-US" smtClean="0"/>
-              <a:t>2020-02-03</a:t>
+              <a:t>2020-04-17</a:t>
             </a:fld>
             <a:endParaRPr lang="en-US"/>
           </a:p>
@@ -4088,7 +4088,7 @@
           <a:p>
             <a:fld id="{C5690C41-1B19-4491-A062-33F2F29E9A8D}" type="datetimeFigureOut">
               <a:rPr lang="en-US" smtClean="0"/>
-              <a:t>2020-02-03</a:t>
+              <a:t>2020-04-17</a:t>
             </a:fld>
             <a:endParaRPr lang="en-US"/>
           </a:p>
@@ -4376,7 +4376,7 @@
           <a:p>
             <a:fld id="{C5690C41-1B19-4491-A062-33F2F29E9A8D}" type="datetimeFigureOut">
               <a:rPr lang="en-US" smtClean="0"/>
-              <a:t>2020-02-03</a:t>
+              <a:t>2020-04-17</a:t>
             </a:fld>
             <a:endParaRPr lang="en-US"/>
           </a:p>
@@ -4798,7 +4798,7 @@
           <a:p>
             <a:fld id="{C5690C41-1B19-4491-A062-33F2F29E9A8D}" type="datetimeFigureOut">
               <a:rPr lang="en-US" smtClean="0"/>
-              <a:t>2020-02-03</a:t>
+              <a:t>2020-04-17</a:t>
             </a:fld>
             <a:endParaRPr lang="en-US"/>
           </a:p>
@@ -4916,7 +4916,7 @@
           <a:p>
             <a:fld id="{C5690C41-1B19-4491-A062-33F2F29E9A8D}" type="datetimeFigureOut">
               <a:rPr lang="en-US" smtClean="0"/>
-              <a:t>2020-02-03</a:t>
+              <a:t>2020-04-17</a:t>
             </a:fld>
             <a:endParaRPr lang="en-US"/>
           </a:p>
@@ -5011,7 +5011,7 @@
           <a:p>
             <a:fld id="{C5690C41-1B19-4491-A062-33F2F29E9A8D}" type="datetimeFigureOut">
               <a:rPr lang="en-US" smtClean="0"/>
-              <a:t>2020-02-03</a:t>
+              <a:t>2020-04-17</a:t>
             </a:fld>
             <a:endParaRPr lang="en-US"/>
           </a:p>
@@ -5271,7 +5271,7 @@
           <a:p>
             <a:fld id="{E3744D7E-A5BB-4306-A750-C25515017678}" type="datetimeFigureOut">
               <a:rPr lang="en-US" smtClean="0"/>
-              <a:t>2020-02-03</a:t>
+              <a:t>2020-04-17</a:t>
             </a:fld>
             <a:endParaRPr lang="en-US"/>
           </a:p>
@@ -5564,7 +5564,7 @@
           <a:p>
             <a:fld id="{C5690C41-1B19-4491-A062-33F2F29E9A8D}" type="datetimeFigureOut">
               <a:rPr lang="en-US" smtClean="0"/>
-              <a:t>2020-02-03</a:t>
+              <a:t>2020-04-17</a:t>
             </a:fld>
             <a:endParaRPr lang="en-US"/>
           </a:p>
@@ -5817,7 +5817,7 @@
           <a:p>
             <a:fld id="{C5690C41-1B19-4491-A062-33F2F29E9A8D}" type="datetimeFigureOut">
               <a:rPr lang="en-US" smtClean="0"/>
-              <a:t>2020-02-03</a:t>
+              <a:t>2020-04-17</a:t>
             </a:fld>
             <a:endParaRPr lang="en-US"/>
           </a:p>
@@ -5987,7 +5987,7 @@
           <a:p>
             <a:fld id="{C5690C41-1B19-4491-A062-33F2F29E9A8D}" type="datetimeFigureOut">
               <a:rPr lang="en-US" smtClean="0"/>
-              <a:t>2020-02-03</a:t>
+              <a:t>2020-04-17</a:t>
             </a:fld>
             <a:endParaRPr lang="en-US"/>
           </a:p>
@@ -6167,7 +6167,7 @@
           <a:p>
             <a:fld id="{C5690C41-1B19-4491-A062-33F2F29E9A8D}" type="datetimeFigureOut">
               <a:rPr lang="en-US" smtClean="0"/>
-              <a:t>2020-02-03</a:t>
+              <a:t>2020-04-17</a:t>
             </a:fld>
             <a:endParaRPr lang="en-US"/>
           </a:p>
@@ -6409,7 +6409,7 @@
           <a:p>
             <a:fld id="{23D18025-B22E-453D-AA62-4A08DAEF541F}" type="datetimeFigureOut">
               <a:rPr lang="en-US" smtClean="0"/>
-              <a:t>2020-02-03</a:t>
+              <a:t>2020-04-17</a:t>
             </a:fld>
             <a:endParaRPr lang="en-US"/>
           </a:p>
@@ -6579,7 +6579,7 @@
           <a:p>
             <a:fld id="{23D18025-B22E-453D-AA62-4A08DAEF541F}" type="datetimeFigureOut">
               <a:rPr lang="en-US" smtClean="0"/>
-              <a:t>2020-02-03</a:t>
+              <a:t>2020-04-17</a:t>
             </a:fld>
             <a:endParaRPr lang="en-US"/>
           </a:p>
@@ -6825,7 +6825,7 @@
           <a:p>
             <a:fld id="{23D18025-B22E-453D-AA62-4A08DAEF541F}" type="datetimeFigureOut">
               <a:rPr lang="en-US" smtClean="0"/>
-              <a:t>2020-02-03</a:t>
+              <a:t>2020-04-17</a:t>
             </a:fld>
             <a:endParaRPr lang="en-US"/>
           </a:p>
@@ -7113,7 +7113,7 @@
           <a:p>
             <a:fld id="{23D18025-B22E-453D-AA62-4A08DAEF541F}" type="datetimeFigureOut">
               <a:rPr lang="en-US" smtClean="0"/>
-              <a:t>2020-02-03</a:t>
+              <a:t>2020-04-17</a:t>
             </a:fld>
             <a:endParaRPr lang="en-US"/>
           </a:p>
@@ -7535,7 +7535,7 @@
           <a:p>
             <a:fld id="{23D18025-B22E-453D-AA62-4A08DAEF541F}" type="datetimeFigureOut">
               <a:rPr lang="en-US" smtClean="0"/>
-              <a:t>2020-02-03</a:t>
+              <a:t>2020-04-17</a:t>
             </a:fld>
             <a:endParaRPr lang="en-US"/>
           </a:p>
@@ -7653,7 +7653,7 @@
           <a:p>
             <a:fld id="{23D18025-B22E-453D-AA62-4A08DAEF541F}" type="datetimeFigureOut">
               <a:rPr lang="en-US" smtClean="0"/>
-              <a:t>2020-02-03</a:t>
+              <a:t>2020-04-17</a:t>
             </a:fld>
             <a:endParaRPr lang="en-US"/>
           </a:p>
@@ -7963,7 +7963,7 @@
           <a:p>
             <a:fld id="{E3744D7E-A5BB-4306-A750-C25515017678}" type="datetimeFigureOut">
               <a:rPr lang="en-US" smtClean="0"/>
-              <a:t>2020-02-03</a:t>
+              <a:t>2020-04-17</a:t>
             </a:fld>
             <a:endParaRPr lang="en-US"/>
           </a:p>
@@ -8074,7 +8074,7 @@
           <a:p>
             <a:fld id="{23D18025-B22E-453D-AA62-4A08DAEF541F}" type="datetimeFigureOut">
               <a:rPr lang="en-US" smtClean="0"/>
-              <a:t>2020-02-03</a:t>
+              <a:t>2020-04-17</a:t>
             </a:fld>
             <a:endParaRPr lang="en-US"/>
           </a:p>
@@ -8351,7 +8351,7 @@
           <a:p>
             <a:fld id="{23D18025-B22E-453D-AA62-4A08DAEF541F}" type="datetimeFigureOut">
               <a:rPr lang="en-US" smtClean="0"/>
-              <a:t>2020-02-03</a:t>
+              <a:t>2020-04-17</a:t>
             </a:fld>
             <a:endParaRPr lang="en-US"/>
           </a:p>
@@ -8604,7 +8604,7 @@
           <a:p>
             <a:fld id="{23D18025-B22E-453D-AA62-4A08DAEF541F}" type="datetimeFigureOut">
               <a:rPr lang="en-US" smtClean="0"/>
-              <a:t>2020-02-03</a:t>
+              <a:t>2020-04-17</a:t>
             </a:fld>
             <a:endParaRPr lang="en-US"/>
           </a:p>
@@ -8774,7 +8774,7 @@
           <a:p>
             <a:fld id="{23D18025-B22E-453D-AA62-4A08DAEF541F}" type="datetimeFigureOut">
               <a:rPr lang="en-US" smtClean="0"/>
-              <a:t>2020-02-03</a:t>
+              <a:t>2020-04-17</a:t>
             </a:fld>
             <a:endParaRPr lang="en-US"/>
           </a:p>
@@ -8954,7 +8954,7 @@
           <a:p>
             <a:fld id="{23D18025-B22E-453D-AA62-4A08DAEF541F}" type="datetimeFigureOut">
               <a:rPr lang="en-US" smtClean="0"/>
-              <a:t>2020-02-03</a:t>
+              <a:t>2020-04-17</a:t>
             </a:fld>
             <a:endParaRPr lang="en-US"/>
           </a:p>
@@ -9196,7 +9196,7 @@
           <a:p>
             <a:fld id="{5A29F1F3-0306-4ADD-8575-5F845BC34EA0}" type="datetimeFigureOut">
               <a:rPr lang="en-US" smtClean="0"/>
-              <a:t>2020-02-03</a:t>
+              <a:t>2020-04-17</a:t>
             </a:fld>
             <a:endParaRPr lang="en-US"/>
           </a:p>
@@ -9366,7 +9366,7 @@
           <a:p>
             <a:fld id="{5A29F1F3-0306-4ADD-8575-5F845BC34EA0}" type="datetimeFigureOut">
               <a:rPr lang="en-US" smtClean="0"/>
-              <a:t>2020-02-03</a:t>
+              <a:t>2020-04-17</a:t>
             </a:fld>
             <a:endParaRPr lang="en-US"/>
           </a:p>
@@ -9612,7 +9612,7 @@
           <a:p>
             <a:fld id="{5A29F1F3-0306-4ADD-8575-5F845BC34EA0}" type="datetimeFigureOut">
               <a:rPr lang="en-US" smtClean="0"/>
-              <a:t>2020-02-03</a:t>
+              <a:t>2020-04-17</a:t>
             </a:fld>
             <a:endParaRPr lang="en-US"/>
           </a:p>
@@ -9900,7 +9900,7 @@
           <a:p>
             <a:fld id="{5A29F1F3-0306-4ADD-8575-5F845BC34EA0}" type="datetimeFigureOut">
               <a:rPr lang="en-US" smtClean="0"/>
-              <a:t>2020-02-03</a:t>
+              <a:t>2020-04-17</a:t>
             </a:fld>
             <a:endParaRPr lang="en-US"/>
           </a:p>
@@ -10322,7 +10322,7 @@
           <a:p>
             <a:fld id="{5A29F1F3-0306-4ADD-8575-5F845BC34EA0}" type="datetimeFigureOut">
               <a:rPr lang="en-US" smtClean="0"/>
-              <a:t>2020-02-03</a:t>
+              <a:t>2020-04-17</a:t>
             </a:fld>
             <a:endParaRPr lang="en-US"/>
           </a:p>
@@ -10772,7 +10772,7 @@
           <a:p>
             <a:fld id="{E3744D7E-A5BB-4306-A750-C25515017678}" type="datetimeFigureOut">
               <a:rPr lang="en-US" smtClean="0"/>
-              <a:t>2020-02-03</a:t>
+              <a:t>2020-04-17</a:t>
             </a:fld>
             <a:endParaRPr lang="en-US"/>
           </a:p>
@@ -10906,7 +10906,7 @@
           <a:p>
             <a:fld id="{5A29F1F3-0306-4ADD-8575-5F845BC34EA0}" type="datetimeFigureOut">
               <a:rPr lang="en-US" smtClean="0"/>
-              <a:t>2020-02-03</a:t>
+              <a:t>2020-04-17</a:t>
             </a:fld>
             <a:endParaRPr lang="en-US"/>
           </a:p>
@@ -11001,7 +11001,7 @@
           <a:p>
             <a:fld id="{5A29F1F3-0306-4ADD-8575-5F845BC34EA0}" type="datetimeFigureOut">
               <a:rPr lang="en-US" smtClean="0"/>
-              <a:t>2020-02-03</a:t>
+              <a:t>2020-04-17</a:t>
             </a:fld>
             <a:endParaRPr lang="en-US"/>
           </a:p>
@@ -11278,7 +11278,7 @@
           <a:p>
             <a:fld id="{5A29F1F3-0306-4ADD-8575-5F845BC34EA0}" type="datetimeFigureOut">
               <a:rPr lang="en-US" smtClean="0"/>
-              <a:t>2020-02-03</a:t>
+              <a:t>2020-04-17</a:t>
             </a:fld>
             <a:endParaRPr lang="en-US"/>
           </a:p>
@@ -11531,7 +11531,7 @@
           <a:p>
             <a:fld id="{5A29F1F3-0306-4ADD-8575-5F845BC34EA0}" type="datetimeFigureOut">
               <a:rPr lang="en-US" smtClean="0"/>
-              <a:t>2020-02-03</a:t>
+              <a:t>2020-04-17</a:t>
             </a:fld>
             <a:endParaRPr lang="en-US"/>
           </a:p>
@@ -11701,7 +11701,7 @@
           <a:p>
             <a:fld id="{5A29F1F3-0306-4ADD-8575-5F845BC34EA0}" type="datetimeFigureOut">
               <a:rPr lang="en-US" smtClean="0"/>
-              <a:t>2020-02-03</a:t>
+              <a:t>2020-04-17</a:t>
             </a:fld>
             <a:endParaRPr lang="en-US"/>
           </a:p>
@@ -11881,7 +11881,7 @@
           <a:p>
             <a:fld id="{5A29F1F3-0306-4ADD-8575-5F845BC34EA0}" type="datetimeFigureOut">
               <a:rPr lang="en-US" smtClean="0"/>
-              <a:t>2020-02-03</a:t>
+              <a:t>2020-04-17</a:t>
             </a:fld>
             <a:endParaRPr lang="en-US"/>
           </a:p>
@@ -12123,7 +12123,7 @@
           <a:p>
             <a:fld id="{2CD378D0-82C9-47C6-BEE5-E347AC6F0A5E}" type="datetimeFigureOut">
               <a:rPr lang="en-US" smtClean="0"/>
-              <a:t>2020-02-03</a:t>
+              <a:t>2020-04-17</a:t>
             </a:fld>
             <a:endParaRPr lang="en-US"/>
           </a:p>
@@ -12293,7 +12293,7 @@
           <a:p>
             <a:fld id="{2CD378D0-82C9-47C6-BEE5-E347AC6F0A5E}" type="datetimeFigureOut">
               <a:rPr lang="en-US" smtClean="0"/>
-              <a:t>2020-02-03</a:t>
+              <a:t>2020-04-17</a:t>
             </a:fld>
             <a:endParaRPr lang="en-US"/>
           </a:p>
@@ -12539,7 +12539,7 @@
           <a:p>
             <a:fld id="{2CD378D0-82C9-47C6-BEE5-E347AC6F0A5E}" type="datetimeFigureOut">
               <a:rPr lang="en-US" smtClean="0"/>
-              <a:t>2020-02-03</a:t>
+              <a:t>2020-04-17</a:t>
             </a:fld>
             <a:endParaRPr lang="en-US"/>
           </a:p>
@@ -12827,7 +12827,7 @@
           <a:p>
             <a:fld id="{2CD378D0-82C9-47C6-BEE5-E347AC6F0A5E}" type="datetimeFigureOut">
               <a:rPr lang="en-US" smtClean="0"/>
-              <a:t>2020-02-03</a:t>
+              <a:t>2020-04-17</a:t>
             </a:fld>
             <a:endParaRPr lang="en-US"/>
           </a:p>
@@ -12961,7 +12961,7 @@
           <a:p>
             <a:fld id="{E3744D7E-A5BB-4306-A750-C25515017678}" type="datetimeFigureOut">
               <a:rPr lang="en-US" smtClean="0"/>
-              <a:t>2020-02-03</a:t>
+              <a:t>2020-04-17</a:t>
             </a:fld>
             <a:endParaRPr lang="en-US"/>
           </a:p>
@@ -13399,7 +13399,7 @@
           <a:p>
             <a:fld id="{2CD378D0-82C9-47C6-BEE5-E347AC6F0A5E}" type="datetimeFigureOut">
               <a:rPr lang="en-US" smtClean="0"/>
-              <a:t>2020-02-03</a:t>
+              <a:t>2020-04-17</a:t>
             </a:fld>
             <a:endParaRPr lang="en-US"/>
           </a:p>
@@ -13517,7 +13517,7 @@
           <a:p>
             <a:fld id="{2CD378D0-82C9-47C6-BEE5-E347AC6F0A5E}" type="datetimeFigureOut">
               <a:rPr lang="en-US" smtClean="0"/>
-              <a:t>2020-02-03</a:t>
+              <a:t>2020-04-17</a:t>
             </a:fld>
             <a:endParaRPr lang="en-US"/>
           </a:p>
@@ -13612,7 +13612,7 @@
           <a:p>
             <a:fld id="{2CD378D0-82C9-47C6-BEE5-E347AC6F0A5E}" type="datetimeFigureOut">
               <a:rPr lang="en-US" smtClean="0"/>
-              <a:t>2020-02-03</a:t>
+              <a:t>2020-04-17</a:t>
             </a:fld>
             <a:endParaRPr lang="en-US"/>
           </a:p>
@@ -13889,7 +13889,7 @@
           <a:p>
             <a:fld id="{2CD378D0-82C9-47C6-BEE5-E347AC6F0A5E}" type="datetimeFigureOut">
               <a:rPr lang="en-US" smtClean="0"/>
-              <a:t>2020-02-03</a:t>
+              <a:t>2020-04-17</a:t>
             </a:fld>
             <a:endParaRPr lang="en-US"/>
           </a:p>
@@ -14142,7 +14142,7 @@
           <a:p>
             <a:fld id="{2CD378D0-82C9-47C6-BEE5-E347AC6F0A5E}" type="datetimeFigureOut">
               <a:rPr lang="en-US" smtClean="0"/>
-              <a:t>2020-02-03</a:t>
+              <a:t>2020-04-17</a:t>
             </a:fld>
             <a:endParaRPr lang="en-US"/>
           </a:p>
@@ -14312,7 +14312,7 @@
           <a:p>
             <a:fld id="{2CD378D0-82C9-47C6-BEE5-E347AC6F0A5E}" type="datetimeFigureOut">
               <a:rPr lang="en-US" smtClean="0"/>
-              <a:t>2020-02-03</a:t>
+              <a:t>2020-04-17</a:t>
             </a:fld>
             <a:endParaRPr lang="en-US"/>
           </a:p>
@@ -14492,7 +14492,7 @@
           <a:p>
             <a:fld id="{2CD378D0-82C9-47C6-BEE5-E347AC6F0A5E}" type="datetimeFigureOut">
               <a:rPr lang="en-US" smtClean="0"/>
-              <a:t>2020-02-03</a:t>
+              <a:t>2020-04-17</a:t>
             </a:fld>
             <a:endParaRPr lang="en-US"/>
           </a:p>
@@ -14734,7 +14734,7 @@
           <a:p>
             <a:fld id="{B96FFCCF-F4AB-4D56-AEE8-39DF7F28FF62}" type="datetimeFigureOut">
               <a:rPr lang="en-US" smtClean="0"/>
-              <a:t>2020-02-03</a:t>
+              <a:t>2020-04-17</a:t>
             </a:fld>
             <a:endParaRPr lang="en-US"/>
           </a:p>
@@ -14904,7 +14904,7 @@
           <a:p>
             <a:fld id="{B96FFCCF-F4AB-4D56-AEE8-39DF7F28FF62}" type="datetimeFigureOut">
               <a:rPr lang="en-US" smtClean="0"/>
-              <a:t>2020-02-03</a:t>
+              <a:t>2020-04-17</a:t>
             </a:fld>
             <a:endParaRPr lang="en-US"/>
           </a:p>
@@ -15150,7 +15150,7 @@
           <a:p>
             <a:fld id="{B96FFCCF-F4AB-4D56-AEE8-39DF7F28FF62}" type="datetimeFigureOut">
               <a:rPr lang="en-US" smtClean="0"/>
-              <a:t>2020-02-03</a:t>
+              <a:t>2020-04-17</a:t>
             </a:fld>
             <a:endParaRPr lang="en-US"/>
           </a:p>
@@ -15253,7 +15253,7 @@
           <a:p>
             <a:fld id="{E3744D7E-A5BB-4306-A750-C25515017678}" type="datetimeFigureOut">
               <a:rPr lang="en-US" smtClean="0"/>
-              <a:t>2020-02-03</a:t>
+              <a:t>2020-04-17</a:t>
             </a:fld>
             <a:endParaRPr lang="en-US"/>
           </a:p>
@@ -15564,7 +15564,7 @@
           <a:p>
             <a:fld id="{B96FFCCF-F4AB-4D56-AEE8-39DF7F28FF62}" type="datetimeFigureOut">
               <a:rPr lang="en-US" smtClean="0"/>
-              <a:t>2020-02-03</a:t>
+              <a:t>2020-04-17</a:t>
             </a:fld>
             <a:endParaRPr lang="en-US"/>
           </a:p>
@@ -15986,7 +15986,7 @@
           <a:p>
             <a:fld id="{B96FFCCF-F4AB-4D56-AEE8-39DF7F28FF62}" type="datetimeFigureOut">
               <a:rPr lang="en-US" smtClean="0"/>
-              <a:t>2020-02-03</a:t>
+              <a:t>2020-04-17</a:t>
             </a:fld>
             <a:endParaRPr lang="en-US"/>
           </a:p>
@@ -16104,7 +16104,7 @@
           <a:p>
             <a:fld id="{B96FFCCF-F4AB-4D56-AEE8-39DF7F28FF62}" type="datetimeFigureOut">
               <a:rPr lang="en-US" smtClean="0"/>
-              <a:t>2020-02-03</a:t>
+              <a:t>2020-04-17</a:t>
             </a:fld>
             <a:endParaRPr lang="en-US"/>
           </a:p>
@@ -16199,7 +16199,7 @@
           <a:p>
             <a:fld id="{B96FFCCF-F4AB-4D56-AEE8-39DF7F28FF62}" type="datetimeFigureOut">
               <a:rPr lang="en-US" smtClean="0"/>
-              <a:t>2020-02-03</a:t>
+              <a:t>2020-04-17</a:t>
             </a:fld>
             <a:endParaRPr lang="en-US"/>
           </a:p>
@@ -16476,7 +16476,7 @@
           <a:p>
             <a:fld id="{B96FFCCF-F4AB-4D56-AEE8-39DF7F28FF62}" type="datetimeFigureOut">
               <a:rPr lang="en-US" smtClean="0"/>
-              <a:t>2020-02-03</a:t>
+              <a:t>2020-04-17</a:t>
             </a:fld>
             <a:endParaRPr lang="en-US"/>
           </a:p>
@@ -16729,7 +16729,7 @@
           <a:p>
             <a:fld id="{B96FFCCF-F4AB-4D56-AEE8-39DF7F28FF62}" type="datetimeFigureOut">
               <a:rPr lang="en-US" smtClean="0"/>
-              <a:t>2020-02-03</a:t>
+              <a:t>2020-04-17</a:t>
             </a:fld>
             <a:endParaRPr lang="en-US"/>
           </a:p>
@@ -16899,7 +16899,7 @@
           <a:p>
             <a:fld id="{B96FFCCF-F4AB-4D56-AEE8-39DF7F28FF62}" type="datetimeFigureOut">
               <a:rPr lang="en-US" smtClean="0"/>
-              <a:t>2020-02-03</a:t>
+              <a:t>2020-04-17</a:t>
             </a:fld>
             <a:endParaRPr lang="en-US"/>
           </a:p>
@@ -17079,7 +17079,7 @@
           <a:p>
             <a:fld id="{B96FFCCF-F4AB-4D56-AEE8-39DF7F28FF62}" type="datetimeFigureOut">
               <a:rPr lang="en-US" smtClean="0"/>
-              <a:t>2020-02-03</a:t>
+              <a:t>2020-04-17</a:t>
             </a:fld>
             <a:endParaRPr lang="en-US"/>
           </a:p>
@@ -17321,7 +17321,7 @@
           <a:p>
             <a:fld id="{E90DB797-294B-4B2B-9A48-229F3ACF3E1A}" type="datetimeFigureOut">
               <a:rPr lang="en-US" smtClean="0"/>
-              <a:t>2020-02-03</a:t>
+              <a:t>2020-04-17</a:t>
             </a:fld>
             <a:endParaRPr lang="en-US"/>
           </a:p>
@@ -17491,7 +17491,7 @@
           <a:p>
             <a:fld id="{E90DB797-294B-4B2B-9A48-229F3ACF3E1A}" type="datetimeFigureOut">
               <a:rPr lang="en-US" smtClean="0"/>
-              <a:t>2020-02-03</a:t>
+              <a:t>2020-04-17</a:t>
             </a:fld>
             <a:endParaRPr lang="en-US"/>
           </a:p>
@@ -17785,7 +17785,7 @@
           <a:p>
             <a:fld id="{E3744D7E-A5BB-4306-A750-C25515017678}" type="datetimeFigureOut">
               <a:rPr lang="en-US" smtClean="0"/>
-              <a:t>2020-02-03</a:t>
+              <a:t>2020-04-17</a:t>
             </a:fld>
             <a:endParaRPr lang="en-US"/>
           </a:p>
@@ -18047,7 +18047,7 @@
           <a:p>
             <a:fld id="{E90DB797-294B-4B2B-9A48-229F3ACF3E1A}" type="datetimeFigureOut">
               <a:rPr lang="en-US" smtClean="0"/>
-              <a:t>2020-02-03</a:t>
+              <a:t>2020-04-17</a:t>
             </a:fld>
             <a:endParaRPr lang="en-US"/>
           </a:p>
@@ -18335,7 +18335,7 @@
           <a:p>
             <a:fld id="{E90DB797-294B-4B2B-9A48-229F3ACF3E1A}" type="datetimeFigureOut">
               <a:rPr lang="en-US" smtClean="0"/>
-              <a:t>2020-02-03</a:t>
+              <a:t>2020-04-17</a:t>
             </a:fld>
             <a:endParaRPr lang="en-US"/>
           </a:p>
@@ -18757,7 +18757,7 @@
           <a:p>
             <a:fld id="{E90DB797-294B-4B2B-9A48-229F3ACF3E1A}" type="datetimeFigureOut">
               <a:rPr lang="en-US" smtClean="0"/>
-              <a:t>2020-02-03</a:t>
+              <a:t>2020-04-17</a:t>
             </a:fld>
             <a:endParaRPr lang="en-US"/>
           </a:p>
@@ -18875,7 +18875,7 @@
           <a:p>
             <a:fld id="{E90DB797-294B-4B2B-9A48-229F3ACF3E1A}" type="datetimeFigureOut">
               <a:rPr lang="en-US" smtClean="0"/>
-              <a:t>2020-02-03</a:t>
+              <a:t>2020-04-17</a:t>
             </a:fld>
             <a:endParaRPr lang="en-US"/>
           </a:p>
@@ -18970,7 +18970,7 @@
           <a:p>
             <a:fld id="{E90DB797-294B-4B2B-9A48-229F3ACF3E1A}" type="datetimeFigureOut">
               <a:rPr lang="en-US" smtClean="0"/>
-              <a:t>2020-02-03</a:t>
+              <a:t>2020-04-17</a:t>
             </a:fld>
             <a:endParaRPr lang="en-US"/>
           </a:p>
@@ -19247,7 +19247,7 @@
           <a:p>
             <a:fld id="{E90DB797-294B-4B2B-9A48-229F3ACF3E1A}" type="datetimeFigureOut">
               <a:rPr lang="en-US" smtClean="0"/>
-              <a:t>2020-02-03</a:t>
+              <a:t>2020-04-17</a:t>
             </a:fld>
             <a:endParaRPr lang="en-US"/>
           </a:p>
@@ -19500,7 +19500,7 @@
           <a:p>
             <a:fld id="{E90DB797-294B-4B2B-9A48-229F3ACF3E1A}" type="datetimeFigureOut">
               <a:rPr lang="en-US" smtClean="0"/>
-              <a:t>2020-02-03</a:t>
+              <a:t>2020-04-17</a:t>
             </a:fld>
             <a:endParaRPr lang="en-US"/>
           </a:p>
@@ -19670,7 +19670,7 @@
           <a:p>
             <a:fld id="{E90DB797-294B-4B2B-9A48-229F3ACF3E1A}" type="datetimeFigureOut">
               <a:rPr lang="en-US" smtClean="0"/>
-              <a:t>2020-02-03</a:t>
+              <a:t>2020-04-17</a:t>
             </a:fld>
             <a:endParaRPr lang="en-US"/>
           </a:p>
@@ -19850,7 +19850,7 @@
           <a:p>
             <a:fld id="{E90DB797-294B-4B2B-9A48-229F3ACF3E1A}" type="datetimeFigureOut">
               <a:rPr lang="en-US" smtClean="0"/>
-              <a:t>2020-02-03</a:t>
+              <a:t>2020-04-17</a:t>
             </a:fld>
             <a:endParaRPr lang="en-US"/>
           </a:p>
@@ -20120,7 +20120,7 @@
           <a:p>
             <a:fld id="{E3744D7E-A5BB-4306-A750-C25515017678}" type="datetimeFigureOut">
               <a:rPr lang="en-US" smtClean="0"/>
-              <a:t>2020-02-03</a:t>
+              <a:t>2020-04-17</a:t>
             </a:fld>
             <a:endParaRPr lang="en-US"/>
           </a:p>
@@ -20652,7 +20652,7 @@
           <a:p>
             <a:fld id="{B880F04E-B60C-4530-BE27-DE08322B2422}" type="datetimeFigureOut">
               <a:rPr lang="en-US" smtClean="0"/>
-              <a:t>2020-02-03</a:t>
+              <a:t>2020-04-17</a:t>
             </a:fld>
             <a:endParaRPr lang="en-US"/>
           </a:p>
@@ -21162,7 +21162,7 @@
           <a:p>
             <a:fld id="{C5690C41-1B19-4491-A062-33F2F29E9A8D}" type="datetimeFigureOut">
               <a:rPr lang="en-US" smtClean="0"/>
-              <a:t>2020-02-03</a:t>
+              <a:t>2020-04-17</a:t>
             </a:fld>
             <a:endParaRPr lang="en-US"/>
           </a:p>
@@ -21672,7 +21672,7 @@
           <a:p>
             <a:fld id="{23D18025-B22E-453D-AA62-4A08DAEF541F}" type="datetimeFigureOut">
               <a:rPr lang="en-US" smtClean="0"/>
-              <a:t>2020-02-03</a:t>
+              <a:t>2020-04-17</a:t>
             </a:fld>
             <a:endParaRPr lang="en-US"/>
           </a:p>
@@ -22182,7 +22182,7 @@
           <a:p>
             <a:fld id="{5A29F1F3-0306-4ADD-8575-5F845BC34EA0}" type="datetimeFigureOut">
               <a:rPr lang="en-US" smtClean="0"/>
-              <a:t>2020-02-03</a:t>
+              <a:t>2020-04-17</a:t>
             </a:fld>
             <a:endParaRPr lang="en-US"/>
           </a:p>
@@ -22692,7 +22692,7 @@
           <a:p>
             <a:fld id="{2CD378D0-82C9-47C6-BEE5-E347AC6F0A5E}" type="datetimeFigureOut">
               <a:rPr lang="en-US" smtClean="0"/>
-              <a:t>2020-02-03</a:t>
+              <a:t>2020-04-17</a:t>
             </a:fld>
             <a:endParaRPr lang="en-US"/>
           </a:p>
@@ -23202,7 +23202,7 @@
           <a:p>
             <a:fld id="{B96FFCCF-F4AB-4D56-AEE8-39DF7F28FF62}" type="datetimeFigureOut">
               <a:rPr lang="en-US" smtClean="0"/>
-              <a:t>2020-02-03</a:t>
+              <a:t>2020-04-17</a:t>
             </a:fld>
             <a:endParaRPr lang="en-US"/>
           </a:p>
@@ -23712,7 +23712,7 @@
           <a:p>
             <a:fld id="{E90DB797-294B-4B2B-9A48-229F3ACF3E1A}" type="datetimeFigureOut">
               <a:rPr lang="en-US" smtClean="0"/>
-              <a:t>2020-02-03</a:t>
+              <a:t>2020-04-17</a:t>
             </a:fld>
             <a:endParaRPr lang="en-US"/>
           </a:p>
@@ -24911,7 +24911,7 @@
         </p:nvSpPr>
         <p:spPr>
           <a:xfrm>
-            <a:off x="6614514" y="2746559"/>
+            <a:off x="6518375" y="2746559"/>
             <a:ext cx="463319" cy="199207"/>
           </a:xfrm>
           <a:prstGeom prst="rect">
@@ -24931,11 +24931,11 @@
           <a:p>
             <a:pPr algn="ctr"/>
             <a:r>
-              <a:rPr lang="en-US" sz="1200" dirty="0" smtClean="0">
+              <a:rPr lang="en-US" sz="1200" dirty="0">
                 <a:latin typeface="Arial" panose="020B0604020202020204" pitchFamily="34" charset="0"/>
                 <a:cs typeface="Arial" panose="020B0604020202020204" pitchFamily="34" charset="0"/>
               </a:rPr>
-              <a:t>$</a:t>
+              <a:t>€</a:t>
             </a:r>
             <a:r>
               <a:rPr lang="en-US" sz="400" dirty="0" smtClean="0">
@@ -24945,11 +24945,18 @@
               <a:t> </a:t>
             </a:r>
             <a:r>
+              <a:rPr lang="en-US" sz="1200" dirty="0">
+                <a:latin typeface="Arial" panose="020B0604020202020204" pitchFamily="34" charset="0"/>
+                <a:cs typeface="Arial" panose="020B0604020202020204" pitchFamily="34" charset="0"/>
+              </a:rPr>
+              <a:t>1</a:t>
+            </a:r>
+            <a:r>
               <a:rPr lang="en-US" sz="1200" dirty="0" smtClean="0">
                 <a:latin typeface="Arial" panose="020B0604020202020204" pitchFamily="34" charset="0"/>
                 <a:cs typeface="Arial" panose="020B0604020202020204" pitchFamily="34" charset="0"/>
               </a:rPr>
-              <a:t>200</a:t>
+              <a:t>00</a:t>
             </a:r>
             <a:endParaRPr lang="en-US" sz="1200" b="1" i="1" dirty="0">
               <a:latin typeface="Arial" panose="020B0604020202020204" pitchFamily="34" charset="0"/>
@@ -24966,8 +24973,8 @@
         </p:nvSpPr>
         <p:spPr>
           <a:xfrm>
-            <a:off x="6078090" y="2717012"/>
-            <a:ext cx="659156" cy="246221"/>
+            <a:off x="6191836" y="2717012"/>
+            <a:ext cx="447683" cy="246221"/>
           </a:xfrm>
           <a:prstGeom prst="rect">
             <a:avLst/>
@@ -24975,18 +24982,24 @@
           <a:noFill/>
         </p:spPr>
         <p:txBody>
-          <a:bodyPr wrap="none" rtlCol="0">
+          <a:bodyPr wrap="none" lIns="36000" rtlCol="0">
             <a:spAutoFit/>
           </a:bodyPr>
           <a:lstStyle/>
           <a:p>
-            <a:pPr algn="ctr"/>
             <a:r>
               <a:rPr lang="en-US" sz="1000" dirty="0" smtClean="0">
                 <a:latin typeface="Arial" panose="020B0604020202020204" pitchFamily="34" charset="0"/>
                 <a:cs typeface="Arial" panose="020B0604020202020204" pitchFamily="34" charset="0"/>
               </a:rPr>
-              <a:t>Amount:</a:t>
+              <a:t>Total</a:t>
+            </a:r>
+            <a:r>
+              <a:rPr lang="en-US" sz="1000" dirty="0" smtClean="0">
+                <a:latin typeface="Arial" panose="020B0604020202020204" pitchFamily="34" charset="0"/>
+                <a:cs typeface="Arial" panose="020B0604020202020204" pitchFamily="34" charset="0"/>
+              </a:rPr>
+              <a:t>:</a:t>
             </a:r>
             <a:endParaRPr lang="en-US" sz="1000" dirty="0">
               <a:latin typeface="Arial" panose="020B0604020202020204" pitchFamily="34" charset="0"/>
@@ -25174,7 +25187,7 @@
         </p:nvSpPr>
         <p:spPr>
           <a:xfrm>
-            <a:off x="3754542" y="3637479"/>
+            <a:off x="3734295" y="3637479"/>
             <a:ext cx="2672526" cy="430887"/>
           </a:xfrm>
           <a:prstGeom prst="rect">
@@ -26091,54 +26104,6 @@
           </a:p>
         </p:txBody>
       </p:sp>
-      <p:pic>
-        <p:nvPicPr>
-          <p:cNvPr id="874" name="Picture 4" descr="C:\Users\Anders\AppData\Local\Microsoft\Windows\INetCache\IE\YM8GPEOA\mobile[1].png"/>
-          <p:cNvPicPr>
-            <a:picLocks noChangeAspect="1" noChangeArrowheads="1"/>
-          </p:cNvPicPr>
-          <p:nvPr/>
-        </p:nvPicPr>
-        <p:blipFill>
-          <a:blip r:embed="rId6" cstate="print">
-            <a:extLst>
-              <a:ext uri="{28A0092B-C50C-407E-A947-70E740481C1C}">
-                <a14:useLocalDpi xmlns:a14="http://schemas.microsoft.com/office/drawing/2010/main" val="0"/>
-              </a:ext>
-            </a:extLst>
-          </a:blip>
-          <a:srcRect/>
-          <a:stretch>
-            <a:fillRect/>
-          </a:stretch>
-        </p:blipFill>
-        <p:spPr bwMode="auto">
-          <a:xfrm rot="10800000">
-            <a:off x="6373684" y="499779"/>
-            <a:ext cx="355673" cy="502719"/>
-          </a:xfrm>
-          <a:prstGeom prst="rect">
-            <a:avLst/>
-          </a:prstGeom>
-          <a:noFill/>
-          <a:effectLst>
-            <a:outerShdw blurRad="50800" dist="38100" dir="2700000" algn="tl" rotWithShape="0">
-              <a:prstClr val="black">
-                <a:alpha val="40000"/>
-              </a:prstClr>
-            </a:outerShdw>
-          </a:effectLst>
-          <a:extLst>
-            <a:ext uri="{909E8E84-426E-40DD-AFC4-6F175D3DCCD1}">
-              <a14:hiddenFill xmlns:a14="http://schemas.microsoft.com/office/drawing/2010/main">
-                <a:solidFill>
-                  <a:srgbClr val="FFFFFF"/>
-                </a:solidFill>
-              </a14:hiddenFill>
-            </a:ext>
-          </a:extLst>
-        </p:spPr>
-      </p:pic>
       <p:sp>
         <p:nvSpPr>
           <p:cNvPr id="875" name="TextBox 874"/>
@@ -26177,64 +26142,6 @@
       </p:sp>
       <p:sp>
         <p:nvSpPr>
-          <p:cNvPr id="876" name="Parallelogram 875"/>
-          <p:cNvSpPr/>
-          <p:nvPr/>
-        </p:nvSpPr>
-        <p:spPr>
-          <a:xfrm>
-            <a:off x="6353464" y="3542561"/>
-            <a:ext cx="414109" cy="237600"/>
-          </a:xfrm>
-          <a:prstGeom prst="parallelogram">
-            <a:avLst/>
-          </a:prstGeom>
-          <a:blipFill>
-            <a:blip r:embed="rId7"/>
-            <a:tile tx="0" ty="0" sx="50000" sy="50000" flip="none" algn="tl"/>
-          </a:blipFill>
-          <a:ln w="6350">
-            <a:solidFill>
-              <a:schemeClr val="bg1">
-                <a:lumMod val="50000"/>
-              </a:schemeClr>
-            </a:solidFill>
-          </a:ln>
-          <a:effectLst>
-            <a:outerShdw blurRad="50800" dist="38100" dir="2700000" algn="tl" rotWithShape="0">
-              <a:prstClr val="black">
-                <a:alpha val="40000"/>
-              </a:prstClr>
-            </a:outerShdw>
-          </a:effectLst>
-        </p:spPr>
-        <p:style>
-          <a:lnRef idx="2">
-            <a:schemeClr val="accent1">
-              <a:shade val="50000"/>
-            </a:schemeClr>
-          </a:lnRef>
-          <a:fillRef idx="1">
-            <a:schemeClr val="accent1"/>
-          </a:fillRef>
-          <a:effectRef idx="0">
-            <a:schemeClr val="accent1"/>
-          </a:effectRef>
-          <a:fontRef idx="minor">
-            <a:schemeClr val="lt1"/>
-          </a:fontRef>
-        </p:style>
-        <p:txBody>
-          <a:bodyPr rtlCol="0" anchor="ctr"/>
-          <a:lstStyle/>
-          <a:p>
-            <a:pPr algn="ctr"/>
-            <a:endParaRPr lang="en-US"/>
-          </a:p>
-        </p:txBody>
-      </p:sp>
-      <p:sp>
-        <p:nvSpPr>
           <p:cNvPr id="878" name="TextBox 877"/>
           <p:cNvSpPr txBox="1"/>
           <p:nvPr/>
@@ -26416,13 +26323,6 @@
                 <a:cs typeface="Arial" panose="020B0604020202020204" pitchFamily="34" charset="0"/>
               </a:rPr>
               <a:t>Request</a:t>
-            </a:r>
-            <a:r>
-              <a:rPr lang="en-US" sz="1000" dirty="0" smtClean="0">
-                <a:latin typeface="Arial" panose="020B0604020202020204" pitchFamily="34" charset="0"/>
-                <a:cs typeface="Arial" panose="020B0604020202020204" pitchFamily="34" charset="0"/>
-              </a:rPr>
-              <a:t/>
             </a:r>
             <a:br>
               <a:rPr lang="en-US" sz="1000" dirty="0" smtClean="0">
@@ -27365,443 +27265,426 @@
           </a:fontRef>
         </p:style>
       </p:cxnSp>
-      <p:grpSp>
-        <p:nvGrpSpPr>
-          <p:cNvPr id="902" name="Group 901"/>
-          <p:cNvGrpSpPr/>
+      <p:sp>
+        <p:nvSpPr>
+          <p:cNvPr id="903" name="Rectangle 902"/>
+          <p:cNvSpPr>
+            <a:spLocks noChangeAspect="1"/>
+          </p:cNvSpPr>
           <p:nvPr/>
-        </p:nvGrpSpPr>
-        <p:grpSpPr>
+        </p:nvSpPr>
+        <p:spPr>
           <a:xfrm>
-            <a:off x="7771830" y="434303"/>
-            <a:ext cx="1596163" cy="1922641"/>
-            <a:chOff x="7223039" y="1412863"/>
-            <a:chExt cx="1596163" cy="1922641"/>
+            <a:off x="7771830" y="469472"/>
+            <a:ext cx="1596163" cy="1684644"/>
           </a:xfrm>
-        </p:grpSpPr>
-        <p:sp>
-          <p:nvSpPr>
-            <p:cNvPr id="903" name="Rectangle 902"/>
-            <p:cNvSpPr>
-              <a:spLocks noChangeAspect="1"/>
-            </p:cNvSpPr>
-            <p:nvPr/>
-          </p:nvSpPr>
-          <p:spPr>
-            <a:xfrm>
-              <a:off x="7223039" y="1412863"/>
-              <a:ext cx="1596163" cy="1922641"/>
-            </a:xfrm>
-            <a:prstGeom prst="rect">
-              <a:avLst/>
-            </a:prstGeom>
+          <a:prstGeom prst="rect">
+            <a:avLst/>
+          </a:prstGeom>
+          <a:solidFill>
+            <a:schemeClr val="bg1"/>
+          </a:solidFill>
+          <a:ln w="9525">
             <a:solidFill>
-              <a:schemeClr val="bg1"/>
+              <a:schemeClr val="bg1">
+                <a:lumMod val="65000"/>
+              </a:schemeClr>
             </a:solidFill>
-            <a:ln w="9525">
+          </a:ln>
+          <a:effectLst>
+            <a:outerShdw blurRad="50800" dist="38100" dir="2700000" algn="tl" rotWithShape="0">
+              <a:prstClr val="black">
+                <a:alpha val="40000"/>
+              </a:prstClr>
+            </a:outerShdw>
+          </a:effectLst>
+        </p:spPr>
+        <p:style>
+          <a:lnRef idx="2">
+            <a:schemeClr val="accent1">
+              <a:shade val="50000"/>
+            </a:schemeClr>
+          </a:lnRef>
+          <a:fillRef idx="1">
+            <a:schemeClr val="accent1"/>
+          </a:fillRef>
+          <a:effectRef idx="0">
+            <a:schemeClr val="accent1"/>
+          </a:effectRef>
+          <a:fontRef idx="minor">
+            <a:schemeClr val="lt1"/>
+          </a:fontRef>
+        </p:style>
+        <p:txBody>
+          <a:bodyPr rtlCol="0" anchor="ctr"/>
+          <a:lstStyle/>
+          <a:p>
+            <a:pPr algn="ctr"/>
+            <a:endParaRPr lang="en-US" sz="1000" dirty="0">
               <a:solidFill>
-                <a:schemeClr val="bg1">
-                  <a:lumMod val="65000"/>
-                </a:schemeClr>
+                <a:schemeClr val="tx1"/>
               </a:solidFill>
-            </a:ln>
-            <a:effectLst>
-              <a:outerShdw blurRad="50800" dist="38100" dir="2700000" algn="tl" rotWithShape="0">
-                <a:prstClr val="black">
-                  <a:alpha val="40000"/>
-                </a:prstClr>
-              </a:outerShdw>
-            </a:effectLst>
-          </p:spPr>
-          <p:style>
-            <a:lnRef idx="2">
-              <a:schemeClr val="accent1">
-                <a:shade val="50000"/>
+              <a:latin typeface="Arial" panose="020B0604020202020204" pitchFamily="34" charset="0"/>
+              <a:cs typeface="Arial" panose="020B0604020202020204" pitchFamily="34" charset="0"/>
+            </a:endParaRPr>
+          </a:p>
+        </p:txBody>
+      </p:sp>
+      <p:pic>
+        <p:nvPicPr>
+          <p:cNvPr id="904" name="Picture 8" descr="key"/>
+          <p:cNvPicPr>
+            <a:picLocks noChangeAspect="1" noChangeArrowheads="1"/>
+          </p:cNvPicPr>
+          <p:nvPr/>
+        </p:nvPicPr>
+        <p:blipFill>
+          <a:blip r:embed="rId4">
+            <a:extLst>
+              <a:ext uri="{BEBA8EAE-BF5A-486C-A8C5-ECC9F3942E4B}">
+                <a14:imgProps xmlns:a14="http://schemas.microsoft.com/office/drawing/2010/main">
+                  <a14:imgLayer r:embed="rId5">
+                    <a14:imgEffect>
+                      <a14:saturation sat="182000"/>
+                    </a14:imgEffect>
+                  </a14:imgLayer>
+                </a14:imgProps>
+              </a:ext>
+              <a:ext uri="{28A0092B-C50C-407E-A947-70E740481C1C}">
+                <a14:useLocalDpi xmlns:a14="http://schemas.microsoft.com/office/drawing/2010/main" val="0"/>
+              </a:ext>
+            </a:extLst>
+          </a:blip>
+          <a:srcRect/>
+          <a:stretch>
+            <a:fillRect/>
+          </a:stretch>
+        </p:blipFill>
+        <p:spPr bwMode="auto">
+          <a:xfrm>
+            <a:off x="7857095" y="541711"/>
+            <a:ext cx="360040" cy="356341"/>
+          </a:xfrm>
+          <a:prstGeom prst="rect">
+            <a:avLst/>
+          </a:prstGeom>
+          <a:noFill/>
+          <a:ln>
+            <a:noFill/>
+          </a:ln>
+          <a:extLst>
+            <a:ext uri="{909E8E84-426E-40DD-AFC4-6F175D3DCCD1}">
+              <a14:hiddenFill xmlns:a14="http://schemas.microsoft.com/office/drawing/2010/main">
+                <a:solidFill>
+                  <a:srgbClr val="FFFFFF"/>
+                </a:solidFill>
+              </a14:hiddenFill>
+            </a:ext>
+            <a:ext uri="{91240B29-F687-4F45-9708-019B960494DF}">
+              <a14:hiddenLine xmlns:a14="http://schemas.microsoft.com/office/drawing/2010/main" w="9525">
+                <a:solidFill>
+                  <a:srgbClr val="000000"/>
+                </a:solidFill>
+                <a:miter lim="800000"/>
+                <a:headEnd/>
+                <a:tailEnd/>
+              </a14:hiddenLine>
+            </a:ext>
+          </a:extLst>
+        </p:spPr>
+      </p:pic>
+      <p:pic>
+        <p:nvPicPr>
+          <p:cNvPr id="905" name="Picture 8" descr="key"/>
+          <p:cNvPicPr>
+            <a:picLocks noChangeAspect="1" noChangeArrowheads="1"/>
+          </p:cNvPicPr>
+          <p:nvPr/>
+        </p:nvPicPr>
+        <p:blipFill>
+          <a:blip r:embed="rId4">
+            <a:duotone>
+              <a:prstClr val="black"/>
+              <a:schemeClr val="accent3">
+                <a:tint val="45000"/>
+                <a:satMod val="400000"/>
               </a:schemeClr>
-            </a:lnRef>
-            <a:fillRef idx="1">
-              <a:schemeClr val="accent1"/>
-            </a:fillRef>
-            <a:effectRef idx="0">
-              <a:schemeClr val="accent1"/>
-            </a:effectRef>
-            <a:fontRef idx="minor">
-              <a:schemeClr val="lt1"/>
-            </a:fontRef>
-          </p:style>
-          <p:txBody>
-            <a:bodyPr rtlCol="0" anchor="ctr"/>
-            <a:lstStyle/>
-            <a:p>
-              <a:pPr algn="ctr"/>
-              <a:endParaRPr lang="en-US" sz="1000" dirty="0">
+            </a:duotone>
+            <a:extLst>
+              <a:ext uri="{BEBA8EAE-BF5A-486C-A8C5-ECC9F3942E4B}">
+                <a14:imgProps xmlns:a14="http://schemas.microsoft.com/office/drawing/2010/main">
+                  <a14:imgLayer r:embed="rId5">
+                    <a14:imgEffect>
+                      <a14:saturation sat="182000"/>
+                    </a14:imgEffect>
+                  </a14:imgLayer>
+                </a14:imgProps>
+              </a:ext>
+              <a:ext uri="{28A0092B-C50C-407E-A947-70E740481C1C}">
+                <a14:useLocalDpi xmlns:a14="http://schemas.microsoft.com/office/drawing/2010/main" val="0"/>
+              </a:ext>
+            </a:extLst>
+          </a:blip>
+          <a:srcRect/>
+          <a:stretch>
+            <a:fillRect/>
+          </a:stretch>
+        </p:blipFill>
+        <p:spPr bwMode="auto">
+          <a:xfrm>
+            <a:off x="7858681" y="867914"/>
+            <a:ext cx="360040" cy="356341"/>
+          </a:xfrm>
+          <a:prstGeom prst="rect">
+            <a:avLst/>
+          </a:prstGeom>
+          <a:noFill/>
+          <a:ln>
+            <a:noFill/>
+          </a:ln>
+          <a:extLst>
+            <a:ext uri="{909E8E84-426E-40DD-AFC4-6F175D3DCCD1}">
+              <a14:hiddenFill xmlns:a14="http://schemas.microsoft.com/office/drawing/2010/main">
                 <a:solidFill>
-                  <a:schemeClr val="tx1"/>
+                  <a:srgbClr val="FFFFFF"/>
                 </a:solidFill>
+              </a14:hiddenFill>
+            </a:ext>
+            <a:ext uri="{91240B29-F687-4F45-9708-019B960494DF}">
+              <a14:hiddenLine xmlns:a14="http://schemas.microsoft.com/office/drawing/2010/main" w="9525">
+                <a:solidFill>
+                  <a:srgbClr val="000000"/>
+                </a:solidFill>
+                <a:miter lim="800000"/>
+                <a:headEnd/>
+                <a:tailEnd/>
+              </a14:hiddenLine>
+            </a:ext>
+          </a:extLst>
+        </p:spPr>
+      </p:pic>
+      <p:sp>
+        <p:nvSpPr>
+          <p:cNvPr id="906" name="TextBox 905"/>
+          <p:cNvSpPr txBox="1"/>
+          <p:nvPr/>
+        </p:nvSpPr>
+        <p:spPr>
+          <a:xfrm>
+            <a:off x="8173528" y="497332"/>
+            <a:ext cx="1071127" cy="400110"/>
+          </a:xfrm>
+          <a:prstGeom prst="rect">
+            <a:avLst/>
+          </a:prstGeom>
+          <a:noFill/>
+        </p:spPr>
+        <p:txBody>
+          <a:bodyPr wrap="none" rtlCol="0">
+            <a:spAutoFit/>
+          </a:bodyPr>
+          <a:lstStyle/>
+          <a:p>
+            <a:r>
+              <a:rPr lang="en-US" sz="1000" dirty="0" smtClean="0">
                 <a:latin typeface="Arial" panose="020B0604020202020204" pitchFamily="34" charset="0"/>
                 <a:cs typeface="Arial" panose="020B0604020202020204" pitchFamily="34" charset="0"/>
-              </a:endParaRPr>
-            </a:p>
-          </p:txBody>
-        </p:sp>
-        <p:pic>
-          <p:nvPicPr>
-            <p:cNvPr id="904" name="Picture 8" descr="key"/>
-            <p:cNvPicPr>
-              <a:picLocks noChangeAspect="1" noChangeArrowheads="1"/>
-            </p:cNvPicPr>
-            <p:nvPr/>
-          </p:nvPicPr>
-          <p:blipFill>
-            <a:blip r:embed="rId4">
-              <a:extLst>
-                <a:ext uri="{BEBA8EAE-BF5A-486C-A8C5-ECC9F3942E4B}">
-                  <a14:imgProps xmlns:a14="http://schemas.microsoft.com/office/drawing/2010/main">
-                    <a14:imgLayer r:embed="rId5">
-                      <a14:imgEffect>
-                        <a14:saturation sat="182000"/>
-                      </a14:imgEffect>
-                    </a14:imgLayer>
-                  </a14:imgProps>
-                </a:ext>
-                <a:ext uri="{28A0092B-C50C-407E-A947-70E740481C1C}">
-                  <a14:useLocalDpi xmlns:a14="http://schemas.microsoft.com/office/drawing/2010/main" val="0"/>
-                </a:ext>
-              </a:extLst>
-            </a:blip>
-            <a:srcRect/>
-            <a:stretch>
-              <a:fillRect/>
-            </a:stretch>
-          </p:blipFill>
-          <p:spPr bwMode="auto">
-            <a:xfrm>
-              <a:off x="7308304" y="1502687"/>
-              <a:ext cx="360040" cy="356341"/>
-            </a:xfrm>
-            <a:prstGeom prst="rect">
-              <a:avLst/>
-            </a:prstGeom>
-            <a:noFill/>
-            <a:ln>
-              <a:noFill/>
-            </a:ln>
-            <a:extLst>
-              <a:ext uri="{909E8E84-426E-40DD-AFC4-6F175D3DCCD1}">
-                <a14:hiddenFill xmlns:a14="http://schemas.microsoft.com/office/drawing/2010/main">
-                  <a:solidFill>
-                    <a:srgbClr val="FFFFFF"/>
-                  </a:solidFill>
-                </a14:hiddenFill>
-              </a:ext>
-              <a:ext uri="{91240B29-F687-4F45-9708-019B960494DF}">
-                <a14:hiddenLine xmlns:a14="http://schemas.microsoft.com/office/drawing/2010/main" w="9525">
-                  <a:solidFill>
-                    <a:srgbClr val="000000"/>
-                  </a:solidFill>
-                  <a:miter lim="800000"/>
-                  <a:headEnd/>
-                  <a:tailEnd/>
-                </a14:hiddenLine>
-              </a:ext>
-            </a:extLst>
-          </p:spPr>
-        </p:pic>
-        <p:pic>
-          <p:nvPicPr>
-            <p:cNvPr id="905" name="Picture 8" descr="key"/>
-            <p:cNvPicPr>
-              <a:picLocks noChangeAspect="1" noChangeArrowheads="1"/>
-            </p:cNvPicPr>
-            <p:nvPr/>
-          </p:nvPicPr>
-          <p:blipFill>
-            <a:blip r:embed="rId4">
-              <a:duotone>
-                <a:prstClr val="black"/>
-                <a:schemeClr val="accent3">
-                  <a:tint val="45000"/>
-                  <a:satMod val="400000"/>
-                </a:schemeClr>
-              </a:duotone>
-              <a:extLst>
-                <a:ext uri="{BEBA8EAE-BF5A-486C-A8C5-ECC9F3942E4B}">
-                  <a14:imgProps xmlns:a14="http://schemas.microsoft.com/office/drawing/2010/main">
-                    <a14:imgLayer r:embed="rId5">
-                      <a14:imgEffect>
-                        <a14:saturation sat="182000"/>
-                      </a14:imgEffect>
-                    </a14:imgLayer>
-                  </a14:imgProps>
-                </a:ext>
-                <a:ext uri="{28A0092B-C50C-407E-A947-70E740481C1C}">
-                  <a14:useLocalDpi xmlns:a14="http://schemas.microsoft.com/office/drawing/2010/main" val="0"/>
-                </a:ext>
-              </a:extLst>
-            </a:blip>
-            <a:srcRect/>
-            <a:stretch>
-              <a:fillRect/>
-            </a:stretch>
-          </p:blipFill>
-          <p:spPr bwMode="auto">
-            <a:xfrm>
-              <a:off x="7309890" y="1828890"/>
-              <a:ext cx="360040" cy="356341"/>
-            </a:xfrm>
-            <a:prstGeom prst="rect">
-              <a:avLst/>
-            </a:prstGeom>
-            <a:noFill/>
-            <a:ln>
-              <a:noFill/>
-            </a:ln>
-            <a:extLst>
-              <a:ext uri="{909E8E84-426E-40DD-AFC4-6F175D3DCCD1}">
-                <a14:hiddenFill xmlns:a14="http://schemas.microsoft.com/office/drawing/2010/main">
-                  <a:solidFill>
-                    <a:srgbClr val="FFFFFF"/>
-                  </a:solidFill>
-                </a14:hiddenFill>
-              </a:ext>
-              <a:ext uri="{91240B29-F687-4F45-9708-019B960494DF}">
-                <a14:hiddenLine xmlns:a14="http://schemas.microsoft.com/office/drawing/2010/main" w="9525">
-                  <a:solidFill>
-                    <a:srgbClr val="000000"/>
-                  </a:solidFill>
-                  <a:miter lim="800000"/>
-                  <a:headEnd/>
-                  <a:tailEnd/>
-                </a14:hiddenLine>
-              </a:ext>
-            </a:extLst>
-          </p:spPr>
-        </p:pic>
-        <p:sp>
-          <p:nvSpPr>
-            <p:cNvPr id="906" name="TextBox 905"/>
-            <p:cNvSpPr txBox="1"/>
-            <p:nvPr/>
-          </p:nvSpPr>
-          <p:spPr>
-            <a:xfrm>
-              <a:off x="7624737" y="1458308"/>
-              <a:ext cx="1071127" cy="400110"/>
-            </a:xfrm>
-            <a:prstGeom prst="rect">
-              <a:avLst/>
-            </a:prstGeom>
-            <a:noFill/>
-          </p:spPr>
-          <p:txBody>
-            <a:bodyPr wrap="none" rtlCol="0">
-              <a:spAutoFit/>
-            </a:bodyPr>
-            <a:lstStyle/>
-            <a:p>
-              <a:r>
-                <a:rPr lang="en-US" sz="1000" dirty="0" smtClean="0">
-                  <a:latin typeface="Arial" panose="020B0604020202020204" pitchFamily="34" charset="0"/>
-                  <a:cs typeface="Arial" panose="020B0604020202020204" pitchFamily="34" charset="0"/>
-                </a:rPr>
-                <a:t>Authorization</a:t>
-              </a:r>
-              <a:br>
-                <a:rPr lang="en-US" sz="1000" dirty="0" smtClean="0">
-                  <a:latin typeface="Arial" panose="020B0604020202020204" pitchFamily="34" charset="0"/>
-                  <a:cs typeface="Arial" panose="020B0604020202020204" pitchFamily="34" charset="0"/>
-                </a:rPr>
-              </a:br>
-              <a:r>
-                <a:rPr lang="en-US" sz="1000" dirty="0" smtClean="0">
-                  <a:latin typeface="Arial" panose="020B0604020202020204" pitchFamily="34" charset="0"/>
-                  <a:cs typeface="Arial" panose="020B0604020202020204" pitchFamily="34" charset="0"/>
-                </a:rPr>
-                <a:t>(</a:t>
-              </a:r>
-              <a:r>
-                <a:rPr lang="en-US" sz="1000" i="1" dirty="0" smtClean="0">
-                  <a:latin typeface="Arial" panose="020B0604020202020204" pitchFamily="34" charset="0"/>
-                  <a:cs typeface="Arial" panose="020B0604020202020204" pitchFamily="34" charset="0"/>
-                </a:rPr>
-                <a:t>Signature</a:t>
-              </a:r>
-              <a:r>
-                <a:rPr lang="en-US" sz="1000" dirty="0" smtClean="0">
-                  <a:latin typeface="Arial" panose="020B0604020202020204" pitchFamily="34" charset="0"/>
-                  <a:cs typeface="Arial" panose="020B0604020202020204" pitchFamily="34" charset="0"/>
-                </a:rPr>
-                <a:t>) Key</a:t>
-              </a:r>
-              <a:endParaRPr lang="en-US" sz="1000" dirty="0">
+              </a:rPr>
+              <a:t>Authorization</a:t>
+            </a:r>
+            <a:br>
+              <a:rPr lang="en-US" sz="1000" dirty="0" smtClean="0">
                 <a:latin typeface="Arial" panose="020B0604020202020204" pitchFamily="34" charset="0"/>
                 <a:cs typeface="Arial" panose="020B0604020202020204" pitchFamily="34" charset="0"/>
-              </a:endParaRPr>
-            </a:p>
-          </p:txBody>
-        </p:sp>
-        <p:sp>
-          <p:nvSpPr>
-            <p:cNvPr id="907" name="TextBox 906"/>
-            <p:cNvSpPr txBox="1"/>
-            <p:nvPr/>
-          </p:nvSpPr>
-          <p:spPr>
-            <a:xfrm>
-              <a:off x="7641778" y="1816813"/>
-              <a:ext cx="822661" cy="400110"/>
-            </a:xfrm>
-            <a:prstGeom prst="rect">
-              <a:avLst/>
-            </a:prstGeom>
-            <a:noFill/>
-          </p:spPr>
-          <p:txBody>
-            <a:bodyPr wrap="none" rtlCol="0">
-              <a:spAutoFit/>
-            </a:bodyPr>
-            <a:lstStyle/>
-            <a:p>
-              <a:r>
-                <a:rPr lang="en-US" sz="1000" dirty="0" smtClean="0">
-                  <a:latin typeface="Arial" panose="020B0604020202020204" pitchFamily="34" charset="0"/>
-                  <a:cs typeface="Arial" panose="020B0604020202020204" pitchFamily="34" charset="0"/>
-                </a:rPr>
-                <a:t>Encryption </a:t>
-              </a:r>
-              <a:br>
-                <a:rPr lang="en-US" sz="1000" dirty="0" smtClean="0">
-                  <a:latin typeface="Arial" panose="020B0604020202020204" pitchFamily="34" charset="0"/>
-                  <a:cs typeface="Arial" panose="020B0604020202020204" pitchFamily="34" charset="0"/>
-                </a:rPr>
-              </a:br>
-              <a:r>
-                <a:rPr lang="en-US" sz="1000" i="1" dirty="0" smtClean="0">
-                  <a:latin typeface="Arial" panose="020B0604020202020204" pitchFamily="34" charset="0"/>
-                  <a:cs typeface="Arial" panose="020B0604020202020204" pitchFamily="34" charset="0"/>
-                </a:rPr>
-                <a:t>Public</a:t>
-              </a:r>
-              <a:r>
-                <a:rPr lang="en-US" sz="1000" dirty="0" smtClean="0">
-                  <a:latin typeface="Arial" panose="020B0604020202020204" pitchFamily="34" charset="0"/>
-                  <a:cs typeface="Arial" panose="020B0604020202020204" pitchFamily="34" charset="0"/>
-                </a:rPr>
-                <a:t> Key</a:t>
-              </a:r>
-              <a:endParaRPr lang="en-US" sz="1000" dirty="0">
+              </a:rPr>
+            </a:br>
+            <a:r>
+              <a:rPr lang="en-US" sz="1000" dirty="0" smtClean="0">
                 <a:latin typeface="Arial" panose="020B0604020202020204" pitchFamily="34" charset="0"/>
                 <a:cs typeface="Arial" panose="020B0604020202020204" pitchFamily="34" charset="0"/>
-              </a:endParaRPr>
-            </a:p>
-          </p:txBody>
-        </p:sp>
-        <p:sp>
-          <p:nvSpPr>
-            <p:cNvPr id="908" name="TextBox 907"/>
-            <p:cNvSpPr txBox="1"/>
-            <p:nvPr/>
-          </p:nvSpPr>
-          <p:spPr>
-            <a:xfrm>
-              <a:off x="7352890" y="2198752"/>
-              <a:ext cx="1414170" cy="1015663"/>
-            </a:xfrm>
-            <a:prstGeom prst="rect">
-              <a:avLst/>
-            </a:prstGeom>
-            <a:noFill/>
-          </p:spPr>
-          <p:txBody>
-            <a:bodyPr wrap="none" rtlCol="0">
-              <a:spAutoFit/>
-            </a:bodyPr>
-            <a:lstStyle/>
-            <a:p>
-              <a:pPr marL="171450" indent="-171450">
-                <a:buFont typeface="Arial" panose="020B0604020202020204" pitchFamily="34" charset="0"/>
-                <a:buChar char="•"/>
-              </a:pPr>
-              <a:r>
-                <a:rPr lang="en-US" sz="1000" dirty="0" smtClean="0">
-                  <a:latin typeface="Arial" panose="020B0604020202020204" pitchFamily="34" charset="0"/>
-                  <a:cs typeface="Arial" panose="020B0604020202020204" pitchFamily="34" charset="0"/>
-                </a:rPr>
-                <a:t>Payment Method</a:t>
-              </a:r>
-            </a:p>
-            <a:p>
-              <a:pPr marL="171450" indent="-171450">
-                <a:buFont typeface="Arial" panose="020B0604020202020204" pitchFamily="34" charset="0"/>
-                <a:buChar char="•"/>
-              </a:pPr>
-              <a:r>
-                <a:rPr lang="en-US" sz="1000" dirty="0" smtClean="0">
-                  <a:latin typeface="Arial" panose="020B0604020202020204" pitchFamily="34" charset="0"/>
-                  <a:cs typeface="Arial" panose="020B0604020202020204" pitchFamily="34" charset="0"/>
-                </a:rPr>
-                <a:t>URL to User Bank</a:t>
-              </a:r>
-            </a:p>
-            <a:p>
-              <a:pPr marL="171450" indent="-171450">
-                <a:buFont typeface="Arial" panose="020B0604020202020204" pitchFamily="34" charset="0"/>
-                <a:buChar char="•"/>
-              </a:pPr>
-              <a:r>
-                <a:rPr lang="en-US" sz="1000" dirty="0" smtClean="0">
-                  <a:latin typeface="Arial" panose="020B0604020202020204" pitchFamily="34" charset="0"/>
-                  <a:cs typeface="Arial" panose="020B0604020202020204" pitchFamily="34" charset="0"/>
-                </a:rPr>
-                <a:t>User Account ID</a:t>
-              </a:r>
-            </a:p>
-            <a:p>
-              <a:pPr marL="171450" indent="-171450">
-                <a:buFont typeface="Arial" panose="020B0604020202020204" pitchFamily="34" charset="0"/>
-                <a:buChar char="•"/>
-              </a:pPr>
-              <a:r>
-                <a:rPr lang="en-US" sz="1000" dirty="0" smtClean="0">
-                  <a:latin typeface="Arial" panose="020B0604020202020204" pitchFamily="34" charset="0"/>
-                  <a:cs typeface="Arial" panose="020B0604020202020204" pitchFamily="34" charset="0"/>
-                </a:rPr>
-                <a:t>PIN</a:t>
-              </a:r>
-            </a:p>
-            <a:p>
-              <a:pPr marL="171450" indent="-171450">
-                <a:buFont typeface="Arial" panose="020B0604020202020204" pitchFamily="34" charset="0"/>
-                <a:buChar char="•"/>
-              </a:pPr>
-              <a:r>
-                <a:rPr lang="en-US" sz="1000" dirty="0" smtClean="0">
-                  <a:latin typeface="Arial" panose="020B0604020202020204" pitchFamily="34" charset="0"/>
-                  <a:cs typeface="Arial" panose="020B0604020202020204" pitchFamily="34" charset="0"/>
-                </a:rPr>
-                <a:t>Card Logotype</a:t>
-              </a:r>
-            </a:p>
-            <a:p>
-              <a:pPr marL="171450" indent="-171450">
-                <a:buFont typeface="Arial" panose="020B0604020202020204" pitchFamily="34" charset="0"/>
-                <a:buChar char="•"/>
-              </a:pPr>
-              <a:r>
-                <a:rPr lang="en-US" sz="1000" dirty="0" smtClean="0">
-                  <a:latin typeface="Arial" panose="020B0604020202020204" pitchFamily="34" charset="0"/>
-                  <a:cs typeface="Arial" panose="020B0604020202020204" pitchFamily="34" charset="0"/>
-                </a:rPr>
-                <a:t>…</a:t>
-              </a:r>
-              <a:endParaRPr lang="en-US" sz="1000" dirty="0">
+              </a:rPr>
+              <a:t>(</a:t>
+            </a:r>
+            <a:r>
+              <a:rPr lang="en-US" sz="1000" i="1" dirty="0" smtClean="0">
                 <a:latin typeface="Arial" panose="020B0604020202020204" pitchFamily="34" charset="0"/>
                 <a:cs typeface="Arial" panose="020B0604020202020204" pitchFamily="34" charset="0"/>
-              </a:endParaRPr>
-            </a:p>
-          </p:txBody>
-        </p:sp>
-      </p:grpSp>
+              </a:rPr>
+              <a:t>Signature</a:t>
+            </a:r>
+            <a:r>
+              <a:rPr lang="en-US" sz="1000" dirty="0" smtClean="0">
+                <a:latin typeface="Arial" panose="020B0604020202020204" pitchFamily="34" charset="0"/>
+                <a:cs typeface="Arial" panose="020B0604020202020204" pitchFamily="34" charset="0"/>
+              </a:rPr>
+              <a:t>) Key</a:t>
+            </a:r>
+            <a:endParaRPr lang="en-US" sz="1000" dirty="0">
+              <a:latin typeface="Arial" panose="020B0604020202020204" pitchFamily="34" charset="0"/>
+              <a:cs typeface="Arial" panose="020B0604020202020204" pitchFamily="34" charset="0"/>
+            </a:endParaRPr>
+          </a:p>
+        </p:txBody>
+      </p:sp>
+      <p:sp>
+        <p:nvSpPr>
+          <p:cNvPr id="907" name="TextBox 906"/>
+          <p:cNvSpPr txBox="1"/>
+          <p:nvPr/>
+        </p:nvSpPr>
+        <p:spPr>
+          <a:xfrm>
+            <a:off x="8190569" y="855837"/>
+            <a:ext cx="822661" cy="400110"/>
+          </a:xfrm>
+          <a:prstGeom prst="rect">
+            <a:avLst/>
+          </a:prstGeom>
+          <a:noFill/>
+        </p:spPr>
+        <p:txBody>
+          <a:bodyPr wrap="none" rtlCol="0">
+            <a:spAutoFit/>
+          </a:bodyPr>
+          <a:lstStyle/>
+          <a:p>
+            <a:r>
+              <a:rPr lang="en-US" sz="1000" dirty="0" smtClean="0">
+                <a:latin typeface="Arial" panose="020B0604020202020204" pitchFamily="34" charset="0"/>
+                <a:cs typeface="Arial" panose="020B0604020202020204" pitchFamily="34" charset="0"/>
+              </a:rPr>
+              <a:t>Encryption </a:t>
+            </a:r>
+            <a:br>
+              <a:rPr lang="en-US" sz="1000" dirty="0" smtClean="0">
+                <a:latin typeface="Arial" panose="020B0604020202020204" pitchFamily="34" charset="0"/>
+                <a:cs typeface="Arial" panose="020B0604020202020204" pitchFamily="34" charset="0"/>
+              </a:rPr>
+            </a:br>
+            <a:r>
+              <a:rPr lang="en-US" sz="1000" i="1" dirty="0" smtClean="0">
+                <a:latin typeface="Arial" panose="020B0604020202020204" pitchFamily="34" charset="0"/>
+                <a:cs typeface="Arial" panose="020B0604020202020204" pitchFamily="34" charset="0"/>
+              </a:rPr>
+              <a:t>Public</a:t>
+            </a:r>
+            <a:r>
+              <a:rPr lang="en-US" sz="1000" dirty="0" smtClean="0">
+                <a:latin typeface="Arial" panose="020B0604020202020204" pitchFamily="34" charset="0"/>
+                <a:cs typeface="Arial" panose="020B0604020202020204" pitchFamily="34" charset="0"/>
+              </a:rPr>
+              <a:t> Key</a:t>
+            </a:r>
+            <a:endParaRPr lang="en-US" sz="1000" dirty="0">
+              <a:latin typeface="Arial" panose="020B0604020202020204" pitchFamily="34" charset="0"/>
+              <a:cs typeface="Arial" panose="020B0604020202020204" pitchFamily="34" charset="0"/>
+            </a:endParaRPr>
+          </a:p>
+        </p:txBody>
+      </p:sp>
+      <p:sp>
+        <p:nvSpPr>
+          <p:cNvPr id="908" name="TextBox 907"/>
+          <p:cNvSpPr txBox="1"/>
+          <p:nvPr/>
+        </p:nvSpPr>
+        <p:spPr>
+          <a:xfrm>
+            <a:off x="7901681" y="1237776"/>
+            <a:ext cx="1386918" cy="861774"/>
+          </a:xfrm>
+          <a:prstGeom prst="rect">
+            <a:avLst/>
+          </a:prstGeom>
+          <a:noFill/>
+        </p:spPr>
+        <p:txBody>
+          <a:bodyPr wrap="none" rtlCol="0">
+            <a:spAutoFit/>
+          </a:bodyPr>
+          <a:lstStyle/>
+          <a:p>
+            <a:pPr marL="171450" indent="-171450">
+              <a:buFont typeface="Arial" panose="020B0604020202020204" pitchFamily="34" charset="0"/>
+              <a:buChar char="•"/>
+            </a:pPr>
+            <a:r>
+              <a:rPr lang="en-US" sz="1000" dirty="0" smtClean="0">
+                <a:latin typeface="Arial" panose="020B0604020202020204" pitchFamily="34" charset="0"/>
+                <a:cs typeface="Arial" panose="020B0604020202020204" pitchFamily="34" charset="0"/>
+              </a:rPr>
+              <a:t>Payment Method</a:t>
+            </a:r>
+          </a:p>
+          <a:p>
+            <a:pPr marL="171450" indent="-171450">
+              <a:buFont typeface="Arial" panose="020B0604020202020204" pitchFamily="34" charset="0"/>
+              <a:buChar char="•"/>
+            </a:pPr>
+            <a:r>
+              <a:rPr lang="en-US" sz="1000" dirty="0" smtClean="0">
+                <a:latin typeface="Arial" panose="020B0604020202020204" pitchFamily="34" charset="0"/>
+                <a:cs typeface="Arial" panose="020B0604020202020204" pitchFamily="34" charset="0"/>
+              </a:rPr>
+              <a:t>URL to User Bank</a:t>
+            </a:r>
+          </a:p>
+          <a:p>
+            <a:pPr marL="171450" indent="-171450">
+              <a:buFont typeface="Arial" panose="020B0604020202020204" pitchFamily="34" charset="0"/>
+              <a:buChar char="•"/>
+            </a:pPr>
+            <a:r>
+              <a:rPr lang="en-US" sz="1000" dirty="0" smtClean="0">
+                <a:latin typeface="Arial" panose="020B0604020202020204" pitchFamily="34" charset="0"/>
+                <a:cs typeface="Arial" panose="020B0604020202020204" pitchFamily="34" charset="0"/>
+              </a:rPr>
+              <a:t>User Account </a:t>
+            </a:r>
+            <a:r>
+              <a:rPr lang="en-US" sz="1000" dirty="0" smtClean="0">
+                <a:latin typeface="Arial" panose="020B0604020202020204" pitchFamily="34" charset="0"/>
+                <a:cs typeface="Arial" panose="020B0604020202020204" pitchFamily="34" charset="0"/>
+              </a:rPr>
+              <a:t>ID</a:t>
+            </a:r>
+            <a:endParaRPr lang="en-US" sz="1000" dirty="0" smtClean="0">
+              <a:latin typeface="Arial" panose="020B0604020202020204" pitchFamily="34" charset="0"/>
+              <a:cs typeface="Arial" panose="020B0604020202020204" pitchFamily="34" charset="0"/>
+            </a:endParaRPr>
+          </a:p>
+          <a:p>
+            <a:pPr marL="171450" indent="-171450">
+              <a:buFont typeface="Arial" panose="020B0604020202020204" pitchFamily="34" charset="0"/>
+              <a:buChar char="•"/>
+            </a:pPr>
+            <a:r>
+              <a:rPr lang="en-US" sz="1000" dirty="0" smtClean="0">
+                <a:latin typeface="Arial" panose="020B0604020202020204" pitchFamily="34" charset="0"/>
+                <a:cs typeface="Arial" panose="020B0604020202020204" pitchFamily="34" charset="0"/>
+              </a:rPr>
+              <a:t>Card Logotype</a:t>
+            </a:r>
+          </a:p>
+          <a:p>
+            <a:pPr marL="171450" indent="-171450">
+              <a:buFont typeface="Arial" panose="020B0604020202020204" pitchFamily="34" charset="0"/>
+              <a:buChar char="•"/>
+            </a:pPr>
+            <a:r>
+              <a:rPr lang="en-US" sz="1000" dirty="0" smtClean="0">
+                <a:latin typeface="Arial" panose="020B0604020202020204" pitchFamily="34" charset="0"/>
+                <a:cs typeface="Arial" panose="020B0604020202020204" pitchFamily="34" charset="0"/>
+              </a:rPr>
+              <a:t>…</a:t>
+            </a:r>
+            <a:endParaRPr lang="en-US" sz="1000" dirty="0">
+              <a:latin typeface="Arial" panose="020B0604020202020204" pitchFamily="34" charset="0"/>
+              <a:cs typeface="Arial" panose="020B0604020202020204" pitchFamily="34" charset="0"/>
+            </a:endParaRPr>
+          </a:p>
+        </p:txBody>
+      </p:sp>
       <p:grpSp>
         <p:nvGrpSpPr>
           <p:cNvPr id="909" name="Group 908"/>
@@ -27955,7 +27838,7 @@
               <a:avLst/>
             </a:prstGeom>
             <a:blipFill>
-              <a:blip r:embed="rId7"/>
+              <a:blip r:embed="rId6"/>
               <a:tile tx="0" ty="0" sx="50000" sy="50000" flip="none" algn="tl"/>
             </a:blipFill>
             <a:ln w="6350">
@@ -28335,7 +28218,7 @@
               <a:rPr lang="en-US" sz="1000" dirty="0" smtClean="0">
                 <a:latin typeface="Arial" panose="020B0604020202020204" pitchFamily="34" charset="0"/>
                 <a:cs typeface="Arial" panose="020B0604020202020204" pitchFamily="34" charset="0"/>
-                <a:hlinkClick r:id="rId8"/>
+                <a:hlinkClick r:id="rId7"/>
               </a:rPr>
               <a:t>Authority Objects</a:t>
             </a:r>
@@ -28374,7 +28257,7 @@
                 <a:latin typeface="Arial" panose="020B0604020202020204" pitchFamily="34" charset="0"/>
                 <a:cs typeface="Arial" panose="020B0604020202020204" pitchFamily="34" charset="0"/>
               </a:rPr>
-              <a:t>V0.72, </a:t>
+              <a:t>V0.73, </a:t>
             </a:r>
             <a:r>
               <a:rPr lang="en-US" sz="800" dirty="0" err="1">
@@ -28395,7 +28278,7 @@
                 <a:latin typeface="Arial" panose="020B0604020202020204" pitchFamily="34" charset="0"/>
                 <a:cs typeface="Arial" panose="020B0604020202020204" pitchFamily="34" charset="0"/>
               </a:rPr>
-              <a:t>2020-02-03</a:t>
+              <a:t>2020-04-17</a:t>
             </a:r>
             <a:endParaRPr lang="en-US" sz="800" dirty="0">
               <a:latin typeface="Arial" panose="020B0604020202020204" pitchFamily="34" charset="0"/>
@@ -28613,7 +28496,7 @@
           <p:nvPr/>
         </p:nvPicPr>
         <p:blipFill>
-          <a:blip r:embed="rId9" cstate="print">
+          <a:blip r:embed="rId8" cstate="print">
             <a:extLst>
               <a:ext uri="{28A0092B-C50C-407E-A947-70E740481C1C}">
                 <a14:useLocalDpi xmlns:a14="http://schemas.microsoft.com/office/drawing/2010/main" val="0"/>
@@ -29615,7 +29498,7 @@
         </p:nvSpPr>
         <p:spPr>
           <a:xfrm>
-            <a:off x="8838837" y="4644558"/>
+            <a:off x="8759709" y="4644558"/>
             <a:ext cx="729687" cy="400110"/>
           </a:xfrm>
           <a:prstGeom prst="rect">
@@ -29922,7 +29805,7 @@
           <p:nvPr/>
         </p:nvPicPr>
         <p:blipFill>
-          <a:blip r:embed="rId10" cstate="print">
+          <a:blip r:embed="rId9" cstate="print">
             <a:extLst>
               <a:ext uri="{28A0092B-C50C-407E-A947-70E740481C1C}">
                 <a14:useLocalDpi xmlns:a14="http://schemas.microsoft.com/office/drawing/2010/main" val="0"/>
@@ -30043,7 +29926,7 @@
           <p:nvPr/>
         </p:nvPicPr>
         <p:blipFill>
-          <a:blip r:embed="rId11" cstate="print">
+          <a:blip r:embed="rId10" cstate="print">
             <a:extLst>
               <a:ext uri="{28A0092B-C50C-407E-A947-70E740481C1C}">
                 <a14:useLocalDpi xmlns:a14="http://schemas.microsoft.com/office/drawing/2010/main" val="0"/>
@@ -30080,7 +29963,7 @@
           <p:nvPr/>
         </p:nvPicPr>
         <p:blipFill>
-          <a:blip r:embed="rId11" cstate="print">
+          <a:blip r:embed="rId10" cstate="print">
             <a:extLst>
               <a:ext uri="{28A0092B-C50C-407E-A947-70E740481C1C}">
                 <a14:useLocalDpi xmlns:a14="http://schemas.microsoft.com/office/drawing/2010/main" val="0"/>
@@ -31531,8 +31414,8 @@
         </p:nvCxnSpPr>
         <p:spPr>
           <a:xfrm>
-            <a:off x="5855436" y="2585609"/>
-            <a:ext cx="288000" cy="254514"/>
+            <a:off x="5855437" y="2585609"/>
+            <a:ext cx="336399" cy="254514"/>
           </a:xfrm>
           <a:prstGeom prst="straightConnector1">
             <a:avLst/>
@@ -31608,7 +31491,7 @@
           <p:nvPr/>
         </p:nvPicPr>
         <p:blipFill>
-          <a:blip r:embed="rId12">
+          <a:blip r:embed="rId11">
             <a:duotone>
               <a:prstClr val="black"/>
               <a:srgbClr val="D9C3A5">
@@ -32414,6 +32297,397 @@
           </a:fontRef>
         </p:style>
       </p:cxnSp>
+      <p:grpSp>
+        <p:nvGrpSpPr>
+          <p:cNvPr id="173" name="Group 172"/>
+          <p:cNvGrpSpPr/>
+          <p:nvPr/>
+        </p:nvGrpSpPr>
+        <p:grpSpPr>
+          <a:xfrm>
+            <a:off x="6382321" y="501824"/>
+            <a:ext cx="357790" cy="502719"/>
+            <a:chOff x="4671633" y="1375561"/>
+            <a:chExt cx="357790" cy="502719"/>
+          </a:xfrm>
+          <a:effectLst>
+            <a:outerShdw blurRad="50800" dist="38100" dir="2700000" algn="tl" rotWithShape="0">
+              <a:prstClr val="black">
+                <a:alpha val="40000"/>
+              </a:prstClr>
+            </a:outerShdw>
+          </a:effectLst>
+        </p:grpSpPr>
+        <p:sp>
+          <p:nvSpPr>
+            <p:cNvPr id="174" name="Rectangle 173"/>
+            <p:cNvSpPr/>
+            <p:nvPr/>
+          </p:nvSpPr>
+          <p:spPr>
+            <a:xfrm>
+              <a:off x="4718398" y="1415566"/>
+              <a:ext cx="250037" cy="418920"/>
+            </a:xfrm>
+            <a:prstGeom prst="rect">
+              <a:avLst/>
+            </a:prstGeom>
+            <a:solidFill>
+              <a:schemeClr val="bg1"/>
+            </a:solidFill>
+            <a:ln>
+              <a:noFill/>
+            </a:ln>
+          </p:spPr>
+          <p:style>
+            <a:lnRef idx="2">
+              <a:schemeClr val="accent1">
+                <a:shade val="50000"/>
+              </a:schemeClr>
+            </a:lnRef>
+            <a:fillRef idx="1">
+              <a:schemeClr val="accent1"/>
+            </a:fillRef>
+            <a:effectRef idx="0">
+              <a:schemeClr val="accent1"/>
+            </a:effectRef>
+            <a:fontRef idx="minor">
+              <a:schemeClr val="lt1"/>
+            </a:fontRef>
+          </p:style>
+          <p:txBody>
+            <a:bodyPr rtlCol="0" anchor="ctr"/>
+            <a:lstStyle/>
+            <a:p>
+              <a:pPr algn="ctr"/>
+              <a:endParaRPr lang="en-US"/>
+            </a:p>
+          </p:txBody>
+        </p:sp>
+        <p:pic>
+          <p:nvPicPr>
+            <p:cNvPr id="175" name="Picture 4" descr="C:\Users\Anders\AppData\Local\Microsoft\Windows\INetCache\IE\YM8GPEOA\mobile[1].png"/>
+            <p:cNvPicPr>
+              <a:picLocks noChangeAspect="1" noChangeArrowheads="1"/>
+            </p:cNvPicPr>
+            <p:nvPr/>
+          </p:nvPicPr>
+          <p:blipFill>
+            <a:blip r:embed="rId12" cstate="print">
+              <a:extLst>
+                <a:ext uri="{28A0092B-C50C-407E-A947-70E740481C1C}">
+                  <a14:useLocalDpi xmlns:a14="http://schemas.microsoft.com/office/drawing/2010/main" val="0"/>
+                </a:ext>
+              </a:extLst>
+            </a:blip>
+            <a:srcRect/>
+            <a:stretch>
+              <a:fillRect/>
+            </a:stretch>
+          </p:blipFill>
+          <p:spPr bwMode="auto">
+            <a:xfrm rot="10800000">
+              <a:off x="4673596" y="1375561"/>
+              <a:ext cx="355673" cy="502719"/>
+            </a:xfrm>
+            <a:prstGeom prst="rect">
+              <a:avLst/>
+            </a:prstGeom>
+            <a:noFill/>
+            <a:effectLst/>
+            <a:extLst>
+              <a:ext uri="{909E8E84-426E-40DD-AFC4-6F175D3DCCD1}">
+                <a14:hiddenFill xmlns:a14="http://schemas.microsoft.com/office/drawing/2010/main">
+                  <a:solidFill>
+                    <a:srgbClr val="FFFFFF"/>
+                  </a:solidFill>
+                </a14:hiddenFill>
+              </a:ext>
+            </a:extLst>
+          </p:spPr>
+        </p:pic>
+        <p:sp>
+          <p:nvSpPr>
+            <p:cNvPr id="176" name="TextBox 175"/>
+            <p:cNvSpPr txBox="1"/>
+            <p:nvPr/>
+          </p:nvSpPr>
+          <p:spPr>
+            <a:xfrm>
+              <a:off x="4671633" y="1457193"/>
+              <a:ext cx="357790" cy="184666"/>
+            </a:xfrm>
+            <a:prstGeom prst="rect">
+              <a:avLst/>
+            </a:prstGeom>
+            <a:noFill/>
+          </p:spPr>
+          <p:txBody>
+            <a:bodyPr wrap="none" rtlCol="0">
+              <a:spAutoFit/>
+            </a:bodyPr>
+            <a:lstStyle/>
+            <a:p>
+              <a:r>
+                <a:rPr lang="en-US" sz="600" dirty="0" smtClean="0">
+                  <a:latin typeface="Arial" panose="020B0604020202020204" pitchFamily="34" charset="0"/>
+                  <a:cs typeface="Arial" panose="020B0604020202020204" pitchFamily="34" charset="0"/>
+                </a:rPr>
+                <a:t>€100</a:t>
+              </a:r>
+              <a:endParaRPr lang="en-US" sz="600" dirty="0">
+                <a:latin typeface="Arial" panose="020B0604020202020204" pitchFamily="34" charset="0"/>
+                <a:cs typeface="Arial" panose="020B0604020202020204" pitchFamily="34" charset="0"/>
+              </a:endParaRPr>
+            </a:p>
+          </p:txBody>
+        </p:sp>
+        <p:grpSp>
+          <p:nvGrpSpPr>
+            <p:cNvPr id="177" name="Group 176"/>
+            <p:cNvGrpSpPr/>
+            <p:nvPr/>
+          </p:nvGrpSpPr>
+          <p:grpSpPr>
+            <a:xfrm>
+              <a:off x="4806043" y="1663895"/>
+              <a:ext cx="72000" cy="72000"/>
+              <a:chOff x="4806043" y="1663895"/>
+              <a:chExt cx="72000" cy="72000"/>
+            </a:xfrm>
+          </p:grpSpPr>
+          <p:sp>
+            <p:nvSpPr>
+              <p:cNvPr id="178" name="Rectangle 177"/>
+              <p:cNvSpPr/>
+              <p:nvPr/>
+            </p:nvSpPr>
+            <p:spPr>
+              <a:xfrm>
+                <a:off x="4806043" y="1663895"/>
+                <a:ext cx="72000" cy="72000"/>
+              </a:xfrm>
+              <a:prstGeom prst="rect">
+                <a:avLst/>
+              </a:prstGeom>
+              <a:solidFill>
+                <a:schemeClr val="bg2"/>
+              </a:solidFill>
+              <a:ln w="6350">
+                <a:solidFill>
+                  <a:schemeClr val="accent1">
+                    <a:shade val="50000"/>
+                  </a:schemeClr>
+                </a:solidFill>
+              </a:ln>
+            </p:spPr>
+            <p:style>
+              <a:lnRef idx="2">
+                <a:schemeClr val="accent1">
+                  <a:shade val="50000"/>
+                </a:schemeClr>
+              </a:lnRef>
+              <a:fillRef idx="1">
+                <a:schemeClr val="accent1"/>
+              </a:fillRef>
+              <a:effectRef idx="0">
+                <a:schemeClr val="accent1"/>
+              </a:effectRef>
+              <a:fontRef idx="minor">
+                <a:schemeClr val="lt1"/>
+              </a:fontRef>
+            </p:style>
+            <p:txBody>
+              <a:bodyPr rtlCol="0" anchor="ctr"/>
+              <a:lstStyle/>
+              <a:p>
+                <a:pPr algn="ctr"/>
+                <a:endParaRPr lang="en-US"/>
+              </a:p>
+            </p:txBody>
+          </p:sp>
+          <p:sp>
+            <p:nvSpPr>
+              <p:cNvPr id="179" name="Rectangle 178"/>
+              <p:cNvSpPr/>
+              <p:nvPr/>
+            </p:nvSpPr>
+            <p:spPr>
+              <a:xfrm>
+                <a:off x="4827723" y="1684013"/>
+                <a:ext cx="30597" cy="30597"/>
+              </a:xfrm>
+              <a:prstGeom prst="rect">
+                <a:avLst/>
+              </a:prstGeom>
+              <a:solidFill>
+                <a:schemeClr val="bg2"/>
+              </a:solidFill>
+              <a:ln w="6350">
+                <a:solidFill>
+                  <a:schemeClr val="accent1">
+                    <a:shade val="50000"/>
+                  </a:schemeClr>
+                </a:solidFill>
+              </a:ln>
+            </p:spPr>
+            <p:style>
+              <a:lnRef idx="2">
+                <a:schemeClr val="accent1">
+                  <a:shade val="50000"/>
+                </a:schemeClr>
+              </a:lnRef>
+              <a:fillRef idx="1">
+                <a:schemeClr val="accent1"/>
+              </a:fillRef>
+              <a:effectRef idx="0">
+                <a:schemeClr val="accent1"/>
+              </a:effectRef>
+              <a:fontRef idx="minor">
+                <a:schemeClr val="lt1"/>
+              </a:fontRef>
+            </p:style>
+            <p:txBody>
+              <a:bodyPr rtlCol="0" anchor="ctr"/>
+              <a:lstStyle/>
+              <a:p>
+                <a:pPr algn="ctr"/>
+                <a:endParaRPr lang="en-US"/>
+              </a:p>
+            </p:txBody>
+          </p:sp>
+        </p:grpSp>
+      </p:grpSp>
+      <p:grpSp>
+        <p:nvGrpSpPr>
+          <p:cNvPr id="10" name="Group 9"/>
+          <p:cNvGrpSpPr/>
+          <p:nvPr/>
+        </p:nvGrpSpPr>
+        <p:grpSpPr>
+          <a:xfrm>
+            <a:off x="6353300" y="3493493"/>
+            <a:ext cx="432138" cy="309773"/>
+            <a:chOff x="6353300" y="3493493"/>
+            <a:chExt cx="432138" cy="309773"/>
+          </a:xfrm>
+        </p:grpSpPr>
+        <p:sp>
+          <p:nvSpPr>
+            <p:cNvPr id="876" name="Parallelogram 875"/>
+            <p:cNvSpPr/>
+            <p:nvPr/>
+          </p:nvSpPr>
+          <p:spPr>
+            <a:xfrm>
+              <a:off x="6371329" y="3493493"/>
+              <a:ext cx="414109" cy="237600"/>
+            </a:xfrm>
+            <a:prstGeom prst="parallelogram">
+              <a:avLst/>
+            </a:prstGeom>
+            <a:blipFill>
+              <a:blip r:embed="rId6"/>
+              <a:tile tx="0" ty="0" sx="50000" sy="50000" flip="none" algn="tl"/>
+            </a:blipFill>
+            <a:ln w="6350">
+              <a:solidFill>
+                <a:schemeClr val="bg1">
+                  <a:lumMod val="50000"/>
+                </a:schemeClr>
+              </a:solidFill>
+            </a:ln>
+            <a:effectLst>
+              <a:outerShdw blurRad="50800" dist="38100" dir="2700000" algn="tl" rotWithShape="0">
+                <a:prstClr val="black">
+                  <a:alpha val="40000"/>
+                </a:prstClr>
+              </a:outerShdw>
+            </a:effectLst>
+          </p:spPr>
+          <p:style>
+            <a:lnRef idx="2">
+              <a:schemeClr val="accent1">
+                <a:shade val="50000"/>
+              </a:schemeClr>
+            </a:lnRef>
+            <a:fillRef idx="1">
+              <a:schemeClr val="accent1"/>
+            </a:fillRef>
+            <a:effectRef idx="0">
+              <a:schemeClr val="accent1"/>
+            </a:effectRef>
+            <a:fontRef idx="minor">
+              <a:schemeClr val="lt1"/>
+            </a:fontRef>
+          </p:style>
+          <p:txBody>
+            <a:bodyPr rtlCol="0" anchor="ctr"/>
+            <a:lstStyle/>
+            <a:p>
+              <a:pPr algn="ctr"/>
+              <a:endParaRPr lang="en-US"/>
+            </a:p>
+          </p:txBody>
+        </p:sp>
+        <p:sp>
+          <p:nvSpPr>
+            <p:cNvPr id="180" name="Parallelogram 179"/>
+            <p:cNvSpPr/>
+            <p:nvPr/>
+          </p:nvSpPr>
+          <p:spPr>
+            <a:xfrm>
+              <a:off x="6353300" y="3731266"/>
+              <a:ext cx="370800" cy="72000"/>
+            </a:xfrm>
+            <a:prstGeom prst="parallelogram">
+              <a:avLst/>
+            </a:prstGeom>
+            <a:solidFill>
+              <a:srgbClr val="FDFAC7"/>
+            </a:solidFill>
+            <a:ln w="6350">
+              <a:solidFill>
+                <a:schemeClr val="bg1">
+                  <a:lumMod val="50000"/>
+                </a:schemeClr>
+              </a:solidFill>
+            </a:ln>
+            <a:effectLst>
+              <a:outerShdw blurRad="50800" dist="38100" dir="2700000" algn="tl" rotWithShape="0">
+                <a:prstClr val="black">
+                  <a:alpha val="40000"/>
+                </a:prstClr>
+              </a:outerShdw>
+            </a:effectLst>
+          </p:spPr>
+          <p:style>
+            <a:lnRef idx="2">
+              <a:schemeClr val="accent1">
+                <a:shade val="50000"/>
+              </a:schemeClr>
+            </a:lnRef>
+            <a:fillRef idx="1">
+              <a:schemeClr val="accent1"/>
+            </a:fillRef>
+            <a:effectRef idx="0">
+              <a:schemeClr val="accent1"/>
+            </a:effectRef>
+            <a:fontRef idx="minor">
+              <a:schemeClr val="lt1"/>
+            </a:fontRef>
+          </p:style>
+          <p:txBody>
+            <a:bodyPr rtlCol="0" anchor="ctr"/>
+            <a:lstStyle/>
+            <a:p>
+              <a:pPr algn="ctr"/>
+              <a:endParaRPr lang="en-US"/>
+            </a:p>
+          </p:txBody>
+        </p:sp>
+      </p:grpSp>
     </p:spTree>
     <p:extLst>
       <p:ext uri="{BB962C8B-B14F-4D97-AF65-F5344CB8AC3E}">

</xml_diff>